<commit_message>
Prezentacja - czesc dotyczaca analizy i architektury
</commit_message>
<xml_diff>
--- a/Dokumentacja/Prezentacja.pptx
+++ b/Dokumentacja/Prezentacja.pptx
@@ -6,17 +6,20 @@
   </p:sldMasterIdLst>
   <p:sldIdLst>
     <p:sldId id="256" r:id="rId2"/>
-    <p:sldId id="258" r:id="rId3"/>
-    <p:sldId id="257" r:id="rId4"/>
-    <p:sldId id="260" r:id="rId5"/>
-    <p:sldId id="261" r:id="rId6"/>
-    <p:sldId id="262" r:id="rId7"/>
-    <p:sldId id="263" r:id="rId8"/>
-    <p:sldId id="259" r:id="rId9"/>
-    <p:sldId id="267" r:id="rId10"/>
-    <p:sldId id="266" r:id="rId11"/>
-    <p:sldId id="265" r:id="rId12"/>
-    <p:sldId id="264" r:id="rId13"/>
+    <p:sldId id="268" r:id="rId3"/>
+    <p:sldId id="269" r:id="rId4"/>
+    <p:sldId id="257" r:id="rId5"/>
+    <p:sldId id="258" r:id="rId6"/>
+    <p:sldId id="270" r:id="rId7"/>
+    <p:sldId id="260" r:id="rId8"/>
+    <p:sldId id="261" r:id="rId9"/>
+    <p:sldId id="262" r:id="rId10"/>
+    <p:sldId id="263" r:id="rId11"/>
+    <p:sldId id="259" r:id="rId12"/>
+    <p:sldId id="267" r:id="rId13"/>
+    <p:sldId id="266" r:id="rId14"/>
+    <p:sldId id="265" r:id="rId15"/>
+    <p:sldId id="264" r:id="rId16"/>
   </p:sldIdLst>
   <p:sldSz cx="12192000" cy="6858000"/>
   <p:notesSz cx="6858000" cy="9144000"/>
@@ -125,12 +128,15 @@
         </p14:section>
         <p14:section name="Michał" id="{A2902A61-51AE-4CC9-9019-D119520FE78F}">
           <p14:sldIdLst>
-            <p14:sldId id="258"/>
+            <p14:sldId id="268"/>
+            <p14:sldId id="269"/>
           </p14:sldIdLst>
         </p14:section>
         <p14:section name="Mateusz" id="{98B21B8B-2B80-48DF-8111-74E14636A865}">
           <p14:sldIdLst>
             <p14:sldId id="257"/>
+            <p14:sldId id="258"/>
+            <p14:sldId id="270"/>
             <p14:sldId id="260"/>
             <p14:sldId id="261"/>
             <p14:sldId id="262"/>
@@ -331,7 +337,7 @@
           <a:p>
             <a:fld id="{0823F1F6-3EC5-4136-881D-29FA4BF8200B}" type="datetimeFigureOut">
               <a:rPr lang="pl-PL" smtClean="0"/>
-              <a:t>30.01.2021</a:t>
+              <a:t>31.01.2021</a:t>
             </a:fld>
             <a:endParaRPr lang="pl-PL"/>
           </a:p>
@@ -559,7 +565,7 @@
           <a:p>
             <a:fld id="{0823F1F6-3EC5-4136-881D-29FA4BF8200B}" type="datetimeFigureOut">
               <a:rPr lang="pl-PL" smtClean="0"/>
-              <a:t>30.01.2021</a:t>
+              <a:t>31.01.2021</a:t>
             </a:fld>
             <a:endParaRPr lang="pl-PL"/>
           </a:p>
@@ -739,7 +745,7 @@
           <a:p>
             <a:fld id="{0823F1F6-3EC5-4136-881D-29FA4BF8200B}" type="datetimeFigureOut">
               <a:rPr lang="pl-PL" smtClean="0"/>
-              <a:t>30.01.2021</a:t>
+              <a:t>31.01.2021</a:t>
             </a:fld>
             <a:endParaRPr lang="pl-PL"/>
           </a:p>
@@ -909,7 +915,7 @@
           <a:p>
             <a:fld id="{0823F1F6-3EC5-4136-881D-29FA4BF8200B}" type="datetimeFigureOut">
               <a:rPr lang="pl-PL" smtClean="0"/>
-              <a:t>30.01.2021</a:t>
+              <a:t>31.01.2021</a:t>
             </a:fld>
             <a:endParaRPr lang="pl-PL"/>
           </a:p>
@@ -1163,7 +1169,7 @@
           <a:p>
             <a:fld id="{0823F1F6-3EC5-4136-881D-29FA4BF8200B}" type="datetimeFigureOut">
               <a:rPr lang="pl-PL" smtClean="0"/>
-              <a:t>30.01.2021</a:t>
+              <a:t>31.01.2021</a:t>
             </a:fld>
             <a:endParaRPr lang="pl-PL"/>
           </a:p>
@@ -1489,7 +1495,7 @@
           <a:p>
             <a:fld id="{0823F1F6-3EC5-4136-881D-29FA4BF8200B}" type="datetimeFigureOut">
               <a:rPr lang="pl-PL" smtClean="0"/>
-              <a:t>30.01.2021</a:t>
+              <a:t>31.01.2021</a:t>
             </a:fld>
             <a:endParaRPr lang="pl-PL"/>
           </a:p>
@@ -1940,7 +1946,7 @@
           <a:p>
             <a:fld id="{0823F1F6-3EC5-4136-881D-29FA4BF8200B}" type="datetimeFigureOut">
               <a:rPr lang="pl-PL" smtClean="0"/>
-              <a:t>30.01.2021</a:t>
+              <a:t>31.01.2021</a:t>
             </a:fld>
             <a:endParaRPr lang="pl-PL"/>
           </a:p>
@@ -2058,7 +2064,7 @@
           <a:p>
             <a:fld id="{0823F1F6-3EC5-4136-881D-29FA4BF8200B}" type="datetimeFigureOut">
               <a:rPr lang="pl-PL" smtClean="0"/>
-              <a:t>30.01.2021</a:t>
+              <a:t>31.01.2021</a:t>
             </a:fld>
             <a:endParaRPr lang="pl-PL"/>
           </a:p>
@@ -2153,7 +2159,7 @@
           <a:p>
             <a:fld id="{0823F1F6-3EC5-4136-881D-29FA4BF8200B}" type="datetimeFigureOut">
               <a:rPr lang="pl-PL" smtClean="0"/>
-              <a:t>30.01.2021</a:t>
+              <a:t>31.01.2021</a:t>
             </a:fld>
             <a:endParaRPr lang="pl-PL"/>
           </a:p>
@@ -2440,7 +2446,7 @@
           <a:p>
             <a:fld id="{0823F1F6-3EC5-4136-881D-29FA4BF8200B}" type="datetimeFigureOut">
               <a:rPr lang="pl-PL" smtClean="0"/>
-              <a:t>30.01.2021</a:t>
+              <a:t>31.01.2021</a:t>
             </a:fld>
             <a:endParaRPr lang="pl-PL"/>
           </a:p>
@@ -2762,7 +2768,7 @@
           <a:p>
             <a:fld id="{0823F1F6-3EC5-4136-881D-29FA4BF8200B}" type="datetimeFigureOut">
               <a:rPr lang="pl-PL" smtClean="0"/>
-              <a:t>30.01.2021</a:t>
+              <a:t>31.01.2021</a:t>
             </a:fld>
             <a:endParaRPr lang="pl-PL"/>
           </a:p>
@@ -3016,7 +3022,7 @@
           <a:p>
             <a:fld id="{0823F1F6-3EC5-4136-881D-29FA4BF8200B}" type="datetimeFigureOut">
               <a:rPr lang="pl-PL" smtClean="0"/>
-              <a:t>30.01.2021</a:t>
+              <a:t>31.01.2021</a:t>
             </a:fld>
             <a:endParaRPr lang="pl-PL"/>
           </a:p>
@@ -3554,9 +3560,18 @@
           <a:bodyPr/>
           <a:lstStyle/>
           <a:p>
+            <a:pPr algn="ctr"/>
             <a:r>
               <a:rPr lang="pl-PL" dirty="0"/>
-              <a:t>Projekt zespołowy</a:t>
+              <a:t>Projekt i implementacja systemu wspomagania zarządzaniem firmą wykonującą zakupy „</a:t>
+            </a:r>
+            <a:r>
+              <a:rPr lang="pl-PL" dirty="0" err="1"/>
+              <a:t>Pandronka</a:t>
+            </a:r>
+            <a:r>
+              <a:rPr lang="pl-PL" dirty="0"/>
+              <a:t>”</a:t>
             </a:r>
           </a:p>
         </p:txBody>
@@ -3596,7 +3611,7 @@
           <p:cNvPr id="2" name="Tytuł 1">
             <a:extLst>
               <a:ext uri="{FF2B5EF4-FFF2-40B4-BE49-F238E27FC236}">
-                <a16:creationId xmlns:a16="http://schemas.microsoft.com/office/drawing/2014/main" id="{CE80579C-84DE-48BB-A341-1DEB50393F10}"/>
+                <a16:creationId xmlns:a16="http://schemas.microsoft.com/office/drawing/2014/main" id="{2F655891-0751-43CE-968B-868010D3CF8F}"/>
               </a:ext>
             </a:extLst>
           </p:cNvPr>
@@ -3613,8 +3628,12 @@
           <a:lstStyle/>
           <a:p>
             <a:r>
+              <a:rPr lang="pl-PL" dirty="0" err="1"/>
+              <a:t>Sendgrid</a:t>
+            </a:r>
+            <a:r>
               <a:rPr lang="pl-PL" dirty="0"/>
-              <a:t>Interfejs użytkownika</a:t>
+              <a:t> – e-mail API</a:t>
             </a:r>
           </a:p>
         </p:txBody>
@@ -3624,7 +3643,7 @@
           <p:cNvPr id="3" name="Symbol zastępczy zawartości 2">
             <a:extLst>
               <a:ext uri="{FF2B5EF4-FFF2-40B4-BE49-F238E27FC236}">
-                <a16:creationId xmlns:a16="http://schemas.microsoft.com/office/drawing/2014/main" id="{9EB40BD8-B84F-4FCC-BC21-BC1F26B66D11}"/>
+                <a16:creationId xmlns:a16="http://schemas.microsoft.com/office/drawing/2014/main" id="{9DAF8F79-0520-4A2A-87B3-55CC710E6332}"/>
               </a:ext>
             </a:extLst>
           </p:cNvPr>
@@ -3637,27 +3656,435 @@
         </p:nvSpPr>
         <p:spPr/>
         <p:txBody>
-          <a:bodyPr vert="horz" lIns="91440" tIns="45720" rIns="91440" bIns="45720" rtlCol="0" anchor="t">
-            <a:normAutofit/>
+          <a:bodyPr/>
+          <a:lstStyle/>
+          <a:p>
+            <a:endParaRPr lang="pl-PL" dirty="0"/>
+          </a:p>
+        </p:txBody>
+      </p:sp>
+      <p:sp>
+        <p:nvSpPr>
+          <p:cNvPr id="18" name="Prostokąt: zaokrąglone rogi 17">
+            <a:extLst>
+              <a:ext uri="{FF2B5EF4-FFF2-40B4-BE49-F238E27FC236}">
+                <a16:creationId xmlns:a16="http://schemas.microsoft.com/office/drawing/2014/main" id="{EA86AB15-EF01-471B-A4CE-445339B1B72A}"/>
+              </a:ext>
+            </a:extLst>
+          </p:cNvPr>
+          <p:cNvSpPr/>
+          <p:nvPr/>
+        </p:nvSpPr>
+        <p:spPr>
+          <a:xfrm>
+            <a:off x="1159252" y="2965201"/>
+            <a:ext cx="1776549" cy="862149"/>
+          </a:xfrm>
+          <a:prstGeom prst="roundRect">
+            <a:avLst/>
+          </a:prstGeom>
+        </p:spPr>
+        <p:style>
+          <a:lnRef idx="2">
+            <a:schemeClr val="accent1">
+              <a:shade val="50000"/>
+            </a:schemeClr>
+          </a:lnRef>
+          <a:fillRef idx="1">
+            <a:schemeClr val="accent1"/>
+          </a:fillRef>
+          <a:effectRef idx="0">
+            <a:schemeClr val="accent1"/>
+          </a:effectRef>
+          <a:fontRef idx="minor">
+            <a:schemeClr val="lt1"/>
+          </a:fontRef>
+        </p:style>
+        <p:txBody>
+          <a:bodyPr rtlCol="0" anchor="ctr"/>
+          <a:lstStyle/>
+          <a:p>
+            <a:pPr algn="ctr"/>
+            <a:r>
+              <a:rPr lang="pl-PL" dirty="0"/>
+              <a:t>Aplikacja </a:t>
+            </a:r>
+            <a:r>
+              <a:rPr lang="pl-PL" dirty="0" err="1"/>
+              <a:t>ASP.Net</a:t>
+            </a:r>
+            <a:r>
+              <a:rPr lang="pl-PL" dirty="0"/>
+              <a:t> </a:t>
+            </a:r>
+            <a:r>
+              <a:rPr lang="pl-PL" dirty="0" err="1"/>
+              <a:t>Core</a:t>
+            </a:r>
+            <a:endParaRPr lang="pl-PL" dirty="0"/>
+          </a:p>
+        </p:txBody>
+      </p:sp>
+      <p:sp>
+        <p:nvSpPr>
+          <p:cNvPr id="19" name="Prostokąt: zaokrąglone rogi 18">
+            <a:extLst>
+              <a:ext uri="{FF2B5EF4-FFF2-40B4-BE49-F238E27FC236}">
+                <a16:creationId xmlns:a16="http://schemas.microsoft.com/office/drawing/2014/main" id="{2246912C-58E9-4B5F-B2A1-6CC9918CA29A}"/>
+              </a:ext>
+            </a:extLst>
+          </p:cNvPr>
+          <p:cNvSpPr/>
+          <p:nvPr/>
+        </p:nvSpPr>
+        <p:spPr>
+          <a:xfrm>
+            <a:off x="992778" y="4737397"/>
+            <a:ext cx="2117195" cy="862149"/>
+          </a:xfrm>
+          <a:prstGeom prst="roundRect">
+            <a:avLst/>
+          </a:prstGeom>
+        </p:spPr>
+        <p:style>
+          <a:lnRef idx="2">
+            <a:schemeClr val="accent1">
+              <a:shade val="50000"/>
+            </a:schemeClr>
+          </a:lnRef>
+          <a:fillRef idx="1">
+            <a:schemeClr val="accent1"/>
+          </a:fillRef>
+          <a:effectRef idx="0">
+            <a:schemeClr val="accent1"/>
+          </a:effectRef>
+          <a:fontRef idx="minor">
+            <a:schemeClr val="lt1"/>
+          </a:fontRef>
+        </p:style>
+        <p:txBody>
+          <a:bodyPr rtlCol="0" anchor="ctr"/>
+          <a:lstStyle/>
+          <a:p>
+            <a:pPr algn="ctr"/>
+            <a:r>
+              <a:rPr lang="pl-PL" dirty="0" err="1"/>
+              <a:t>EmailOptions</a:t>
+            </a:r>
+            <a:r>
+              <a:rPr lang="pl-PL" dirty="0"/>
+              <a:t> i </a:t>
+            </a:r>
+            <a:r>
+              <a:rPr lang="pl-PL" dirty="0" err="1"/>
+              <a:t>SendGridClient</a:t>
+            </a:r>
+            <a:endParaRPr lang="pl-PL" dirty="0"/>
+          </a:p>
+        </p:txBody>
+      </p:sp>
+      <p:sp>
+        <p:nvSpPr>
+          <p:cNvPr id="20" name="Prostokąt: zaokrąglone rogi 19">
+            <a:extLst>
+              <a:ext uri="{FF2B5EF4-FFF2-40B4-BE49-F238E27FC236}">
+                <a16:creationId xmlns:a16="http://schemas.microsoft.com/office/drawing/2014/main" id="{BBDCCE45-A743-4D23-B85E-E79E9AEC9BA3}"/>
+              </a:ext>
+            </a:extLst>
+          </p:cNvPr>
+          <p:cNvSpPr/>
+          <p:nvPr/>
+        </p:nvSpPr>
+        <p:spPr>
+          <a:xfrm>
+            <a:off x="4573011" y="4737397"/>
+            <a:ext cx="1776549" cy="862149"/>
+          </a:xfrm>
+          <a:prstGeom prst="roundRect">
+            <a:avLst/>
+          </a:prstGeom>
+        </p:spPr>
+        <p:style>
+          <a:lnRef idx="2">
+            <a:schemeClr val="accent1">
+              <a:shade val="50000"/>
+            </a:schemeClr>
+          </a:lnRef>
+          <a:fillRef idx="1">
+            <a:schemeClr val="accent1"/>
+          </a:fillRef>
+          <a:effectRef idx="0">
+            <a:schemeClr val="accent1"/>
+          </a:effectRef>
+          <a:fontRef idx="minor">
+            <a:schemeClr val="lt1"/>
+          </a:fontRef>
+        </p:style>
+        <p:txBody>
+          <a:bodyPr rtlCol="0" anchor="ctr"/>
+          <a:lstStyle/>
+          <a:p>
+            <a:pPr algn="ctr"/>
+            <a:r>
+              <a:rPr lang="pl-PL" dirty="0" err="1"/>
+              <a:t>Sendgrid</a:t>
+            </a:r>
+            <a:r>
+              <a:rPr lang="pl-PL" dirty="0"/>
+              <a:t> API</a:t>
+            </a:r>
+          </a:p>
+        </p:txBody>
+      </p:sp>
+      <p:sp>
+        <p:nvSpPr>
+          <p:cNvPr id="21" name="Strzałka: w prawo 20">
+            <a:extLst>
+              <a:ext uri="{FF2B5EF4-FFF2-40B4-BE49-F238E27FC236}">
+                <a16:creationId xmlns:a16="http://schemas.microsoft.com/office/drawing/2014/main" id="{2FD987A4-2A1C-4D8F-81B4-5461D7BB13D6}"/>
+              </a:ext>
+            </a:extLst>
+          </p:cNvPr>
+          <p:cNvSpPr/>
+          <p:nvPr/>
+        </p:nvSpPr>
+        <p:spPr>
+          <a:xfrm rot="5400000">
+            <a:off x="1706839" y="4167176"/>
+            <a:ext cx="681372" cy="324075"/>
+          </a:xfrm>
+          <a:prstGeom prst="rightArrow">
+            <a:avLst/>
+          </a:prstGeom>
+        </p:spPr>
+        <p:style>
+          <a:lnRef idx="2">
+            <a:schemeClr val="accent1">
+              <a:shade val="50000"/>
+            </a:schemeClr>
+          </a:lnRef>
+          <a:fillRef idx="1">
+            <a:schemeClr val="accent1"/>
+          </a:fillRef>
+          <a:effectRef idx="0">
+            <a:schemeClr val="accent1"/>
+          </a:effectRef>
+          <a:fontRef idx="minor">
+            <a:schemeClr val="lt1"/>
+          </a:fontRef>
+        </p:style>
+        <p:txBody>
+          <a:bodyPr rtlCol="0" anchor="ctr"/>
+          <a:lstStyle/>
+          <a:p>
+            <a:pPr algn="ctr"/>
+            <a:endParaRPr lang="pl-PL"/>
+          </a:p>
+        </p:txBody>
+      </p:sp>
+      <p:sp>
+        <p:nvSpPr>
+          <p:cNvPr id="22" name="pole tekstowe 21">
+            <a:extLst>
+              <a:ext uri="{FF2B5EF4-FFF2-40B4-BE49-F238E27FC236}">
+                <a16:creationId xmlns:a16="http://schemas.microsoft.com/office/drawing/2014/main" id="{D8313037-F6A8-4AA0-9C67-F14B8C019E94}"/>
+              </a:ext>
+            </a:extLst>
+          </p:cNvPr>
+          <p:cNvSpPr txBox="1"/>
+          <p:nvPr/>
+        </p:nvSpPr>
+        <p:spPr>
+          <a:xfrm>
+            <a:off x="2138966" y="4035313"/>
+            <a:ext cx="1098378" cy="369332"/>
+          </a:xfrm>
+          <a:prstGeom prst="rect">
+            <a:avLst/>
+          </a:prstGeom>
+          <a:noFill/>
+        </p:spPr>
+        <p:txBody>
+          <a:bodyPr wrap="none" rtlCol="0">
+            <a:spAutoFit/>
           </a:bodyPr>
           <a:lstStyle/>
           <a:p>
             <a:r>
-              <a:rPr lang="pl-PL"/>
-              <a:t>Partial views - przykład TableButtonPartial </a:t>
-            </a:r>
-          </a:p>
-          <a:p>
-            <a:endParaRPr lang="pl-PL" dirty="0"/>
+              <a:rPr lang="pl-PL" dirty="0"/>
+              <a:t>korzysta</a:t>
+            </a:r>
+          </a:p>
+        </p:txBody>
+      </p:sp>
+      <p:sp>
+        <p:nvSpPr>
+          <p:cNvPr id="23" name="Strzałka: w prawo 22">
+            <a:extLst>
+              <a:ext uri="{FF2B5EF4-FFF2-40B4-BE49-F238E27FC236}">
+                <a16:creationId xmlns:a16="http://schemas.microsoft.com/office/drawing/2014/main" id="{35893DB5-D33E-411D-8DEC-3300C1D3939B}"/>
+              </a:ext>
+            </a:extLst>
+          </p:cNvPr>
+          <p:cNvSpPr/>
+          <p:nvPr/>
+        </p:nvSpPr>
+        <p:spPr>
+          <a:xfrm>
+            <a:off x="3262372" y="4737397"/>
+            <a:ext cx="1158240" cy="324075"/>
+          </a:xfrm>
+          <a:prstGeom prst="rightArrow">
+            <a:avLst/>
+          </a:prstGeom>
+        </p:spPr>
+        <p:style>
+          <a:lnRef idx="2">
+            <a:schemeClr val="accent1">
+              <a:shade val="50000"/>
+            </a:schemeClr>
+          </a:lnRef>
+          <a:fillRef idx="1">
+            <a:schemeClr val="accent1"/>
+          </a:fillRef>
+          <a:effectRef idx="0">
+            <a:schemeClr val="accent1"/>
+          </a:effectRef>
+          <a:fontRef idx="minor">
+            <a:schemeClr val="lt1"/>
+          </a:fontRef>
+        </p:style>
+        <p:txBody>
+          <a:bodyPr rtlCol="0" anchor="ctr"/>
+          <a:lstStyle/>
+          <a:p>
+            <a:pPr algn="ctr"/>
+            <a:endParaRPr lang="pl-PL"/>
+          </a:p>
+        </p:txBody>
+      </p:sp>
+      <p:sp>
+        <p:nvSpPr>
+          <p:cNvPr id="24" name="pole tekstowe 23">
+            <a:extLst>
+              <a:ext uri="{FF2B5EF4-FFF2-40B4-BE49-F238E27FC236}">
+                <a16:creationId xmlns:a16="http://schemas.microsoft.com/office/drawing/2014/main" id="{339606C3-A802-4E75-8122-C981DB4F320A}"/>
+              </a:ext>
+            </a:extLst>
+          </p:cNvPr>
+          <p:cNvSpPr txBox="1"/>
+          <p:nvPr/>
+        </p:nvSpPr>
+        <p:spPr>
+          <a:xfrm>
+            <a:off x="3191546" y="4435077"/>
+            <a:ext cx="1180131" cy="369332"/>
+          </a:xfrm>
+          <a:prstGeom prst="rect">
+            <a:avLst/>
+          </a:prstGeom>
+          <a:noFill/>
+        </p:spPr>
+        <p:txBody>
+          <a:bodyPr wrap="none" rtlCol="0">
+            <a:spAutoFit/>
+          </a:bodyPr>
+          <a:lstStyle/>
+          <a:p>
+            <a:r>
+              <a:rPr lang="pl-PL" dirty="0"/>
+              <a:t>wywołuje</a:t>
+            </a:r>
+          </a:p>
+        </p:txBody>
+      </p:sp>
+      <p:sp>
+        <p:nvSpPr>
+          <p:cNvPr id="25" name="Strzałka: w prawo 24">
+            <a:extLst>
+              <a:ext uri="{FF2B5EF4-FFF2-40B4-BE49-F238E27FC236}">
+                <a16:creationId xmlns:a16="http://schemas.microsoft.com/office/drawing/2014/main" id="{69227147-1B23-4C79-AB39-AADABF45E6BF}"/>
+              </a:ext>
+            </a:extLst>
+          </p:cNvPr>
+          <p:cNvSpPr/>
+          <p:nvPr/>
+        </p:nvSpPr>
+        <p:spPr>
+          <a:xfrm rot="10800000">
+            <a:off x="3202492" y="5275471"/>
+            <a:ext cx="1158240" cy="324075"/>
+          </a:xfrm>
+          <a:prstGeom prst="rightArrow">
+            <a:avLst/>
+          </a:prstGeom>
+        </p:spPr>
+        <p:style>
+          <a:lnRef idx="2">
+            <a:schemeClr val="accent1">
+              <a:shade val="50000"/>
+            </a:schemeClr>
+          </a:lnRef>
+          <a:fillRef idx="1">
+            <a:schemeClr val="accent1"/>
+          </a:fillRef>
+          <a:effectRef idx="0">
+            <a:schemeClr val="accent1"/>
+          </a:effectRef>
+          <a:fontRef idx="minor">
+            <a:schemeClr val="lt1"/>
+          </a:fontRef>
+        </p:style>
+        <p:txBody>
+          <a:bodyPr rtlCol="0" anchor="ctr"/>
+          <a:lstStyle/>
+          <a:p>
+            <a:pPr algn="ctr"/>
+            <a:endParaRPr lang="pl-PL"/>
+          </a:p>
+        </p:txBody>
+      </p:sp>
+      <p:sp>
+        <p:nvSpPr>
+          <p:cNvPr id="26" name="pole tekstowe 25">
+            <a:extLst>
+              <a:ext uri="{FF2B5EF4-FFF2-40B4-BE49-F238E27FC236}">
+                <a16:creationId xmlns:a16="http://schemas.microsoft.com/office/drawing/2014/main" id="{AC9D4ED4-CC2D-41A0-AE13-D31D53B6C26E}"/>
+              </a:ext>
+            </a:extLst>
+          </p:cNvPr>
+          <p:cNvSpPr txBox="1"/>
+          <p:nvPr/>
+        </p:nvSpPr>
+        <p:spPr>
+          <a:xfrm>
+            <a:off x="3191546" y="5532534"/>
+            <a:ext cx="1322798" cy="369332"/>
+          </a:xfrm>
+          <a:prstGeom prst="rect">
+            <a:avLst/>
+          </a:prstGeom>
+          <a:noFill/>
+        </p:spPr>
+        <p:txBody>
+          <a:bodyPr wrap="none" rtlCol="0">
+            <a:spAutoFit/>
+          </a:bodyPr>
+          <a:lstStyle/>
+          <a:p>
+            <a:r>
+              <a:rPr lang="pl-PL" dirty="0"/>
+              <a:t>odpowiada</a:t>
+            </a:r>
           </a:p>
         </p:txBody>
       </p:sp>
       <p:pic>
         <p:nvPicPr>
-          <p:cNvPr id="5" name="Obraz 5" descr="Obraz zawierający tekst&#10;&#10;Opis wygenerowany automatycznie">
+          <p:cNvPr id="27" name="Obraz 26">
             <a:extLst>
               <a:ext uri="{FF2B5EF4-FFF2-40B4-BE49-F238E27FC236}">
-                <a16:creationId xmlns:a16="http://schemas.microsoft.com/office/drawing/2014/main" id="{566C36B5-CDA8-4FB3-ACD9-E73BA69B628E}"/>
+                <a16:creationId xmlns:a16="http://schemas.microsoft.com/office/drawing/2014/main" id="{374D52F0-9196-44C9-B821-78242C54DC2A}"/>
               </a:ext>
             </a:extLst>
           </p:cNvPr>
@@ -3674,8 +4101,8 @@
         </p:blipFill>
         <p:spPr>
           <a:xfrm>
-            <a:off x="1382486" y="2342698"/>
-            <a:ext cx="4659085" cy="1867806"/>
+            <a:off x="6246270" y="2069138"/>
+            <a:ext cx="3929805" cy="2335507"/>
           </a:xfrm>
           <a:prstGeom prst="rect">
             <a:avLst/>
@@ -3685,7 +4112,7 @@
     </p:spTree>
     <p:extLst>
       <p:ext uri="{BB962C8B-B14F-4D97-AF65-F5344CB8AC3E}">
-        <p14:creationId xmlns:p14="http://schemas.microsoft.com/office/powerpoint/2010/main" val="2630863259"/>
+        <p14:creationId xmlns:p14="http://schemas.microsoft.com/office/powerpoint/2010/main" val="1061040325"/>
       </p:ext>
     </p:extLst>
   </p:cSld>
@@ -3717,6 +4144,399 @@
           <p:cNvPr id="2" name="Tytuł 1">
             <a:extLst>
               <a:ext uri="{FF2B5EF4-FFF2-40B4-BE49-F238E27FC236}">
+                <a16:creationId xmlns:a16="http://schemas.microsoft.com/office/drawing/2014/main" id="{CE80579C-84DE-48BB-A341-1DEB50393F10}"/>
+              </a:ext>
+            </a:extLst>
+          </p:cNvPr>
+          <p:cNvSpPr>
+            <a:spLocks noGrp="1"/>
+          </p:cNvSpPr>
+          <p:nvPr>
+            <p:ph type="title"/>
+          </p:nvPr>
+        </p:nvSpPr>
+        <p:spPr/>
+        <p:txBody>
+          <a:bodyPr/>
+          <a:lstStyle/>
+          <a:p>
+            <a:r>
+              <a:rPr lang="pl-PL" dirty="0"/>
+              <a:t>Interfejs użytkownika</a:t>
+            </a:r>
+          </a:p>
+        </p:txBody>
+      </p:sp>
+      <p:sp>
+        <p:nvSpPr>
+          <p:cNvPr id="3" name="Symbol zastępczy zawartości 2">
+            <a:extLst>
+              <a:ext uri="{FF2B5EF4-FFF2-40B4-BE49-F238E27FC236}">
+                <a16:creationId xmlns:a16="http://schemas.microsoft.com/office/drawing/2014/main" id="{9EB40BD8-B84F-4FCC-BC21-BC1F26B66D11}"/>
+              </a:ext>
+            </a:extLst>
+          </p:cNvPr>
+          <p:cNvSpPr>
+            <a:spLocks noGrp="1"/>
+          </p:cNvSpPr>
+          <p:nvPr>
+            <p:ph idx="1"/>
+          </p:nvPr>
+        </p:nvSpPr>
+        <p:spPr/>
+        <p:txBody>
+          <a:bodyPr vert="horz" lIns="91440" tIns="45720" rIns="91440" bIns="45720" rtlCol="0" anchor="t">
+            <a:normAutofit/>
+          </a:bodyPr>
+          <a:lstStyle/>
+          <a:p>
+            <a:r>
+              <a:rPr lang="pl-PL"/>
+              <a:t>Razor Pages </a:t>
+            </a:r>
+            <a:endParaRPr lang="pl-PL" dirty="0"/>
+          </a:p>
+          <a:p>
+            <a:r>
+              <a:rPr lang="pl-PL"/>
+              <a:t>Bootstrap</a:t>
+            </a:r>
+            <a:endParaRPr lang="pl-PL" dirty="0"/>
+          </a:p>
+          <a:p>
+            <a:pPr marL="0" indent="0">
+              <a:buNone/>
+            </a:pPr>
+            <a:endParaRPr lang="pl-PL" dirty="0"/>
+          </a:p>
+          <a:p>
+            <a:endParaRPr lang="pl-PL" dirty="0"/>
+          </a:p>
+          <a:p>
+            <a:endParaRPr lang="pl-PL" dirty="0"/>
+          </a:p>
+        </p:txBody>
+      </p:sp>
+    </p:spTree>
+    <p:extLst>
+      <p:ext uri="{BB962C8B-B14F-4D97-AF65-F5344CB8AC3E}">
+        <p14:creationId xmlns:p14="http://schemas.microsoft.com/office/powerpoint/2010/main" val="2830796625"/>
+      </p:ext>
+    </p:extLst>
+  </p:cSld>
+  <p:clrMapOvr>
+    <a:masterClrMapping/>
+  </p:clrMapOvr>
+</p:sld>
+</file>
+
+<file path=ppt/slides/slide12.xml><?xml version="1.0" encoding="utf-8"?>
+<p:sld xmlns:a="http://schemas.openxmlformats.org/drawingml/2006/main" xmlns:r="http://schemas.openxmlformats.org/officeDocument/2006/relationships" xmlns:p="http://schemas.openxmlformats.org/presentationml/2006/main">
+  <p:cSld>
+    <p:spTree>
+      <p:nvGrpSpPr>
+        <p:cNvPr id="1" name=""/>
+        <p:cNvGrpSpPr/>
+        <p:nvPr/>
+      </p:nvGrpSpPr>
+      <p:grpSpPr>
+        <a:xfrm>
+          <a:off x="0" y="0"/>
+          <a:ext cx="0" cy="0"/>
+          <a:chOff x="0" y="0"/>
+          <a:chExt cx="0" cy="0"/>
+        </a:xfrm>
+      </p:grpSpPr>
+      <p:sp>
+        <p:nvSpPr>
+          <p:cNvPr id="2" name="Tytuł 1">
+            <a:extLst>
+              <a:ext uri="{FF2B5EF4-FFF2-40B4-BE49-F238E27FC236}">
+                <a16:creationId xmlns:a16="http://schemas.microsoft.com/office/drawing/2014/main" id="{CE80579C-84DE-48BB-A341-1DEB50393F10}"/>
+              </a:ext>
+            </a:extLst>
+          </p:cNvPr>
+          <p:cNvSpPr>
+            <a:spLocks noGrp="1"/>
+          </p:cNvSpPr>
+          <p:nvPr>
+            <p:ph type="title"/>
+          </p:nvPr>
+        </p:nvSpPr>
+        <p:spPr/>
+        <p:txBody>
+          <a:bodyPr/>
+          <a:lstStyle/>
+          <a:p>
+            <a:r>
+              <a:rPr lang="pl-PL" dirty="0"/>
+              <a:t>Interfejs użytkownika</a:t>
+            </a:r>
+          </a:p>
+        </p:txBody>
+      </p:sp>
+      <p:sp>
+        <p:nvSpPr>
+          <p:cNvPr id="3" name="Symbol zastępczy zawartości 2">
+            <a:extLst>
+              <a:ext uri="{FF2B5EF4-FFF2-40B4-BE49-F238E27FC236}">
+                <a16:creationId xmlns:a16="http://schemas.microsoft.com/office/drawing/2014/main" id="{9EB40BD8-B84F-4FCC-BC21-BC1F26B66D11}"/>
+              </a:ext>
+            </a:extLst>
+          </p:cNvPr>
+          <p:cNvSpPr>
+            <a:spLocks noGrp="1"/>
+          </p:cNvSpPr>
+          <p:nvPr>
+            <p:ph idx="1"/>
+          </p:nvPr>
+        </p:nvSpPr>
+        <p:spPr/>
+        <p:txBody>
+          <a:bodyPr vert="horz" lIns="91440" tIns="45720" rIns="91440" bIns="45720" rtlCol="0" anchor="t">
+            <a:normAutofit/>
+          </a:bodyPr>
+          <a:lstStyle/>
+          <a:p>
+            <a:r>
+              <a:rPr lang="pl-PL"/>
+              <a:t>Struktura Areas oraz Shared</a:t>
+            </a:r>
+            <a:endParaRPr lang="pl-PL" dirty="0"/>
+          </a:p>
+          <a:p>
+            <a:endParaRPr lang="pl-PL" dirty="0"/>
+          </a:p>
+          <a:p>
+            <a:pPr marL="0" indent="0">
+              <a:buNone/>
+            </a:pPr>
+            <a:endParaRPr lang="pl-PL" dirty="0"/>
+          </a:p>
+          <a:p>
+            <a:endParaRPr lang="pl-PL" dirty="0"/>
+          </a:p>
+          <a:p>
+            <a:endParaRPr lang="pl-PL" dirty="0"/>
+          </a:p>
+        </p:txBody>
+      </p:sp>
+      <p:pic>
+        <p:nvPicPr>
+          <p:cNvPr id="4" name="Obraz 4">
+            <a:extLst>
+              <a:ext uri="{FF2B5EF4-FFF2-40B4-BE49-F238E27FC236}">
+                <a16:creationId xmlns:a16="http://schemas.microsoft.com/office/drawing/2014/main" id="{4782A249-DCEB-406B-8B94-60F25E6C25D7}"/>
+              </a:ext>
+            </a:extLst>
+          </p:cNvPr>
+          <p:cNvPicPr>
+            <a:picLocks noChangeAspect="1"/>
+          </p:cNvPicPr>
+          <p:nvPr/>
+        </p:nvPicPr>
+        <p:blipFill>
+          <a:blip r:embed="rId2"/>
+          <a:stretch>
+            <a:fillRect/>
+          </a:stretch>
+        </p:blipFill>
+        <p:spPr>
+          <a:xfrm>
+            <a:off x="1390716" y="2394857"/>
+            <a:ext cx="3575826" cy="3635829"/>
+          </a:xfrm>
+          <a:prstGeom prst="rect">
+            <a:avLst/>
+          </a:prstGeom>
+        </p:spPr>
+      </p:pic>
+      <p:pic>
+        <p:nvPicPr>
+          <p:cNvPr id="5" name="Obraz 5" descr="Obraz zawierający stół&#10;&#10;Opis wygenerowany automatycznie">
+            <a:extLst>
+              <a:ext uri="{FF2B5EF4-FFF2-40B4-BE49-F238E27FC236}">
+                <a16:creationId xmlns:a16="http://schemas.microsoft.com/office/drawing/2014/main" id="{4FE5F266-E2C3-4CA1-8EEB-250776E6772F}"/>
+              </a:ext>
+            </a:extLst>
+          </p:cNvPr>
+          <p:cNvPicPr>
+            <a:picLocks noChangeAspect="1"/>
+          </p:cNvPicPr>
+          <p:nvPr/>
+        </p:nvPicPr>
+        <p:blipFill>
+          <a:blip r:embed="rId3"/>
+          <a:stretch>
+            <a:fillRect/>
+          </a:stretch>
+        </p:blipFill>
+        <p:spPr>
+          <a:xfrm>
+            <a:off x="6528707" y="2287360"/>
+            <a:ext cx="3565071" cy="3676650"/>
+          </a:xfrm>
+          <a:prstGeom prst="rect">
+            <a:avLst/>
+          </a:prstGeom>
+        </p:spPr>
+      </p:pic>
+    </p:spTree>
+    <p:extLst>
+      <p:ext uri="{BB962C8B-B14F-4D97-AF65-F5344CB8AC3E}">
+        <p14:creationId xmlns:p14="http://schemas.microsoft.com/office/powerpoint/2010/main" val="419028080"/>
+      </p:ext>
+    </p:extLst>
+  </p:cSld>
+  <p:clrMapOvr>
+    <a:masterClrMapping/>
+  </p:clrMapOvr>
+</p:sld>
+</file>
+
+<file path=ppt/slides/slide13.xml><?xml version="1.0" encoding="utf-8"?>
+<p:sld xmlns:a="http://schemas.openxmlformats.org/drawingml/2006/main" xmlns:r="http://schemas.openxmlformats.org/officeDocument/2006/relationships" xmlns:p="http://schemas.openxmlformats.org/presentationml/2006/main">
+  <p:cSld>
+    <p:spTree>
+      <p:nvGrpSpPr>
+        <p:cNvPr id="1" name=""/>
+        <p:cNvGrpSpPr/>
+        <p:nvPr/>
+      </p:nvGrpSpPr>
+      <p:grpSpPr>
+        <a:xfrm>
+          <a:off x="0" y="0"/>
+          <a:ext cx="0" cy="0"/>
+          <a:chOff x="0" y="0"/>
+          <a:chExt cx="0" cy="0"/>
+        </a:xfrm>
+      </p:grpSpPr>
+      <p:sp>
+        <p:nvSpPr>
+          <p:cNvPr id="2" name="Tytuł 1">
+            <a:extLst>
+              <a:ext uri="{FF2B5EF4-FFF2-40B4-BE49-F238E27FC236}">
+                <a16:creationId xmlns:a16="http://schemas.microsoft.com/office/drawing/2014/main" id="{CE80579C-84DE-48BB-A341-1DEB50393F10}"/>
+              </a:ext>
+            </a:extLst>
+          </p:cNvPr>
+          <p:cNvSpPr>
+            <a:spLocks noGrp="1"/>
+          </p:cNvSpPr>
+          <p:nvPr>
+            <p:ph type="title"/>
+          </p:nvPr>
+        </p:nvSpPr>
+        <p:spPr/>
+        <p:txBody>
+          <a:bodyPr/>
+          <a:lstStyle/>
+          <a:p>
+            <a:r>
+              <a:rPr lang="pl-PL" dirty="0"/>
+              <a:t>Interfejs użytkownika</a:t>
+            </a:r>
+          </a:p>
+        </p:txBody>
+      </p:sp>
+      <p:sp>
+        <p:nvSpPr>
+          <p:cNvPr id="3" name="Symbol zastępczy zawartości 2">
+            <a:extLst>
+              <a:ext uri="{FF2B5EF4-FFF2-40B4-BE49-F238E27FC236}">
+                <a16:creationId xmlns:a16="http://schemas.microsoft.com/office/drawing/2014/main" id="{9EB40BD8-B84F-4FCC-BC21-BC1F26B66D11}"/>
+              </a:ext>
+            </a:extLst>
+          </p:cNvPr>
+          <p:cNvSpPr>
+            <a:spLocks noGrp="1"/>
+          </p:cNvSpPr>
+          <p:nvPr>
+            <p:ph idx="1"/>
+          </p:nvPr>
+        </p:nvSpPr>
+        <p:spPr/>
+        <p:txBody>
+          <a:bodyPr vert="horz" lIns="91440" tIns="45720" rIns="91440" bIns="45720" rtlCol="0" anchor="t">
+            <a:normAutofit/>
+          </a:bodyPr>
+          <a:lstStyle/>
+          <a:p>
+            <a:r>
+              <a:rPr lang="pl-PL"/>
+              <a:t>Partial views - przykład TableButtonPartial </a:t>
+            </a:r>
+          </a:p>
+          <a:p>
+            <a:endParaRPr lang="pl-PL" dirty="0"/>
+          </a:p>
+        </p:txBody>
+      </p:sp>
+      <p:pic>
+        <p:nvPicPr>
+          <p:cNvPr id="5" name="Obraz 5" descr="Obraz zawierający tekst&#10;&#10;Opis wygenerowany automatycznie">
+            <a:extLst>
+              <a:ext uri="{FF2B5EF4-FFF2-40B4-BE49-F238E27FC236}">
+                <a16:creationId xmlns:a16="http://schemas.microsoft.com/office/drawing/2014/main" id="{566C36B5-CDA8-4FB3-ACD9-E73BA69B628E}"/>
+              </a:ext>
+            </a:extLst>
+          </p:cNvPr>
+          <p:cNvPicPr>
+            <a:picLocks noChangeAspect="1"/>
+          </p:cNvPicPr>
+          <p:nvPr/>
+        </p:nvPicPr>
+        <p:blipFill>
+          <a:blip r:embed="rId2"/>
+          <a:stretch>
+            <a:fillRect/>
+          </a:stretch>
+        </p:blipFill>
+        <p:spPr>
+          <a:xfrm>
+            <a:off x="1382486" y="2342698"/>
+            <a:ext cx="4659085" cy="1867806"/>
+          </a:xfrm>
+          <a:prstGeom prst="rect">
+            <a:avLst/>
+          </a:prstGeom>
+        </p:spPr>
+      </p:pic>
+    </p:spTree>
+    <p:extLst>
+      <p:ext uri="{BB962C8B-B14F-4D97-AF65-F5344CB8AC3E}">
+        <p14:creationId xmlns:p14="http://schemas.microsoft.com/office/powerpoint/2010/main" val="2630863259"/>
+      </p:ext>
+    </p:extLst>
+  </p:cSld>
+  <p:clrMapOvr>
+    <a:masterClrMapping/>
+  </p:clrMapOvr>
+</p:sld>
+</file>
+
+<file path=ppt/slides/slide14.xml><?xml version="1.0" encoding="utf-8"?>
+<p:sld xmlns:a="http://schemas.openxmlformats.org/drawingml/2006/main" xmlns:r="http://schemas.openxmlformats.org/officeDocument/2006/relationships" xmlns:p="http://schemas.openxmlformats.org/presentationml/2006/main">
+  <p:cSld>
+    <p:spTree>
+      <p:nvGrpSpPr>
+        <p:cNvPr id="1" name=""/>
+        <p:cNvGrpSpPr/>
+        <p:nvPr/>
+      </p:nvGrpSpPr>
+      <p:grpSpPr>
+        <a:xfrm>
+          <a:off x="0" y="0"/>
+          <a:ext cx="0" cy="0"/>
+          <a:chOff x="0" y="0"/>
+          <a:chExt cx="0" cy="0"/>
+        </a:xfrm>
+      </p:grpSpPr>
+      <p:sp>
+        <p:nvSpPr>
+          <p:cNvPr id="2" name="Tytuł 1">
+            <a:extLst>
+              <a:ext uri="{FF2B5EF4-FFF2-40B4-BE49-F238E27FC236}">
                 <a16:creationId xmlns:a16="http://schemas.microsoft.com/office/drawing/2014/main" id="{2854C2B8-898B-451F-850B-1B4366F27292}"/>
               </a:ext>
             </a:extLst>
@@ -3836,7 +4656,7 @@
 </p:sld>
 </file>
 
-<file path=ppt/slides/slide12.xml><?xml version="1.0" encoding="utf-8"?>
+<file path=ppt/slides/slide15.xml><?xml version="1.0" encoding="utf-8"?>
 <p:sld xmlns:a="http://schemas.openxmlformats.org/drawingml/2006/main" xmlns:r="http://schemas.openxmlformats.org/officeDocument/2006/relationships" xmlns:p="http://schemas.openxmlformats.org/presentationml/2006/main">
   <p:cSld>
     <p:spTree>
@@ -4008,7 +4828,7 @@
           <p:cNvPr id="2" name="Tytuł 1">
             <a:extLst>
               <a:ext uri="{FF2B5EF4-FFF2-40B4-BE49-F238E27FC236}">
-                <a16:creationId xmlns:a16="http://schemas.microsoft.com/office/drawing/2014/main" id="{F995F813-BE46-4B51-964A-C892A479182A}"/>
+                <a16:creationId xmlns:a16="http://schemas.microsoft.com/office/drawing/2014/main" id="{F5E69F03-C880-46CF-9017-F222DB5E2B4F}"/>
               </a:ext>
             </a:extLst>
           </p:cNvPr>
@@ -4026,17 +4846,17 @@
           <a:p>
             <a:r>
               <a:rPr lang="pl-PL" dirty="0"/>
-              <a:t>O projekcie</a:t>
-            </a:r>
-          </a:p>
-        </p:txBody>
-      </p:sp>
-      <p:sp>
-        <p:nvSpPr>
-          <p:cNvPr id="3" name="Symbol zastępczy zawartości 2">
+              <a:t>Analiza  - wymagane funkcje</a:t>
+            </a:r>
+          </a:p>
+        </p:txBody>
+      </p:sp>
+      <p:sp>
+        <p:nvSpPr>
+          <p:cNvPr id="7" name="Symbol zastępczy zawartości 6">
             <a:extLst>
               <a:ext uri="{FF2B5EF4-FFF2-40B4-BE49-F238E27FC236}">
-                <a16:creationId xmlns:a16="http://schemas.microsoft.com/office/drawing/2014/main" id="{45E5BD19-295E-4AEB-A072-313A802B40CD}"/>
+                <a16:creationId xmlns:a16="http://schemas.microsoft.com/office/drawing/2014/main" id="{C4FBCC57-7065-4F3E-964A-C77235CD5A39}"/>
               </a:ext>
             </a:extLst>
           </p:cNvPr>
@@ -4054,15 +4874,25 @@
           <a:p>
             <a:r>
               <a:rPr lang="pl-PL" dirty="0"/>
-              <a:t>Użyte wzorce: MVC, </a:t>
-            </a:r>
-            <a:r>
-              <a:rPr lang="pl-PL" dirty="0" err="1"/>
-              <a:t>DependencyInjection</a:t>
-            </a:r>
+              <a:t>Sortowanie po kategorii</a:t>
+            </a:r>
+          </a:p>
+          <a:p>
             <a:r>
               <a:rPr lang="pl-PL" dirty="0"/>
-              <a:t>, Identity</a:t>
+              <a:t>Przejrzysty i przyjazny dla klienta wygląd</a:t>
+            </a:r>
+          </a:p>
+          <a:p>
+            <a:r>
+              <a:rPr lang="pl-PL" dirty="0"/>
+              <a:t>Dostęp do aplikacji dla kuriera</a:t>
+            </a:r>
+          </a:p>
+          <a:p>
+            <a:r>
+              <a:rPr lang="pl-PL" dirty="0"/>
+              <a:t>Funkcjonalność koszyka</a:t>
             </a:r>
           </a:p>
         </p:txBody>
@@ -4070,7 +4900,7 @@
     </p:spTree>
     <p:extLst>
       <p:ext uri="{BB962C8B-B14F-4D97-AF65-F5344CB8AC3E}">
-        <p14:creationId xmlns:p14="http://schemas.microsoft.com/office/powerpoint/2010/main" val="1496689100"/>
+        <p14:creationId xmlns:p14="http://schemas.microsoft.com/office/powerpoint/2010/main" val="2737875354"/>
       </p:ext>
     </p:extLst>
   </p:cSld>
@@ -4102,7 +4932,7 @@
           <p:cNvPr id="2" name="Tytuł 1">
             <a:extLst>
               <a:ext uri="{FF2B5EF4-FFF2-40B4-BE49-F238E27FC236}">
-                <a16:creationId xmlns:a16="http://schemas.microsoft.com/office/drawing/2014/main" id="{842CC3E0-D777-485F-8973-6962CFAF4899}"/>
+                <a16:creationId xmlns:a16="http://schemas.microsoft.com/office/drawing/2014/main" id="{5AA740B2-7477-4146-9A6A-23344A3BB55E}"/>
               </a:ext>
             </a:extLst>
           </p:cNvPr>
@@ -4113,34 +4943,29 @@
             <p:ph type="title"/>
           </p:nvPr>
         </p:nvSpPr>
-        <p:spPr>
-          <a:xfrm>
-            <a:off x="782901" y="-287383"/>
-            <a:ext cx="9692640" cy="1325562"/>
-          </a:xfrm>
-        </p:spPr>
+        <p:spPr/>
         <p:txBody>
           <a:bodyPr/>
           <a:lstStyle/>
           <a:p>
             <a:r>
               <a:rPr lang="pl-PL" dirty="0"/>
-              <a:t>Implementacja</a:t>
+              <a:t>Analiza – specyfikacja funkcjonalna</a:t>
             </a:r>
           </a:p>
         </p:txBody>
       </p:sp>
       <p:pic>
         <p:nvPicPr>
-          <p:cNvPr id="7" name="Symbol zastępczy zawartości 3">
+          <p:cNvPr id="5" name="Symbol zastępczy zawartości 4">
             <a:extLst>
               <a:ext uri="{FF2B5EF4-FFF2-40B4-BE49-F238E27FC236}">
-                <a16:creationId xmlns:a16="http://schemas.microsoft.com/office/drawing/2014/main" id="{BED85369-52AF-4FA4-99B3-210BAC5F0477}"/>
+                <a16:creationId xmlns:a16="http://schemas.microsoft.com/office/drawing/2014/main" id="{6DC70369-E0DE-4B2A-818E-999A7FB5FCDF}"/>
               </a:ext>
             </a:extLst>
           </p:cNvPr>
           <p:cNvPicPr>
-            <a:picLocks noGrp="1"/>
+            <a:picLocks noGrp="1" noChangeAspect="1"/>
           </p:cNvPicPr>
           <p:nvPr>
             <p:ph idx="1"/>
@@ -4154,18 +4979,15 @@
         </p:blipFill>
         <p:spPr>
           <a:xfrm>
-            <a:off x="-179397" y="1203642"/>
-            <a:ext cx="11474413" cy="5715318"/>
-          </a:xfrm>
-          <a:prstGeom prst="rect">
-            <a:avLst/>
-          </a:prstGeom>
+            <a:off x="2997200" y="2442369"/>
+            <a:ext cx="5124450" cy="3124200"/>
+          </a:xfrm>
         </p:spPr>
       </p:pic>
     </p:spTree>
     <p:extLst>
       <p:ext uri="{BB962C8B-B14F-4D97-AF65-F5344CB8AC3E}">
-        <p14:creationId xmlns:p14="http://schemas.microsoft.com/office/powerpoint/2010/main" val="1091382430"/>
+        <p14:creationId xmlns:p14="http://schemas.microsoft.com/office/powerpoint/2010/main" val="4120480085"/>
       </p:ext>
     </p:extLst>
   </p:cSld>
@@ -4197,7 +5019,7 @@
           <p:cNvPr id="2" name="Tytuł 1">
             <a:extLst>
               <a:ext uri="{FF2B5EF4-FFF2-40B4-BE49-F238E27FC236}">
-                <a16:creationId xmlns:a16="http://schemas.microsoft.com/office/drawing/2014/main" id="{5F7473A0-EB20-47EB-9FAC-C1E2BCC98ADC}"/>
+                <a16:creationId xmlns:a16="http://schemas.microsoft.com/office/drawing/2014/main" id="{842CC3E0-D777-485F-8973-6962CFAF4899}"/>
               </a:ext>
             </a:extLst>
           </p:cNvPr>
@@ -4208,81 +5030,59 @@
             <p:ph type="title"/>
           </p:nvPr>
         </p:nvSpPr>
-        <p:spPr/>
+        <p:spPr>
+          <a:xfrm>
+            <a:off x="782901" y="-287383"/>
+            <a:ext cx="9692640" cy="1325562"/>
+          </a:xfrm>
+        </p:spPr>
         <p:txBody>
           <a:bodyPr/>
           <a:lstStyle/>
           <a:p>
             <a:r>
-              <a:rPr lang="pl-PL" dirty="0" err="1"/>
-              <a:t>Frameworki</a:t>
-            </a:r>
-            <a:endParaRPr lang="pl-PL" dirty="0"/>
-          </a:p>
-        </p:txBody>
-      </p:sp>
-      <p:sp>
-        <p:nvSpPr>
-          <p:cNvPr id="6" name="Symbol zastępczy zawartości 5">
+              <a:rPr lang="pl-PL" dirty="0"/>
+              <a:t>Implementacja</a:t>
+            </a:r>
+          </a:p>
+        </p:txBody>
+      </p:sp>
+      <p:pic>
+        <p:nvPicPr>
+          <p:cNvPr id="7" name="Symbol zastępczy zawartości 3">
             <a:extLst>
               <a:ext uri="{FF2B5EF4-FFF2-40B4-BE49-F238E27FC236}">
-                <a16:creationId xmlns:a16="http://schemas.microsoft.com/office/drawing/2014/main" id="{8053B8E4-466B-4655-8A3A-1341EA980997}"/>
+                <a16:creationId xmlns:a16="http://schemas.microsoft.com/office/drawing/2014/main" id="{BED85369-52AF-4FA4-99B3-210BAC5F0477}"/>
               </a:ext>
             </a:extLst>
           </p:cNvPr>
-          <p:cNvSpPr>
-            <a:spLocks noGrp="1"/>
-          </p:cNvSpPr>
+          <p:cNvPicPr>
+            <a:picLocks noGrp="1"/>
+          </p:cNvPicPr>
           <p:nvPr>
             <p:ph idx="1"/>
           </p:nvPr>
-        </p:nvSpPr>
+        </p:nvPicPr>
+        <p:blipFill>
+          <a:blip r:embed="rId2"/>
+          <a:stretch>
+            <a:fillRect/>
+          </a:stretch>
+        </p:blipFill>
         <p:spPr>
           <a:xfrm>
-            <a:off x="1261872" y="1828801"/>
-            <a:ext cx="8595360" cy="1402080"/>
-          </a:xfrm>
-        </p:spPr>
-        <p:txBody>
-          <a:bodyPr vert="horz" lIns="91440" tIns="45720" rIns="91440" bIns="45720" rtlCol="0" anchor="t">
-            <a:normAutofit/>
-          </a:bodyPr>
-          <a:lstStyle/>
-          <a:p>
-            <a:r>
-              <a:rPr lang="pl-PL" dirty="0" err="1"/>
-              <a:t>Entity</a:t>
-            </a:r>
-            <a:r>
-              <a:rPr lang="pl-PL" dirty="0"/>
-              <a:t> Framework </a:t>
-            </a:r>
-            <a:r>
-              <a:rPr lang="pl-PL"/>
-              <a:t>Core</a:t>
-            </a:r>
-            <a:endParaRPr lang="pl-PL" dirty="0"/>
-          </a:p>
-          <a:p>
-            <a:r>
-              <a:rPr lang="pl-PL" dirty="0" err="1"/>
-              <a:t>Stripe</a:t>
-            </a:r>
-            <a:endParaRPr lang="pl-PL" dirty="0"/>
-          </a:p>
-          <a:p>
-            <a:r>
-              <a:rPr lang="pl-PL" dirty="0" err="1"/>
-              <a:t>Sendgrid</a:t>
-            </a:r>
-            <a:endParaRPr lang="pl-PL" dirty="0"/>
-          </a:p>
-        </p:txBody>
-      </p:sp>
+            <a:off x="-179397" y="1203642"/>
+            <a:ext cx="11474413" cy="5715318"/>
+          </a:xfrm>
+          <a:prstGeom prst="rect">
+            <a:avLst/>
+          </a:prstGeom>
+        </p:spPr>
+      </p:pic>
     </p:spTree>
     <p:extLst>
       <p:ext uri="{BB962C8B-B14F-4D97-AF65-F5344CB8AC3E}">
-        <p14:creationId xmlns:p14="http://schemas.microsoft.com/office/powerpoint/2010/main" val="1257251168"/>
+        <p14:creationId xmlns:p14="http://schemas.microsoft.com/office/powerpoint/2010/main" val="1091382430"/>
       </p:ext>
     </p:extLst>
   </p:cSld>
@@ -4314,7 +5114,7 @@
           <p:cNvPr id="2" name="Tytuł 1">
             <a:extLst>
               <a:ext uri="{FF2B5EF4-FFF2-40B4-BE49-F238E27FC236}">
-                <a16:creationId xmlns:a16="http://schemas.microsoft.com/office/drawing/2014/main" id="{7D521247-F99E-4288-BA43-27EA423979D9}"/>
+                <a16:creationId xmlns:a16="http://schemas.microsoft.com/office/drawing/2014/main" id="{F995F813-BE46-4B51-964A-C892A479182A}"/>
               </a:ext>
             </a:extLst>
           </p:cNvPr>
@@ -4331,693 +5131,65 @@
           <a:lstStyle/>
           <a:p>
             <a:r>
-              <a:rPr lang="pl-PL" dirty="0" err="1"/>
-              <a:t>Entity</a:t>
-            </a:r>
-            <a:r>
               <a:rPr lang="pl-PL" dirty="0"/>
-              <a:t> Framework </a:t>
-            </a:r>
-            <a:r>
-              <a:rPr lang="pl-PL" dirty="0" err="1"/>
-              <a:t>Core</a:t>
-            </a:r>
-            <a:endParaRPr lang="pl-PL" dirty="0"/>
-          </a:p>
-        </p:txBody>
-      </p:sp>
-      <p:sp>
-        <p:nvSpPr>
-          <p:cNvPr id="4" name="Prostokąt: zaokrąglone rogi 3">
+              <a:t>Wzorzec MVC</a:t>
+            </a:r>
+          </a:p>
+        </p:txBody>
+      </p:sp>
+      <p:pic>
+        <p:nvPicPr>
+          <p:cNvPr id="1028" name="Picture 4" descr="ASP: Aplikacje wielowarstwowe i wzorzec MVC">
             <a:extLst>
               <a:ext uri="{FF2B5EF4-FFF2-40B4-BE49-F238E27FC236}">
-                <a16:creationId xmlns:a16="http://schemas.microsoft.com/office/drawing/2014/main" id="{196FE014-16BF-40B2-B0F7-5B74DAEFB519}"/>
+                <a16:creationId xmlns:a16="http://schemas.microsoft.com/office/drawing/2014/main" id="{9FD22477-4C9B-4FB9-AD84-0F7EEA0D53CF}"/>
               </a:ext>
             </a:extLst>
           </p:cNvPr>
-          <p:cNvSpPr/>
-          <p:nvPr/>
-        </p:nvSpPr>
-        <p:spPr>
-          <a:xfrm>
-            <a:off x="779418" y="2566851"/>
-            <a:ext cx="1776549" cy="862149"/>
-          </a:xfrm>
-          <a:prstGeom prst="roundRect">
-            <a:avLst/>
-          </a:prstGeom>
-        </p:spPr>
-        <p:style>
-          <a:lnRef idx="2">
-            <a:schemeClr val="accent1">
-              <a:shade val="50000"/>
-            </a:schemeClr>
-          </a:lnRef>
-          <a:fillRef idx="1">
-            <a:schemeClr val="accent1"/>
-          </a:fillRef>
-          <a:effectRef idx="0">
-            <a:schemeClr val="accent1"/>
-          </a:effectRef>
-          <a:fontRef idx="minor">
-            <a:schemeClr val="lt1"/>
-          </a:fontRef>
-        </p:style>
-        <p:txBody>
-          <a:bodyPr rtlCol="0" anchor="ctr"/>
-          <a:lstStyle/>
-          <a:p>
-            <a:pPr algn="ctr"/>
-            <a:r>
-              <a:rPr lang="pl-PL" dirty="0"/>
-              <a:t>Aplikacja </a:t>
-            </a:r>
-            <a:r>
-              <a:rPr lang="pl-PL" dirty="0" err="1"/>
-              <a:t>ASP.Net</a:t>
-            </a:r>
-            <a:r>
-              <a:rPr lang="pl-PL" dirty="0"/>
-              <a:t> </a:t>
-            </a:r>
-            <a:r>
-              <a:rPr lang="pl-PL" dirty="0" err="1"/>
-              <a:t>Core</a:t>
-            </a:r>
-            <a:endParaRPr lang="pl-PL" dirty="0"/>
-          </a:p>
-        </p:txBody>
-      </p:sp>
-      <p:sp>
-        <p:nvSpPr>
-          <p:cNvPr id="5" name="Prostokąt: zaokrąglone rogi 4">
+          <p:cNvPicPr>
+            <a:picLocks noGrp="1" noChangeAspect="1" noChangeArrowheads="1"/>
+          </p:cNvPicPr>
+          <p:nvPr>
+            <p:ph idx="1"/>
+          </p:nvPr>
+        </p:nvPicPr>
+        <p:blipFill>
+          <a:blip r:embed="rId2">
             <a:extLst>
-              <a:ext uri="{FF2B5EF4-FFF2-40B4-BE49-F238E27FC236}">
-                <a16:creationId xmlns:a16="http://schemas.microsoft.com/office/drawing/2014/main" id="{4FD5509A-8ADD-452C-AF54-410055B42998}"/>
+              <a:ext uri="{28A0092B-C50C-407E-A947-70E740481C1C}">
+                <a14:useLocalDpi xmlns:a14="http://schemas.microsoft.com/office/drawing/2010/main" val="0"/>
               </a:ext>
             </a:extLst>
-          </p:cNvPr>
-          <p:cNvSpPr/>
-          <p:nvPr/>
-        </p:nvSpPr>
-        <p:spPr>
+          </a:blip>
+          <a:srcRect/>
+          <a:stretch>
+            <a:fillRect/>
+          </a:stretch>
+        </p:blipFill>
+        <p:spPr bwMode="auto">
           <a:xfrm>
-            <a:off x="4019005" y="2566849"/>
-            <a:ext cx="1776549" cy="862149"/>
-          </a:xfrm>
-          <a:prstGeom prst="roundRect">
-            <a:avLst/>
-          </a:prstGeom>
-        </p:spPr>
-        <p:style>
-          <a:lnRef idx="2">
-            <a:schemeClr val="accent1">
-              <a:shade val="50000"/>
-            </a:schemeClr>
-          </a:lnRef>
-          <a:fillRef idx="1">
-            <a:schemeClr val="accent1"/>
-          </a:fillRef>
-          <a:effectRef idx="0">
-            <a:schemeClr val="accent1"/>
-          </a:effectRef>
-          <a:fontRef idx="minor">
-            <a:schemeClr val="lt1"/>
-          </a:fontRef>
-        </p:style>
-        <p:txBody>
-          <a:bodyPr rtlCol="0" anchor="ctr"/>
-          <a:lstStyle/>
-          <a:p>
-            <a:pPr algn="ctr"/>
-            <a:r>
-              <a:rPr lang="pl-PL" dirty="0"/>
-              <a:t>Model i </a:t>
-            </a:r>
-            <a:r>
-              <a:rPr lang="pl-PL" dirty="0" err="1"/>
-              <a:t>DbContext</a:t>
-            </a:r>
-            <a:endParaRPr lang="pl-PL" dirty="0"/>
-          </a:p>
-        </p:txBody>
-      </p:sp>
-      <p:sp>
-        <p:nvSpPr>
-          <p:cNvPr id="6" name="Prostokąt: zaokrąglone rogi 5">
-            <a:extLst>
-              <a:ext uri="{FF2B5EF4-FFF2-40B4-BE49-F238E27FC236}">
-                <a16:creationId xmlns:a16="http://schemas.microsoft.com/office/drawing/2014/main" id="{061925D0-E45C-4BBA-A1F0-F8DCFD55675D}"/>
-              </a:ext>
-            </a:extLst>
-          </p:cNvPr>
-          <p:cNvSpPr/>
-          <p:nvPr/>
-        </p:nvSpPr>
-        <p:spPr>
-          <a:xfrm>
-            <a:off x="6100356" y="3901440"/>
-            <a:ext cx="1776549" cy="862149"/>
-          </a:xfrm>
-          <a:prstGeom prst="roundRect">
-            <a:avLst/>
-          </a:prstGeom>
-        </p:spPr>
-        <p:style>
-          <a:lnRef idx="2">
-            <a:schemeClr val="accent1">
-              <a:shade val="50000"/>
-            </a:schemeClr>
-          </a:lnRef>
-          <a:fillRef idx="1">
-            <a:schemeClr val="accent1"/>
-          </a:fillRef>
-          <a:effectRef idx="0">
-            <a:schemeClr val="accent1"/>
-          </a:effectRef>
-          <a:fontRef idx="minor">
-            <a:schemeClr val="lt1"/>
-          </a:fontRef>
-        </p:style>
-        <p:txBody>
-          <a:bodyPr rtlCol="0" anchor="ctr"/>
-          <a:lstStyle/>
-          <a:p>
-            <a:pPr algn="ctr"/>
-            <a:r>
-              <a:rPr lang="pl-PL" dirty="0"/>
-              <a:t>Migracje</a:t>
-            </a:r>
-          </a:p>
-        </p:txBody>
-      </p:sp>
-      <p:sp>
-        <p:nvSpPr>
-          <p:cNvPr id="7" name="Prostokąt: zaokrąglone rogi 6">
-            <a:extLst>
-              <a:ext uri="{FF2B5EF4-FFF2-40B4-BE49-F238E27FC236}">
-                <a16:creationId xmlns:a16="http://schemas.microsoft.com/office/drawing/2014/main" id="{9FDDE0A7-A396-47E6-8EF6-1FECAD1A60D5}"/>
-              </a:ext>
-            </a:extLst>
-          </p:cNvPr>
-          <p:cNvSpPr/>
-          <p:nvPr/>
-        </p:nvSpPr>
-        <p:spPr>
-          <a:xfrm>
-            <a:off x="4341222" y="5188450"/>
-            <a:ext cx="1776549" cy="862149"/>
-          </a:xfrm>
-          <a:prstGeom prst="roundRect">
-            <a:avLst/>
-          </a:prstGeom>
-        </p:spPr>
-        <p:style>
-          <a:lnRef idx="2">
-            <a:schemeClr val="accent1">
-              <a:shade val="50000"/>
-            </a:schemeClr>
-          </a:lnRef>
-          <a:fillRef idx="1">
-            <a:schemeClr val="accent1"/>
-          </a:fillRef>
-          <a:effectRef idx="0">
-            <a:schemeClr val="accent1"/>
-          </a:effectRef>
-          <a:fontRef idx="minor">
-            <a:schemeClr val="lt1"/>
-          </a:fontRef>
-        </p:style>
-        <p:txBody>
-          <a:bodyPr rtlCol="0" anchor="ctr"/>
-          <a:lstStyle/>
-          <a:p>
-            <a:pPr algn="ctr"/>
-            <a:r>
-              <a:rPr lang="pl-PL" dirty="0"/>
-              <a:t>Skrypt SQL</a:t>
-            </a:r>
-          </a:p>
-        </p:txBody>
-      </p:sp>
-      <p:sp>
-        <p:nvSpPr>
-          <p:cNvPr id="8" name="Prostokąt: zaokrąglone rogi 7">
-            <a:extLst>
-              <a:ext uri="{FF2B5EF4-FFF2-40B4-BE49-F238E27FC236}">
-                <a16:creationId xmlns:a16="http://schemas.microsoft.com/office/drawing/2014/main" id="{25FB8CDF-6F5A-44E7-A119-8FB7C6C00624}"/>
-              </a:ext>
-            </a:extLst>
-          </p:cNvPr>
-          <p:cNvSpPr/>
-          <p:nvPr/>
-        </p:nvSpPr>
-        <p:spPr>
-          <a:xfrm>
-            <a:off x="7876905" y="5188450"/>
-            <a:ext cx="1776549" cy="862149"/>
-          </a:xfrm>
-          <a:prstGeom prst="roundRect">
-            <a:avLst/>
-          </a:prstGeom>
-        </p:spPr>
-        <p:style>
-          <a:lnRef idx="2">
-            <a:schemeClr val="accent1">
-              <a:shade val="50000"/>
-            </a:schemeClr>
-          </a:lnRef>
-          <a:fillRef idx="1">
-            <a:schemeClr val="accent1"/>
-          </a:fillRef>
-          <a:effectRef idx="0">
-            <a:schemeClr val="accent1"/>
-          </a:effectRef>
-          <a:fontRef idx="minor">
-            <a:schemeClr val="lt1"/>
-          </a:fontRef>
-        </p:style>
-        <p:txBody>
-          <a:bodyPr rtlCol="0" anchor="ctr"/>
-          <a:lstStyle/>
-          <a:p>
-            <a:pPr algn="ctr"/>
-            <a:r>
-              <a:rPr lang="pl-PL" dirty="0"/>
-              <a:t>Baza danych</a:t>
-            </a:r>
-          </a:p>
-        </p:txBody>
-      </p:sp>
-      <p:sp>
-        <p:nvSpPr>
-          <p:cNvPr id="14" name="Strzałka: w prawo 13">
-            <a:extLst>
-              <a:ext uri="{FF2B5EF4-FFF2-40B4-BE49-F238E27FC236}">
-                <a16:creationId xmlns:a16="http://schemas.microsoft.com/office/drawing/2014/main" id="{BCD1F377-1D7B-4E8B-9ADA-69655A861E54}"/>
-              </a:ext>
-            </a:extLst>
-          </p:cNvPr>
-          <p:cNvSpPr/>
-          <p:nvPr/>
-        </p:nvSpPr>
-        <p:spPr>
-          <a:xfrm>
-            <a:off x="2708366" y="2835887"/>
-            <a:ext cx="1158240" cy="324075"/>
-          </a:xfrm>
-          <a:prstGeom prst="rightArrow">
-            <a:avLst/>
-          </a:prstGeom>
-        </p:spPr>
-        <p:style>
-          <a:lnRef idx="2">
-            <a:schemeClr val="accent1">
-              <a:shade val="50000"/>
-            </a:schemeClr>
-          </a:lnRef>
-          <a:fillRef idx="1">
-            <a:schemeClr val="accent1"/>
-          </a:fillRef>
-          <a:effectRef idx="0">
-            <a:schemeClr val="accent1"/>
-          </a:effectRef>
-          <a:fontRef idx="minor">
-            <a:schemeClr val="lt1"/>
-          </a:fontRef>
-        </p:style>
-        <p:txBody>
-          <a:bodyPr rtlCol="0" anchor="ctr"/>
-          <a:lstStyle/>
-          <a:p>
-            <a:pPr algn="ctr"/>
-            <a:endParaRPr lang="pl-PL"/>
-          </a:p>
-        </p:txBody>
-      </p:sp>
-      <p:sp>
-        <p:nvSpPr>
-          <p:cNvPr id="15" name="pole tekstowe 14">
-            <a:extLst>
-              <a:ext uri="{FF2B5EF4-FFF2-40B4-BE49-F238E27FC236}">
-                <a16:creationId xmlns:a16="http://schemas.microsoft.com/office/drawing/2014/main" id="{D6DE99AB-5AA9-4592-A22E-A12F892B1B2A}"/>
-              </a:ext>
-            </a:extLst>
-          </p:cNvPr>
-          <p:cNvSpPr txBox="1"/>
-          <p:nvPr/>
-        </p:nvSpPr>
-        <p:spPr>
-          <a:xfrm>
-            <a:off x="2708366" y="2466555"/>
-            <a:ext cx="1098378" cy="369332"/>
+            <a:off x="3340100" y="2561431"/>
+            <a:ext cx="4438650" cy="2886075"/>
           </a:xfrm>
           <a:prstGeom prst="rect">
             <a:avLst/>
           </a:prstGeom>
           <a:noFill/>
-        </p:spPr>
-        <p:txBody>
-          <a:bodyPr wrap="none" rtlCol="0">
-            <a:spAutoFit/>
-          </a:bodyPr>
-          <a:lstStyle/>
-          <a:p>
-            <a:r>
-              <a:rPr lang="pl-PL" dirty="0"/>
-              <a:t>korzysta</a:t>
-            </a:r>
-          </a:p>
-        </p:txBody>
-      </p:sp>
-      <p:sp>
-        <p:nvSpPr>
-          <p:cNvPr id="16" name="Strzałka: w prawo 15">
-            <a:extLst>
-              <a:ext uri="{FF2B5EF4-FFF2-40B4-BE49-F238E27FC236}">
-                <a16:creationId xmlns:a16="http://schemas.microsoft.com/office/drawing/2014/main" id="{E6839D4B-FFA6-46CD-BBBE-F4DBA8DBE385}"/>
-              </a:ext>
-            </a:extLst>
-          </p:cNvPr>
-          <p:cNvSpPr/>
-          <p:nvPr/>
-        </p:nvSpPr>
-        <p:spPr>
-          <a:xfrm rot="2573836">
-            <a:off x="5750981" y="3226499"/>
-            <a:ext cx="1158240" cy="324075"/>
-          </a:xfrm>
-          <a:prstGeom prst="rightArrow">
-            <a:avLst/>
-          </a:prstGeom>
-        </p:spPr>
-        <p:style>
-          <a:lnRef idx="2">
-            <a:schemeClr val="accent1">
-              <a:shade val="50000"/>
-            </a:schemeClr>
-          </a:lnRef>
-          <a:fillRef idx="1">
-            <a:schemeClr val="accent1"/>
-          </a:fillRef>
-          <a:effectRef idx="0">
-            <a:schemeClr val="accent1"/>
-          </a:effectRef>
-          <a:fontRef idx="minor">
-            <a:schemeClr val="lt1"/>
-          </a:fontRef>
-        </p:style>
-        <p:txBody>
-          <a:bodyPr rtlCol="0" anchor="ctr"/>
-          <a:lstStyle/>
-          <a:p>
-            <a:pPr algn="ctr"/>
-            <a:endParaRPr lang="pl-PL"/>
-          </a:p>
-        </p:txBody>
-      </p:sp>
-      <p:sp>
-        <p:nvSpPr>
-          <p:cNvPr id="17" name="pole tekstowe 16">
-            <a:extLst>
-              <a:ext uri="{FF2B5EF4-FFF2-40B4-BE49-F238E27FC236}">
-                <a16:creationId xmlns:a16="http://schemas.microsoft.com/office/drawing/2014/main" id="{C07615AC-DD3B-4B8A-AAEA-9D022C63BEF7}"/>
-              </a:ext>
-            </a:extLst>
-          </p:cNvPr>
-          <p:cNvSpPr txBox="1"/>
-          <p:nvPr/>
-        </p:nvSpPr>
-        <p:spPr>
-          <a:xfrm>
-            <a:off x="6310649" y="2939953"/>
-            <a:ext cx="1107996" cy="369332"/>
-          </a:xfrm>
-          <a:prstGeom prst="rect">
-            <a:avLst/>
-          </a:prstGeom>
-          <a:noFill/>
-        </p:spPr>
-        <p:txBody>
-          <a:bodyPr wrap="none" rtlCol="0">
-            <a:spAutoFit/>
-          </a:bodyPr>
-          <a:lstStyle/>
-          <a:p>
-            <a:r>
-              <a:rPr lang="pl-PL" dirty="0"/>
-              <a:t>generuje</a:t>
-            </a:r>
-          </a:p>
-        </p:txBody>
-      </p:sp>
-      <p:sp>
-        <p:nvSpPr>
-          <p:cNvPr id="18" name="Strzałka: w prawo 17">
-            <a:extLst>
-              <a:ext uri="{FF2B5EF4-FFF2-40B4-BE49-F238E27FC236}">
-                <a16:creationId xmlns:a16="http://schemas.microsoft.com/office/drawing/2014/main" id="{80F10ADF-FDE6-4DF7-94C5-7F3FA399ED01}"/>
-              </a:ext>
-            </a:extLst>
-          </p:cNvPr>
-          <p:cNvSpPr/>
-          <p:nvPr/>
-        </p:nvSpPr>
-        <p:spPr>
-          <a:xfrm rot="7973592">
-            <a:off x="4999644" y="4491847"/>
-            <a:ext cx="1158240" cy="324075"/>
-          </a:xfrm>
-          <a:prstGeom prst="rightArrow">
-            <a:avLst/>
-          </a:prstGeom>
-        </p:spPr>
-        <p:style>
-          <a:lnRef idx="2">
-            <a:schemeClr val="accent1">
-              <a:shade val="50000"/>
-            </a:schemeClr>
-          </a:lnRef>
-          <a:fillRef idx="1">
-            <a:schemeClr val="accent1"/>
-          </a:fillRef>
-          <a:effectRef idx="0">
-            <a:schemeClr val="accent1"/>
-          </a:effectRef>
-          <a:fontRef idx="minor">
-            <a:schemeClr val="lt1"/>
-          </a:fontRef>
-        </p:style>
-        <p:txBody>
-          <a:bodyPr rtlCol="0" anchor="ctr"/>
-          <a:lstStyle/>
-          <a:p>
-            <a:pPr algn="ctr"/>
-            <a:endParaRPr lang="pl-PL"/>
-          </a:p>
-        </p:txBody>
-      </p:sp>
-      <p:sp>
-        <p:nvSpPr>
-          <p:cNvPr id="19" name="pole tekstowe 18">
-            <a:extLst>
-              <a:ext uri="{FF2B5EF4-FFF2-40B4-BE49-F238E27FC236}">
-                <a16:creationId xmlns:a16="http://schemas.microsoft.com/office/drawing/2014/main" id="{3390D1A1-B34A-4443-A97B-C88D00349D84}"/>
-              </a:ext>
-            </a:extLst>
-          </p:cNvPr>
-          <p:cNvSpPr txBox="1"/>
-          <p:nvPr/>
-        </p:nvSpPr>
-        <p:spPr>
-          <a:xfrm>
-            <a:off x="4470768" y="4304525"/>
-            <a:ext cx="1107996" cy="369332"/>
-          </a:xfrm>
-          <a:prstGeom prst="rect">
-            <a:avLst/>
-          </a:prstGeom>
-          <a:noFill/>
-        </p:spPr>
-        <p:txBody>
-          <a:bodyPr wrap="none" rtlCol="0">
-            <a:spAutoFit/>
-          </a:bodyPr>
-          <a:lstStyle/>
-          <a:p>
-            <a:r>
-              <a:rPr lang="pl-PL" dirty="0"/>
-              <a:t>generuje</a:t>
-            </a:r>
-          </a:p>
-        </p:txBody>
-      </p:sp>
-      <p:sp>
-        <p:nvSpPr>
-          <p:cNvPr id="20" name="Strzałka: w prawo 19">
-            <a:extLst>
-              <a:ext uri="{FF2B5EF4-FFF2-40B4-BE49-F238E27FC236}">
-                <a16:creationId xmlns:a16="http://schemas.microsoft.com/office/drawing/2014/main" id="{3F8B85F8-F2C5-470A-8B8B-AEE52E052CCC}"/>
-              </a:ext>
-            </a:extLst>
-          </p:cNvPr>
-          <p:cNvSpPr/>
-          <p:nvPr/>
-        </p:nvSpPr>
-        <p:spPr>
-          <a:xfrm rot="2573836">
-            <a:off x="7871517" y="4506980"/>
-            <a:ext cx="1158240" cy="324075"/>
-          </a:xfrm>
-          <a:prstGeom prst="rightArrow">
-            <a:avLst/>
-          </a:prstGeom>
-        </p:spPr>
-        <p:style>
-          <a:lnRef idx="2">
-            <a:schemeClr val="accent1">
-              <a:shade val="50000"/>
-            </a:schemeClr>
-          </a:lnRef>
-          <a:fillRef idx="1">
-            <a:schemeClr val="accent1"/>
-          </a:fillRef>
-          <a:effectRef idx="0">
-            <a:schemeClr val="accent1"/>
-          </a:effectRef>
-          <a:fontRef idx="minor">
-            <a:schemeClr val="lt1"/>
-          </a:fontRef>
-        </p:style>
-        <p:txBody>
-          <a:bodyPr rtlCol="0" anchor="ctr"/>
-          <a:lstStyle/>
-          <a:p>
-            <a:pPr algn="ctr"/>
-            <a:endParaRPr lang="pl-PL"/>
-          </a:p>
-        </p:txBody>
-      </p:sp>
-      <p:sp>
-        <p:nvSpPr>
-          <p:cNvPr id="21" name="pole tekstowe 20">
-            <a:extLst>
-              <a:ext uri="{FF2B5EF4-FFF2-40B4-BE49-F238E27FC236}">
-                <a16:creationId xmlns:a16="http://schemas.microsoft.com/office/drawing/2014/main" id="{5D14E219-10B8-4F97-8728-E121B3373D70}"/>
-              </a:ext>
-            </a:extLst>
-          </p:cNvPr>
-          <p:cNvSpPr txBox="1"/>
-          <p:nvPr/>
-        </p:nvSpPr>
-        <p:spPr>
-          <a:xfrm>
-            <a:off x="8431185" y="4220434"/>
-            <a:ext cx="1388522" cy="369332"/>
-          </a:xfrm>
-          <a:prstGeom prst="rect">
-            <a:avLst/>
-          </a:prstGeom>
-          <a:noFill/>
-        </p:spPr>
-        <p:txBody>
-          <a:bodyPr wrap="none" rtlCol="0">
-            <a:spAutoFit/>
-          </a:bodyPr>
-          <a:lstStyle/>
-          <a:p>
-            <a:r>
-              <a:rPr lang="pl-PL" dirty="0"/>
-              <a:t>aktualizuje</a:t>
-            </a:r>
-          </a:p>
-        </p:txBody>
-      </p:sp>
-      <p:sp>
-        <p:nvSpPr>
-          <p:cNvPr id="22" name="Strzałka: w prawo 21">
-            <a:extLst>
-              <a:ext uri="{FF2B5EF4-FFF2-40B4-BE49-F238E27FC236}">
-                <a16:creationId xmlns:a16="http://schemas.microsoft.com/office/drawing/2014/main" id="{851C729A-CA0A-4A4E-8078-307DEBAFA466}"/>
-              </a:ext>
-            </a:extLst>
-          </p:cNvPr>
-          <p:cNvSpPr/>
-          <p:nvPr/>
-        </p:nvSpPr>
-        <p:spPr>
-          <a:xfrm>
-            <a:off x="6405155" y="5525931"/>
-            <a:ext cx="1158240" cy="324075"/>
-          </a:xfrm>
-          <a:prstGeom prst="rightArrow">
-            <a:avLst/>
-          </a:prstGeom>
-        </p:spPr>
-        <p:style>
-          <a:lnRef idx="2">
-            <a:schemeClr val="accent1">
-              <a:shade val="50000"/>
-            </a:schemeClr>
-          </a:lnRef>
-          <a:fillRef idx="1">
-            <a:schemeClr val="accent1"/>
-          </a:fillRef>
-          <a:effectRef idx="0">
-            <a:schemeClr val="accent1"/>
-          </a:effectRef>
-          <a:fontRef idx="minor">
-            <a:schemeClr val="lt1"/>
-          </a:fontRef>
-        </p:style>
-        <p:txBody>
-          <a:bodyPr rtlCol="0" anchor="ctr"/>
-          <a:lstStyle/>
-          <a:p>
-            <a:pPr algn="ctr"/>
-            <a:endParaRPr lang="pl-PL"/>
-          </a:p>
-        </p:txBody>
-      </p:sp>
-      <p:sp>
-        <p:nvSpPr>
-          <p:cNvPr id="23" name="pole tekstowe 22">
-            <a:extLst>
-              <a:ext uri="{FF2B5EF4-FFF2-40B4-BE49-F238E27FC236}">
-                <a16:creationId xmlns:a16="http://schemas.microsoft.com/office/drawing/2014/main" id="{2C837667-31BB-4660-9E3E-15FEF5E90769}"/>
-              </a:ext>
-            </a:extLst>
-          </p:cNvPr>
-          <p:cNvSpPr txBox="1"/>
-          <p:nvPr/>
-        </p:nvSpPr>
-        <p:spPr>
-          <a:xfrm>
-            <a:off x="6290014" y="5188450"/>
-            <a:ext cx="1388522" cy="369332"/>
-          </a:xfrm>
-          <a:prstGeom prst="rect">
-            <a:avLst/>
-          </a:prstGeom>
-          <a:noFill/>
-        </p:spPr>
-        <p:txBody>
-          <a:bodyPr wrap="none" rtlCol="0">
-            <a:spAutoFit/>
-          </a:bodyPr>
-          <a:lstStyle/>
-          <a:p>
-            <a:r>
-              <a:rPr lang="pl-PL" dirty="0"/>
-              <a:t>aktualizuje</a:t>
-            </a:r>
-          </a:p>
-        </p:txBody>
-      </p:sp>
+          <a:extLst>
+            <a:ext uri="{909E8E84-426E-40DD-AFC4-6F175D3DCCD1}">
+              <a14:hiddenFill xmlns:a14="http://schemas.microsoft.com/office/drawing/2010/main">
+                <a:solidFill>
+                  <a:srgbClr val="FFFFFF"/>
+                </a:solidFill>
+              </a14:hiddenFill>
+            </a:ext>
+          </a:extLst>
+        </p:spPr>
+      </p:pic>
     </p:spTree>
     <p:extLst>
       <p:ext uri="{BB962C8B-B14F-4D97-AF65-F5344CB8AC3E}">
-        <p14:creationId xmlns:p14="http://schemas.microsoft.com/office/powerpoint/2010/main" val="1277708116"/>
+        <p14:creationId xmlns:p14="http://schemas.microsoft.com/office/powerpoint/2010/main" val="1496689100"/>
       </p:ext>
     </p:extLst>
   </p:cSld>
@@ -5049,7 +5221,7 @@
           <p:cNvPr id="2" name="Tytuł 1">
             <a:extLst>
               <a:ext uri="{FF2B5EF4-FFF2-40B4-BE49-F238E27FC236}">
-                <a16:creationId xmlns:a16="http://schemas.microsoft.com/office/drawing/2014/main" id="{9360C57A-54BB-463B-B11D-EDA92B04C4E1}"/>
+                <a16:creationId xmlns:a16="http://schemas.microsoft.com/office/drawing/2014/main" id="{B12FB97F-7AA6-44D8-AA4B-4728336C750B}"/>
               </a:ext>
             </a:extLst>
           </p:cNvPr>
@@ -5066,465 +5238,65 @@
           <a:lstStyle/>
           <a:p>
             <a:r>
-              <a:rPr lang="pl-PL" dirty="0" err="1"/>
-              <a:t>Stripe</a:t>
-            </a:r>
-            <a:r>
               <a:rPr lang="pl-PL" dirty="0"/>
-              <a:t> – płatności online</a:t>
-            </a:r>
-          </a:p>
-        </p:txBody>
-      </p:sp>
-      <p:sp>
-        <p:nvSpPr>
-          <p:cNvPr id="4" name="Prostokąt: zaokrąglone rogi 3">
+              <a:t>ASP.NET IDENTITY</a:t>
+            </a:r>
+          </a:p>
+        </p:txBody>
+      </p:sp>
+      <p:pic>
+        <p:nvPicPr>
+          <p:cNvPr id="2050" name="Picture 2" descr="Niestandardowi dostawcy magazynu dla programu ASP.NET Core Identity |  Microsoft Docs">
             <a:extLst>
               <a:ext uri="{FF2B5EF4-FFF2-40B4-BE49-F238E27FC236}">
-                <a16:creationId xmlns:a16="http://schemas.microsoft.com/office/drawing/2014/main" id="{2856FFAD-AF17-4BC7-8AFD-5E17A224F5EB}"/>
+                <a16:creationId xmlns:a16="http://schemas.microsoft.com/office/drawing/2014/main" id="{90798F18-0FA2-40E5-A890-AC02EC0E7001}"/>
               </a:ext>
             </a:extLst>
           </p:cNvPr>
-          <p:cNvSpPr/>
-          <p:nvPr/>
-        </p:nvSpPr>
-        <p:spPr>
-          <a:xfrm>
-            <a:off x="1681766" y="2895533"/>
-            <a:ext cx="1776549" cy="862149"/>
-          </a:xfrm>
-          <a:prstGeom prst="roundRect">
-            <a:avLst/>
-          </a:prstGeom>
-        </p:spPr>
-        <p:style>
-          <a:lnRef idx="2">
-            <a:schemeClr val="accent1">
-              <a:shade val="50000"/>
-            </a:schemeClr>
-          </a:lnRef>
-          <a:fillRef idx="1">
-            <a:schemeClr val="accent1"/>
-          </a:fillRef>
-          <a:effectRef idx="0">
-            <a:schemeClr val="accent1"/>
-          </a:effectRef>
-          <a:fontRef idx="minor">
-            <a:schemeClr val="lt1"/>
-          </a:fontRef>
-        </p:style>
-        <p:txBody>
-          <a:bodyPr rtlCol="0" anchor="ctr"/>
-          <a:lstStyle/>
-          <a:p>
-            <a:pPr algn="ctr"/>
-            <a:r>
-              <a:rPr lang="pl-PL" dirty="0"/>
-              <a:t>Aplikacja </a:t>
-            </a:r>
-            <a:r>
-              <a:rPr lang="pl-PL" dirty="0" err="1"/>
-              <a:t>ASP.Net</a:t>
-            </a:r>
-            <a:r>
-              <a:rPr lang="pl-PL" dirty="0"/>
-              <a:t> </a:t>
-            </a:r>
-            <a:r>
-              <a:rPr lang="pl-PL" dirty="0" err="1"/>
-              <a:t>Core</a:t>
-            </a:r>
-            <a:endParaRPr lang="pl-PL" dirty="0"/>
-          </a:p>
-        </p:txBody>
-      </p:sp>
-      <p:sp>
-        <p:nvSpPr>
-          <p:cNvPr id="5" name="Prostokąt: zaokrąglone rogi 4">
+          <p:cNvPicPr>
+            <a:picLocks noGrp="1" noChangeAspect="1" noChangeArrowheads="1"/>
+          </p:cNvPicPr>
+          <p:nvPr>
+            <p:ph idx="1"/>
+          </p:nvPr>
+        </p:nvPicPr>
+        <p:blipFill>
+          <a:blip r:embed="rId2">
             <a:extLst>
-              <a:ext uri="{FF2B5EF4-FFF2-40B4-BE49-F238E27FC236}">
-                <a16:creationId xmlns:a16="http://schemas.microsoft.com/office/drawing/2014/main" id="{A5BB7905-DE24-434F-8803-BF58C4B9F39D}"/>
+              <a:ext uri="{28A0092B-C50C-407E-A947-70E740481C1C}">
+                <a14:useLocalDpi xmlns:a14="http://schemas.microsoft.com/office/drawing/2010/main" val="0"/>
               </a:ext>
             </a:extLst>
-          </p:cNvPr>
-          <p:cNvSpPr/>
-          <p:nvPr/>
-        </p:nvSpPr>
-        <p:spPr>
+          </a:blip>
+          <a:srcRect/>
+          <a:stretch>
+            <a:fillRect/>
+          </a:stretch>
+        </p:blipFill>
+        <p:spPr bwMode="auto">
           <a:xfrm>
-            <a:off x="1681766" y="4717885"/>
-            <a:ext cx="1776549" cy="862149"/>
-          </a:xfrm>
-          <a:prstGeom prst="roundRect">
-            <a:avLst/>
-          </a:prstGeom>
-        </p:spPr>
-        <p:style>
-          <a:lnRef idx="2">
-            <a:schemeClr val="accent1">
-              <a:shade val="50000"/>
-            </a:schemeClr>
-          </a:lnRef>
-          <a:fillRef idx="1">
-            <a:schemeClr val="accent1"/>
-          </a:fillRef>
-          <a:effectRef idx="0">
-            <a:schemeClr val="accent1"/>
-          </a:effectRef>
-          <a:fontRef idx="minor">
-            <a:schemeClr val="lt1"/>
-          </a:fontRef>
-        </p:style>
-        <p:txBody>
-          <a:bodyPr rtlCol="0" anchor="ctr"/>
-          <a:lstStyle/>
-          <a:p>
-            <a:pPr algn="ctr"/>
-            <a:r>
-              <a:rPr lang="pl-PL" dirty="0"/>
-              <a:t>Klucz </a:t>
-            </a:r>
-            <a:r>
-              <a:rPr lang="pl-PL" dirty="0" err="1"/>
-              <a:t>Auth</a:t>
-            </a:r>
-            <a:r>
-              <a:rPr lang="pl-PL" dirty="0"/>
-              <a:t> i Model</a:t>
-            </a:r>
-          </a:p>
-        </p:txBody>
-      </p:sp>
-      <p:sp>
-        <p:nvSpPr>
-          <p:cNvPr id="6" name="Prostokąt: zaokrąglone rogi 5">
-            <a:extLst>
-              <a:ext uri="{FF2B5EF4-FFF2-40B4-BE49-F238E27FC236}">
-                <a16:creationId xmlns:a16="http://schemas.microsoft.com/office/drawing/2014/main" id="{E682170E-E940-42D9-9AAD-A6D27E69C478}"/>
-              </a:ext>
-            </a:extLst>
-          </p:cNvPr>
-          <p:cNvSpPr/>
-          <p:nvPr/>
-        </p:nvSpPr>
-        <p:spPr>
-          <a:xfrm>
-            <a:off x="4921353" y="4717885"/>
-            <a:ext cx="1776549" cy="862149"/>
-          </a:xfrm>
-          <a:prstGeom prst="roundRect">
-            <a:avLst/>
-          </a:prstGeom>
-        </p:spPr>
-        <p:style>
-          <a:lnRef idx="2">
-            <a:schemeClr val="accent1">
-              <a:shade val="50000"/>
-            </a:schemeClr>
-          </a:lnRef>
-          <a:fillRef idx="1">
-            <a:schemeClr val="accent1"/>
-          </a:fillRef>
-          <a:effectRef idx="0">
-            <a:schemeClr val="accent1"/>
-          </a:effectRef>
-          <a:fontRef idx="minor">
-            <a:schemeClr val="lt1"/>
-          </a:fontRef>
-        </p:style>
-        <p:txBody>
-          <a:bodyPr rtlCol="0" anchor="ctr"/>
-          <a:lstStyle/>
-          <a:p>
-            <a:pPr algn="ctr"/>
-            <a:r>
-              <a:rPr lang="pl-PL" dirty="0" err="1"/>
-              <a:t>Stripe</a:t>
-            </a:r>
-            <a:r>
-              <a:rPr lang="pl-PL" dirty="0"/>
-              <a:t> API</a:t>
-            </a:r>
-          </a:p>
-        </p:txBody>
-      </p:sp>
-      <p:sp>
-        <p:nvSpPr>
-          <p:cNvPr id="9" name="Strzałka: w prawo 8">
-            <a:extLst>
-              <a:ext uri="{FF2B5EF4-FFF2-40B4-BE49-F238E27FC236}">
-                <a16:creationId xmlns:a16="http://schemas.microsoft.com/office/drawing/2014/main" id="{15F3DC0D-0D2F-44FF-B991-ACD528E3CD99}"/>
-              </a:ext>
-            </a:extLst>
-          </p:cNvPr>
-          <p:cNvSpPr/>
-          <p:nvPr/>
-        </p:nvSpPr>
-        <p:spPr>
-          <a:xfrm rot="5400000">
-            <a:off x="2229353" y="4097508"/>
-            <a:ext cx="681372" cy="324075"/>
-          </a:xfrm>
-          <a:prstGeom prst="rightArrow">
-            <a:avLst/>
-          </a:prstGeom>
-        </p:spPr>
-        <p:style>
-          <a:lnRef idx="2">
-            <a:schemeClr val="accent1">
-              <a:shade val="50000"/>
-            </a:schemeClr>
-          </a:lnRef>
-          <a:fillRef idx="1">
-            <a:schemeClr val="accent1"/>
-          </a:fillRef>
-          <a:effectRef idx="0">
-            <a:schemeClr val="accent1"/>
-          </a:effectRef>
-          <a:fontRef idx="minor">
-            <a:schemeClr val="lt1"/>
-          </a:fontRef>
-        </p:style>
-        <p:txBody>
-          <a:bodyPr rtlCol="0" anchor="ctr"/>
-          <a:lstStyle/>
-          <a:p>
-            <a:pPr algn="ctr"/>
-            <a:endParaRPr lang="pl-PL"/>
-          </a:p>
-        </p:txBody>
-      </p:sp>
-      <p:sp>
-        <p:nvSpPr>
-          <p:cNvPr id="10" name="pole tekstowe 9">
-            <a:extLst>
-              <a:ext uri="{FF2B5EF4-FFF2-40B4-BE49-F238E27FC236}">
-                <a16:creationId xmlns:a16="http://schemas.microsoft.com/office/drawing/2014/main" id="{FB75A087-849C-44DF-AB45-3EA4C535434A}"/>
-              </a:ext>
-            </a:extLst>
-          </p:cNvPr>
-          <p:cNvSpPr txBox="1"/>
-          <p:nvPr/>
-        </p:nvSpPr>
-        <p:spPr>
-          <a:xfrm>
-            <a:off x="2661480" y="3965645"/>
-            <a:ext cx="1098378" cy="369332"/>
+            <a:off x="2662475" y="1828800"/>
+            <a:ext cx="5793901" cy="4351338"/>
           </a:xfrm>
           <a:prstGeom prst="rect">
             <a:avLst/>
           </a:prstGeom>
           <a:noFill/>
-        </p:spPr>
-        <p:txBody>
-          <a:bodyPr wrap="none" rtlCol="0">
-            <a:spAutoFit/>
-          </a:bodyPr>
-          <a:lstStyle/>
-          <a:p>
-            <a:r>
-              <a:rPr lang="pl-PL" dirty="0"/>
-              <a:t>korzysta</a:t>
-            </a:r>
-          </a:p>
-        </p:txBody>
-      </p:sp>
-      <p:sp>
-        <p:nvSpPr>
-          <p:cNvPr id="11" name="Strzałka: w prawo 10">
-            <a:extLst>
-              <a:ext uri="{FF2B5EF4-FFF2-40B4-BE49-F238E27FC236}">
-                <a16:creationId xmlns:a16="http://schemas.microsoft.com/office/drawing/2014/main" id="{964D6393-C5B8-4D19-864B-4732FFBA0BFD}"/>
-              </a:ext>
-            </a:extLst>
-          </p:cNvPr>
-          <p:cNvSpPr/>
-          <p:nvPr/>
-        </p:nvSpPr>
-        <p:spPr>
-          <a:xfrm>
-            <a:off x="3610714" y="4717885"/>
-            <a:ext cx="1158240" cy="324075"/>
-          </a:xfrm>
-          <a:prstGeom prst="rightArrow">
-            <a:avLst/>
-          </a:prstGeom>
-        </p:spPr>
-        <p:style>
-          <a:lnRef idx="2">
-            <a:schemeClr val="accent1">
-              <a:shade val="50000"/>
-            </a:schemeClr>
-          </a:lnRef>
-          <a:fillRef idx="1">
-            <a:schemeClr val="accent1"/>
-          </a:fillRef>
-          <a:effectRef idx="0">
-            <a:schemeClr val="accent1"/>
-          </a:effectRef>
-          <a:fontRef idx="minor">
-            <a:schemeClr val="lt1"/>
-          </a:fontRef>
-        </p:style>
-        <p:txBody>
-          <a:bodyPr rtlCol="0" anchor="ctr"/>
-          <a:lstStyle/>
-          <a:p>
-            <a:pPr algn="ctr"/>
-            <a:endParaRPr lang="pl-PL"/>
-          </a:p>
-        </p:txBody>
-      </p:sp>
-      <p:sp>
-        <p:nvSpPr>
-          <p:cNvPr id="12" name="pole tekstowe 11">
-            <a:extLst>
-              <a:ext uri="{FF2B5EF4-FFF2-40B4-BE49-F238E27FC236}">
-                <a16:creationId xmlns:a16="http://schemas.microsoft.com/office/drawing/2014/main" id="{0950CA78-9CC2-46BC-8DA9-2B4844928BF0}"/>
-              </a:ext>
-            </a:extLst>
-          </p:cNvPr>
-          <p:cNvSpPr txBox="1"/>
-          <p:nvPr/>
-        </p:nvSpPr>
-        <p:spPr>
-          <a:xfrm>
-            <a:off x="3539888" y="4415565"/>
-            <a:ext cx="1180131" cy="369332"/>
-          </a:xfrm>
-          <a:prstGeom prst="rect">
-            <a:avLst/>
-          </a:prstGeom>
-          <a:noFill/>
-        </p:spPr>
-        <p:txBody>
-          <a:bodyPr wrap="none" rtlCol="0">
-            <a:spAutoFit/>
-          </a:bodyPr>
-          <a:lstStyle/>
-          <a:p>
-            <a:r>
-              <a:rPr lang="pl-PL" dirty="0"/>
-              <a:t>wywołuje</a:t>
-            </a:r>
-          </a:p>
-        </p:txBody>
-      </p:sp>
-      <p:sp>
-        <p:nvSpPr>
-          <p:cNvPr id="20" name="Strzałka: w prawo 19">
-            <a:extLst>
-              <a:ext uri="{FF2B5EF4-FFF2-40B4-BE49-F238E27FC236}">
-                <a16:creationId xmlns:a16="http://schemas.microsoft.com/office/drawing/2014/main" id="{780722DB-6D36-45B5-8871-0186277B07ED}"/>
-              </a:ext>
-            </a:extLst>
-          </p:cNvPr>
-          <p:cNvSpPr/>
-          <p:nvPr/>
-        </p:nvSpPr>
-        <p:spPr>
-          <a:xfrm rot="10800000">
-            <a:off x="3550834" y="5255959"/>
-            <a:ext cx="1158240" cy="324075"/>
-          </a:xfrm>
-          <a:prstGeom prst="rightArrow">
-            <a:avLst/>
-          </a:prstGeom>
-        </p:spPr>
-        <p:style>
-          <a:lnRef idx="2">
-            <a:schemeClr val="accent1">
-              <a:shade val="50000"/>
-            </a:schemeClr>
-          </a:lnRef>
-          <a:fillRef idx="1">
-            <a:schemeClr val="accent1"/>
-          </a:fillRef>
-          <a:effectRef idx="0">
-            <a:schemeClr val="accent1"/>
-          </a:effectRef>
-          <a:fontRef idx="minor">
-            <a:schemeClr val="lt1"/>
-          </a:fontRef>
-        </p:style>
-        <p:txBody>
-          <a:bodyPr rtlCol="0" anchor="ctr"/>
-          <a:lstStyle/>
-          <a:p>
-            <a:pPr algn="ctr"/>
-            <a:endParaRPr lang="pl-PL"/>
-          </a:p>
-        </p:txBody>
-      </p:sp>
-      <p:sp>
-        <p:nvSpPr>
-          <p:cNvPr id="21" name="pole tekstowe 20">
-            <a:extLst>
-              <a:ext uri="{FF2B5EF4-FFF2-40B4-BE49-F238E27FC236}">
-                <a16:creationId xmlns:a16="http://schemas.microsoft.com/office/drawing/2014/main" id="{0DF1D55B-58DA-4327-9695-B098EBE39EB3}"/>
-              </a:ext>
-            </a:extLst>
-          </p:cNvPr>
-          <p:cNvSpPr txBox="1"/>
-          <p:nvPr/>
-        </p:nvSpPr>
-        <p:spPr>
-          <a:xfrm>
-            <a:off x="3539888" y="5513022"/>
-            <a:ext cx="1322798" cy="369332"/>
-          </a:xfrm>
-          <a:prstGeom prst="rect">
-            <a:avLst/>
-          </a:prstGeom>
-          <a:noFill/>
-        </p:spPr>
-        <p:txBody>
-          <a:bodyPr wrap="none" rtlCol="0">
-            <a:spAutoFit/>
-          </a:bodyPr>
-          <a:lstStyle/>
-          <a:p>
-            <a:r>
-              <a:rPr lang="pl-PL" dirty="0"/>
-              <a:t>odpowiada</a:t>
-            </a:r>
-          </a:p>
-        </p:txBody>
-      </p:sp>
-      <p:pic>
-        <p:nvPicPr>
-          <p:cNvPr id="23" name="Obraz 22">
-            <a:extLst>
-              <a:ext uri="{FF2B5EF4-FFF2-40B4-BE49-F238E27FC236}">
-                <a16:creationId xmlns:a16="http://schemas.microsoft.com/office/drawing/2014/main" id="{9FD9DAB2-CCE2-4BA1-8330-4F93B049D562}"/>
-              </a:ext>
-            </a:extLst>
-          </p:cNvPr>
-          <p:cNvPicPr>
-            <a:picLocks noChangeAspect="1"/>
-          </p:cNvPicPr>
-          <p:nvPr/>
-        </p:nvPicPr>
-        <p:blipFill>
-          <a:blip r:embed="rId2"/>
-          <a:stretch>
-            <a:fillRect/>
-          </a:stretch>
-        </p:blipFill>
-        <p:spPr>
-          <a:xfrm>
-            <a:off x="7544968" y="1729217"/>
-            <a:ext cx="2723245" cy="4472856"/>
-          </a:xfrm>
-          <a:prstGeom prst="rect">
-            <a:avLst/>
-          </a:prstGeom>
+          <a:extLst>
+            <a:ext uri="{909E8E84-426E-40DD-AFC4-6F175D3DCCD1}">
+              <a14:hiddenFill xmlns:a14="http://schemas.microsoft.com/office/drawing/2010/main">
+                <a:solidFill>
+                  <a:srgbClr val="FFFFFF"/>
+                </a:solidFill>
+              </a14:hiddenFill>
+            </a:ext>
+          </a:extLst>
         </p:spPr>
       </p:pic>
     </p:spTree>
     <p:extLst>
       <p:ext uri="{BB962C8B-B14F-4D97-AF65-F5344CB8AC3E}">
-        <p14:creationId xmlns:p14="http://schemas.microsoft.com/office/powerpoint/2010/main" val="3228916118"/>
+        <p14:creationId xmlns:p14="http://schemas.microsoft.com/office/powerpoint/2010/main" val="4179623338"/>
       </p:ext>
     </p:extLst>
   </p:cSld>
@@ -5556,7 +5328,7 @@
           <p:cNvPr id="2" name="Tytuł 1">
             <a:extLst>
               <a:ext uri="{FF2B5EF4-FFF2-40B4-BE49-F238E27FC236}">
-                <a16:creationId xmlns:a16="http://schemas.microsoft.com/office/drawing/2014/main" id="{2F655891-0751-43CE-968B-868010D3CF8F}"/>
+                <a16:creationId xmlns:a16="http://schemas.microsoft.com/office/drawing/2014/main" id="{5F7473A0-EB20-47EB-9FAC-C1E2BCC98ADC}"/>
               </a:ext>
             </a:extLst>
           </p:cNvPr>
@@ -5574,21 +5346,18 @@
           <a:p>
             <a:r>
               <a:rPr lang="pl-PL" dirty="0" err="1"/>
-              <a:t>Sendgrid</a:t>
-            </a:r>
-            <a:r>
-              <a:rPr lang="pl-PL" dirty="0"/>
-              <a:t> – e-mail API</a:t>
-            </a:r>
-          </a:p>
-        </p:txBody>
-      </p:sp>
-      <p:sp>
-        <p:nvSpPr>
-          <p:cNvPr id="3" name="Symbol zastępczy zawartości 2">
+              <a:t>Frameworki</a:t>
+            </a:r>
+            <a:endParaRPr lang="pl-PL" dirty="0"/>
+          </a:p>
+        </p:txBody>
+      </p:sp>
+      <p:sp>
+        <p:nvSpPr>
+          <p:cNvPr id="6" name="Symbol zastępczy zawartości 5">
             <a:extLst>
               <a:ext uri="{FF2B5EF4-FFF2-40B4-BE49-F238E27FC236}">
-                <a16:creationId xmlns:a16="http://schemas.microsoft.com/office/drawing/2014/main" id="{9DAF8F79-0520-4A2A-87B3-55CC710E6332}"/>
+                <a16:creationId xmlns:a16="http://schemas.microsoft.com/office/drawing/2014/main" id="{8053B8E4-466B-4655-8A3A-1341EA980997}"/>
               </a:ext>
             </a:extLst>
           </p:cNvPr>
@@ -5599,465 +5368,52 @@
             <p:ph idx="1"/>
           </p:nvPr>
         </p:nvSpPr>
-        <p:spPr/>
-        <p:txBody>
-          <a:bodyPr/>
-          <a:lstStyle/>
-          <a:p>
+        <p:spPr>
+          <a:xfrm>
+            <a:off x="1261872" y="1828801"/>
+            <a:ext cx="8595360" cy="1402080"/>
+          </a:xfrm>
+        </p:spPr>
+        <p:txBody>
+          <a:bodyPr vert="horz" lIns="91440" tIns="45720" rIns="91440" bIns="45720" rtlCol="0" anchor="t">
+            <a:normAutofit/>
+          </a:bodyPr>
+          <a:lstStyle/>
+          <a:p>
+            <a:r>
+              <a:rPr lang="pl-PL" dirty="0" err="1"/>
+              <a:t>Entity</a:t>
+            </a:r>
+            <a:r>
+              <a:rPr lang="pl-PL" dirty="0"/>
+              <a:t> Framework </a:t>
+            </a:r>
+            <a:r>
+              <a:rPr lang="pl-PL"/>
+              <a:t>Core</a:t>
+            </a:r>
             <a:endParaRPr lang="pl-PL" dirty="0"/>
           </a:p>
-        </p:txBody>
-      </p:sp>
-      <p:sp>
-        <p:nvSpPr>
-          <p:cNvPr id="18" name="Prostokąt: zaokrąglone rogi 17">
-            <a:extLst>
-              <a:ext uri="{FF2B5EF4-FFF2-40B4-BE49-F238E27FC236}">
-                <a16:creationId xmlns:a16="http://schemas.microsoft.com/office/drawing/2014/main" id="{EA86AB15-EF01-471B-A4CE-445339B1B72A}"/>
-              </a:ext>
-            </a:extLst>
-          </p:cNvPr>
-          <p:cNvSpPr/>
-          <p:nvPr/>
-        </p:nvSpPr>
-        <p:spPr>
-          <a:xfrm>
-            <a:off x="1159252" y="2965201"/>
-            <a:ext cx="1776549" cy="862149"/>
-          </a:xfrm>
-          <a:prstGeom prst="roundRect">
-            <a:avLst/>
-          </a:prstGeom>
-        </p:spPr>
-        <p:style>
-          <a:lnRef idx="2">
-            <a:schemeClr val="accent1">
-              <a:shade val="50000"/>
-            </a:schemeClr>
-          </a:lnRef>
-          <a:fillRef idx="1">
-            <a:schemeClr val="accent1"/>
-          </a:fillRef>
-          <a:effectRef idx="0">
-            <a:schemeClr val="accent1"/>
-          </a:effectRef>
-          <a:fontRef idx="minor">
-            <a:schemeClr val="lt1"/>
-          </a:fontRef>
-        </p:style>
-        <p:txBody>
-          <a:bodyPr rtlCol="0" anchor="ctr"/>
-          <a:lstStyle/>
-          <a:p>
-            <a:pPr algn="ctr"/>
-            <a:r>
-              <a:rPr lang="pl-PL" dirty="0"/>
-              <a:t>Aplikacja </a:t>
-            </a:r>
+          <a:p>
             <a:r>
               <a:rPr lang="pl-PL" dirty="0" err="1"/>
-              <a:t>ASP.Net</a:t>
-            </a:r>
-            <a:r>
-              <a:rPr lang="pl-PL" dirty="0"/>
-              <a:t> </a:t>
-            </a:r>
-            <a:r>
-              <a:rPr lang="pl-PL" dirty="0" err="1"/>
-              <a:t>Core</a:t>
+              <a:t>Stripe</a:t>
             </a:r>
             <a:endParaRPr lang="pl-PL" dirty="0"/>
           </a:p>
-        </p:txBody>
-      </p:sp>
-      <p:sp>
-        <p:nvSpPr>
-          <p:cNvPr id="19" name="Prostokąt: zaokrąglone rogi 18">
-            <a:extLst>
-              <a:ext uri="{FF2B5EF4-FFF2-40B4-BE49-F238E27FC236}">
-                <a16:creationId xmlns:a16="http://schemas.microsoft.com/office/drawing/2014/main" id="{2246912C-58E9-4B5F-B2A1-6CC9918CA29A}"/>
-              </a:ext>
-            </a:extLst>
-          </p:cNvPr>
-          <p:cNvSpPr/>
-          <p:nvPr/>
-        </p:nvSpPr>
-        <p:spPr>
-          <a:xfrm>
-            <a:off x="992778" y="4737397"/>
-            <a:ext cx="2117195" cy="862149"/>
-          </a:xfrm>
-          <a:prstGeom prst="roundRect">
-            <a:avLst/>
-          </a:prstGeom>
-        </p:spPr>
-        <p:style>
-          <a:lnRef idx="2">
-            <a:schemeClr val="accent1">
-              <a:shade val="50000"/>
-            </a:schemeClr>
-          </a:lnRef>
-          <a:fillRef idx="1">
-            <a:schemeClr val="accent1"/>
-          </a:fillRef>
-          <a:effectRef idx="0">
-            <a:schemeClr val="accent1"/>
-          </a:effectRef>
-          <a:fontRef idx="minor">
-            <a:schemeClr val="lt1"/>
-          </a:fontRef>
-        </p:style>
-        <p:txBody>
-          <a:bodyPr rtlCol="0" anchor="ctr"/>
-          <a:lstStyle/>
-          <a:p>
-            <a:pPr algn="ctr"/>
-            <a:r>
-              <a:rPr lang="pl-PL" dirty="0" err="1"/>
-              <a:t>EmailOptions</a:t>
-            </a:r>
-            <a:r>
-              <a:rPr lang="pl-PL" dirty="0"/>
-              <a:t> i </a:t>
-            </a:r>
-            <a:r>
-              <a:rPr lang="pl-PL" dirty="0" err="1"/>
-              <a:t>SendGridClient</a:t>
-            </a:r>
-            <a:endParaRPr lang="pl-PL" dirty="0"/>
-          </a:p>
-        </p:txBody>
-      </p:sp>
-      <p:sp>
-        <p:nvSpPr>
-          <p:cNvPr id="20" name="Prostokąt: zaokrąglone rogi 19">
-            <a:extLst>
-              <a:ext uri="{FF2B5EF4-FFF2-40B4-BE49-F238E27FC236}">
-                <a16:creationId xmlns:a16="http://schemas.microsoft.com/office/drawing/2014/main" id="{BBDCCE45-A743-4D23-B85E-E79E9AEC9BA3}"/>
-              </a:ext>
-            </a:extLst>
-          </p:cNvPr>
-          <p:cNvSpPr/>
-          <p:nvPr/>
-        </p:nvSpPr>
-        <p:spPr>
-          <a:xfrm>
-            <a:off x="4573011" y="4737397"/>
-            <a:ext cx="1776549" cy="862149"/>
-          </a:xfrm>
-          <a:prstGeom prst="roundRect">
-            <a:avLst/>
-          </a:prstGeom>
-        </p:spPr>
-        <p:style>
-          <a:lnRef idx="2">
-            <a:schemeClr val="accent1">
-              <a:shade val="50000"/>
-            </a:schemeClr>
-          </a:lnRef>
-          <a:fillRef idx="1">
-            <a:schemeClr val="accent1"/>
-          </a:fillRef>
-          <a:effectRef idx="0">
-            <a:schemeClr val="accent1"/>
-          </a:effectRef>
-          <a:fontRef idx="minor">
-            <a:schemeClr val="lt1"/>
-          </a:fontRef>
-        </p:style>
-        <p:txBody>
-          <a:bodyPr rtlCol="0" anchor="ctr"/>
-          <a:lstStyle/>
-          <a:p>
-            <a:pPr algn="ctr"/>
+          <a:p>
             <a:r>
               <a:rPr lang="pl-PL" dirty="0" err="1"/>
               <a:t>Sendgrid</a:t>
             </a:r>
-            <a:r>
-              <a:rPr lang="pl-PL" dirty="0"/>
-              <a:t> API</a:t>
-            </a:r>
-          </a:p>
-        </p:txBody>
-      </p:sp>
-      <p:sp>
-        <p:nvSpPr>
-          <p:cNvPr id="21" name="Strzałka: w prawo 20">
-            <a:extLst>
-              <a:ext uri="{FF2B5EF4-FFF2-40B4-BE49-F238E27FC236}">
-                <a16:creationId xmlns:a16="http://schemas.microsoft.com/office/drawing/2014/main" id="{2FD987A4-2A1C-4D8F-81B4-5461D7BB13D6}"/>
-              </a:ext>
-            </a:extLst>
-          </p:cNvPr>
-          <p:cNvSpPr/>
-          <p:nvPr/>
-        </p:nvSpPr>
-        <p:spPr>
-          <a:xfrm rot="5400000">
-            <a:off x="1706839" y="4167176"/>
-            <a:ext cx="681372" cy="324075"/>
-          </a:xfrm>
-          <a:prstGeom prst="rightArrow">
-            <a:avLst/>
-          </a:prstGeom>
-        </p:spPr>
-        <p:style>
-          <a:lnRef idx="2">
-            <a:schemeClr val="accent1">
-              <a:shade val="50000"/>
-            </a:schemeClr>
-          </a:lnRef>
-          <a:fillRef idx="1">
-            <a:schemeClr val="accent1"/>
-          </a:fillRef>
-          <a:effectRef idx="0">
-            <a:schemeClr val="accent1"/>
-          </a:effectRef>
-          <a:fontRef idx="minor">
-            <a:schemeClr val="lt1"/>
-          </a:fontRef>
-        </p:style>
-        <p:txBody>
-          <a:bodyPr rtlCol="0" anchor="ctr"/>
-          <a:lstStyle/>
-          <a:p>
-            <a:pPr algn="ctr"/>
-            <a:endParaRPr lang="pl-PL"/>
-          </a:p>
-        </p:txBody>
-      </p:sp>
-      <p:sp>
-        <p:nvSpPr>
-          <p:cNvPr id="22" name="pole tekstowe 21">
-            <a:extLst>
-              <a:ext uri="{FF2B5EF4-FFF2-40B4-BE49-F238E27FC236}">
-                <a16:creationId xmlns:a16="http://schemas.microsoft.com/office/drawing/2014/main" id="{D8313037-F6A8-4AA0-9C67-F14B8C019E94}"/>
-              </a:ext>
-            </a:extLst>
-          </p:cNvPr>
-          <p:cNvSpPr txBox="1"/>
-          <p:nvPr/>
-        </p:nvSpPr>
-        <p:spPr>
-          <a:xfrm>
-            <a:off x="2138966" y="4035313"/>
-            <a:ext cx="1098378" cy="369332"/>
-          </a:xfrm>
-          <a:prstGeom prst="rect">
-            <a:avLst/>
-          </a:prstGeom>
-          <a:noFill/>
-        </p:spPr>
-        <p:txBody>
-          <a:bodyPr wrap="none" rtlCol="0">
-            <a:spAutoFit/>
-          </a:bodyPr>
-          <a:lstStyle/>
-          <a:p>
-            <a:r>
-              <a:rPr lang="pl-PL" dirty="0"/>
-              <a:t>korzysta</a:t>
-            </a:r>
-          </a:p>
-        </p:txBody>
-      </p:sp>
-      <p:sp>
-        <p:nvSpPr>
-          <p:cNvPr id="23" name="Strzałka: w prawo 22">
-            <a:extLst>
-              <a:ext uri="{FF2B5EF4-FFF2-40B4-BE49-F238E27FC236}">
-                <a16:creationId xmlns:a16="http://schemas.microsoft.com/office/drawing/2014/main" id="{35893DB5-D33E-411D-8DEC-3300C1D3939B}"/>
-              </a:ext>
-            </a:extLst>
-          </p:cNvPr>
-          <p:cNvSpPr/>
-          <p:nvPr/>
-        </p:nvSpPr>
-        <p:spPr>
-          <a:xfrm>
-            <a:off x="3262372" y="4737397"/>
-            <a:ext cx="1158240" cy="324075"/>
-          </a:xfrm>
-          <a:prstGeom prst="rightArrow">
-            <a:avLst/>
-          </a:prstGeom>
-        </p:spPr>
-        <p:style>
-          <a:lnRef idx="2">
-            <a:schemeClr val="accent1">
-              <a:shade val="50000"/>
-            </a:schemeClr>
-          </a:lnRef>
-          <a:fillRef idx="1">
-            <a:schemeClr val="accent1"/>
-          </a:fillRef>
-          <a:effectRef idx="0">
-            <a:schemeClr val="accent1"/>
-          </a:effectRef>
-          <a:fontRef idx="minor">
-            <a:schemeClr val="lt1"/>
-          </a:fontRef>
-        </p:style>
-        <p:txBody>
-          <a:bodyPr rtlCol="0" anchor="ctr"/>
-          <a:lstStyle/>
-          <a:p>
-            <a:pPr algn="ctr"/>
-            <a:endParaRPr lang="pl-PL"/>
-          </a:p>
-        </p:txBody>
-      </p:sp>
-      <p:sp>
-        <p:nvSpPr>
-          <p:cNvPr id="24" name="pole tekstowe 23">
-            <a:extLst>
-              <a:ext uri="{FF2B5EF4-FFF2-40B4-BE49-F238E27FC236}">
-                <a16:creationId xmlns:a16="http://schemas.microsoft.com/office/drawing/2014/main" id="{339606C3-A802-4E75-8122-C981DB4F320A}"/>
-              </a:ext>
-            </a:extLst>
-          </p:cNvPr>
-          <p:cNvSpPr txBox="1"/>
-          <p:nvPr/>
-        </p:nvSpPr>
-        <p:spPr>
-          <a:xfrm>
-            <a:off x="3191546" y="4435077"/>
-            <a:ext cx="1180131" cy="369332"/>
-          </a:xfrm>
-          <a:prstGeom prst="rect">
-            <a:avLst/>
-          </a:prstGeom>
-          <a:noFill/>
-        </p:spPr>
-        <p:txBody>
-          <a:bodyPr wrap="none" rtlCol="0">
-            <a:spAutoFit/>
-          </a:bodyPr>
-          <a:lstStyle/>
-          <a:p>
-            <a:r>
-              <a:rPr lang="pl-PL" dirty="0"/>
-              <a:t>wywołuje</a:t>
-            </a:r>
-          </a:p>
-        </p:txBody>
-      </p:sp>
-      <p:sp>
-        <p:nvSpPr>
-          <p:cNvPr id="25" name="Strzałka: w prawo 24">
-            <a:extLst>
-              <a:ext uri="{FF2B5EF4-FFF2-40B4-BE49-F238E27FC236}">
-                <a16:creationId xmlns:a16="http://schemas.microsoft.com/office/drawing/2014/main" id="{69227147-1B23-4C79-AB39-AADABF45E6BF}"/>
-              </a:ext>
-            </a:extLst>
-          </p:cNvPr>
-          <p:cNvSpPr/>
-          <p:nvPr/>
-        </p:nvSpPr>
-        <p:spPr>
-          <a:xfrm rot="10800000">
-            <a:off x="3202492" y="5275471"/>
-            <a:ext cx="1158240" cy="324075"/>
-          </a:xfrm>
-          <a:prstGeom prst="rightArrow">
-            <a:avLst/>
-          </a:prstGeom>
-        </p:spPr>
-        <p:style>
-          <a:lnRef idx="2">
-            <a:schemeClr val="accent1">
-              <a:shade val="50000"/>
-            </a:schemeClr>
-          </a:lnRef>
-          <a:fillRef idx="1">
-            <a:schemeClr val="accent1"/>
-          </a:fillRef>
-          <a:effectRef idx="0">
-            <a:schemeClr val="accent1"/>
-          </a:effectRef>
-          <a:fontRef idx="minor">
-            <a:schemeClr val="lt1"/>
-          </a:fontRef>
-        </p:style>
-        <p:txBody>
-          <a:bodyPr rtlCol="0" anchor="ctr"/>
-          <a:lstStyle/>
-          <a:p>
-            <a:pPr algn="ctr"/>
-            <a:endParaRPr lang="pl-PL"/>
-          </a:p>
-        </p:txBody>
-      </p:sp>
-      <p:sp>
-        <p:nvSpPr>
-          <p:cNvPr id="26" name="pole tekstowe 25">
-            <a:extLst>
-              <a:ext uri="{FF2B5EF4-FFF2-40B4-BE49-F238E27FC236}">
-                <a16:creationId xmlns:a16="http://schemas.microsoft.com/office/drawing/2014/main" id="{AC9D4ED4-CC2D-41A0-AE13-D31D53B6C26E}"/>
-              </a:ext>
-            </a:extLst>
-          </p:cNvPr>
-          <p:cNvSpPr txBox="1"/>
-          <p:nvPr/>
-        </p:nvSpPr>
-        <p:spPr>
-          <a:xfrm>
-            <a:off x="3191546" y="5532534"/>
-            <a:ext cx="1322798" cy="369332"/>
-          </a:xfrm>
-          <a:prstGeom prst="rect">
-            <a:avLst/>
-          </a:prstGeom>
-          <a:noFill/>
-        </p:spPr>
-        <p:txBody>
-          <a:bodyPr wrap="none" rtlCol="0">
-            <a:spAutoFit/>
-          </a:bodyPr>
-          <a:lstStyle/>
-          <a:p>
-            <a:r>
-              <a:rPr lang="pl-PL" dirty="0"/>
-              <a:t>odpowiada</a:t>
-            </a:r>
-          </a:p>
-        </p:txBody>
-      </p:sp>
-      <p:pic>
-        <p:nvPicPr>
-          <p:cNvPr id="27" name="Obraz 26">
-            <a:extLst>
-              <a:ext uri="{FF2B5EF4-FFF2-40B4-BE49-F238E27FC236}">
-                <a16:creationId xmlns:a16="http://schemas.microsoft.com/office/drawing/2014/main" id="{374D52F0-9196-44C9-B821-78242C54DC2A}"/>
-              </a:ext>
-            </a:extLst>
-          </p:cNvPr>
-          <p:cNvPicPr>
-            <a:picLocks noChangeAspect="1"/>
-          </p:cNvPicPr>
-          <p:nvPr/>
-        </p:nvPicPr>
-        <p:blipFill>
-          <a:blip r:embed="rId2"/>
-          <a:stretch>
-            <a:fillRect/>
-          </a:stretch>
-        </p:blipFill>
-        <p:spPr>
-          <a:xfrm>
-            <a:off x="6246270" y="2069138"/>
-            <a:ext cx="3929805" cy="2335507"/>
-          </a:xfrm>
-          <a:prstGeom prst="rect">
-            <a:avLst/>
-          </a:prstGeom>
-        </p:spPr>
-      </p:pic>
+            <a:endParaRPr lang="pl-PL" dirty="0"/>
+          </a:p>
+        </p:txBody>
+      </p:sp>
     </p:spTree>
     <p:extLst>
       <p:ext uri="{BB962C8B-B14F-4D97-AF65-F5344CB8AC3E}">
-        <p14:creationId xmlns:p14="http://schemas.microsoft.com/office/powerpoint/2010/main" val="1061040325"/>
+        <p14:creationId xmlns:p14="http://schemas.microsoft.com/office/powerpoint/2010/main" val="1257251168"/>
       </p:ext>
     </p:extLst>
   </p:cSld>
@@ -6089,7 +5445,7 @@
           <p:cNvPr id="2" name="Tytuł 1">
             <a:extLst>
               <a:ext uri="{FF2B5EF4-FFF2-40B4-BE49-F238E27FC236}">
-                <a16:creationId xmlns:a16="http://schemas.microsoft.com/office/drawing/2014/main" id="{CE80579C-84DE-48BB-A341-1DEB50393F10}"/>
+                <a16:creationId xmlns:a16="http://schemas.microsoft.com/office/drawing/2014/main" id="{7D521247-F99E-4288-BA43-27EA423979D9}"/>
               </a:ext>
             </a:extLst>
           </p:cNvPr>
@@ -6106,66 +5462,693 @@
           <a:lstStyle/>
           <a:p>
             <a:r>
+              <a:rPr lang="pl-PL" dirty="0" err="1"/>
+              <a:t>Entity</a:t>
+            </a:r>
+            <a:r>
               <a:rPr lang="pl-PL" dirty="0"/>
-              <a:t>Interfejs użytkownika</a:t>
-            </a:r>
-          </a:p>
-        </p:txBody>
-      </p:sp>
-      <p:sp>
-        <p:nvSpPr>
-          <p:cNvPr id="3" name="Symbol zastępczy zawartości 2">
+              <a:t> Framework </a:t>
+            </a:r>
+            <a:r>
+              <a:rPr lang="pl-PL" dirty="0" err="1"/>
+              <a:t>Core</a:t>
+            </a:r>
+            <a:endParaRPr lang="pl-PL" dirty="0"/>
+          </a:p>
+        </p:txBody>
+      </p:sp>
+      <p:sp>
+        <p:nvSpPr>
+          <p:cNvPr id="4" name="Prostokąt: zaokrąglone rogi 3">
             <a:extLst>
               <a:ext uri="{FF2B5EF4-FFF2-40B4-BE49-F238E27FC236}">
-                <a16:creationId xmlns:a16="http://schemas.microsoft.com/office/drawing/2014/main" id="{9EB40BD8-B84F-4FCC-BC21-BC1F26B66D11}"/>
+                <a16:creationId xmlns:a16="http://schemas.microsoft.com/office/drawing/2014/main" id="{196FE014-16BF-40B2-B0F7-5B74DAEFB519}"/>
               </a:ext>
             </a:extLst>
           </p:cNvPr>
-          <p:cNvSpPr>
-            <a:spLocks noGrp="1"/>
-          </p:cNvSpPr>
-          <p:nvPr>
-            <p:ph idx="1"/>
-          </p:nvPr>
-        </p:nvSpPr>
-        <p:spPr/>
-        <p:txBody>
-          <a:bodyPr vert="horz" lIns="91440" tIns="45720" rIns="91440" bIns="45720" rtlCol="0" anchor="t">
-            <a:normAutofit/>
+          <p:cNvSpPr/>
+          <p:nvPr/>
+        </p:nvSpPr>
+        <p:spPr>
+          <a:xfrm>
+            <a:off x="779418" y="2566851"/>
+            <a:ext cx="1776549" cy="862149"/>
+          </a:xfrm>
+          <a:prstGeom prst="roundRect">
+            <a:avLst/>
+          </a:prstGeom>
+        </p:spPr>
+        <p:style>
+          <a:lnRef idx="2">
+            <a:schemeClr val="accent1">
+              <a:shade val="50000"/>
+            </a:schemeClr>
+          </a:lnRef>
+          <a:fillRef idx="1">
+            <a:schemeClr val="accent1"/>
+          </a:fillRef>
+          <a:effectRef idx="0">
+            <a:schemeClr val="accent1"/>
+          </a:effectRef>
+          <a:fontRef idx="minor">
+            <a:schemeClr val="lt1"/>
+          </a:fontRef>
+        </p:style>
+        <p:txBody>
+          <a:bodyPr rtlCol="0" anchor="ctr"/>
+          <a:lstStyle/>
+          <a:p>
+            <a:pPr algn="ctr"/>
+            <a:r>
+              <a:rPr lang="pl-PL" dirty="0"/>
+              <a:t>Aplikacja </a:t>
+            </a:r>
+            <a:r>
+              <a:rPr lang="pl-PL" dirty="0" err="1"/>
+              <a:t>ASP.Net</a:t>
+            </a:r>
+            <a:r>
+              <a:rPr lang="pl-PL" dirty="0"/>
+              <a:t> </a:t>
+            </a:r>
+            <a:r>
+              <a:rPr lang="pl-PL" dirty="0" err="1"/>
+              <a:t>Core</a:t>
+            </a:r>
+            <a:endParaRPr lang="pl-PL" dirty="0"/>
+          </a:p>
+        </p:txBody>
+      </p:sp>
+      <p:sp>
+        <p:nvSpPr>
+          <p:cNvPr id="5" name="Prostokąt: zaokrąglone rogi 4">
+            <a:extLst>
+              <a:ext uri="{FF2B5EF4-FFF2-40B4-BE49-F238E27FC236}">
+                <a16:creationId xmlns:a16="http://schemas.microsoft.com/office/drawing/2014/main" id="{4FD5509A-8ADD-452C-AF54-410055B42998}"/>
+              </a:ext>
+            </a:extLst>
+          </p:cNvPr>
+          <p:cNvSpPr/>
+          <p:nvPr/>
+        </p:nvSpPr>
+        <p:spPr>
+          <a:xfrm>
+            <a:off x="4019005" y="2566849"/>
+            <a:ext cx="1776549" cy="862149"/>
+          </a:xfrm>
+          <a:prstGeom prst="roundRect">
+            <a:avLst/>
+          </a:prstGeom>
+        </p:spPr>
+        <p:style>
+          <a:lnRef idx="2">
+            <a:schemeClr val="accent1">
+              <a:shade val="50000"/>
+            </a:schemeClr>
+          </a:lnRef>
+          <a:fillRef idx="1">
+            <a:schemeClr val="accent1"/>
+          </a:fillRef>
+          <a:effectRef idx="0">
+            <a:schemeClr val="accent1"/>
+          </a:effectRef>
+          <a:fontRef idx="minor">
+            <a:schemeClr val="lt1"/>
+          </a:fontRef>
+        </p:style>
+        <p:txBody>
+          <a:bodyPr rtlCol="0" anchor="ctr"/>
+          <a:lstStyle/>
+          <a:p>
+            <a:pPr algn="ctr"/>
+            <a:r>
+              <a:rPr lang="pl-PL" dirty="0"/>
+              <a:t>Model i </a:t>
+            </a:r>
+            <a:r>
+              <a:rPr lang="pl-PL" dirty="0" err="1"/>
+              <a:t>DbContext</a:t>
+            </a:r>
+            <a:endParaRPr lang="pl-PL" dirty="0"/>
+          </a:p>
+        </p:txBody>
+      </p:sp>
+      <p:sp>
+        <p:nvSpPr>
+          <p:cNvPr id="6" name="Prostokąt: zaokrąglone rogi 5">
+            <a:extLst>
+              <a:ext uri="{FF2B5EF4-FFF2-40B4-BE49-F238E27FC236}">
+                <a16:creationId xmlns:a16="http://schemas.microsoft.com/office/drawing/2014/main" id="{061925D0-E45C-4BBA-A1F0-F8DCFD55675D}"/>
+              </a:ext>
+            </a:extLst>
+          </p:cNvPr>
+          <p:cNvSpPr/>
+          <p:nvPr/>
+        </p:nvSpPr>
+        <p:spPr>
+          <a:xfrm>
+            <a:off x="6100356" y="3901440"/>
+            <a:ext cx="1776549" cy="862149"/>
+          </a:xfrm>
+          <a:prstGeom prst="roundRect">
+            <a:avLst/>
+          </a:prstGeom>
+        </p:spPr>
+        <p:style>
+          <a:lnRef idx="2">
+            <a:schemeClr val="accent1">
+              <a:shade val="50000"/>
+            </a:schemeClr>
+          </a:lnRef>
+          <a:fillRef idx="1">
+            <a:schemeClr val="accent1"/>
+          </a:fillRef>
+          <a:effectRef idx="0">
+            <a:schemeClr val="accent1"/>
+          </a:effectRef>
+          <a:fontRef idx="minor">
+            <a:schemeClr val="lt1"/>
+          </a:fontRef>
+        </p:style>
+        <p:txBody>
+          <a:bodyPr rtlCol="0" anchor="ctr"/>
+          <a:lstStyle/>
+          <a:p>
+            <a:pPr algn="ctr"/>
+            <a:r>
+              <a:rPr lang="pl-PL" dirty="0"/>
+              <a:t>Migracje</a:t>
+            </a:r>
+          </a:p>
+        </p:txBody>
+      </p:sp>
+      <p:sp>
+        <p:nvSpPr>
+          <p:cNvPr id="7" name="Prostokąt: zaokrąglone rogi 6">
+            <a:extLst>
+              <a:ext uri="{FF2B5EF4-FFF2-40B4-BE49-F238E27FC236}">
+                <a16:creationId xmlns:a16="http://schemas.microsoft.com/office/drawing/2014/main" id="{9FDDE0A7-A396-47E6-8EF6-1FECAD1A60D5}"/>
+              </a:ext>
+            </a:extLst>
+          </p:cNvPr>
+          <p:cNvSpPr/>
+          <p:nvPr/>
+        </p:nvSpPr>
+        <p:spPr>
+          <a:xfrm>
+            <a:off x="4341222" y="5188450"/>
+            <a:ext cx="1776549" cy="862149"/>
+          </a:xfrm>
+          <a:prstGeom prst="roundRect">
+            <a:avLst/>
+          </a:prstGeom>
+        </p:spPr>
+        <p:style>
+          <a:lnRef idx="2">
+            <a:schemeClr val="accent1">
+              <a:shade val="50000"/>
+            </a:schemeClr>
+          </a:lnRef>
+          <a:fillRef idx="1">
+            <a:schemeClr val="accent1"/>
+          </a:fillRef>
+          <a:effectRef idx="0">
+            <a:schemeClr val="accent1"/>
+          </a:effectRef>
+          <a:fontRef idx="minor">
+            <a:schemeClr val="lt1"/>
+          </a:fontRef>
+        </p:style>
+        <p:txBody>
+          <a:bodyPr rtlCol="0" anchor="ctr"/>
+          <a:lstStyle/>
+          <a:p>
+            <a:pPr algn="ctr"/>
+            <a:r>
+              <a:rPr lang="pl-PL" dirty="0"/>
+              <a:t>Skrypt SQL</a:t>
+            </a:r>
+          </a:p>
+        </p:txBody>
+      </p:sp>
+      <p:sp>
+        <p:nvSpPr>
+          <p:cNvPr id="8" name="Prostokąt: zaokrąglone rogi 7">
+            <a:extLst>
+              <a:ext uri="{FF2B5EF4-FFF2-40B4-BE49-F238E27FC236}">
+                <a16:creationId xmlns:a16="http://schemas.microsoft.com/office/drawing/2014/main" id="{25FB8CDF-6F5A-44E7-A119-8FB7C6C00624}"/>
+              </a:ext>
+            </a:extLst>
+          </p:cNvPr>
+          <p:cNvSpPr/>
+          <p:nvPr/>
+        </p:nvSpPr>
+        <p:spPr>
+          <a:xfrm>
+            <a:off x="7876905" y="5188450"/>
+            <a:ext cx="1776549" cy="862149"/>
+          </a:xfrm>
+          <a:prstGeom prst="roundRect">
+            <a:avLst/>
+          </a:prstGeom>
+        </p:spPr>
+        <p:style>
+          <a:lnRef idx="2">
+            <a:schemeClr val="accent1">
+              <a:shade val="50000"/>
+            </a:schemeClr>
+          </a:lnRef>
+          <a:fillRef idx="1">
+            <a:schemeClr val="accent1"/>
+          </a:fillRef>
+          <a:effectRef idx="0">
+            <a:schemeClr val="accent1"/>
+          </a:effectRef>
+          <a:fontRef idx="minor">
+            <a:schemeClr val="lt1"/>
+          </a:fontRef>
+        </p:style>
+        <p:txBody>
+          <a:bodyPr rtlCol="0" anchor="ctr"/>
+          <a:lstStyle/>
+          <a:p>
+            <a:pPr algn="ctr"/>
+            <a:r>
+              <a:rPr lang="pl-PL" dirty="0"/>
+              <a:t>Baza danych</a:t>
+            </a:r>
+          </a:p>
+        </p:txBody>
+      </p:sp>
+      <p:sp>
+        <p:nvSpPr>
+          <p:cNvPr id="14" name="Strzałka: w prawo 13">
+            <a:extLst>
+              <a:ext uri="{FF2B5EF4-FFF2-40B4-BE49-F238E27FC236}">
+                <a16:creationId xmlns:a16="http://schemas.microsoft.com/office/drawing/2014/main" id="{BCD1F377-1D7B-4E8B-9ADA-69655A861E54}"/>
+              </a:ext>
+            </a:extLst>
+          </p:cNvPr>
+          <p:cNvSpPr/>
+          <p:nvPr/>
+        </p:nvSpPr>
+        <p:spPr>
+          <a:xfrm>
+            <a:off x="2708366" y="2835887"/>
+            <a:ext cx="1158240" cy="324075"/>
+          </a:xfrm>
+          <a:prstGeom prst="rightArrow">
+            <a:avLst/>
+          </a:prstGeom>
+        </p:spPr>
+        <p:style>
+          <a:lnRef idx="2">
+            <a:schemeClr val="accent1">
+              <a:shade val="50000"/>
+            </a:schemeClr>
+          </a:lnRef>
+          <a:fillRef idx="1">
+            <a:schemeClr val="accent1"/>
+          </a:fillRef>
+          <a:effectRef idx="0">
+            <a:schemeClr val="accent1"/>
+          </a:effectRef>
+          <a:fontRef idx="minor">
+            <a:schemeClr val="lt1"/>
+          </a:fontRef>
+        </p:style>
+        <p:txBody>
+          <a:bodyPr rtlCol="0" anchor="ctr"/>
+          <a:lstStyle/>
+          <a:p>
+            <a:pPr algn="ctr"/>
+            <a:endParaRPr lang="pl-PL"/>
+          </a:p>
+        </p:txBody>
+      </p:sp>
+      <p:sp>
+        <p:nvSpPr>
+          <p:cNvPr id="15" name="pole tekstowe 14">
+            <a:extLst>
+              <a:ext uri="{FF2B5EF4-FFF2-40B4-BE49-F238E27FC236}">
+                <a16:creationId xmlns:a16="http://schemas.microsoft.com/office/drawing/2014/main" id="{D6DE99AB-5AA9-4592-A22E-A12F892B1B2A}"/>
+              </a:ext>
+            </a:extLst>
+          </p:cNvPr>
+          <p:cNvSpPr txBox="1"/>
+          <p:nvPr/>
+        </p:nvSpPr>
+        <p:spPr>
+          <a:xfrm>
+            <a:off x="2708366" y="2466555"/>
+            <a:ext cx="1098378" cy="369332"/>
+          </a:xfrm>
+          <a:prstGeom prst="rect">
+            <a:avLst/>
+          </a:prstGeom>
+          <a:noFill/>
+        </p:spPr>
+        <p:txBody>
+          <a:bodyPr wrap="none" rtlCol="0">
+            <a:spAutoFit/>
           </a:bodyPr>
           <a:lstStyle/>
           <a:p>
             <a:r>
-              <a:rPr lang="pl-PL"/>
-              <a:t>Razor Pages </a:t>
-            </a:r>
-            <a:endParaRPr lang="pl-PL" dirty="0"/>
-          </a:p>
-          <a:p>
-            <a:r>
-              <a:rPr lang="pl-PL"/>
-              <a:t>Bootstrap</a:t>
-            </a:r>
-            <a:endParaRPr lang="pl-PL" dirty="0"/>
-          </a:p>
-          <a:p>
-            <a:pPr marL="0" indent="0">
-              <a:buNone/>
-            </a:pPr>
-            <a:endParaRPr lang="pl-PL" dirty="0"/>
-          </a:p>
-          <a:p>
-            <a:endParaRPr lang="pl-PL" dirty="0"/>
-          </a:p>
-          <a:p>
-            <a:endParaRPr lang="pl-PL" dirty="0"/>
+              <a:rPr lang="pl-PL" dirty="0"/>
+              <a:t>korzysta</a:t>
+            </a:r>
+          </a:p>
+        </p:txBody>
+      </p:sp>
+      <p:sp>
+        <p:nvSpPr>
+          <p:cNvPr id="16" name="Strzałka: w prawo 15">
+            <a:extLst>
+              <a:ext uri="{FF2B5EF4-FFF2-40B4-BE49-F238E27FC236}">
+                <a16:creationId xmlns:a16="http://schemas.microsoft.com/office/drawing/2014/main" id="{E6839D4B-FFA6-46CD-BBBE-F4DBA8DBE385}"/>
+              </a:ext>
+            </a:extLst>
+          </p:cNvPr>
+          <p:cNvSpPr/>
+          <p:nvPr/>
+        </p:nvSpPr>
+        <p:spPr>
+          <a:xfrm rot="2573836">
+            <a:off x="5750981" y="3226499"/>
+            <a:ext cx="1158240" cy="324075"/>
+          </a:xfrm>
+          <a:prstGeom prst="rightArrow">
+            <a:avLst/>
+          </a:prstGeom>
+        </p:spPr>
+        <p:style>
+          <a:lnRef idx="2">
+            <a:schemeClr val="accent1">
+              <a:shade val="50000"/>
+            </a:schemeClr>
+          </a:lnRef>
+          <a:fillRef idx="1">
+            <a:schemeClr val="accent1"/>
+          </a:fillRef>
+          <a:effectRef idx="0">
+            <a:schemeClr val="accent1"/>
+          </a:effectRef>
+          <a:fontRef idx="minor">
+            <a:schemeClr val="lt1"/>
+          </a:fontRef>
+        </p:style>
+        <p:txBody>
+          <a:bodyPr rtlCol="0" anchor="ctr"/>
+          <a:lstStyle/>
+          <a:p>
+            <a:pPr algn="ctr"/>
+            <a:endParaRPr lang="pl-PL"/>
+          </a:p>
+        </p:txBody>
+      </p:sp>
+      <p:sp>
+        <p:nvSpPr>
+          <p:cNvPr id="17" name="pole tekstowe 16">
+            <a:extLst>
+              <a:ext uri="{FF2B5EF4-FFF2-40B4-BE49-F238E27FC236}">
+                <a16:creationId xmlns:a16="http://schemas.microsoft.com/office/drawing/2014/main" id="{C07615AC-DD3B-4B8A-AAEA-9D022C63BEF7}"/>
+              </a:ext>
+            </a:extLst>
+          </p:cNvPr>
+          <p:cNvSpPr txBox="1"/>
+          <p:nvPr/>
+        </p:nvSpPr>
+        <p:spPr>
+          <a:xfrm>
+            <a:off x="6310649" y="2939953"/>
+            <a:ext cx="1107996" cy="369332"/>
+          </a:xfrm>
+          <a:prstGeom prst="rect">
+            <a:avLst/>
+          </a:prstGeom>
+          <a:noFill/>
+        </p:spPr>
+        <p:txBody>
+          <a:bodyPr wrap="none" rtlCol="0">
+            <a:spAutoFit/>
+          </a:bodyPr>
+          <a:lstStyle/>
+          <a:p>
+            <a:r>
+              <a:rPr lang="pl-PL" dirty="0"/>
+              <a:t>generuje</a:t>
+            </a:r>
+          </a:p>
+        </p:txBody>
+      </p:sp>
+      <p:sp>
+        <p:nvSpPr>
+          <p:cNvPr id="18" name="Strzałka: w prawo 17">
+            <a:extLst>
+              <a:ext uri="{FF2B5EF4-FFF2-40B4-BE49-F238E27FC236}">
+                <a16:creationId xmlns:a16="http://schemas.microsoft.com/office/drawing/2014/main" id="{80F10ADF-FDE6-4DF7-94C5-7F3FA399ED01}"/>
+              </a:ext>
+            </a:extLst>
+          </p:cNvPr>
+          <p:cNvSpPr/>
+          <p:nvPr/>
+        </p:nvSpPr>
+        <p:spPr>
+          <a:xfrm rot="7973592">
+            <a:off x="4999644" y="4491847"/>
+            <a:ext cx="1158240" cy="324075"/>
+          </a:xfrm>
+          <a:prstGeom prst="rightArrow">
+            <a:avLst/>
+          </a:prstGeom>
+        </p:spPr>
+        <p:style>
+          <a:lnRef idx="2">
+            <a:schemeClr val="accent1">
+              <a:shade val="50000"/>
+            </a:schemeClr>
+          </a:lnRef>
+          <a:fillRef idx="1">
+            <a:schemeClr val="accent1"/>
+          </a:fillRef>
+          <a:effectRef idx="0">
+            <a:schemeClr val="accent1"/>
+          </a:effectRef>
+          <a:fontRef idx="minor">
+            <a:schemeClr val="lt1"/>
+          </a:fontRef>
+        </p:style>
+        <p:txBody>
+          <a:bodyPr rtlCol="0" anchor="ctr"/>
+          <a:lstStyle/>
+          <a:p>
+            <a:pPr algn="ctr"/>
+            <a:endParaRPr lang="pl-PL"/>
+          </a:p>
+        </p:txBody>
+      </p:sp>
+      <p:sp>
+        <p:nvSpPr>
+          <p:cNvPr id="19" name="pole tekstowe 18">
+            <a:extLst>
+              <a:ext uri="{FF2B5EF4-FFF2-40B4-BE49-F238E27FC236}">
+                <a16:creationId xmlns:a16="http://schemas.microsoft.com/office/drawing/2014/main" id="{3390D1A1-B34A-4443-A97B-C88D00349D84}"/>
+              </a:ext>
+            </a:extLst>
+          </p:cNvPr>
+          <p:cNvSpPr txBox="1"/>
+          <p:nvPr/>
+        </p:nvSpPr>
+        <p:spPr>
+          <a:xfrm>
+            <a:off x="4470768" y="4304525"/>
+            <a:ext cx="1107996" cy="369332"/>
+          </a:xfrm>
+          <a:prstGeom prst="rect">
+            <a:avLst/>
+          </a:prstGeom>
+          <a:noFill/>
+        </p:spPr>
+        <p:txBody>
+          <a:bodyPr wrap="none" rtlCol="0">
+            <a:spAutoFit/>
+          </a:bodyPr>
+          <a:lstStyle/>
+          <a:p>
+            <a:r>
+              <a:rPr lang="pl-PL" dirty="0"/>
+              <a:t>generuje</a:t>
+            </a:r>
+          </a:p>
+        </p:txBody>
+      </p:sp>
+      <p:sp>
+        <p:nvSpPr>
+          <p:cNvPr id="20" name="Strzałka: w prawo 19">
+            <a:extLst>
+              <a:ext uri="{FF2B5EF4-FFF2-40B4-BE49-F238E27FC236}">
+                <a16:creationId xmlns:a16="http://schemas.microsoft.com/office/drawing/2014/main" id="{3F8B85F8-F2C5-470A-8B8B-AEE52E052CCC}"/>
+              </a:ext>
+            </a:extLst>
+          </p:cNvPr>
+          <p:cNvSpPr/>
+          <p:nvPr/>
+        </p:nvSpPr>
+        <p:spPr>
+          <a:xfrm rot="2573836">
+            <a:off x="7871517" y="4506980"/>
+            <a:ext cx="1158240" cy="324075"/>
+          </a:xfrm>
+          <a:prstGeom prst="rightArrow">
+            <a:avLst/>
+          </a:prstGeom>
+        </p:spPr>
+        <p:style>
+          <a:lnRef idx="2">
+            <a:schemeClr val="accent1">
+              <a:shade val="50000"/>
+            </a:schemeClr>
+          </a:lnRef>
+          <a:fillRef idx="1">
+            <a:schemeClr val="accent1"/>
+          </a:fillRef>
+          <a:effectRef idx="0">
+            <a:schemeClr val="accent1"/>
+          </a:effectRef>
+          <a:fontRef idx="minor">
+            <a:schemeClr val="lt1"/>
+          </a:fontRef>
+        </p:style>
+        <p:txBody>
+          <a:bodyPr rtlCol="0" anchor="ctr"/>
+          <a:lstStyle/>
+          <a:p>
+            <a:pPr algn="ctr"/>
+            <a:endParaRPr lang="pl-PL"/>
+          </a:p>
+        </p:txBody>
+      </p:sp>
+      <p:sp>
+        <p:nvSpPr>
+          <p:cNvPr id="21" name="pole tekstowe 20">
+            <a:extLst>
+              <a:ext uri="{FF2B5EF4-FFF2-40B4-BE49-F238E27FC236}">
+                <a16:creationId xmlns:a16="http://schemas.microsoft.com/office/drawing/2014/main" id="{5D14E219-10B8-4F97-8728-E121B3373D70}"/>
+              </a:ext>
+            </a:extLst>
+          </p:cNvPr>
+          <p:cNvSpPr txBox="1"/>
+          <p:nvPr/>
+        </p:nvSpPr>
+        <p:spPr>
+          <a:xfrm>
+            <a:off x="8431185" y="4220434"/>
+            <a:ext cx="1388522" cy="369332"/>
+          </a:xfrm>
+          <a:prstGeom prst="rect">
+            <a:avLst/>
+          </a:prstGeom>
+          <a:noFill/>
+        </p:spPr>
+        <p:txBody>
+          <a:bodyPr wrap="none" rtlCol="0">
+            <a:spAutoFit/>
+          </a:bodyPr>
+          <a:lstStyle/>
+          <a:p>
+            <a:r>
+              <a:rPr lang="pl-PL" dirty="0"/>
+              <a:t>aktualizuje</a:t>
+            </a:r>
+          </a:p>
+        </p:txBody>
+      </p:sp>
+      <p:sp>
+        <p:nvSpPr>
+          <p:cNvPr id="22" name="Strzałka: w prawo 21">
+            <a:extLst>
+              <a:ext uri="{FF2B5EF4-FFF2-40B4-BE49-F238E27FC236}">
+                <a16:creationId xmlns:a16="http://schemas.microsoft.com/office/drawing/2014/main" id="{851C729A-CA0A-4A4E-8078-307DEBAFA466}"/>
+              </a:ext>
+            </a:extLst>
+          </p:cNvPr>
+          <p:cNvSpPr/>
+          <p:nvPr/>
+        </p:nvSpPr>
+        <p:spPr>
+          <a:xfrm>
+            <a:off x="6405155" y="5525931"/>
+            <a:ext cx="1158240" cy="324075"/>
+          </a:xfrm>
+          <a:prstGeom prst="rightArrow">
+            <a:avLst/>
+          </a:prstGeom>
+        </p:spPr>
+        <p:style>
+          <a:lnRef idx="2">
+            <a:schemeClr val="accent1">
+              <a:shade val="50000"/>
+            </a:schemeClr>
+          </a:lnRef>
+          <a:fillRef idx="1">
+            <a:schemeClr val="accent1"/>
+          </a:fillRef>
+          <a:effectRef idx="0">
+            <a:schemeClr val="accent1"/>
+          </a:effectRef>
+          <a:fontRef idx="minor">
+            <a:schemeClr val="lt1"/>
+          </a:fontRef>
+        </p:style>
+        <p:txBody>
+          <a:bodyPr rtlCol="0" anchor="ctr"/>
+          <a:lstStyle/>
+          <a:p>
+            <a:pPr algn="ctr"/>
+            <a:endParaRPr lang="pl-PL"/>
+          </a:p>
+        </p:txBody>
+      </p:sp>
+      <p:sp>
+        <p:nvSpPr>
+          <p:cNvPr id="23" name="pole tekstowe 22">
+            <a:extLst>
+              <a:ext uri="{FF2B5EF4-FFF2-40B4-BE49-F238E27FC236}">
+                <a16:creationId xmlns:a16="http://schemas.microsoft.com/office/drawing/2014/main" id="{2C837667-31BB-4660-9E3E-15FEF5E90769}"/>
+              </a:ext>
+            </a:extLst>
+          </p:cNvPr>
+          <p:cNvSpPr txBox="1"/>
+          <p:nvPr/>
+        </p:nvSpPr>
+        <p:spPr>
+          <a:xfrm>
+            <a:off x="6290014" y="5188450"/>
+            <a:ext cx="1388522" cy="369332"/>
+          </a:xfrm>
+          <a:prstGeom prst="rect">
+            <a:avLst/>
+          </a:prstGeom>
+          <a:noFill/>
+        </p:spPr>
+        <p:txBody>
+          <a:bodyPr wrap="none" rtlCol="0">
+            <a:spAutoFit/>
+          </a:bodyPr>
+          <a:lstStyle/>
+          <a:p>
+            <a:r>
+              <a:rPr lang="pl-PL" dirty="0"/>
+              <a:t>aktualizuje</a:t>
+            </a:r>
           </a:p>
         </p:txBody>
       </p:sp>
     </p:spTree>
     <p:extLst>
       <p:ext uri="{BB962C8B-B14F-4D97-AF65-F5344CB8AC3E}">
-        <p14:creationId xmlns:p14="http://schemas.microsoft.com/office/powerpoint/2010/main" val="2830796625"/>
+        <p14:creationId xmlns:p14="http://schemas.microsoft.com/office/powerpoint/2010/main" val="1277708116"/>
       </p:ext>
     </p:extLst>
   </p:cSld>
@@ -6197,7 +6180,7 @@
           <p:cNvPr id="2" name="Tytuł 1">
             <a:extLst>
               <a:ext uri="{FF2B5EF4-FFF2-40B4-BE49-F238E27FC236}">
-                <a16:creationId xmlns:a16="http://schemas.microsoft.com/office/drawing/2014/main" id="{CE80579C-84DE-48BB-A341-1DEB50393F10}"/>
+                <a16:creationId xmlns:a16="http://schemas.microsoft.com/office/drawing/2014/main" id="{9360C57A-54BB-463B-B11D-EDA92B04C4E1}"/>
               </a:ext>
             </a:extLst>
           </p:cNvPr>
@@ -6214,64 +6197,437 @@
           <a:lstStyle/>
           <a:p>
             <a:r>
+              <a:rPr lang="pl-PL" dirty="0" err="1"/>
+              <a:t>Stripe</a:t>
+            </a:r>
+            <a:r>
               <a:rPr lang="pl-PL" dirty="0"/>
-              <a:t>Interfejs użytkownika</a:t>
-            </a:r>
-          </a:p>
-        </p:txBody>
-      </p:sp>
-      <p:sp>
-        <p:nvSpPr>
-          <p:cNvPr id="3" name="Symbol zastępczy zawartości 2">
+              <a:t> – płatności online</a:t>
+            </a:r>
+          </a:p>
+        </p:txBody>
+      </p:sp>
+      <p:sp>
+        <p:nvSpPr>
+          <p:cNvPr id="4" name="Prostokąt: zaokrąglone rogi 3">
             <a:extLst>
               <a:ext uri="{FF2B5EF4-FFF2-40B4-BE49-F238E27FC236}">
-                <a16:creationId xmlns:a16="http://schemas.microsoft.com/office/drawing/2014/main" id="{9EB40BD8-B84F-4FCC-BC21-BC1F26B66D11}"/>
+                <a16:creationId xmlns:a16="http://schemas.microsoft.com/office/drawing/2014/main" id="{2856FFAD-AF17-4BC7-8AFD-5E17A224F5EB}"/>
               </a:ext>
             </a:extLst>
           </p:cNvPr>
-          <p:cNvSpPr>
-            <a:spLocks noGrp="1"/>
-          </p:cNvSpPr>
-          <p:nvPr>
-            <p:ph idx="1"/>
-          </p:nvPr>
-        </p:nvSpPr>
-        <p:spPr/>
-        <p:txBody>
-          <a:bodyPr vert="horz" lIns="91440" tIns="45720" rIns="91440" bIns="45720" rtlCol="0" anchor="t">
-            <a:normAutofit/>
+          <p:cNvSpPr/>
+          <p:nvPr/>
+        </p:nvSpPr>
+        <p:spPr>
+          <a:xfrm>
+            <a:off x="1681766" y="2895533"/>
+            <a:ext cx="1776549" cy="862149"/>
+          </a:xfrm>
+          <a:prstGeom prst="roundRect">
+            <a:avLst/>
+          </a:prstGeom>
+        </p:spPr>
+        <p:style>
+          <a:lnRef idx="2">
+            <a:schemeClr val="accent1">
+              <a:shade val="50000"/>
+            </a:schemeClr>
+          </a:lnRef>
+          <a:fillRef idx="1">
+            <a:schemeClr val="accent1"/>
+          </a:fillRef>
+          <a:effectRef idx="0">
+            <a:schemeClr val="accent1"/>
+          </a:effectRef>
+          <a:fontRef idx="minor">
+            <a:schemeClr val="lt1"/>
+          </a:fontRef>
+        </p:style>
+        <p:txBody>
+          <a:bodyPr rtlCol="0" anchor="ctr"/>
+          <a:lstStyle/>
+          <a:p>
+            <a:pPr algn="ctr"/>
+            <a:r>
+              <a:rPr lang="pl-PL" dirty="0"/>
+              <a:t>Aplikacja </a:t>
+            </a:r>
+            <a:r>
+              <a:rPr lang="pl-PL" dirty="0" err="1"/>
+              <a:t>ASP.Net</a:t>
+            </a:r>
+            <a:r>
+              <a:rPr lang="pl-PL" dirty="0"/>
+              <a:t> </a:t>
+            </a:r>
+            <a:r>
+              <a:rPr lang="pl-PL" dirty="0" err="1"/>
+              <a:t>Core</a:t>
+            </a:r>
+            <a:endParaRPr lang="pl-PL" dirty="0"/>
+          </a:p>
+        </p:txBody>
+      </p:sp>
+      <p:sp>
+        <p:nvSpPr>
+          <p:cNvPr id="5" name="Prostokąt: zaokrąglone rogi 4">
+            <a:extLst>
+              <a:ext uri="{FF2B5EF4-FFF2-40B4-BE49-F238E27FC236}">
+                <a16:creationId xmlns:a16="http://schemas.microsoft.com/office/drawing/2014/main" id="{A5BB7905-DE24-434F-8803-BF58C4B9F39D}"/>
+              </a:ext>
+            </a:extLst>
+          </p:cNvPr>
+          <p:cNvSpPr/>
+          <p:nvPr/>
+        </p:nvSpPr>
+        <p:spPr>
+          <a:xfrm>
+            <a:off x="1681766" y="4717885"/>
+            <a:ext cx="1776549" cy="862149"/>
+          </a:xfrm>
+          <a:prstGeom prst="roundRect">
+            <a:avLst/>
+          </a:prstGeom>
+        </p:spPr>
+        <p:style>
+          <a:lnRef idx="2">
+            <a:schemeClr val="accent1">
+              <a:shade val="50000"/>
+            </a:schemeClr>
+          </a:lnRef>
+          <a:fillRef idx="1">
+            <a:schemeClr val="accent1"/>
+          </a:fillRef>
+          <a:effectRef idx="0">
+            <a:schemeClr val="accent1"/>
+          </a:effectRef>
+          <a:fontRef idx="minor">
+            <a:schemeClr val="lt1"/>
+          </a:fontRef>
+        </p:style>
+        <p:txBody>
+          <a:bodyPr rtlCol="0" anchor="ctr"/>
+          <a:lstStyle/>
+          <a:p>
+            <a:pPr algn="ctr"/>
+            <a:r>
+              <a:rPr lang="pl-PL" dirty="0"/>
+              <a:t>Klucz </a:t>
+            </a:r>
+            <a:r>
+              <a:rPr lang="pl-PL" dirty="0" err="1"/>
+              <a:t>Auth</a:t>
+            </a:r>
+            <a:r>
+              <a:rPr lang="pl-PL" dirty="0"/>
+              <a:t> i Model</a:t>
+            </a:r>
+          </a:p>
+        </p:txBody>
+      </p:sp>
+      <p:sp>
+        <p:nvSpPr>
+          <p:cNvPr id="6" name="Prostokąt: zaokrąglone rogi 5">
+            <a:extLst>
+              <a:ext uri="{FF2B5EF4-FFF2-40B4-BE49-F238E27FC236}">
+                <a16:creationId xmlns:a16="http://schemas.microsoft.com/office/drawing/2014/main" id="{E682170E-E940-42D9-9AAD-A6D27E69C478}"/>
+              </a:ext>
+            </a:extLst>
+          </p:cNvPr>
+          <p:cNvSpPr/>
+          <p:nvPr/>
+        </p:nvSpPr>
+        <p:spPr>
+          <a:xfrm>
+            <a:off x="4921353" y="4717885"/>
+            <a:ext cx="1776549" cy="862149"/>
+          </a:xfrm>
+          <a:prstGeom prst="roundRect">
+            <a:avLst/>
+          </a:prstGeom>
+        </p:spPr>
+        <p:style>
+          <a:lnRef idx="2">
+            <a:schemeClr val="accent1">
+              <a:shade val="50000"/>
+            </a:schemeClr>
+          </a:lnRef>
+          <a:fillRef idx="1">
+            <a:schemeClr val="accent1"/>
+          </a:fillRef>
+          <a:effectRef idx="0">
+            <a:schemeClr val="accent1"/>
+          </a:effectRef>
+          <a:fontRef idx="minor">
+            <a:schemeClr val="lt1"/>
+          </a:fontRef>
+        </p:style>
+        <p:txBody>
+          <a:bodyPr rtlCol="0" anchor="ctr"/>
+          <a:lstStyle/>
+          <a:p>
+            <a:pPr algn="ctr"/>
+            <a:r>
+              <a:rPr lang="pl-PL" dirty="0" err="1"/>
+              <a:t>Stripe</a:t>
+            </a:r>
+            <a:r>
+              <a:rPr lang="pl-PL" dirty="0"/>
+              <a:t> API</a:t>
+            </a:r>
+          </a:p>
+        </p:txBody>
+      </p:sp>
+      <p:sp>
+        <p:nvSpPr>
+          <p:cNvPr id="9" name="Strzałka: w prawo 8">
+            <a:extLst>
+              <a:ext uri="{FF2B5EF4-FFF2-40B4-BE49-F238E27FC236}">
+                <a16:creationId xmlns:a16="http://schemas.microsoft.com/office/drawing/2014/main" id="{15F3DC0D-0D2F-44FF-B991-ACD528E3CD99}"/>
+              </a:ext>
+            </a:extLst>
+          </p:cNvPr>
+          <p:cNvSpPr/>
+          <p:nvPr/>
+        </p:nvSpPr>
+        <p:spPr>
+          <a:xfrm rot="5400000">
+            <a:off x="2229353" y="4097508"/>
+            <a:ext cx="681372" cy="324075"/>
+          </a:xfrm>
+          <a:prstGeom prst="rightArrow">
+            <a:avLst/>
+          </a:prstGeom>
+        </p:spPr>
+        <p:style>
+          <a:lnRef idx="2">
+            <a:schemeClr val="accent1">
+              <a:shade val="50000"/>
+            </a:schemeClr>
+          </a:lnRef>
+          <a:fillRef idx="1">
+            <a:schemeClr val="accent1"/>
+          </a:fillRef>
+          <a:effectRef idx="0">
+            <a:schemeClr val="accent1"/>
+          </a:effectRef>
+          <a:fontRef idx="minor">
+            <a:schemeClr val="lt1"/>
+          </a:fontRef>
+        </p:style>
+        <p:txBody>
+          <a:bodyPr rtlCol="0" anchor="ctr"/>
+          <a:lstStyle/>
+          <a:p>
+            <a:pPr algn="ctr"/>
+            <a:endParaRPr lang="pl-PL"/>
+          </a:p>
+        </p:txBody>
+      </p:sp>
+      <p:sp>
+        <p:nvSpPr>
+          <p:cNvPr id="10" name="pole tekstowe 9">
+            <a:extLst>
+              <a:ext uri="{FF2B5EF4-FFF2-40B4-BE49-F238E27FC236}">
+                <a16:creationId xmlns:a16="http://schemas.microsoft.com/office/drawing/2014/main" id="{FB75A087-849C-44DF-AB45-3EA4C535434A}"/>
+              </a:ext>
+            </a:extLst>
+          </p:cNvPr>
+          <p:cNvSpPr txBox="1"/>
+          <p:nvPr/>
+        </p:nvSpPr>
+        <p:spPr>
+          <a:xfrm>
+            <a:off x="2661480" y="3965645"/>
+            <a:ext cx="1098378" cy="369332"/>
+          </a:xfrm>
+          <a:prstGeom prst="rect">
+            <a:avLst/>
+          </a:prstGeom>
+          <a:noFill/>
+        </p:spPr>
+        <p:txBody>
+          <a:bodyPr wrap="none" rtlCol="0">
+            <a:spAutoFit/>
           </a:bodyPr>
           <a:lstStyle/>
           <a:p>
             <a:r>
-              <a:rPr lang="pl-PL"/>
-              <a:t>Struktura Areas oraz Shared</a:t>
-            </a:r>
-            <a:endParaRPr lang="pl-PL" dirty="0"/>
-          </a:p>
-          <a:p>
-            <a:endParaRPr lang="pl-PL" dirty="0"/>
-          </a:p>
-          <a:p>
-            <a:pPr marL="0" indent="0">
-              <a:buNone/>
-            </a:pPr>
-            <a:endParaRPr lang="pl-PL" dirty="0"/>
-          </a:p>
-          <a:p>
-            <a:endParaRPr lang="pl-PL" dirty="0"/>
-          </a:p>
-          <a:p>
-            <a:endParaRPr lang="pl-PL" dirty="0"/>
+              <a:rPr lang="pl-PL" dirty="0"/>
+              <a:t>korzysta</a:t>
+            </a:r>
+          </a:p>
+        </p:txBody>
+      </p:sp>
+      <p:sp>
+        <p:nvSpPr>
+          <p:cNvPr id="11" name="Strzałka: w prawo 10">
+            <a:extLst>
+              <a:ext uri="{FF2B5EF4-FFF2-40B4-BE49-F238E27FC236}">
+                <a16:creationId xmlns:a16="http://schemas.microsoft.com/office/drawing/2014/main" id="{964D6393-C5B8-4D19-864B-4732FFBA0BFD}"/>
+              </a:ext>
+            </a:extLst>
+          </p:cNvPr>
+          <p:cNvSpPr/>
+          <p:nvPr/>
+        </p:nvSpPr>
+        <p:spPr>
+          <a:xfrm>
+            <a:off x="3610714" y="4717885"/>
+            <a:ext cx="1158240" cy="324075"/>
+          </a:xfrm>
+          <a:prstGeom prst="rightArrow">
+            <a:avLst/>
+          </a:prstGeom>
+        </p:spPr>
+        <p:style>
+          <a:lnRef idx="2">
+            <a:schemeClr val="accent1">
+              <a:shade val="50000"/>
+            </a:schemeClr>
+          </a:lnRef>
+          <a:fillRef idx="1">
+            <a:schemeClr val="accent1"/>
+          </a:fillRef>
+          <a:effectRef idx="0">
+            <a:schemeClr val="accent1"/>
+          </a:effectRef>
+          <a:fontRef idx="minor">
+            <a:schemeClr val="lt1"/>
+          </a:fontRef>
+        </p:style>
+        <p:txBody>
+          <a:bodyPr rtlCol="0" anchor="ctr"/>
+          <a:lstStyle/>
+          <a:p>
+            <a:pPr algn="ctr"/>
+            <a:endParaRPr lang="pl-PL"/>
+          </a:p>
+        </p:txBody>
+      </p:sp>
+      <p:sp>
+        <p:nvSpPr>
+          <p:cNvPr id="12" name="pole tekstowe 11">
+            <a:extLst>
+              <a:ext uri="{FF2B5EF4-FFF2-40B4-BE49-F238E27FC236}">
+                <a16:creationId xmlns:a16="http://schemas.microsoft.com/office/drawing/2014/main" id="{0950CA78-9CC2-46BC-8DA9-2B4844928BF0}"/>
+              </a:ext>
+            </a:extLst>
+          </p:cNvPr>
+          <p:cNvSpPr txBox="1"/>
+          <p:nvPr/>
+        </p:nvSpPr>
+        <p:spPr>
+          <a:xfrm>
+            <a:off x="3539888" y="4415565"/>
+            <a:ext cx="1180131" cy="369332"/>
+          </a:xfrm>
+          <a:prstGeom prst="rect">
+            <a:avLst/>
+          </a:prstGeom>
+          <a:noFill/>
+        </p:spPr>
+        <p:txBody>
+          <a:bodyPr wrap="none" rtlCol="0">
+            <a:spAutoFit/>
+          </a:bodyPr>
+          <a:lstStyle/>
+          <a:p>
+            <a:r>
+              <a:rPr lang="pl-PL" dirty="0"/>
+              <a:t>wywołuje</a:t>
+            </a:r>
+          </a:p>
+        </p:txBody>
+      </p:sp>
+      <p:sp>
+        <p:nvSpPr>
+          <p:cNvPr id="20" name="Strzałka: w prawo 19">
+            <a:extLst>
+              <a:ext uri="{FF2B5EF4-FFF2-40B4-BE49-F238E27FC236}">
+                <a16:creationId xmlns:a16="http://schemas.microsoft.com/office/drawing/2014/main" id="{780722DB-6D36-45B5-8871-0186277B07ED}"/>
+              </a:ext>
+            </a:extLst>
+          </p:cNvPr>
+          <p:cNvSpPr/>
+          <p:nvPr/>
+        </p:nvSpPr>
+        <p:spPr>
+          <a:xfrm rot="10800000">
+            <a:off x="3550834" y="5255959"/>
+            <a:ext cx="1158240" cy="324075"/>
+          </a:xfrm>
+          <a:prstGeom prst="rightArrow">
+            <a:avLst/>
+          </a:prstGeom>
+        </p:spPr>
+        <p:style>
+          <a:lnRef idx="2">
+            <a:schemeClr val="accent1">
+              <a:shade val="50000"/>
+            </a:schemeClr>
+          </a:lnRef>
+          <a:fillRef idx="1">
+            <a:schemeClr val="accent1"/>
+          </a:fillRef>
+          <a:effectRef idx="0">
+            <a:schemeClr val="accent1"/>
+          </a:effectRef>
+          <a:fontRef idx="minor">
+            <a:schemeClr val="lt1"/>
+          </a:fontRef>
+        </p:style>
+        <p:txBody>
+          <a:bodyPr rtlCol="0" anchor="ctr"/>
+          <a:lstStyle/>
+          <a:p>
+            <a:pPr algn="ctr"/>
+            <a:endParaRPr lang="pl-PL"/>
+          </a:p>
+        </p:txBody>
+      </p:sp>
+      <p:sp>
+        <p:nvSpPr>
+          <p:cNvPr id="21" name="pole tekstowe 20">
+            <a:extLst>
+              <a:ext uri="{FF2B5EF4-FFF2-40B4-BE49-F238E27FC236}">
+                <a16:creationId xmlns:a16="http://schemas.microsoft.com/office/drawing/2014/main" id="{0DF1D55B-58DA-4327-9695-B098EBE39EB3}"/>
+              </a:ext>
+            </a:extLst>
+          </p:cNvPr>
+          <p:cNvSpPr txBox="1"/>
+          <p:nvPr/>
+        </p:nvSpPr>
+        <p:spPr>
+          <a:xfrm>
+            <a:off x="3539888" y="5513022"/>
+            <a:ext cx="1322798" cy="369332"/>
+          </a:xfrm>
+          <a:prstGeom prst="rect">
+            <a:avLst/>
+          </a:prstGeom>
+          <a:noFill/>
+        </p:spPr>
+        <p:txBody>
+          <a:bodyPr wrap="none" rtlCol="0">
+            <a:spAutoFit/>
+          </a:bodyPr>
+          <a:lstStyle/>
+          <a:p>
+            <a:r>
+              <a:rPr lang="pl-PL" dirty="0"/>
+              <a:t>odpowiada</a:t>
+            </a:r>
           </a:p>
         </p:txBody>
       </p:sp>
       <p:pic>
         <p:nvPicPr>
-          <p:cNvPr id="4" name="Obraz 4">
+          <p:cNvPr id="23" name="Obraz 22">
             <a:extLst>
               <a:ext uri="{FF2B5EF4-FFF2-40B4-BE49-F238E27FC236}">
-                <a16:creationId xmlns:a16="http://schemas.microsoft.com/office/drawing/2014/main" id="{4782A249-DCEB-406B-8B94-60F25E6C25D7}"/>
+                <a16:creationId xmlns:a16="http://schemas.microsoft.com/office/drawing/2014/main" id="{9FD9DAB2-CCE2-4BA1-8330-4F93B049D562}"/>
               </a:ext>
             </a:extLst>
           </p:cNvPr>
@@ -6288,38 +6644,8 @@
         </p:blipFill>
         <p:spPr>
           <a:xfrm>
-            <a:off x="1390716" y="2394857"/>
-            <a:ext cx="3575826" cy="3635829"/>
-          </a:xfrm>
-          <a:prstGeom prst="rect">
-            <a:avLst/>
-          </a:prstGeom>
-        </p:spPr>
-      </p:pic>
-      <p:pic>
-        <p:nvPicPr>
-          <p:cNvPr id="5" name="Obraz 5" descr="Obraz zawierający stół&#10;&#10;Opis wygenerowany automatycznie">
-            <a:extLst>
-              <a:ext uri="{FF2B5EF4-FFF2-40B4-BE49-F238E27FC236}">
-                <a16:creationId xmlns:a16="http://schemas.microsoft.com/office/drawing/2014/main" id="{4FE5F266-E2C3-4CA1-8EEB-250776E6772F}"/>
-              </a:ext>
-            </a:extLst>
-          </p:cNvPr>
-          <p:cNvPicPr>
-            <a:picLocks noChangeAspect="1"/>
-          </p:cNvPicPr>
-          <p:nvPr/>
-        </p:nvPicPr>
-        <p:blipFill>
-          <a:blip r:embed="rId3"/>
-          <a:stretch>
-            <a:fillRect/>
-          </a:stretch>
-        </p:blipFill>
-        <p:spPr>
-          <a:xfrm>
-            <a:off x="6528707" y="2287360"/>
-            <a:ext cx="3565071" cy="3676650"/>
+            <a:off x="7544968" y="1729217"/>
+            <a:ext cx="2723245" cy="4472856"/>
           </a:xfrm>
           <a:prstGeom prst="rect">
             <a:avLst/>
@@ -6329,7 +6655,7 @@
     </p:spTree>
     <p:extLst>
       <p:ext uri="{BB962C8B-B14F-4D97-AF65-F5344CB8AC3E}">
-        <p14:creationId xmlns:p14="http://schemas.microsoft.com/office/powerpoint/2010/main" val="419028080"/>
+        <p14:creationId xmlns:p14="http://schemas.microsoft.com/office/powerpoint/2010/main" val="3228916118"/>
       </p:ext>
     </p:extLst>
   </p:cSld>

</xml_diff>

<commit_message>
Prezentacja - czesc dotyczaca analizy i architekturyv2
</commit_message>
<xml_diff>
--- a/Dokumentacja/Prezentacja.pptx
+++ b/Dokumentacja/Prezentacja.pptx
@@ -10,16 +10,17 @@
     <p:sldId id="269" r:id="rId4"/>
     <p:sldId id="257" r:id="rId5"/>
     <p:sldId id="258" r:id="rId6"/>
-    <p:sldId id="270" r:id="rId7"/>
-    <p:sldId id="260" r:id="rId8"/>
-    <p:sldId id="261" r:id="rId9"/>
-    <p:sldId id="262" r:id="rId10"/>
-    <p:sldId id="263" r:id="rId11"/>
-    <p:sldId id="259" r:id="rId12"/>
-    <p:sldId id="267" r:id="rId13"/>
-    <p:sldId id="266" r:id="rId14"/>
-    <p:sldId id="265" r:id="rId15"/>
-    <p:sldId id="264" r:id="rId16"/>
+    <p:sldId id="271" r:id="rId7"/>
+    <p:sldId id="270" r:id="rId8"/>
+    <p:sldId id="260" r:id="rId9"/>
+    <p:sldId id="261" r:id="rId10"/>
+    <p:sldId id="262" r:id="rId11"/>
+    <p:sldId id="263" r:id="rId12"/>
+    <p:sldId id="259" r:id="rId13"/>
+    <p:sldId id="267" r:id="rId14"/>
+    <p:sldId id="266" r:id="rId15"/>
+    <p:sldId id="265" r:id="rId16"/>
+    <p:sldId id="264" r:id="rId17"/>
   </p:sldIdLst>
   <p:sldSz cx="12192000" cy="6858000"/>
   <p:notesSz cx="6858000" cy="9144000"/>
@@ -136,6 +137,7 @@
           <p14:sldIdLst>
             <p14:sldId id="257"/>
             <p14:sldId id="258"/>
+            <p14:sldId id="271"/>
             <p14:sldId id="270"/>
             <p14:sldId id="260"/>
             <p14:sldId id="261"/>
@@ -3611,7 +3613,7 @@
           <p:cNvPr id="2" name="Tytuł 1">
             <a:extLst>
               <a:ext uri="{FF2B5EF4-FFF2-40B4-BE49-F238E27FC236}">
-                <a16:creationId xmlns:a16="http://schemas.microsoft.com/office/drawing/2014/main" id="{2F655891-0751-43CE-968B-868010D3CF8F}"/>
+                <a16:creationId xmlns:a16="http://schemas.microsoft.com/office/drawing/2014/main" id="{9360C57A-54BB-463B-B11D-EDA92B04C4E1}"/>
               </a:ext>
             </a:extLst>
           </p:cNvPr>
@@ -3629,46 +3631,21 @@
           <a:p>
             <a:r>
               <a:rPr lang="pl-PL" dirty="0" err="1"/>
-              <a:t>Sendgrid</a:t>
+              <a:t>Stripe</a:t>
             </a:r>
             <a:r>
               <a:rPr lang="pl-PL" dirty="0"/>
-              <a:t> – e-mail API</a:t>
-            </a:r>
-          </a:p>
-        </p:txBody>
-      </p:sp>
-      <p:sp>
-        <p:nvSpPr>
-          <p:cNvPr id="3" name="Symbol zastępczy zawartości 2">
+              <a:t> – płatności online</a:t>
+            </a:r>
+          </a:p>
+        </p:txBody>
+      </p:sp>
+      <p:sp>
+        <p:nvSpPr>
+          <p:cNvPr id="4" name="Prostokąt: zaokrąglone rogi 3">
             <a:extLst>
               <a:ext uri="{FF2B5EF4-FFF2-40B4-BE49-F238E27FC236}">
-                <a16:creationId xmlns:a16="http://schemas.microsoft.com/office/drawing/2014/main" id="{9DAF8F79-0520-4A2A-87B3-55CC710E6332}"/>
-              </a:ext>
-            </a:extLst>
-          </p:cNvPr>
-          <p:cNvSpPr>
-            <a:spLocks noGrp="1"/>
-          </p:cNvSpPr>
-          <p:nvPr>
-            <p:ph idx="1"/>
-          </p:nvPr>
-        </p:nvSpPr>
-        <p:spPr/>
-        <p:txBody>
-          <a:bodyPr/>
-          <a:lstStyle/>
-          <a:p>
-            <a:endParaRPr lang="pl-PL" dirty="0"/>
-          </a:p>
-        </p:txBody>
-      </p:sp>
-      <p:sp>
-        <p:nvSpPr>
-          <p:cNvPr id="18" name="Prostokąt: zaokrąglone rogi 17">
-            <a:extLst>
-              <a:ext uri="{FF2B5EF4-FFF2-40B4-BE49-F238E27FC236}">
-                <a16:creationId xmlns:a16="http://schemas.microsoft.com/office/drawing/2014/main" id="{EA86AB15-EF01-471B-A4CE-445339B1B72A}"/>
+                <a16:creationId xmlns:a16="http://schemas.microsoft.com/office/drawing/2014/main" id="{2856FFAD-AF17-4BC7-8AFD-5E17A224F5EB}"/>
               </a:ext>
             </a:extLst>
           </p:cNvPr>
@@ -3677,7 +3654,7 @@
         </p:nvSpPr>
         <p:spPr>
           <a:xfrm>
-            <a:off x="1159252" y="2965201"/>
+            <a:off x="1681766" y="2895533"/>
             <a:ext cx="1776549" cy="862149"/>
           </a:xfrm>
           <a:prstGeom prst="roundRect">
@@ -3727,10 +3704,10 @@
       </p:sp>
       <p:sp>
         <p:nvSpPr>
-          <p:cNvPr id="19" name="Prostokąt: zaokrąglone rogi 18">
+          <p:cNvPr id="5" name="Prostokąt: zaokrąglone rogi 4">
             <a:extLst>
               <a:ext uri="{FF2B5EF4-FFF2-40B4-BE49-F238E27FC236}">
-                <a16:creationId xmlns:a16="http://schemas.microsoft.com/office/drawing/2014/main" id="{2246912C-58E9-4B5F-B2A1-6CC9918CA29A}"/>
+                <a16:creationId xmlns:a16="http://schemas.microsoft.com/office/drawing/2014/main" id="{A5BB7905-DE24-434F-8803-BF58C4B9F39D}"/>
               </a:ext>
             </a:extLst>
           </p:cNvPr>
@@ -3739,8 +3716,8 @@
         </p:nvSpPr>
         <p:spPr>
           <a:xfrm>
-            <a:off x="992778" y="4737397"/>
-            <a:ext cx="2117195" cy="862149"/>
+            <a:off x="1681766" y="4717885"/>
+            <a:ext cx="1776549" cy="862149"/>
           </a:xfrm>
           <a:prstGeom prst="roundRect">
             <a:avLst/>
@@ -3768,27 +3745,26 @@
           <a:p>
             <a:pPr algn="ctr"/>
             <a:r>
+              <a:rPr lang="pl-PL" dirty="0"/>
+              <a:t>Klucz </a:t>
+            </a:r>
+            <a:r>
               <a:rPr lang="pl-PL" dirty="0" err="1"/>
-              <a:t>EmailOptions</a:t>
+              <a:t>Auth</a:t>
             </a:r>
             <a:r>
               <a:rPr lang="pl-PL" dirty="0"/>
-              <a:t> i </a:t>
-            </a:r>
-            <a:r>
-              <a:rPr lang="pl-PL" dirty="0" err="1"/>
-              <a:t>SendGridClient</a:t>
-            </a:r>
-            <a:endParaRPr lang="pl-PL" dirty="0"/>
-          </a:p>
-        </p:txBody>
-      </p:sp>
-      <p:sp>
-        <p:nvSpPr>
-          <p:cNvPr id="20" name="Prostokąt: zaokrąglone rogi 19">
+              <a:t> i Model</a:t>
+            </a:r>
+          </a:p>
+        </p:txBody>
+      </p:sp>
+      <p:sp>
+        <p:nvSpPr>
+          <p:cNvPr id="6" name="Prostokąt: zaokrąglone rogi 5">
             <a:extLst>
               <a:ext uri="{FF2B5EF4-FFF2-40B4-BE49-F238E27FC236}">
-                <a16:creationId xmlns:a16="http://schemas.microsoft.com/office/drawing/2014/main" id="{BBDCCE45-A743-4D23-B85E-E79E9AEC9BA3}"/>
+                <a16:creationId xmlns:a16="http://schemas.microsoft.com/office/drawing/2014/main" id="{E682170E-E940-42D9-9AAD-A6D27E69C478}"/>
               </a:ext>
             </a:extLst>
           </p:cNvPr>
@@ -3797,7 +3773,7 @@
         </p:nvSpPr>
         <p:spPr>
           <a:xfrm>
-            <a:off x="4573011" y="4737397"/>
+            <a:off x="4921353" y="4717885"/>
             <a:ext cx="1776549" cy="862149"/>
           </a:xfrm>
           <a:prstGeom prst="roundRect">
@@ -3827,7 +3803,7 @@
             <a:pPr algn="ctr"/>
             <a:r>
               <a:rPr lang="pl-PL" dirty="0" err="1"/>
-              <a:t>Sendgrid</a:t>
+              <a:t>Stripe</a:t>
             </a:r>
             <a:r>
               <a:rPr lang="pl-PL" dirty="0"/>
@@ -3838,10 +3814,10 @@
       </p:sp>
       <p:sp>
         <p:nvSpPr>
-          <p:cNvPr id="21" name="Strzałka: w prawo 20">
+          <p:cNvPr id="9" name="Strzałka: w prawo 8">
             <a:extLst>
               <a:ext uri="{FF2B5EF4-FFF2-40B4-BE49-F238E27FC236}">
-                <a16:creationId xmlns:a16="http://schemas.microsoft.com/office/drawing/2014/main" id="{2FD987A4-2A1C-4D8F-81B4-5461D7BB13D6}"/>
+                <a16:creationId xmlns:a16="http://schemas.microsoft.com/office/drawing/2014/main" id="{15F3DC0D-0D2F-44FF-B991-ACD528E3CD99}"/>
               </a:ext>
             </a:extLst>
           </p:cNvPr>
@@ -3850,7 +3826,7 @@
         </p:nvSpPr>
         <p:spPr>
           <a:xfrm rot="5400000">
-            <a:off x="1706839" y="4167176"/>
+            <a:off x="2229353" y="4097508"/>
             <a:ext cx="681372" cy="324075"/>
           </a:xfrm>
           <a:prstGeom prst="rightArrow">
@@ -3884,10 +3860,10 @@
       </p:sp>
       <p:sp>
         <p:nvSpPr>
-          <p:cNvPr id="22" name="pole tekstowe 21">
+          <p:cNvPr id="10" name="pole tekstowe 9">
             <a:extLst>
               <a:ext uri="{FF2B5EF4-FFF2-40B4-BE49-F238E27FC236}">
-                <a16:creationId xmlns:a16="http://schemas.microsoft.com/office/drawing/2014/main" id="{D8313037-F6A8-4AA0-9C67-F14B8C019E94}"/>
+                <a16:creationId xmlns:a16="http://schemas.microsoft.com/office/drawing/2014/main" id="{FB75A087-849C-44DF-AB45-3EA4C535434A}"/>
               </a:ext>
             </a:extLst>
           </p:cNvPr>
@@ -3896,7 +3872,7 @@
         </p:nvSpPr>
         <p:spPr>
           <a:xfrm>
-            <a:off x="2138966" y="4035313"/>
+            <a:off x="2661480" y="3965645"/>
             <a:ext cx="1098378" cy="369332"/>
           </a:xfrm>
           <a:prstGeom prst="rect">
@@ -3919,10 +3895,10 @@
       </p:sp>
       <p:sp>
         <p:nvSpPr>
-          <p:cNvPr id="23" name="Strzałka: w prawo 22">
+          <p:cNvPr id="11" name="Strzałka: w prawo 10">
             <a:extLst>
               <a:ext uri="{FF2B5EF4-FFF2-40B4-BE49-F238E27FC236}">
-                <a16:creationId xmlns:a16="http://schemas.microsoft.com/office/drawing/2014/main" id="{35893DB5-D33E-411D-8DEC-3300C1D3939B}"/>
+                <a16:creationId xmlns:a16="http://schemas.microsoft.com/office/drawing/2014/main" id="{964D6393-C5B8-4D19-864B-4732FFBA0BFD}"/>
               </a:ext>
             </a:extLst>
           </p:cNvPr>
@@ -3931,7 +3907,7 @@
         </p:nvSpPr>
         <p:spPr>
           <a:xfrm>
-            <a:off x="3262372" y="4737397"/>
+            <a:off x="3610714" y="4717885"/>
             <a:ext cx="1158240" cy="324075"/>
           </a:xfrm>
           <a:prstGeom prst="rightArrow">
@@ -3965,10 +3941,10 @@
       </p:sp>
       <p:sp>
         <p:nvSpPr>
-          <p:cNvPr id="24" name="pole tekstowe 23">
+          <p:cNvPr id="12" name="pole tekstowe 11">
             <a:extLst>
               <a:ext uri="{FF2B5EF4-FFF2-40B4-BE49-F238E27FC236}">
-                <a16:creationId xmlns:a16="http://schemas.microsoft.com/office/drawing/2014/main" id="{339606C3-A802-4E75-8122-C981DB4F320A}"/>
+                <a16:creationId xmlns:a16="http://schemas.microsoft.com/office/drawing/2014/main" id="{0950CA78-9CC2-46BC-8DA9-2B4844928BF0}"/>
               </a:ext>
             </a:extLst>
           </p:cNvPr>
@@ -3977,7 +3953,7 @@
         </p:nvSpPr>
         <p:spPr>
           <a:xfrm>
-            <a:off x="3191546" y="4435077"/>
+            <a:off x="3539888" y="4415565"/>
             <a:ext cx="1180131" cy="369332"/>
           </a:xfrm>
           <a:prstGeom prst="rect">
@@ -4000,10 +3976,10 @@
       </p:sp>
       <p:sp>
         <p:nvSpPr>
-          <p:cNvPr id="25" name="Strzałka: w prawo 24">
+          <p:cNvPr id="20" name="Strzałka: w prawo 19">
             <a:extLst>
               <a:ext uri="{FF2B5EF4-FFF2-40B4-BE49-F238E27FC236}">
-                <a16:creationId xmlns:a16="http://schemas.microsoft.com/office/drawing/2014/main" id="{69227147-1B23-4C79-AB39-AADABF45E6BF}"/>
+                <a16:creationId xmlns:a16="http://schemas.microsoft.com/office/drawing/2014/main" id="{780722DB-6D36-45B5-8871-0186277B07ED}"/>
               </a:ext>
             </a:extLst>
           </p:cNvPr>
@@ -4012,7 +3988,7 @@
         </p:nvSpPr>
         <p:spPr>
           <a:xfrm rot="10800000">
-            <a:off x="3202492" y="5275471"/>
+            <a:off x="3550834" y="5255959"/>
             <a:ext cx="1158240" cy="324075"/>
           </a:xfrm>
           <a:prstGeom prst="rightArrow">
@@ -4046,10 +4022,10 @@
       </p:sp>
       <p:sp>
         <p:nvSpPr>
-          <p:cNvPr id="26" name="pole tekstowe 25">
+          <p:cNvPr id="21" name="pole tekstowe 20">
             <a:extLst>
               <a:ext uri="{FF2B5EF4-FFF2-40B4-BE49-F238E27FC236}">
-                <a16:creationId xmlns:a16="http://schemas.microsoft.com/office/drawing/2014/main" id="{AC9D4ED4-CC2D-41A0-AE13-D31D53B6C26E}"/>
+                <a16:creationId xmlns:a16="http://schemas.microsoft.com/office/drawing/2014/main" id="{0DF1D55B-58DA-4327-9695-B098EBE39EB3}"/>
               </a:ext>
             </a:extLst>
           </p:cNvPr>
@@ -4058,7 +4034,7 @@
         </p:nvSpPr>
         <p:spPr>
           <a:xfrm>
-            <a:off x="3191546" y="5532534"/>
+            <a:off x="3539888" y="5513022"/>
             <a:ext cx="1322798" cy="369332"/>
           </a:xfrm>
           <a:prstGeom prst="rect">
@@ -4081,10 +4057,10 @@
       </p:sp>
       <p:pic>
         <p:nvPicPr>
-          <p:cNvPr id="27" name="Obraz 26">
+          <p:cNvPr id="23" name="Obraz 22">
             <a:extLst>
               <a:ext uri="{FF2B5EF4-FFF2-40B4-BE49-F238E27FC236}">
-                <a16:creationId xmlns:a16="http://schemas.microsoft.com/office/drawing/2014/main" id="{374D52F0-9196-44C9-B821-78242C54DC2A}"/>
+                <a16:creationId xmlns:a16="http://schemas.microsoft.com/office/drawing/2014/main" id="{9FD9DAB2-CCE2-4BA1-8330-4F93B049D562}"/>
               </a:ext>
             </a:extLst>
           </p:cNvPr>
@@ -4101,8 +4077,8 @@
         </p:blipFill>
         <p:spPr>
           <a:xfrm>
-            <a:off x="6246270" y="2069138"/>
-            <a:ext cx="3929805" cy="2335507"/>
+            <a:off x="7544968" y="1729217"/>
+            <a:ext cx="2723245" cy="4472856"/>
           </a:xfrm>
           <a:prstGeom prst="rect">
             <a:avLst/>
@@ -4112,7 +4088,7 @@
     </p:spTree>
     <p:extLst>
       <p:ext uri="{BB962C8B-B14F-4D97-AF65-F5344CB8AC3E}">
-        <p14:creationId xmlns:p14="http://schemas.microsoft.com/office/powerpoint/2010/main" val="1061040325"/>
+        <p14:creationId xmlns:p14="http://schemas.microsoft.com/office/powerpoint/2010/main" val="3228916118"/>
       </p:ext>
     </p:extLst>
   </p:cSld>
@@ -4144,7 +4120,7 @@
           <p:cNvPr id="2" name="Tytuł 1">
             <a:extLst>
               <a:ext uri="{FF2B5EF4-FFF2-40B4-BE49-F238E27FC236}">
-                <a16:creationId xmlns:a16="http://schemas.microsoft.com/office/drawing/2014/main" id="{CE80579C-84DE-48BB-A341-1DEB50393F10}"/>
+                <a16:creationId xmlns:a16="http://schemas.microsoft.com/office/drawing/2014/main" id="{2F655891-0751-43CE-968B-868010D3CF8F}"/>
               </a:ext>
             </a:extLst>
           </p:cNvPr>
@@ -4161,8 +4137,12 @@
           <a:lstStyle/>
           <a:p>
             <a:r>
+              <a:rPr lang="pl-PL" dirty="0" err="1"/>
+              <a:t>Sendgrid</a:t>
+            </a:r>
+            <a:r>
               <a:rPr lang="pl-PL" dirty="0"/>
-              <a:t>Interfejs użytkownika</a:t>
+              <a:t> – e-mail API</a:t>
             </a:r>
           </a:p>
         </p:txBody>
@@ -4172,7 +4152,7 @@
           <p:cNvPr id="3" name="Symbol zastępczy zawartości 2">
             <a:extLst>
               <a:ext uri="{FF2B5EF4-FFF2-40B4-BE49-F238E27FC236}">
-                <a16:creationId xmlns:a16="http://schemas.microsoft.com/office/drawing/2014/main" id="{9EB40BD8-B84F-4FCC-BC21-BC1F26B66D11}"/>
+                <a16:creationId xmlns:a16="http://schemas.microsoft.com/office/drawing/2014/main" id="{9DAF8F79-0520-4A2A-87B3-55CC710E6332}"/>
               </a:ext>
             </a:extLst>
           </p:cNvPr>
@@ -4185,42 +4165,463 @@
         </p:nvSpPr>
         <p:spPr/>
         <p:txBody>
-          <a:bodyPr vert="horz" lIns="91440" tIns="45720" rIns="91440" bIns="45720" rtlCol="0" anchor="t">
-            <a:normAutofit/>
+          <a:bodyPr/>
+          <a:lstStyle/>
+          <a:p>
+            <a:endParaRPr lang="pl-PL" dirty="0"/>
+          </a:p>
+        </p:txBody>
+      </p:sp>
+      <p:sp>
+        <p:nvSpPr>
+          <p:cNvPr id="18" name="Prostokąt: zaokrąglone rogi 17">
+            <a:extLst>
+              <a:ext uri="{FF2B5EF4-FFF2-40B4-BE49-F238E27FC236}">
+                <a16:creationId xmlns:a16="http://schemas.microsoft.com/office/drawing/2014/main" id="{EA86AB15-EF01-471B-A4CE-445339B1B72A}"/>
+              </a:ext>
+            </a:extLst>
+          </p:cNvPr>
+          <p:cNvSpPr/>
+          <p:nvPr/>
+        </p:nvSpPr>
+        <p:spPr>
+          <a:xfrm>
+            <a:off x="1159252" y="2965201"/>
+            <a:ext cx="1776549" cy="862149"/>
+          </a:xfrm>
+          <a:prstGeom prst="roundRect">
+            <a:avLst/>
+          </a:prstGeom>
+        </p:spPr>
+        <p:style>
+          <a:lnRef idx="2">
+            <a:schemeClr val="accent1">
+              <a:shade val="50000"/>
+            </a:schemeClr>
+          </a:lnRef>
+          <a:fillRef idx="1">
+            <a:schemeClr val="accent1"/>
+          </a:fillRef>
+          <a:effectRef idx="0">
+            <a:schemeClr val="accent1"/>
+          </a:effectRef>
+          <a:fontRef idx="minor">
+            <a:schemeClr val="lt1"/>
+          </a:fontRef>
+        </p:style>
+        <p:txBody>
+          <a:bodyPr rtlCol="0" anchor="ctr"/>
+          <a:lstStyle/>
+          <a:p>
+            <a:pPr algn="ctr"/>
+            <a:r>
+              <a:rPr lang="pl-PL" dirty="0"/>
+              <a:t>Aplikacja </a:t>
+            </a:r>
+            <a:r>
+              <a:rPr lang="pl-PL" dirty="0" err="1"/>
+              <a:t>ASP.Net</a:t>
+            </a:r>
+            <a:r>
+              <a:rPr lang="pl-PL" dirty="0"/>
+              <a:t> </a:t>
+            </a:r>
+            <a:r>
+              <a:rPr lang="pl-PL" dirty="0" err="1"/>
+              <a:t>Core</a:t>
+            </a:r>
+            <a:endParaRPr lang="pl-PL" dirty="0"/>
+          </a:p>
+        </p:txBody>
+      </p:sp>
+      <p:sp>
+        <p:nvSpPr>
+          <p:cNvPr id="19" name="Prostokąt: zaokrąglone rogi 18">
+            <a:extLst>
+              <a:ext uri="{FF2B5EF4-FFF2-40B4-BE49-F238E27FC236}">
+                <a16:creationId xmlns:a16="http://schemas.microsoft.com/office/drawing/2014/main" id="{2246912C-58E9-4B5F-B2A1-6CC9918CA29A}"/>
+              </a:ext>
+            </a:extLst>
+          </p:cNvPr>
+          <p:cNvSpPr/>
+          <p:nvPr/>
+        </p:nvSpPr>
+        <p:spPr>
+          <a:xfrm>
+            <a:off x="992778" y="4737397"/>
+            <a:ext cx="2117195" cy="862149"/>
+          </a:xfrm>
+          <a:prstGeom prst="roundRect">
+            <a:avLst/>
+          </a:prstGeom>
+        </p:spPr>
+        <p:style>
+          <a:lnRef idx="2">
+            <a:schemeClr val="accent1">
+              <a:shade val="50000"/>
+            </a:schemeClr>
+          </a:lnRef>
+          <a:fillRef idx="1">
+            <a:schemeClr val="accent1"/>
+          </a:fillRef>
+          <a:effectRef idx="0">
+            <a:schemeClr val="accent1"/>
+          </a:effectRef>
+          <a:fontRef idx="minor">
+            <a:schemeClr val="lt1"/>
+          </a:fontRef>
+        </p:style>
+        <p:txBody>
+          <a:bodyPr rtlCol="0" anchor="ctr"/>
+          <a:lstStyle/>
+          <a:p>
+            <a:pPr algn="ctr"/>
+            <a:r>
+              <a:rPr lang="pl-PL" dirty="0" err="1"/>
+              <a:t>EmailOptions</a:t>
+            </a:r>
+            <a:r>
+              <a:rPr lang="pl-PL" dirty="0"/>
+              <a:t> i </a:t>
+            </a:r>
+            <a:r>
+              <a:rPr lang="pl-PL" dirty="0" err="1"/>
+              <a:t>SendGridClient</a:t>
+            </a:r>
+            <a:endParaRPr lang="pl-PL" dirty="0"/>
+          </a:p>
+        </p:txBody>
+      </p:sp>
+      <p:sp>
+        <p:nvSpPr>
+          <p:cNvPr id="20" name="Prostokąt: zaokrąglone rogi 19">
+            <a:extLst>
+              <a:ext uri="{FF2B5EF4-FFF2-40B4-BE49-F238E27FC236}">
+                <a16:creationId xmlns:a16="http://schemas.microsoft.com/office/drawing/2014/main" id="{BBDCCE45-A743-4D23-B85E-E79E9AEC9BA3}"/>
+              </a:ext>
+            </a:extLst>
+          </p:cNvPr>
+          <p:cNvSpPr/>
+          <p:nvPr/>
+        </p:nvSpPr>
+        <p:spPr>
+          <a:xfrm>
+            <a:off x="4573011" y="4737397"/>
+            <a:ext cx="1776549" cy="862149"/>
+          </a:xfrm>
+          <a:prstGeom prst="roundRect">
+            <a:avLst/>
+          </a:prstGeom>
+        </p:spPr>
+        <p:style>
+          <a:lnRef idx="2">
+            <a:schemeClr val="accent1">
+              <a:shade val="50000"/>
+            </a:schemeClr>
+          </a:lnRef>
+          <a:fillRef idx="1">
+            <a:schemeClr val="accent1"/>
+          </a:fillRef>
+          <a:effectRef idx="0">
+            <a:schemeClr val="accent1"/>
+          </a:effectRef>
+          <a:fontRef idx="minor">
+            <a:schemeClr val="lt1"/>
+          </a:fontRef>
+        </p:style>
+        <p:txBody>
+          <a:bodyPr rtlCol="0" anchor="ctr"/>
+          <a:lstStyle/>
+          <a:p>
+            <a:pPr algn="ctr"/>
+            <a:r>
+              <a:rPr lang="pl-PL" dirty="0" err="1"/>
+              <a:t>Sendgrid</a:t>
+            </a:r>
+            <a:r>
+              <a:rPr lang="pl-PL" dirty="0"/>
+              <a:t> API</a:t>
+            </a:r>
+          </a:p>
+        </p:txBody>
+      </p:sp>
+      <p:sp>
+        <p:nvSpPr>
+          <p:cNvPr id="21" name="Strzałka: w prawo 20">
+            <a:extLst>
+              <a:ext uri="{FF2B5EF4-FFF2-40B4-BE49-F238E27FC236}">
+                <a16:creationId xmlns:a16="http://schemas.microsoft.com/office/drawing/2014/main" id="{2FD987A4-2A1C-4D8F-81B4-5461D7BB13D6}"/>
+              </a:ext>
+            </a:extLst>
+          </p:cNvPr>
+          <p:cNvSpPr/>
+          <p:nvPr/>
+        </p:nvSpPr>
+        <p:spPr>
+          <a:xfrm rot="5400000">
+            <a:off x="1706839" y="4167176"/>
+            <a:ext cx="681372" cy="324075"/>
+          </a:xfrm>
+          <a:prstGeom prst="rightArrow">
+            <a:avLst/>
+          </a:prstGeom>
+        </p:spPr>
+        <p:style>
+          <a:lnRef idx="2">
+            <a:schemeClr val="accent1">
+              <a:shade val="50000"/>
+            </a:schemeClr>
+          </a:lnRef>
+          <a:fillRef idx="1">
+            <a:schemeClr val="accent1"/>
+          </a:fillRef>
+          <a:effectRef idx="0">
+            <a:schemeClr val="accent1"/>
+          </a:effectRef>
+          <a:fontRef idx="minor">
+            <a:schemeClr val="lt1"/>
+          </a:fontRef>
+        </p:style>
+        <p:txBody>
+          <a:bodyPr rtlCol="0" anchor="ctr"/>
+          <a:lstStyle/>
+          <a:p>
+            <a:pPr algn="ctr"/>
+            <a:endParaRPr lang="pl-PL"/>
+          </a:p>
+        </p:txBody>
+      </p:sp>
+      <p:sp>
+        <p:nvSpPr>
+          <p:cNvPr id="22" name="pole tekstowe 21">
+            <a:extLst>
+              <a:ext uri="{FF2B5EF4-FFF2-40B4-BE49-F238E27FC236}">
+                <a16:creationId xmlns:a16="http://schemas.microsoft.com/office/drawing/2014/main" id="{D8313037-F6A8-4AA0-9C67-F14B8C019E94}"/>
+              </a:ext>
+            </a:extLst>
+          </p:cNvPr>
+          <p:cNvSpPr txBox="1"/>
+          <p:nvPr/>
+        </p:nvSpPr>
+        <p:spPr>
+          <a:xfrm>
+            <a:off x="2138966" y="4035313"/>
+            <a:ext cx="1098378" cy="369332"/>
+          </a:xfrm>
+          <a:prstGeom prst="rect">
+            <a:avLst/>
+          </a:prstGeom>
+          <a:noFill/>
+        </p:spPr>
+        <p:txBody>
+          <a:bodyPr wrap="none" rtlCol="0">
+            <a:spAutoFit/>
           </a:bodyPr>
           <a:lstStyle/>
           <a:p>
             <a:r>
-              <a:rPr lang="pl-PL"/>
-              <a:t>Razor Pages </a:t>
-            </a:r>
-            <a:endParaRPr lang="pl-PL" dirty="0"/>
-          </a:p>
-          <a:p>
-            <a:r>
-              <a:rPr lang="pl-PL"/>
-              <a:t>Bootstrap</a:t>
-            </a:r>
-            <a:endParaRPr lang="pl-PL" dirty="0"/>
-          </a:p>
-          <a:p>
-            <a:pPr marL="0" indent="0">
-              <a:buNone/>
-            </a:pPr>
-            <a:endParaRPr lang="pl-PL" dirty="0"/>
-          </a:p>
-          <a:p>
-            <a:endParaRPr lang="pl-PL" dirty="0"/>
-          </a:p>
-          <a:p>
-            <a:endParaRPr lang="pl-PL" dirty="0"/>
-          </a:p>
-        </p:txBody>
-      </p:sp>
+              <a:rPr lang="pl-PL" dirty="0"/>
+              <a:t>korzysta</a:t>
+            </a:r>
+          </a:p>
+        </p:txBody>
+      </p:sp>
+      <p:sp>
+        <p:nvSpPr>
+          <p:cNvPr id="23" name="Strzałka: w prawo 22">
+            <a:extLst>
+              <a:ext uri="{FF2B5EF4-FFF2-40B4-BE49-F238E27FC236}">
+                <a16:creationId xmlns:a16="http://schemas.microsoft.com/office/drawing/2014/main" id="{35893DB5-D33E-411D-8DEC-3300C1D3939B}"/>
+              </a:ext>
+            </a:extLst>
+          </p:cNvPr>
+          <p:cNvSpPr/>
+          <p:nvPr/>
+        </p:nvSpPr>
+        <p:spPr>
+          <a:xfrm>
+            <a:off x="3262372" y="4737397"/>
+            <a:ext cx="1158240" cy="324075"/>
+          </a:xfrm>
+          <a:prstGeom prst="rightArrow">
+            <a:avLst/>
+          </a:prstGeom>
+        </p:spPr>
+        <p:style>
+          <a:lnRef idx="2">
+            <a:schemeClr val="accent1">
+              <a:shade val="50000"/>
+            </a:schemeClr>
+          </a:lnRef>
+          <a:fillRef idx="1">
+            <a:schemeClr val="accent1"/>
+          </a:fillRef>
+          <a:effectRef idx="0">
+            <a:schemeClr val="accent1"/>
+          </a:effectRef>
+          <a:fontRef idx="minor">
+            <a:schemeClr val="lt1"/>
+          </a:fontRef>
+        </p:style>
+        <p:txBody>
+          <a:bodyPr rtlCol="0" anchor="ctr"/>
+          <a:lstStyle/>
+          <a:p>
+            <a:pPr algn="ctr"/>
+            <a:endParaRPr lang="pl-PL"/>
+          </a:p>
+        </p:txBody>
+      </p:sp>
+      <p:sp>
+        <p:nvSpPr>
+          <p:cNvPr id="24" name="pole tekstowe 23">
+            <a:extLst>
+              <a:ext uri="{FF2B5EF4-FFF2-40B4-BE49-F238E27FC236}">
+                <a16:creationId xmlns:a16="http://schemas.microsoft.com/office/drawing/2014/main" id="{339606C3-A802-4E75-8122-C981DB4F320A}"/>
+              </a:ext>
+            </a:extLst>
+          </p:cNvPr>
+          <p:cNvSpPr txBox="1"/>
+          <p:nvPr/>
+        </p:nvSpPr>
+        <p:spPr>
+          <a:xfrm>
+            <a:off x="3191546" y="4435077"/>
+            <a:ext cx="1180131" cy="369332"/>
+          </a:xfrm>
+          <a:prstGeom prst="rect">
+            <a:avLst/>
+          </a:prstGeom>
+          <a:noFill/>
+        </p:spPr>
+        <p:txBody>
+          <a:bodyPr wrap="none" rtlCol="0">
+            <a:spAutoFit/>
+          </a:bodyPr>
+          <a:lstStyle/>
+          <a:p>
+            <a:r>
+              <a:rPr lang="pl-PL" dirty="0"/>
+              <a:t>wywołuje</a:t>
+            </a:r>
+          </a:p>
+        </p:txBody>
+      </p:sp>
+      <p:sp>
+        <p:nvSpPr>
+          <p:cNvPr id="25" name="Strzałka: w prawo 24">
+            <a:extLst>
+              <a:ext uri="{FF2B5EF4-FFF2-40B4-BE49-F238E27FC236}">
+                <a16:creationId xmlns:a16="http://schemas.microsoft.com/office/drawing/2014/main" id="{69227147-1B23-4C79-AB39-AADABF45E6BF}"/>
+              </a:ext>
+            </a:extLst>
+          </p:cNvPr>
+          <p:cNvSpPr/>
+          <p:nvPr/>
+        </p:nvSpPr>
+        <p:spPr>
+          <a:xfrm rot="10800000">
+            <a:off x="3202492" y="5275471"/>
+            <a:ext cx="1158240" cy="324075"/>
+          </a:xfrm>
+          <a:prstGeom prst="rightArrow">
+            <a:avLst/>
+          </a:prstGeom>
+        </p:spPr>
+        <p:style>
+          <a:lnRef idx="2">
+            <a:schemeClr val="accent1">
+              <a:shade val="50000"/>
+            </a:schemeClr>
+          </a:lnRef>
+          <a:fillRef idx="1">
+            <a:schemeClr val="accent1"/>
+          </a:fillRef>
+          <a:effectRef idx="0">
+            <a:schemeClr val="accent1"/>
+          </a:effectRef>
+          <a:fontRef idx="minor">
+            <a:schemeClr val="lt1"/>
+          </a:fontRef>
+        </p:style>
+        <p:txBody>
+          <a:bodyPr rtlCol="0" anchor="ctr"/>
+          <a:lstStyle/>
+          <a:p>
+            <a:pPr algn="ctr"/>
+            <a:endParaRPr lang="pl-PL"/>
+          </a:p>
+        </p:txBody>
+      </p:sp>
+      <p:sp>
+        <p:nvSpPr>
+          <p:cNvPr id="26" name="pole tekstowe 25">
+            <a:extLst>
+              <a:ext uri="{FF2B5EF4-FFF2-40B4-BE49-F238E27FC236}">
+                <a16:creationId xmlns:a16="http://schemas.microsoft.com/office/drawing/2014/main" id="{AC9D4ED4-CC2D-41A0-AE13-D31D53B6C26E}"/>
+              </a:ext>
+            </a:extLst>
+          </p:cNvPr>
+          <p:cNvSpPr txBox="1"/>
+          <p:nvPr/>
+        </p:nvSpPr>
+        <p:spPr>
+          <a:xfrm>
+            <a:off x="3191546" y="5532534"/>
+            <a:ext cx="1322798" cy="369332"/>
+          </a:xfrm>
+          <a:prstGeom prst="rect">
+            <a:avLst/>
+          </a:prstGeom>
+          <a:noFill/>
+        </p:spPr>
+        <p:txBody>
+          <a:bodyPr wrap="none" rtlCol="0">
+            <a:spAutoFit/>
+          </a:bodyPr>
+          <a:lstStyle/>
+          <a:p>
+            <a:r>
+              <a:rPr lang="pl-PL" dirty="0"/>
+              <a:t>odpowiada</a:t>
+            </a:r>
+          </a:p>
+        </p:txBody>
+      </p:sp>
+      <p:pic>
+        <p:nvPicPr>
+          <p:cNvPr id="27" name="Obraz 26">
+            <a:extLst>
+              <a:ext uri="{FF2B5EF4-FFF2-40B4-BE49-F238E27FC236}">
+                <a16:creationId xmlns:a16="http://schemas.microsoft.com/office/drawing/2014/main" id="{374D52F0-9196-44C9-B821-78242C54DC2A}"/>
+              </a:ext>
+            </a:extLst>
+          </p:cNvPr>
+          <p:cNvPicPr>
+            <a:picLocks noChangeAspect="1"/>
+          </p:cNvPicPr>
+          <p:nvPr/>
+        </p:nvPicPr>
+        <p:blipFill>
+          <a:blip r:embed="rId2"/>
+          <a:stretch>
+            <a:fillRect/>
+          </a:stretch>
+        </p:blipFill>
+        <p:spPr>
+          <a:xfrm>
+            <a:off x="6246270" y="2069138"/>
+            <a:ext cx="3929805" cy="2335507"/>
+          </a:xfrm>
+          <a:prstGeom prst="rect">
+            <a:avLst/>
+          </a:prstGeom>
+        </p:spPr>
+      </p:pic>
     </p:spTree>
     <p:extLst>
       <p:ext uri="{BB962C8B-B14F-4D97-AF65-F5344CB8AC3E}">
-        <p14:creationId xmlns:p14="http://schemas.microsoft.com/office/powerpoint/2010/main" val="2830796625"/>
+        <p14:creationId xmlns:p14="http://schemas.microsoft.com/office/powerpoint/2010/main" val="1061040325"/>
       </p:ext>
     </p:extLst>
   </p:cSld>
@@ -4300,11 +4701,15 @@
           <a:p>
             <a:r>
               <a:rPr lang="pl-PL"/>
-              <a:t>Struktura Areas oraz Shared</a:t>
+              <a:t>Razor Pages </a:t>
             </a:r>
             <a:endParaRPr lang="pl-PL" dirty="0"/>
           </a:p>
           <a:p>
+            <a:r>
+              <a:rPr lang="pl-PL"/>
+              <a:t>Bootstrap</a:t>
+            </a:r>
             <a:endParaRPr lang="pl-PL" dirty="0"/>
           </a:p>
           <a:p>
@@ -4321,70 +4726,10 @@
           </a:p>
         </p:txBody>
       </p:sp>
-      <p:pic>
-        <p:nvPicPr>
-          <p:cNvPr id="4" name="Obraz 4">
-            <a:extLst>
-              <a:ext uri="{FF2B5EF4-FFF2-40B4-BE49-F238E27FC236}">
-                <a16:creationId xmlns:a16="http://schemas.microsoft.com/office/drawing/2014/main" id="{4782A249-DCEB-406B-8B94-60F25E6C25D7}"/>
-              </a:ext>
-            </a:extLst>
-          </p:cNvPr>
-          <p:cNvPicPr>
-            <a:picLocks noChangeAspect="1"/>
-          </p:cNvPicPr>
-          <p:nvPr/>
-        </p:nvPicPr>
-        <p:blipFill>
-          <a:blip r:embed="rId2"/>
-          <a:stretch>
-            <a:fillRect/>
-          </a:stretch>
-        </p:blipFill>
-        <p:spPr>
-          <a:xfrm>
-            <a:off x="1390716" y="2394857"/>
-            <a:ext cx="3575826" cy="3635829"/>
-          </a:xfrm>
-          <a:prstGeom prst="rect">
-            <a:avLst/>
-          </a:prstGeom>
-        </p:spPr>
-      </p:pic>
-      <p:pic>
-        <p:nvPicPr>
-          <p:cNvPr id="5" name="Obraz 5" descr="Obraz zawierający stół&#10;&#10;Opis wygenerowany automatycznie">
-            <a:extLst>
-              <a:ext uri="{FF2B5EF4-FFF2-40B4-BE49-F238E27FC236}">
-                <a16:creationId xmlns:a16="http://schemas.microsoft.com/office/drawing/2014/main" id="{4FE5F266-E2C3-4CA1-8EEB-250776E6772F}"/>
-              </a:ext>
-            </a:extLst>
-          </p:cNvPr>
-          <p:cNvPicPr>
-            <a:picLocks noChangeAspect="1"/>
-          </p:cNvPicPr>
-          <p:nvPr/>
-        </p:nvPicPr>
-        <p:blipFill>
-          <a:blip r:embed="rId3"/>
-          <a:stretch>
-            <a:fillRect/>
-          </a:stretch>
-        </p:blipFill>
-        <p:spPr>
-          <a:xfrm>
-            <a:off x="6528707" y="2287360"/>
-            <a:ext cx="3565071" cy="3676650"/>
-          </a:xfrm>
-          <a:prstGeom prst="rect">
-            <a:avLst/>
-          </a:prstGeom>
-        </p:spPr>
-      </p:pic>
     </p:spTree>
     <p:extLst>
       <p:ext uri="{BB962C8B-B14F-4D97-AF65-F5344CB8AC3E}">
-        <p14:creationId xmlns:p14="http://schemas.microsoft.com/office/powerpoint/2010/main" val="419028080"/>
+        <p14:creationId xmlns:p14="http://schemas.microsoft.com/office/powerpoint/2010/main" val="2830796625"/>
       </p:ext>
     </p:extLst>
   </p:cSld>
@@ -4464,8 +4809,21 @@
           <a:p>
             <a:r>
               <a:rPr lang="pl-PL"/>
-              <a:t>Partial views - przykład TableButtonPartial </a:t>
-            </a:r>
+              <a:t>Struktura Areas oraz Shared</a:t>
+            </a:r>
+            <a:endParaRPr lang="pl-PL" dirty="0"/>
+          </a:p>
+          <a:p>
+            <a:endParaRPr lang="pl-PL" dirty="0"/>
+          </a:p>
+          <a:p>
+            <a:pPr marL="0" indent="0">
+              <a:buNone/>
+            </a:pPr>
+            <a:endParaRPr lang="pl-PL" dirty="0"/>
+          </a:p>
+          <a:p>
+            <a:endParaRPr lang="pl-PL" dirty="0"/>
           </a:p>
           <a:p>
             <a:endParaRPr lang="pl-PL" dirty="0"/>
@@ -4474,10 +4832,10 @@
       </p:sp>
       <p:pic>
         <p:nvPicPr>
-          <p:cNvPr id="5" name="Obraz 5" descr="Obraz zawierający tekst&#10;&#10;Opis wygenerowany automatycznie">
+          <p:cNvPr id="4" name="Obraz 4">
             <a:extLst>
               <a:ext uri="{FF2B5EF4-FFF2-40B4-BE49-F238E27FC236}">
-                <a16:creationId xmlns:a16="http://schemas.microsoft.com/office/drawing/2014/main" id="{566C36B5-CDA8-4FB3-ACD9-E73BA69B628E}"/>
+                <a16:creationId xmlns:a16="http://schemas.microsoft.com/office/drawing/2014/main" id="{4782A249-DCEB-406B-8B94-60F25E6C25D7}"/>
               </a:ext>
             </a:extLst>
           </p:cNvPr>
@@ -4494,8 +4852,38 @@
         </p:blipFill>
         <p:spPr>
           <a:xfrm>
-            <a:off x="1382486" y="2342698"/>
-            <a:ext cx="4659085" cy="1867806"/>
+            <a:off x="1390716" y="2394857"/>
+            <a:ext cx="3575826" cy="3635829"/>
+          </a:xfrm>
+          <a:prstGeom prst="rect">
+            <a:avLst/>
+          </a:prstGeom>
+        </p:spPr>
+      </p:pic>
+      <p:pic>
+        <p:nvPicPr>
+          <p:cNvPr id="5" name="Obraz 5" descr="Obraz zawierający stół&#10;&#10;Opis wygenerowany automatycznie">
+            <a:extLst>
+              <a:ext uri="{FF2B5EF4-FFF2-40B4-BE49-F238E27FC236}">
+                <a16:creationId xmlns:a16="http://schemas.microsoft.com/office/drawing/2014/main" id="{4FE5F266-E2C3-4CA1-8EEB-250776E6772F}"/>
+              </a:ext>
+            </a:extLst>
+          </p:cNvPr>
+          <p:cNvPicPr>
+            <a:picLocks noChangeAspect="1"/>
+          </p:cNvPicPr>
+          <p:nvPr/>
+        </p:nvPicPr>
+        <p:blipFill>
+          <a:blip r:embed="rId3"/>
+          <a:stretch>
+            <a:fillRect/>
+          </a:stretch>
+        </p:blipFill>
+        <p:spPr>
+          <a:xfrm>
+            <a:off x="6528707" y="2287360"/>
+            <a:ext cx="3565071" cy="3676650"/>
           </a:xfrm>
           <a:prstGeom prst="rect">
             <a:avLst/>
@@ -4505,7 +4893,7 @@
     </p:spTree>
     <p:extLst>
       <p:ext uri="{BB962C8B-B14F-4D97-AF65-F5344CB8AC3E}">
-        <p14:creationId xmlns:p14="http://schemas.microsoft.com/office/powerpoint/2010/main" val="2630863259"/>
+        <p14:creationId xmlns:p14="http://schemas.microsoft.com/office/powerpoint/2010/main" val="419028080"/>
       </p:ext>
     </p:extLst>
   </p:cSld>
@@ -4537,6 +4925,127 @@
           <p:cNvPr id="2" name="Tytuł 1">
             <a:extLst>
               <a:ext uri="{FF2B5EF4-FFF2-40B4-BE49-F238E27FC236}">
+                <a16:creationId xmlns:a16="http://schemas.microsoft.com/office/drawing/2014/main" id="{CE80579C-84DE-48BB-A341-1DEB50393F10}"/>
+              </a:ext>
+            </a:extLst>
+          </p:cNvPr>
+          <p:cNvSpPr>
+            <a:spLocks noGrp="1"/>
+          </p:cNvSpPr>
+          <p:nvPr>
+            <p:ph type="title"/>
+          </p:nvPr>
+        </p:nvSpPr>
+        <p:spPr/>
+        <p:txBody>
+          <a:bodyPr/>
+          <a:lstStyle/>
+          <a:p>
+            <a:r>
+              <a:rPr lang="pl-PL" dirty="0"/>
+              <a:t>Interfejs użytkownika</a:t>
+            </a:r>
+          </a:p>
+        </p:txBody>
+      </p:sp>
+      <p:sp>
+        <p:nvSpPr>
+          <p:cNvPr id="3" name="Symbol zastępczy zawartości 2">
+            <a:extLst>
+              <a:ext uri="{FF2B5EF4-FFF2-40B4-BE49-F238E27FC236}">
+                <a16:creationId xmlns:a16="http://schemas.microsoft.com/office/drawing/2014/main" id="{9EB40BD8-B84F-4FCC-BC21-BC1F26B66D11}"/>
+              </a:ext>
+            </a:extLst>
+          </p:cNvPr>
+          <p:cNvSpPr>
+            <a:spLocks noGrp="1"/>
+          </p:cNvSpPr>
+          <p:nvPr>
+            <p:ph idx="1"/>
+          </p:nvPr>
+        </p:nvSpPr>
+        <p:spPr/>
+        <p:txBody>
+          <a:bodyPr vert="horz" lIns="91440" tIns="45720" rIns="91440" bIns="45720" rtlCol="0" anchor="t">
+            <a:normAutofit/>
+          </a:bodyPr>
+          <a:lstStyle/>
+          <a:p>
+            <a:r>
+              <a:rPr lang="pl-PL"/>
+              <a:t>Partial views - przykład TableButtonPartial </a:t>
+            </a:r>
+          </a:p>
+          <a:p>
+            <a:endParaRPr lang="pl-PL" dirty="0"/>
+          </a:p>
+        </p:txBody>
+      </p:sp>
+      <p:pic>
+        <p:nvPicPr>
+          <p:cNvPr id="5" name="Obraz 5" descr="Obraz zawierający tekst&#10;&#10;Opis wygenerowany automatycznie">
+            <a:extLst>
+              <a:ext uri="{FF2B5EF4-FFF2-40B4-BE49-F238E27FC236}">
+                <a16:creationId xmlns:a16="http://schemas.microsoft.com/office/drawing/2014/main" id="{566C36B5-CDA8-4FB3-ACD9-E73BA69B628E}"/>
+              </a:ext>
+            </a:extLst>
+          </p:cNvPr>
+          <p:cNvPicPr>
+            <a:picLocks noChangeAspect="1"/>
+          </p:cNvPicPr>
+          <p:nvPr/>
+        </p:nvPicPr>
+        <p:blipFill>
+          <a:blip r:embed="rId2"/>
+          <a:stretch>
+            <a:fillRect/>
+          </a:stretch>
+        </p:blipFill>
+        <p:spPr>
+          <a:xfrm>
+            <a:off x="1382486" y="2342698"/>
+            <a:ext cx="4659085" cy="1867806"/>
+          </a:xfrm>
+          <a:prstGeom prst="rect">
+            <a:avLst/>
+          </a:prstGeom>
+        </p:spPr>
+      </p:pic>
+    </p:spTree>
+    <p:extLst>
+      <p:ext uri="{BB962C8B-B14F-4D97-AF65-F5344CB8AC3E}">
+        <p14:creationId xmlns:p14="http://schemas.microsoft.com/office/powerpoint/2010/main" val="2630863259"/>
+      </p:ext>
+    </p:extLst>
+  </p:cSld>
+  <p:clrMapOvr>
+    <a:masterClrMapping/>
+  </p:clrMapOvr>
+</p:sld>
+</file>
+
+<file path=ppt/slides/slide15.xml><?xml version="1.0" encoding="utf-8"?>
+<p:sld xmlns:a="http://schemas.openxmlformats.org/drawingml/2006/main" xmlns:r="http://schemas.openxmlformats.org/officeDocument/2006/relationships" xmlns:p="http://schemas.openxmlformats.org/presentationml/2006/main">
+  <p:cSld>
+    <p:spTree>
+      <p:nvGrpSpPr>
+        <p:cNvPr id="1" name=""/>
+        <p:cNvGrpSpPr/>
+        <p:nvPr/>
+      </p:nvGrpSpPr>
+      <p:grpSpPr>
+        <a:xfrm>
+          <a:off x="0" y="0"/>
+          <a:ext cx="0" cy="0"/>
+          <a:chOff x="0" y="0"/>
+          <a:chExt cx="0" cy="0"/>
+        </a:xfrm>
+      </p:grpSpPr>
+      <p:sp>
+        <p:nvSpPr>
+          <p:cNvPr id="2" name="Tytuł 1">
+            <a:extLst>
+              <a:ext uri="{FF2B5EF4-FFF2-40B4-BE49-F238E27FC236}">
                 <a16:creationId xmlns:a16="http://schemas.microsoft.com/office/drawing/2014/main" id="{2854C2B8-898B-451F-850B-1B4366F27292}"/>
               </a:ext>
             </a:extLst>
@@ -4656,7 +5165,7 @@
 </p:sld>
 </file>
 
-<file path=ppt/slides/slide15.xml><?xml version="1.0" encoding="utf-8"?>
+<file path=ppt/slides/slide16.xml><?xml version="1.0" encoding="utf-8"?>
 <p:sld xmlns:a="http://schemas.openxmlformats.org/drawingml/2006/main" xmlns:r="http://schemas.openxmlformats.org/officeDocument/2006/relationships" xmlns:p="http://schemas.openxmlformats.org/presentationml/2006/main">
   <p:cSld>
     <p:spTree>
@@ -5221,7 +5730,7 @@
           <p:cNvPr id="2" name="Tytuł 1">
             <a:extLst>
               <a:ext uri="{FF2B5EF4-FFF2-40B4-BE49-F238E27FC236}">
-                <a16:creationId xmlns:a16="http://schemas.microsoft.com/office/drawing/2014/main" id="{B12FB97F-7AA6-44D8-AA4B-4728336C750B}"/>
+                <a16:creationId xmlns:a16="http://schemas.microsoft.com/office/drawing/2014/main" id="{78CC289D-72CD-4F32-9E73-F0AFEE3DD1C2}"/>
               </a:ext>
             </a:extLst>
           </p:cNvPr>
@@ -5234,22 +5743,40 @@
         </p:nvSpPr>
         <p:spPr/>
         <p:txBody>
-          <a:bodyPr/>
+          <a:bodyPr>
+            <a:normAutofit/>
+          </a:bodyPr>
           <a:lstStyle/>
           <a:p>
             <a:r>
               <a:rPr lang="pl-PL" dirty="0"/>
-              <a:t>ASP.NET IDENTITY</a:t>
+              <a:t>Wstrzykiwanie zależności (</a:t>
+            </a:r>
+            <a:r>
+              <a:rPr lang="pl-PL" dirty="0" err="1"/>
+              <a:t>Dependency</a:t>
+            </a:r>
+            <a:r>
+              <a:rPr lang="pl-PL" dirty="0"/>
+              <a:t> </a:t>
+            </a:r>
+            <a:r>
+              <a:rPr lang="pl-PL" dirty="0" err="1"/>
+              <a:t>injection</a:t>
+            </a:r>
+            <a:r>
+              <a:rPr lang="pl-PL" dirty="0"/>
+              <a:t>)</a:t>
             </a:r>
           </a:p>
         </p:txBody>
       </p:sp>
       <p:pic>
         <p:nvPicPr>
-          <p:cNvPr id="2050" name="Picture 2" descr="Niestandardowi dostawcy magazynu dla programu ASP.NET Core Identity |  Microsoft Docs">
+          <p:cNvPr id="1026" name="Picture 2" descr="Dependency Injection">
             <a:extLst>
               <a:ext uri="{FF2B5EF4-FFF2-40B4-BE49-F238E27FC236}">
-                <a16:creationId xmlns:a16="http://schemas.microsoft.com/office/drawing/2014/main" id="{90798F18-0FA2-40E5-A890-AC02EC0E7001}"/>
+                <a16:creationId xmlns:a16="http://schemas.microsoft.com/office/drawing/2014/main" id="{4338835A-B58D-42FE-AFBF-66E6D6BDD9C3}"/>
               </a:ext>
             </a:extLst>
           </p:cNvPr>
@@ -5275,8 +5802,8 @@
         </p:blipFill>
         <p:spPr bwMode="auto">
           <a:xfrm>
-            <a:off x="2662475" y="1828800"/>
-            <a:ext cx="5793901" cy="4351338"/>
+            <a:off x="3802063" y="3061494"/>
+            <a:ext cx="3514725" cy="1885950"/>
           </a:xfrm>
           <a:prstGeom prst="rect">
             <a:avLst/>
@@ -5296,7 +5823,7 @@
     </p:spTree>
     <p:extLst>
       <p:ext uri="{BB962C8B-B14F-4D97-AF65-F5344CB8AC3E}">
-        <p14:creationId xmlns:p14="http://schemas.microsoft.com/office/powerpoint/2010/main" val="4179623338"/>
+        <p14:creationId xmlns:p14="http://schemas.microsoft.com/office/powerpoint/2010/main" val="1504997750"/>
       </p:ext>
     </p:extLst>
   </p:cSld>
@@ -5328,7 +5855,7 @@
           <p:cNvPr id="2" name="Tytuł 1">
             <a:extLst>
               <a:ext uri="{FF2B5EF4-FFF2-40B4-BE49-F238E27FC236}">
-                <a16:creationId xmlns:a16="http://schemas.microsoft.com/office/drawing/2014/main" id="{5F7473A0-EB20-47EB-9FAC-C1E2BCC98ADC}"/>
+                <a16:creationId xmlns:a16="http://schemas.microsoft.com/office/drawing/2014/main" id="{B12FB97F-7AA6-44D8-AA4B-4728336C750B}"/>
               </a:ext>
             </a:extLst>
           </p:cNvPr>
@@ -5345,75 +5872,65 @@
           <a:lstStyle/>
           <a:p>
             <a:r>
-              <a:rPr lang="pl-PL" dirty="0" err="1"/>
-              <a:t>Frameworki</a:t>
-            </a:r>
-            <a:endParaRPr lang="pl-PL" dirty="0"/>
-          </a:p>
-        </p:txBody>
-      </p:sp>
-      <p:sp>
-        <p:nvSpPr>
-          <p:cNvPr id="6" name="Symbol zastępczy zawartości 5">
+              <a:rPr lang="pl-PL" dirty="0"/>
+              <a:t>ASP.NET IDENTITY</a:t>
+            </a:r>
+          </a:p>
+        </p:txBody>
+      </p:sp>
+      <p:pic>
+        <p:nvPicPr>
+          <p:cNvPr id="2050" name="Picture 2" descr="Niestandardowi dostawcy magazynu dla programu ASP.NET Core Identity |  Microsoft Docs">
             <a:extLst>
               <a:ext uri="{FF2B5EF4-FFF2-40B4-BE49-F238E27FC236}">
-                <a16:creationId xmlns:a16="http://schemas.microsoft.com/office/drawing/2014/main" id="{8053B8E4-466B-4655-8A3A-1341EA980997}"/>
+                <a16:creationId xmlns:a16="http://schemas.microsoft.com/office/drawing/2014/main" id="{90798F18-0FA2-40E5-A890-AC02EC0E7001}"/>
               </a:ext>
             </a:extLst>
           </p:cNvPr>
-          <p:cNvSpPr>
-            <a:spLocks noGrp="1"/>
-          </p:cNvSpPr>
+          <p:cNvPicPr>
+            <a:picLocks noGrp="1" noChangeAspect="1" noChangeArrowheads="1"/>
+          </p:cNvPicPr>
           <p:nvPr>
             <p:ph idx="1"/>
           </p:nvPr>
-        </p:nvSpPr>
-        <p:spPr>
+        </p:nvPicPr>
+        <p:blipFill>
+          <a:blip r:embed="rId2">
+            <a:extLst>
+              <a:ext uri="{28A0092B-C50C-407E-A947-70E740481C1C}">
+                <a14:useLocalDpi xmlns:a14="http://schemas.microsoft.com/office/drawing/2010/main" val="0"/>
+              </a:ext>
+            </a:extLst>
+          </a:blip>
+          <a:srcRect/>
+          <a:stretch>
+            <a:fillRect/>
+          </a:stretch>
+        </p:blipFill>
+        <p:spPr bwMode="auto">
           <a:xfrm>
-            <a:off x="1261872" y="1828801"/>
-            <a:ext cx="8595360" cy="1402080"/>
-          </a:xfrm>
-        </p:spPr>
-        <p:txBody>
-          <a:bodyPr vert="horz" lIns="91440" tIns="45720" rIns="91440" bIns="45720" rtlCol="0" anchor="t">
-            <a:normAutofit/>
-          </a:bodyPr>
-          <a:lstStyle/>
-          <a:p>
-            <a:r>
-              <a:rPr lang="pl-PL" dirty="0" err="1"/>
-              <a:t>Entity</a:t>
-            </a:r>
-            <a:r>
-              <a:rPr lang="pl-PL" dirty="0"/>
-              <a:t> Framework </a:t>
-            </a:r>
-            <a:r>
-              <a:rPr lang="pl-PL"/>
-              <a:t>Core</a:t>
-            </a:r>
-            <a:endParaRPr lang="pl-PL" dirty="0"/>
-          </a:p>
-          <a:p>
-            <a:r>
-              <a:rPr lang="pl-PL" dirty="0" err="1"/>
-              <a:t>Stripe</a:t>
-            </a:r>
-            <a:endParaRPr lang="pl-PL" dirty="0"/>
-          </a:p>
-          <a:p>
-            <a:r>
-              <a:rPr lang="pl-PL" dirty="0" err="1"/>
-              <a:t>Sendgrid</a:t>
-            </a:r>
-            <a:endParaRPr lang="pl-PL" dirty="0"/>
-          </a:p>
-        </p:txBody>
-      </p:sp>
+            <a:off x="2662475" y="1828800"/>
+            <a:ext cx="5793901" cy="4351338"/>
+          </a:xfrm>
+          <a:prstGeom prst="rect">
+            <a:avLst/>
+          </a:prstGeom>
+          <a:noFill/>
+          <a:extLst>
+            <a:ext uri="{909E8E84-426E-40DD-AFC4-6F175D3DCCD1}">
+              <a14:hiddenFill xmlns:a14="http://schemas.microsoft.com/office/drawing/2010/main">
+                <a:solidFill>
+                  <a:srgbClr val="FFFFFF"/>
+                </a:solidFill>
+              </a14:hiddenFill>
+            </a:ext>
+          </a:extLst>
+        </p:spPr>
+      </p:pic>
     </p:spTree>
     <p:extLst>
       <p:ext uri="{BB962C8B-B14F-4D97-AF65-F5344CB8AC3E}">
-        <p14:creationId xmlns:p14="http://schemas.microsoft.com/office/powerpoint/2010/main" val="1257251168"/>
+        <p14:creationId xmlns:p14="http://schemas.microsoft.com/office/powerpoint/2010/main" val="4179623338"/>
       </p:ext>
     </p:extLst>
   </p:cSld>
@@ -5445,7 +5962,7 @@
           <p:cNvPr id="2" name="Tytuł 1">
             <a:extLst>
               <a:ext uri="{FF2B5EF4-FFF2-40B4-BE49-F238E27FC236}">
-                <a16:creationId xmlns:a16="http://schemas.microsoft.com/office/drawing/2014/main" id="{7D521247-F99E-4288-BA43-27EA423979D9}"/>
+                <a16:creationId xmlns:a16="http://schemas.microsoft.com/office/drawing/2014/main" id="{5F7473A0-EB20-47EB-9FAC-C1E2BCC98ADC}"/>
               </a:ext>
             </a:extLst>
           </p:cNvPr>
@@ -5459,6 +5976,42 @@
         <p:spPr/>
         <p:txBody>
           <a:bodyPr/>
+          <a:lstStyle/>
+          <a:p>
+            <a:r>
+              <a:rPr lang="pl-PL" dirty="0" err="1"/>
+              <a:t>Frameworki</a:t>
+            </a:r>
+            <a:endParaRPr lang="pl-PL" dirty="0"/>
+          </a:p>
+        </p:txBody>
+      </p:sp>
+      <p:sp>
+        <p:nvSpPr>
+          <p:cNvPr id="6" name="Symbol zastępczy zawartości 5">
+            <a:extLst>
+              <a:ext uri="{FF2B5EF4-FFF2-40B4-BE49-F238E27FC236}">
+                <a16:creationId xmlns:a16="http://schemas.microsoft.com/office/drawing/2014/main" id="{8053B8E4-466B-4655-8A3A-1341EA980997}"/>
+              </a:ext>
+            </a:extLst>
+          </p:cNvPr>
+          <p:cNvSpPr>
+            <a:spLocks noGrp="1"/>
+          </p:cNvSpPr>
+          <p:nvPr>
+            <p:ph idx="1"/>
+          </p:nvPr>
+        </p:nvSpPr>
+        <p:spPr>
+          <a:xfrm>
+            <a:off x="1261872" y="1828801"/>
+            <a:ext cx="8595360" cy="1402080"/>
+          </a:xfrm>
+        </p:spPr>
+        <p:txBody>
+          <a:bodyPr vert="horz" lIns="91440" tIns="45720" rIns="91440" bIns="45720" rtlCol="0" anchor="t">
+            <a:normAutofit/>
+          </a:bodyPr>
           <a:lstStyle/>
           <a:p>
             <a:r>
@@ -5470,685 +6023,31 @@
               <a:t> Framework </a:t>
             </a:r>
             <a:r>
+              <a:rPr lang="pl-PL"/>
+              <a:t>Core</a:t>
+            </a:r>
+            <a:endParaRPr lang="pl-PL" dirty="0"/>
+          </a:p>
+          <a:p>
+            <a:r>
               <a:rPr lang="pl-PL" dirty="0" err="1"/>
-              <a:t>Core</a:t>
+              <a:t>Stripe</a:t>
             </a:r>
             <a:endParaRPr lang="pl-PL" dirty="0"/>
           </a:p>
-        </p:txBody>
-      </p:sp>
-      <p:sp>
-        <p:nvSpPr>
-          <p:cNvPr id="4" name="Prostokąt: zaokrąglone rogi 3">
-            <a:extLst>
-              <a:ext uri="{FF2B5EF4-FFF2-40B4-BE49-F238E27FC236}">
-                <a16:creationId xmlns:a16="http://schemas.microsoft.com/office/drawing/2014/main" id="{196FE014-16BF-40B2-B0F7-5B74DAEFB519}"/>
-              </a:ext>
-            </a:extLst>
-          </p:cNvPr>
-          <p:cNvSpPr/>
-          <p:nvPr/>
-        </p:nvSpPr>
-        <p:spPr>
-          <a:xfrm>
-            <a:off x="779418" y="2566851"/>
-            <a:ext cx="1776549" cy="862149"/>
-          </a:xfrm>
-          <a:prstGeom prst="roundRect">
-            <a:avLst/>
-          </a:prstGeom>
-        </p:spPr>
-        <p:style>
-          <a:lnRef idx="2">
-            <a:schemeClr val="accent1">
-              <a:shade val="50000"/>
-            </a:schemeClr>
-          </a:lnRef>
-          <a:fillRef idx="1">
-            <a:schemeClr val="accent1"/>
-          </a:fillRef>
-          <a:effectRef idx="0">
-            <a:schemeClr val="accent1"/>
-          </a:effectRef>
-          <a:fontRef idx="minor">
-            <a:schemeClr val="lt1"/>
-          </a:fontRef>
-        </p:style>
-        <p:txBody>
-          <a:bodyPr rtlCol="0" anchor="ctr"/>
-          <a:lstStyle/>
-          <a:p>
-            <a:pPr algn="ctr"/>
-            <a:r>
-              <a:rPr lang="pl-PL" dirty="0"/>
-              <a:t>Aplikacja </a:t>
-            </a:r>
+          <a:p>
             <a:r>
               <a:rPr lang="pl-PL" dirty="0" err="1"/>
-              <a:t>ASP.Net</a:t>
-            </a:r>
-            <a:r>
-              <a:rPr lang="pl-PL" dirty="0"/>
-              <a:t> </a:t>
-            </a:r>
-            <a:r>
-              <a:rPr lang="pl-PL" dirty="0" err="1"/>
-              <a:t>Core</a:t>
+              <a:t>Sendgrid</a:t>
             </a:r>
             <a:endParaRPr lang="pl-PL" dirty="0"/>
-          </a:p>
-        </p:txBody>
-      </p:sp>
-      <p:sp>
-        <p:nvSpPr>
-          <p:cNvPr id="5" name="Prostokąt: zaokrąglone rogi 4">
-            <a:extLst>
-              <a:ext uri="{FF2B5EF4-FFF2-40B4-BE49-F238E27FC236}">
-                <a16:creationId xmlns:a16="http://schemas.microsoft.com/office/drawing/2014/main" id="{4FD5509A-8ADD-452C-AF54-410055B42998}"/>
-              </a:ext>
-            </a:extLst>
-          </p:cNvPr>
-          <p:cNvSpPr/>
-          <p:nvPr/>
-        </p:nvSpPr>
-        <p:spPr>
-          <a:xfrm>
-            <a:off x="4019005" y="2566849"/>
-            <a:ext cx="1776549" cy="862149"/>
-          </a:xfrm>
-          <a:prstGeom prst="roundRect">
-            <a:avLst/>
-          </a:prstGeom>
-        </p:spPr>
-        <p:style>
-          <a:lnRef idx="2">
-            <a:schemeClr val="accent1">
-              <a:shade val="50000"/>
-            </a:schemeClr>
-          </a:lnRef>
-          <a:fillRef idx="1">
-            <a:schemeClr val="accent1"/>
-          </a:fillRef>
-          <a:effectRef idx="0">
-            <a:schemeClr val="accent1"/>
-          </a:effectRef>
-          <a:fontRef idx="minor">
-            <a:schemeClr val="lt1"/>
-          </a:fontRef>
-        </p:style>
-        <p:txBody>
-          <a:bodyPr rtlCol="0" anchor="ctr"/>
-          <a:lstStyle/>
-          <a:p>
-            <a:pPr algn="ctr"/>
-            <a:r>
-              <a:rPr lang="pl-PL" dirty="0"/>
-              <a:t>Model i </a:t>
-            </a:r>
-            <a:r>
-              <a:rPr lang="pl-PL" dirty="0" err="1"/>
-              <a:t>DbContext</a:t>
-            </a:r>
-            <a:endParaRPr lang="pl-PL" dirty="0"/>
-          </a:p>
-        </p:txBody>
-      </p:sp>
-      <p:sp>
-        <p:nvSpPr>
-          <p:cNvPr id="6" name="Prostokąt: zaokrąglone rogi 5">
-            <a:extLst>
-              <a:ext uri="{FF2B5EF4-FFF2-40B4-BE49-F238E27FC236}">
-                <a16:creationId xmlns:a16="http://schemas.microsoft.com/office/drawing/2014/main" id="{061925D0-E45C-4BBA-A1F0-F8DCFD55675D}"/>
-              </a:ext>
-            </a:extLst>
-          </p:cNvPr>
-          <p:cNvSpPr/>
-          <p:nvPr/>
-        </p:nvSpPr>
-        <p:spPr>
-          <a:xfrm>
-            <a:off x="6100356" y="3901440"/>
-            <a:ext cx="1776549" cy="862149"/>
-          </a:xfrm>
-          <a:prstGeom prst="roundRect">
-            <a:avLst/>
-          </a:prstGeom>
-        </p:spPr>
-        <p:style>
-          <a:lnRef idx="2">
-            <a:schemeClr val="accent1">
-              <a:shade val="50000"/>
-            </a:schemeClr>
-          </a:lnRef>
-          <a:fillRef idx="1">
-            <a:schemeClr val="accent1"/>
-          </a:fillRef>
-          <a:effectRef idx="0">
-            <a:schemeClr val="accent1"/>
-          </a:effectRef>
-          <a:fontRef idx="minor">
-            <a:schemeClr val="lt1"/>
-          </a:fontRef>
-        </p:style>
-        <p:txBody>
-          <a:bodyPr rtlCol="0" anchor="ctr"/>
-          <a:lstStyle/>
-          <a:p>
-            <a:pPr algn="ctr"/>
-            <a:r>
-              <a:rPr lang="pl-PL" dirty="0"/>
-              <a:t>Migracje</a:t>
-            </a:r>
-          </a:p>
-        </p:txBody>
-      </p:sp>
-      <p:sp>
-        <p:nvSpPr>
-          <p:cNvPr id="7" name="Prostokąt: zaokrąglone rogi 6">
-            <a:extLst>
-              <a:ext uri="{FF2B5EF4-FFF2-40B4-BE49-F238E27FC236}">
-                <a16:creationId xmlns:a16="http://schemas.microsoft.com/office/drawing/2014/main" id="{9FDDE0A7-A396-47E6-8EF6-1FECAD1A60D5}"/>
-              </a:ext>
-            </a:extLst>
-          </p:cNvPr>
-          <p:cNvSpPr/>
-          <p:nvPr/>
-        </p:nvSpPr>
-        <p:spPr>
-          <a:xfrm>
-            <a:off x="4341222" y="5188450"/>
-            <a:ext cx="1776549" cy="862149"/>
-          </a:xfrm>
-          <a:prstGeom prst="roundRect">
-            <a:avLst/>
-          </a:prstGeom>
-        </p:spPr>
-        <p:style>
-          <a:lnRef idx="2">
-            <a:schemeClr val="accent1">
-              <a:shade val="50000"/>
-            </a:schemeClr>
-          </a:lnRef>
-          <a:fillRef idx="1">
-            <a:schemeClr val="accent1"/>
-          </a:fillRef>
-          <a:effectRef idx="0">
-            <a:schemeClr val="accent1"/>
-          </a:effectRef>
-          <a:fontRef idx="minor">
-            <a:schemeClr val="lt1"/>
-          </a:fontRef>
-        </p:style>
-        <p:txBody>
-          <a:bodyPr rtlCol="0" anchor="ctr"/>
-          <a:lstStyle/>
-          <a:p>
-            <a:pPr algn="ctr"/>
-            <a:r>
-              <a:rPr lang="pl-PL" dirty="0"/>
-              <a:t>Skrypt SQL</a:t>
-            </a:r>
-          </a:p>
-        </p:txBody>
-      </p:sp>
-      <p:sp>
-        <p:nvSpPr>
-          <p:cNvPr id="8" name="Prostokąt: zaokrąglone rogi 7">
-            <a:extLst>
-              <a:ext uri="{FF2B5EF4-FFF2-40B4-BE49-F238E27FC236}">
-                <a16:creationId xmlns:a16="http://schemas.microsoft.com/office/drawing/2014/main" id="{25FB8CDF-6F5A-44E7-A119-8FB7C6C00624}"/>
-              </a:ext>
-            </a:extLst>
-          </p:cNvPr>
-          <p:cNvSpPr/>
-          <p:nvPr/>
-        </p:nvSpPr>
-        <p:spPr>
-          <a:xfrm>
-            <a:off x="7876905" y="5188450"/>
-            <a:ext cx="1776549" cy="862149"/>
-          </a:xfrm>
-          <a:prstGeom prst="roundRect">
-            <a:avLst/>
-          </a:prstGeom>
-        </p:spPr>
-        <p:style>
-          <a:lnRef idx="2">
-            <a:schemeClr val="accent1">
-              <a:shade val="50000"/>
-            </a:schemeClr>
-          </a:lnRef>
-          <a:fillRef idx="1">
-            <a:schemeClr val="accent1"/>
-          </a:fillRef>
-          <a:effectRef idx="0">
-            <a:schemeClr val="accent1"/>
-          </a:effectRef>
-          <a:fontRef idx="minor">
-            <a:schemeClr val="lt1"/>
-          </a:fontRef>
-        </p:style>
-        <p:txBody>
-          <a:bodyPr rtlCol="0" anchor="ctr"/>
-          <a:lstStyle/>
-          <a:p>
-            <a:pPr algn="ctr"/>
-            <a:r>
-              <a:rPr lang="pl-PL" dirty="0"/>
-              <a:t>Baza danych</a:t>
-            </a:r>
-          </a:p>
-        </p:txBody>
-      </p:sp>
-      <p:sp>
-        <p:nvSpPr>
-          <p:cNvPr id="14" name="Strzałka: w prawo 13">
-            <a:extLst>
-              <a:ext uri="{FF2B5EF4-FFF2-40B4-BE49-F238E27FC236}">
-                <a16:creationId xmlns:a16="http://schemas.microsoft.com/office/drawing/2014/main" id="{BCD1F377-1D7B-4E8B-9ADA-69655A861E54}"/>
-              </a:ext>
-            </a:extLst>
-          </p:cNvPr>
-          <p:cNvSpPr/>
-          <p:nvPr/>
-        </p:nvSpPr>
-        <p:spPr>
-          <a:xfrm>
-            <a:off x="2708366" y="2835887"/>
-            <a:ext cx="1158240" cy="324075"/>
-          </a:xfrm>
-          <a:prstGeom prst="rightArrow">
-            <a:avLst/>
-          </a:prstGeom>
-        </p:spPr>
-        <p:style>
-          <a:lnRef idx="2">
-            <a:schemeClr val="accent1">
-              <a:shade val="50000"/>
-            </a:schemeClr>
-          </a:lnRef>
-          <a:fillRef idx="1">
-            <a:schemeClr val="accent1"/>
-          </a:fillRef>
-          <a:effectRef idx="0">
-            <a:schemeClr val="accent1"/>
-          </a:effectRef>
-          <a:fontRef idx="minor">
-            <a:schemeClr val="lt1"/>
-          </a:fontRef>
-        </p:style>
-        <p:txBody>
-          <a:bodyPr rtlCol="0" anchor="ctr"/>
-          <a:lstStyle/>
-          <a:p>
-            <a:pPr algn="ctr"/>
-            <a:endParaRPr lang="pl-PL"/>
-          </a:p>
-        </p:txBody>
-      </p:sp>
-      <p:sp>
-        <p:nvSpPr>
-          <p:cNvPr id="15" name="pole tekstowe 14">
-            <a:extLst>
-              <a:ext uri="{FF2B5EF4-FFF2-40B4-BE49-F238E27FC236}">
-                <a16:creationId xmlns:a16="http://schemas.microsoft.com/office/drawing/2014/main" id="{D6DE99AB-5AA9-4592-A22E-A12F892B1B2A}"/>
-              </a:ext>
-            </a:extLst>
-          </p:cNvPr>
-          <p:cNvSpPr txBox="1"/>
-          <p:nvPr/>
-        </p:nvSpPr>
-        <p:spPr>
-          <a:xfrm>
-            <a:off x="2708366" y="2466555"/>
-            <a:ext cx="1098378" cy="369332"/>
-          </a:xfrm>
-          <a:prstGeom prst="rect">
-            <a:avLst/>
-          </a:prstGeom>
-          <a:noFill/>
-        </p:spPr>
-        <p:txBody>
-          <a:bodyPr wrap="none" rtlCol="0">
-            <a:spAutoFit/>
-          </a:bodyPr>
-          <a:lstStyle/>
-          <a:p>
-            <a:r>
-              <a:rPr lang="pl-PL" dirty="0"/>
-              <a:t>korzysta</a:t>
-            </a:r>
-          </a:p>
-        </p:txBody>
-      </p:sp>
-      <p:sp>
-        <p:nvSpPr>
-          <p:cNvPr id="16" name="Strzałka: w prawo 15">
-            <a:extLst>
-              <a:ext uri="{FF2B5EF4-FFF2-40B4-BE49-F238E27FC236}">
-                <a16:creationId xmlns:a16="http://schemas.microsoft.com/office/drawing/2014/main" id="{E6839D4B-FFA6-46CD-BBBE-F4DBA8DBE385}"/>
-              </a:ext>
-            </a:extLst>
-          </p:cNvPr>
-          <p:cNvSpPr/>
-          <p:nvPr/>
-        </p:nvSpPr>
-        <p:spPr>
-          <a:xfrm rot="2573836">
-            <a:off x="5750981" y="3226499"/>
-            <a:ext cx="1158240" cy="324075"/>
-          </a:xfrm>
-          <a:prstGeom prst="rightArrow">
-            <a:avLst/>
-          </a:prstGeom>
-        </p:spPr>
-        <p:style>
-          <a:lnRef idx="2">
-            <a:schemeClr val="accent1">
-              <a:shade val="50000"/>
-            </a:schemeClr>
-          </a:lnRef>
-          <a:fillRef idx="1">
-            <a:schemeClr val="accent1"/>
-          </a:fillRef>
-          <a:effectRef idx="0">
-            <a:schemeClr val="accent1"/>
-          </a:effectRef>
-          <a:fontRef idx="minor">
-            <a:schemeClr val="lt1"/>
-          </a:fontRef>
-        </p:style>
-        <p:txBody>
-          <a:bodyPr rtlCol="0" anchor="ctr"/>
-          <a:lstStyle/>
-          <a:p>
-            <a:pPr algn="ctr"/>
-            <a:endParaRPr lang="pl-PL"/>
-          </a:p>
-        </p:txBody>
-      </p:sp>
-      <p:sp>
-        <p:nvSpPr>
-          <p:cNvPr id="17" name="pole tekstowe 16">
-            <a:extLst>
-              <a:ext uri="{FF2B5EF4-FFF2-40B4-BE49-F238E27FC236}">
-                <a16:creationId xmlns:a16="http://schemas.microsoft.com/office/drawing/2014/main" id="{C07615AC-DD3B-4B8A-AAEA-9D022C63BEF7}"/>
-              </a:ext>
-            </a:extLst>
-          </p:cNvPr>
-          <p:cNvSpPr txBox="1"/>
-          <p:nvPr/>
-        </p:nvSpPr>
-        <p:spPr>
-          <a:xfrm>
-            <a:off x="6310649" y="2939953"/>
-            <a:ext cx="1107996" cy="369332"/>
-          </a:xfrm>
-          <a:prstGeom prst="rect">
-            <a:avLst/>
-          </a:prstGeom>
-          <a:noFill/>
-        </p:spPr>
-        <p:txBody>
-          <a:bodyPr wrap="none" rtlCol="0">
-            <a:spAutoFit/>
-          </a:bodyPr>
-          <a:lstStyle/>
-          <a:p>
-            <a:r>
-              <a:rPr lang="pl-PL" dirty="0"/>
-              <a:t>generuje</a:t>
-            </a:r>
-          </a:p>
-        </p:txBody>
-      </p:sp>
-      <p:sp>
-        <p:nvSpPr>
-          <p:cNvPr id="18" name="Strzałka: w prawo 17">
-            <a:extLst>
-              <a:ext uri="{FF2B5EF4-FFF2-40B4-BE49-F238E27FC236}">
-                <a16:creationId xmlns:a16="http://schemas.microsoft.com/office/drawing/2014/main" id="{80F10ADF-FDE6-4DF7-94C5-7F3FA399ED01}"/>
-              </a:ext>
-            </a:extLst>
-          </p:cNvPr>
-          <p:cNvSpPr/>
-          <p:nvPr/>
-        </p:nvSpPr>
-        <p:spPr>
-          <a:xfrm rot="7973592">
-            <a:off x="4999644" y="4491847"/>
-            <a:ext cx="1158240" cy="324075"/>
-          </a:xfrm>
-          <a:prstGeom prst="rightArrow">
-            <a:avLst/>
-          </a:prstGeom>
-        </p:spPr>
-        <p:style>
-          <a:lnRef idx="2">
-            <a:schemeClr val="accent1">
-              <a:shade val="50000"/>
-            </a:schemeClr>
-          </a:lnRef>
-          <a:fillRef idx="1">
-            <a:schemeClr val="accent1"/>
-          </a:fillRef>
-          <a:effectRef idx="0">
-            <a:schemeClr val="accent1"/>
-          </a:effectRef>
-          <a:fontRef idx="minor">
-            <a:schemeClr val="lt1"/>
-          </a:fontRef>
-        </p:style>
-        <p:txBody>
-          <a:bodyPr rtlCol="0" anchor="ctr"/>
-          <a:lstStyle/>
-          <a:p>
-            <a:pPr algn="ctr"/>
-            <a:endParaRPr lang="pl-PL"/>
-          </a:p>
-        </p:txBody>
-      </p:sp>
-      <p:sp>
-        <p:nvSpPr>
-          <p:cNvPr id="19" name="pole tekstowe 18">
-            <a:extLst>
-              <a:ext uri="{FF2B5EF4-FFF2-40B4-BE49-F238E27FC236}">
-                <a16:creationId xmlns:a16="http://schemas.microsoft.com/office/drawing/2014/main" id="{3390D1A1-B34A-4443-A97B-C88D00349D84}"/>
-              </a:ext>
-            </a:extLst>
-          </p:cNvPr>
-          <p:cNvSpPr txBox="1"/>
-          <p:nvPr/>
-        </p:nvSpPr>
-        <p:spPr>
-          <a:xfrm>
-            <a:off x="4470768" y="4304525"/>
-            <a:ext cx="1107996" cy="369332"/>
-          </a:xfrm>
-          <a:prstGeom prst="rect">
-            <a:avLst/>
-          </a:prstGeom>
-          <a:noFill/>
-        </p:spPr>
-        <p:txBody>
-          <a:bodyPr wrap="none" rtlCol="0">
-            <a:spAutoFit/>
-          </a:bodyPr>
-          <a:lstStyle/>
-          <a:p>
-            <a:r>
-              <a:rPr lang="pl-PL" dirty="0"/>
-              <a:t>generuje</a:t>
-            </a:r>
-          </a:p>
-        </p:txBody>
-      </p:sp>
-      <p:sp>
-        <p:nvSpPr>
-          <p:cNvPr id="20" name="Strzałka: w prawo 19">
-            <a:extLst>
-              <a:ext uri="{FF2B5EF4-FFF2-40B4-BE49-F238E27FC236}">
-                <a16:creationId xmlns:a16="http://schemas.microsoft.com/office/drawing/2014/main" id="{3F8B85F8-F2C5-470A-8B8B-AEE52E052CCC}"/>
-              </a:ext>
-            </a:extLst>
-          </p:cNvPr>
-          <p:cNvSpPr/>
-          <p:nvPr/>
-        </p:nvSpPr>
-        <p:spPr>
-          <a:xfrm rot="2573836">
-            <a:off x="7871517" y="4506980"/>
-            <a:ext cx="1158240" cy="324075"/>
-          </a:xfrm>
-          <a:prstGeom prst="rightArrow">
-            <a:avLst/>
-          </a:prstGeom>
-        </p:spPr>
-        <p:style>
-          <a:lnRef idx="2">
-            <a:schemeClr val="accent1">
-              <a:shade val="50000"/>
-            </a:schemeClr>
-          </a:lnRef>
-          <a:fillRef idx="1">
-            <a:schemeClr val="accent1"/>
-          </a:fillRef>
-          <a:effectRef idx="0">
-            <a:schemeClr val="accent1"/>
-          </a:effectRef>
-          <a:fontRef idx="minor">
-            <a:schemeClr val="lt1"/>
-          </a:fontRef>
-        </p:style>
-        <p:txBody>
-          <a:bodyPr rtlCol="0" anchor="ctr"/>
-          <a:lstStyle/>
-          <a:p>
-            <a:pPr algn="ctr"/>
-            <a:endParaRPr lang="pl-PL"/>
-          </a:p>
-        </p:txBody>
-      </p:sp>
-      <p:sp>
-        <p:nvSpPr>
-          <p:cNvPr id="21" name="pole tekstowe 20">
-            <a:extLst>
-              <a:ext uri="{FF2B5EF4-FFF2-40B4-BE49-F238E27FC236}">
-                <a16:creationId xmlns:a16="http://schemas.microsoft.com/office/drawing/2014/main" id="{5D14E219-10B8-4F97-8728-E121B3373D70}"/>
-              </a:ext>
-            </a:extLst>
-          </p:cNvPr>
-          <p:cNvSpPr txBox="1"/>
-          <p:nvPr/>
-        </p:nvSpPr>
-        <p:spPr>
-          <a:xfrm>
-            <a:off x="8431185" y="4220434"/>
-            <a:ext cx="1388522" cy="369332"/>
-          </a:xfrm>
-          <a:prstGeom prst="rect">
-            <a:avLst/>
-          </a:prstGeom>
-          <a:noFill/>
-        </p:spPr>
-        <p:txBody>
-          <a:bodyPr wrap="none" rtlCol="0">
-            <a:spAutoFit/>
-          </a:bodyPr>
-          <a:lstStyle/>
-          <a:p>
-            <a:r>
-              <a:rPr lang="pl-PL" dirty="0"/>
-              <a:t>aktualizuje</a:t>
-            </a:r>
-          </a:p>
-        </p:txBody>
-      </p:sp>
-      <p:sp>
-        <p:nvSpPr>
-          <p:cNvPr id="22" name="Strzałka: w prawo 21">
-            <a:extLst>
-              <a:ext uri="{FF2B5EF4-FFF2-40B4-BE49-F238E27FC236}">
-                <a16:creationId xmlns:a16="http://schemas.microsoft.com/office/drawing/2014/main" id="{851C729A-CA0A-4A4E-8078-307DEBAFA466}"/>
-              </a:ext>
-            </a:extLst>
-          </p:cNvPr>
-          <p:cNvSpPr/>
-          <p:nvPr/>
-        </p:nvSpPr>
-        <p:spPr>
-          <a:xfrm>
-            <a:off x="6405155" y="5525931"/>
-            <a:ext cx="1158240" cy="324075"/>
-          </a:xfrm>
-          <a:prstGeom prst="rightArrow">
-            <a:avLst/>
-          </a:prstGeom>
-        </p:spPr>
-        <p:style>
-          <a:lnRef idx="2">
-            <a:schemeClr val="accent1">
-              <a:shade val="50000"/>
-            </a:schemeClr>
-          </a:lnRef>
-          <a:fillRef idx="1">
-            <a:schemeClr val="accent1"/>
-          </a:fillRef>
-          <a:effectRef idx="0">
-            <a:schemeClr val="accent1"/>
-          </a:effectRef>
-          <a:fontRef idx="minor">
-            <a:schemeClr val="lt1"/>
-          </a:fontRef>
-        </p:style>
-        <p:txBody>
-          <a:bodyPr rtlCol="0" anchor="ctr"/>
-          <a:lstStyle/>
-          <a:p>
-            <a:pPr algn="ctr"/>
-            <a:endParaRPr lang="pl-PL"/>
-          </a:p>
-        </p:txBody>
-      </p:sp>
-      <p:sp>
-        <p:nvSpPr>
-          <p:cNvPr id="23" name="pole tekstowe 22">
-            <a:extLst>
-              <a:ext uri="{FF2B5EF4-FFF2-40B4-BE49-F238E27FC236}">
-                <a16:creationId xmlns:a16="http://schemas.microsoft.com/office/drawing/2014/main" id="{2C837667-31BB-4660-9E3E-15FEF5E90769}"/>
-              </a:ext>
-            </a:extLst>
-          </p:cNvPr>
-          <p:cNvSpPr txBox="1"/>
-          <p:nvPr/>
-        </p:nvSpPr>
-        <p:spPr>
-          <a:xfrm>
-            <a:off x="6290014" y="5188450"/>
-            <a:ext cx="1388522" cy="369332"/>
-          </a:xfrm>
-          <a:prstGeom prst="rect">
-            <a:avLst/>
-          </a:prstGeom>
-          <a:noFill/>
-        </p:spPr>
-        <p:txBody>
-          <a:bodyPr wrap="none" rtlCol="0">
-            <a:spAutoFit/>
-          </a:bodyPr>
-          <a:lstStyle/>
-          <a:p>
-            <a:r>
-              <a:rPr lang="pl-PL" dirty="0"/>
-              <a:t>aktualizuje</a:t>
-            </a:r>
           </a:p>
         </p:txBody>
       </p:sp>
     </p:spTree>
     <p:extLst>
       <p:ext uri="{BB962C8B-B14F-4D97-AF65-F5344CB8AC3E}">
-        <p14:creationId xmlns:p14="http://schemas.microsoft.com/office/powerpoint/2010/main" val="1277708116"/>
+        <p14:creationId xmlns:p14="http://schemas.microsoft.com/office/powerpoint/2010/main" val="1257251168"/>
       </p:ext>
     </p:extLst>
   </p:cSld>
@@ -6180,7 +6079,7 @@
           <p:cNvPr id="2" name="Tytuł 1">
             <a:extLst>
               <a:ext uri="{FF2B5EF4-FFF2-40B4-BE49-F238E27FC236}">
-                <a16:creationId xmlns:a16="http://schemas.microsoft.com/office/drawing/2014/main" id="{9360C57A-54BB-463B-B11D-EDA92B04C4E1}"/>
+                <a16:creationId xmlns:a16="http://schemas.microsoft.com/office/drawing/2014/main" id="{7D521247-F99E-4288-BA43-27EA423979D9}"/>
               </a:ext>
             </a:extLst>
           </p:cNvPr>
@@ -6198,12 +6097,17 @@
           <a:p>
             <a:r>
               <a:rPr lang="pl-PL" dirty="0" err="1"/>
-              <a:t>Stripe</a:t>
+              <a:t>Entity</a:t>
             </a:r>
             <a:r>
               <a:rPr lang="pl-PL" dirty="0"/>
-              <a:t> – płatności online</a:t>
-            </a:r>
+              <a:t> Framework </a:t>
+            </a:r>
+            <a:r>
+              <a:rPr lang="pl-PL" dirty="0" err="1"/>
+              <a:t>Core</a:t>
+            </a:r>
+            <a:endParaRPr lang="pl-PL" dirty="0"/>
           </a:p>
         </p:txBody>
       </p:sp>
@@ -6212,7 +6116,7 @@
           <p:cNvPr id="4" name="Prostokąt: zaokrąglone rogi 3">
             <a:extLst>
               <a:ext uri="{FF2B5EF4-FFF2-40B4-BE49-F238E27FC236}">
-                <a16:creationId xmlns:a16="http://schemas.microsoft.com/office/drawing/2014/main" id="{2856FFAD-AF17-4BC7-8AFD-5E17A224F5EB}"/>
+                <a16:creationId xmlns:a16="http://schemas.microsoft.com/office/drawing/2014/main" id="{196FE014-16BF-40B2-B0F7-5B74DAEFB519}"/>
               </a:ext>
             </a:extLst>
           </p:cNvPr>
@@ -6221,7 +6125,7 @@
         </p:nvSpPr>
         <p:spPr>
           <a:xfrm>
-            <a:off x="1681766" y="2895533"/>
+            <a:off x="779418" y="2566851"/>
             <a:ext cx="1776549" cy="862149"/>
           </a:xfrm>
           <a:prstGeom prst="roundRect">
@@ -6274,7 +6178,7 @@
           <p:cNvPr id="5" name="Prostokąt: zaokrąglone rogi 4">
             <a:extLst>
               <a:ext uri="{FF2B5EF4-FFF2-40B4-BE49-F238E27FC236}">
-                <a16:creationId xmlns:a16="http://schemas.microsoft.com/office/drawing/2014/main" id="{A5BB7905-DE24-434F-8803-BF58C4B9F39D}"/>
+                <a16:creationId xmlns:a16="http://schemas.microsoft.com/office/drawing/2014/main" id="{4FD5509A-8ADD-452C-AF54-410055B42998}"/>
               </a:ext>
             </a:extLst>
           </p:cNvPr>
@@ -6283,7 +6187,7 @@
         </p:nvSpPr>
         <p:spPr>
           <a:xfrm>
-            <a:off x="1681766" y="4717885"/>
+            <a:off x="4019005" y="2566849"/>
             <a:ext cx="1776549" cy="862149"/>
           </a:xfrm>
           <a:prstGeom prst="roundRect">
@@ -6313,16 +6217,13 @@
             <a:pPr algn="ctr"/>
             <a:r>
               <a:rPr lang="pl-PL" dirty="0"/>
-              <a:t>Klucz </a:t>
+              <a:t>Model i </a:t>
             </a:r>
             <a:r>
               <a:rPr lang="pl-PL" dirty="0" err="1"/>
-              <a:t>Auth</a:t>
-            </a:r>
-            <a:r>
-              <a:rPr lang="pl-PL" dirty="0"/>
-              <a:t> i Model</a:t>
-            </a:r>
+              <a:t>DbContext</a:t>
+            </a:r>
+            <a:endParaRPr lang="pl-PL" dirty="0"/>
           </a:p>
         </p:txBody>
       </p:sp>
@@ -6331,7 +6232,7 @@
           <p:cNvPr id="6" name="Prostokąt: zaokrąglone rogi 5">
             <a:extLst>
               <a:ext uri="{FF2B5EF4-FFF2-40B4-BE49-F238E27FC236}">
-                <a16:creationId xmlns:a16="http://schemas.microsoft.com/office/drawing/2014/main" id="{E682170E-E940-42D9-9AAD-A6D27E69C478}"/>
+                <a16:creationId xmlns:a16="http://schemas.microsoft.com/office/drawing/2014/main" id="{061925D0-E45C-4BBA-A1F0-F8DCFD55675D}"/>
               </a:ext>
             </a:extLst>
           </p:cNvPr>
@@ -6340,7 +6241,7 @@
         </p:nvSpPr>
         <p:spPr>
           <a:xfrm>
-            <a:off x="4921353" y="4717885"/>
+            <a:off x="6100356" y="3901440"/>
             <a:ext cx="1776549" cy="862149"/>
           </a:xfrm>
           <a:prstGeom prst="roundRect">
@@ -6369,22 +6270,18 @@
           <a:p>
             <a:pPr algn="ctr"/>
             <a:r>
-              <a:rPr lang="pl-PL" dirty="0" err="1"/>
-              <a:t>Stripe</a:t>
-            </a:r>
-            <a:r>
               <a:rPr lang="pl-PL" dirty="0"/>
-              <a:t> API</a:t>
-            </a:r>
-          </a:p>
-        </p:txBody>
-      </p:sp>
-      <p:sp>
-        <p:nvSpPr>
-          <p:cNvPr id="9" name="Strzałka: w prawo 8">
+              <a:t>Migracje</a:t>
+            </a:r>
+          </a:p>
+        </p:txBody>
+      </p:sp>
+      <p:sp>
+        <p:nvSpPr>
+          <p:cNvPr id="7" name="Prostokąt: zaokrąglone rogi 6">
             <a:extLst>
               <a:ext uri="{FF2B5EF4-FFF2-40B4-BE49-F238E27FC236}">
-                <a16:creationId xmlns:a16="http://schemas.microsoft.com/office/drawing/2014/main" id="{15F3DC0D-0D2F-44FF-B991-ACD528E3CD99}"/>
+                <a16:creationId xmlns:a16="http://schemas.microsoft.com/office/drawing/2014/main" id="{9FDDE0A7-A396-47E6-8EF6-1FECAD1A60D5}"/>
               </a:ext>
             </a:extLst>
           </p:cNvPr>
@@ -6392,11 +6289,11 @@
           <p:nvPr/>
         </p:nvSpPr>
         <p:spPr>
-          <a:xfrm rot="5400000">
-            <a:off x="2229353" y="4097508"/>
-            <a:ext cx="681372" cy="324075"/>
-          </a:xfrm>
-          <a:prstGeom prst="rightArrow">
+          <a:xfrm>
+            <a:off x="4341222" y="5188450"/>
+            <a:ext cx="1776549" cy="862149"/>
+          </a:xfrm>
+          <a:prstGeom prst="roundRect">
             <a:avLst/>
           </a:prstGeom>
         </p:spPr>
@@ -6421,51 +6318,19 @@
           <a:lstStyle/>
           <a:p>
             <a:pPr algn="ctr"/>
-            <a:endParaRPr lang="pl-PL"/>
-          </a:p>
-        </p:txBody>
-      </p:sp>
-      <p:sp>
-        <p:nvSpPr>
-          <p:cNvPr id="10" name="pole tekstowe 9">
+            <a:r>
+              <a:rPr lang="pl-PL" dirty="0"/>
+              <a:t>Skrypt SQL</a:t>
+            </a:r>
+          </a:p>
+        </p:txBody>
+      </p:sp>
+      <p:sp>
+        <p:nvSpPr>
+          <p:cNvPr id="8" name="Prostokąt: zaokrąglone rogi 7">
             <a:extLst>
               <a:ext uri="{FF2B5EF4-FFF2-40B4-BE49-F238E27FC236}">
-                <a16:creationId xmlns:a16="http://schemas.microsoft.com/office/drawing/2014/main" id="{FB75A087-849C-44DF-AB45-3EA4C535434A}"/>
-              </a:ext>
-            </a:extLst>
-          </p:cNvPr>
-          <p:cNvSpPr txBox="1"/>
-          <p:nvPr/>
-        </p:nvSpPr>
-        <p:spPr>
-          <a:xfrm>
-            <a:off x="2661480" y="3965645"/>
-            <a:ext cx="1098378" cy="369332"/>
-          </a:xfrm>
-          <a:prstGeom prst="rect">
-            <a:avLst/>
-          </a:prstGeom>
-          <a:noFill/>
-        </p:spPr>
-        <p:txBody>
-          <a:bodyPr wrap="none" rtlCol="0">
-            <a:spAutoFit/>
-          </a:bodyPr>
-          <a:lstStyle/>
-          <a:p>
-            <a:r>
-              <a:rPr lang="pl-PL" dirty="0"/>
-              <a:t>korzysta</a:t>
-            </a:r>
-          </a:p>
-        </p:txBody>
-      </p:sp>
-      <p:sp>
-        <p:nvSpPr>
-          <p:cNvPr id="11" name="Strzałka: w prawo 10">
-            <a:extLst>
-              <a:ext uri="{FF2B5EF4-FFF2-40B4-BE49-F238E27FC236}">
-                <a16:creationId xmlns:a16="http://schemas.microsoft.com/office/drawing/2014/main" id="{964D6393-C5B8-4D19-864B-4732FFBA0BFD}"/>
+                <a16:creationId xmlns:a16="http://schemas.microsoft.com/office/drawing/2014/main" id="{25FB8CDF-6F5A-44E7-A119-8FB7C6C00624}"/>
               </a:ext>
             </a:extLst>
           </p:cNvPr>
@@ -6474,10 +6339,10 @@
         </p:nvSpPr>
         <p:spPr>
           <a:xfrm>
-            <a:off x="3610714" y="4717885"/>
-            <a:ext cx="1158240" cy="324075"/>
-          </a:xfrm>
-          <a:prstGeom prst="rightArrow">
+            <a:off x="7876905" y="5188450"/>
+            <a:ext cx="1776549" cy="862149"/>
+          </a:xfrm>
+          <a:prstGeom prst="roundRect">
             <a:avLst/>
           </a:prstGeom>
         </p:spPr>
@@ -6502,51 +6367,19 @@
           <a:lstStyle/>
           <a:p>
             <a:pPr algn="ctr"/>
-            <a:endParaRPr lang="pl-PL"/>
-          </a:p>
-        </p:txBody>
-      </p:sp>
-      <p:sp>
-        <p:nvSpPr>
-          <p:cNvPr id="12" name="pole tekstowe 11">
+            <a:r>
+              <a:rPr lang="pl-PL" dirty="0"/>
+              <a:t>Baza danych</a:t>
+            </a:r>
+          </a:p>
+        </p:txBody>
+      </p:sp>
+      <p:sp>
+        <p:nvSpPr>
+          <p:cNvPr id="14" name="Strzałka: w prawo 13">
             <a:extLst>
               <a:ext uri="{FF2B5EF4-FFF2-40B4-BE49-F238E27FC236}">
-                <a16:creationId xmlns:a16="http://schemas.microsoft.com/office/drawing/2014/main" id="{0950CA78-9CC2-46BC-8DA9-2B4844928BF0}"/>
-              </a:ext>
-            </a:extLst>
-          </p:cNvPr>
-          <p:cNvSpPr txBox="1"/>
-          <p:nvPr/>
-        </p:nvSpPr>
-        <p:spPr>
-          <a:xfrm>
-            <a:off x="3539888" y="4415565"/>
-            <a:ext cx="1180131" cy="369332"/>
-          </a:xfrm>
-          <a:prstGeom prst="rect">
-            <a:avLst/>
-          </a:prstGeom>
-          <a:noFill/>
-        </p:spPr>
-        <p:txBody>
-          <a:bodyPr wrap="none" rtlCol="0">
-            <a:spAutoFit/>
-          </a:bodyPr>
-          <a:lstStyle/>
-          <a:p>
-            <a:r>
-              <a:rPr lang="pl-PL" dirty="0"/>
-              <a:t>wywołuje</a:t>
-            </a:r>
-          </a:p>
-        </p:txBody>
-      </p:sp>
-      <p:sp>
-        <p:nvSpPr>
-          <p:cNvPr id="20" name="Strzałka: w prawo 19">
-            <a:extLst>
-              <a:ext uri="{FF2B5EF4-FFF2-40B4-BE49-F238E27FC236}">
-                <a16:creationId xmlns:a16="http://schemas.microsoft.com/office/drawing/2014/main" id="{780722DB-6D36-45B5-8871-0186277B07ED}"/>
+                <a16:creationId xmlns:a16="http://schemas.microsoft.com/office/drawing/2014/main" id="{BCD1F377-1D7B-4E8B-9ADA-69655A861E54}"/>
               </a:ext>
             </a:extLst>
           </p:cNvPr>
@@ -6554,8 +6387,8 @@
           <p:nvPr/>
         </p:nvSpPr>
         <p:spPr>
-          <a:xfrm rot="10800000">
-            <a:off x="3550834" y="5255959"/>
+          <a:xfrm>
+            <a:off x="2708366" y="2835887"/>
             <a:ext cx="1158240" cy="324075"/>
           </a:xfrm>
           <a:prstGeom prst="rightArrow">
@@ -6589,10 +6422,10 @@
       </p:sp>
       <p:sp>
         <p:nvSpPr>
-          <p:cNvPr id="21" name="pole tekstowe 20">
+          <p:cNvPr id="15" name="pole tekstowe 14">
             <a:extLst>
               <a:ext uri="{FF2B5EF4-FFF2-40B4-BE49-F238E27FC236}">
-                <a16:creationId xmlns:a16="http://schemas.microsoft.com/office/drawing/2014/main" id="{0DF1D55B-58DA-4327-9695-B098EBE39EB3}"/>
+                <a16:creationId xmlns:a16="http://schemas.microsoft.com/office/drawing/2014/main" id="{D6DE99AB-5AA9-4592-A22E-A12F892B1B2A}"/>
               </a:ext>
             </a:extLst>
           </p:cNvPr>
@@ -6601,8 +6434,8 @@
         </p:nvSpPr>
         <p:spPr>
           <a:xfrm>
-            <a:off x="3539888" y="5513022"/>
-            <a:ext cx="1322798" cy="369332"/>
+            <a:off x="2708366" y="2466555"/>
+            <a:ext cx="1098378" cy="369332"/>
           </a:xfrm>
           <a:prstGeom prst="rect">
             <a:avLst/>
@@ -6617,45 +6450,339 @@
           <a:p>
             <a:r>
               <a:rPr lang="pl-PL" dirty="0"/>
-              <a:t>odpowiada</a:t>
-            </a:r>
-          </a:p>
-        </p:txBody>
-      </p:sp>
-      <p:pic>
-        <p:nvPicPr>
-          <p:cNvPr id="23" name="Obraz 22">
+              <a:t>korzysta</a:t>
+            </a:r>
+          </a:p>
+        </p:txBody>
+      </p:sp>
+      <p:sp>
+        <p:nvSpPr>
+          <p:cNvPr id="16" name="Strzałka: w prawo 15">
             <a:extLst>
               <a:ext uri="{FF2B5EF4-FFF2-40B4-BE49-F238E27FC236}">
-                <a16:creationId xmlns:a16="http://schemas.microsoft.com/office/drawing/2014/main" id="{9FD9DAB2-CCE2-4BA1-8330-4F93B049D562}"/>
+                <a16:creationId xmlns:a16="http://schemas.microsoft.com/office/drawing/2014/main" id="{E6839D4B-FFA6-46CD-BBBE-F4DBA8DBE385}"/>
               </a:ext>
             </a:extLst>
           </p:cNvPr>
-          <p:cNvPicPr>
-            <a:picLocks noChangeAspect="1"/>
-          </p:cNvPicPr>
+          <p:cNvSpPr/>
           <p:nvPr/>
-        </p:nvPicPr>
-        <p:blipFill>
-          <a:blip r:embed="rId2"/>
-          <a:stretch>
-            <a:fillRect/>
-          </a:stretch>
-        </p:blipFill>
+        </p:nvSpPr>
+        <p:spPr>
+          <a:xfrm rot="2573836">
+            <a:off x="5750981" y="3226499"/>
+            <a:ext cx="1158240" cy="324075"/>
+          </a:xfrm>
+          <a:prstGeom prst="rightArrow">
+            <a:avLst/>
+          </a:prstGeom>
+        </p:spPr>
+        <p:style>
+          <a:lnRef idx="2">
+            <a:schemeClr val="accent1">
+              <a:shade val="50000"/>
+            </a:schemeClr>
+          </a:lnRef>
+          <a:fillRef idx="1">
+            <a:schemeClr val="accent1"/>
+          </a:fillRef>
+          <a:effectRef idx="0">
+            <a:schemeClr val="accent1"/>
+          </a:effectRef>
+          <a:fontRef idx="minor">
+            <a:schemeClr val="lt1"/>
+          </a:fontRef>
+        </p:style>
+        <p:txBody>
+          <a:bodyPr rtlCol="0" anchor="ctr"/>
+          <a:lstStyle/>
+          <a:p>
+            <a:pPr algn="ctr"/>
+            <a:endParaRPr lang="pl-PL"/>
+          </a:p>
+        </p:txBody>
+      </p:sp>
+      <p:sp>
+        <p:nvSpPr>
+          <p:cNvPr id="17" name="pole tekstowe 16">
+            <a:extLst>
+              <a:ext uri="{FF2B5EF4-FFF2-40B4-BE49-F238E27FC236}">
+                <a16:creationId xmlns:a16="http://schemas.microsoft.com/office/drawing/2014/main" id="{C07615AC-DD3B-4B8A-AAEA-9D022C63BEF7}"/>
+              </a:ext>
+            </a:extLst>
+          </p:cNvPr>
+          <p:cNvSpPr txBox="1"/>
+          <p:nvPr/>
+        </p:nvSpPr>
         <p:spPr>
           <a:xfrm>
-            <a:off x="7544968" y="1729217"/>
-            <a:ext cx="2723245" cy="4472856"/>
+            <a:off x="6310649" y="2939953"/>
+            <a:ext cx="1107996" cy="369332"/>
           </a:xfrm>
           <a:prstGeom prst="rect">
             <a:avLst/>
           </a:prstGeom>
-        </p:spPr>
-      </p:pic>
+          <a:noFill/>
+        </p:spPr>
+        <p:txBody>
+          <a:bodyPr wrap="none" rtlCol="0">
+            <a:spAutoFit/>
+          </a:bodyPr>
+          <a:lstStyle/>
+          <a:p>
+            <a:r>
+              <a:rPr lang="pl-PL" dirty="0"/>
+              <a:t>generuje</a:t>
+            </a:r>
+          </a:p>
+        </p:txBody>
+      </p:sp>
+      <p:sp>
+        <p:nvSpPr>
+          <p:cNvPr id="18" name="Strzałka: w prawo 17">
+            <a:extLst>
+              <a:ext uri="{FF2B5EF4-FFF2-40B4-BE49-F238E27FC236}">
+                <a16:creationId xmlns:a16="http://schemas.microsoft.com/office/drawing/2014/main" id="{80F10ADF-FDE6-4DF7-94C5-7F3FA399ED01}"/>
+              </a:ext>
+            </a:extLst>
+          </p:cNvPr>
+          <p:cNvSpPr/>
+          <p:nvPr/>
+        </p:nvSpPr>
+        <p:spPr>
+          <a:xfrm rot="7973592">
+            <a:off x="4999644" y="4491847"/>
+            <a:ext cx="1158240" cy="324075"/>
+          </a:xfrm>
+          <a:prstGeom prst="rightArrow">
+            <a:avLst/>
+          </a:prstGeom>
+        </p:spPr>
+        <p:style>
+          <a:lnRef idx="2">
+            <a:schemeClr val="accent1">
+              <a:shade val="50000"/>
+            </a:schemeClr>
+          </a:lnRef>
+          <a:fillRef idx="1">
+            <a:schemeClr val="accent1"/>
+          </a:fillRef>
+          <a:effectRef idx="0">
+            <a:schemeClr val="accent1"/>
+          </a:effectRef>
+          <a:fontRef idx="minor">
+            <a:schemeClr val="lt1"/>
+          </a:fontRef>
+        </p:style>
+        <p:txBody>
+          <a:bodyPr rtlCol="0" anchor="ctr"/>
+          <a:lstStyle/>
+          <a:p>
+            <a:pPr algn="ctr"/>
+            <a:endParaRPr lang="pl-PL"/>
+          </a:p>
+        </p:txBody>
+      </p:sp>
+      <p:sp>
+        <p:nvSpPr>
+          <p:cNvPr id="19" name="pole tekstowe 18">
+            <a:extLst>
+              <a:ext uri="{FF2B5EF4-FFF2-40B4-BE49-F238E27FC236}">
+                <a16:creationId xmlns:a16="http://schemas.microsoft.com/office/drawing/2014/main" id="{3390D1A1-B34A-4443-A97B-C88D00349D84}"/>
+              </a:ext>
+            </a:extLst>
+          </p:cNvPr>
+          <p:cNvSpPr txBox="1"/>
+          <p:nvPr/>
+        </p:nvSpPr>
+        <p:spPr>
+          <a:xfrm>
+            <a:off x="4470768" y="4304525"/>
+            <a:ext cx="1107996" cy="369332"/>
+          </a:xfrm>
+          <a:prstGeom prst="rect">
+            <a:avLst/>
+          </a:prstGeom>
+          <a:noFill/>
+        </p:spPr>
+        <p:txBody>
+          <a:bodyPr wrap="none" rtlCol="0">
+            <a:spAutoFit/>
+          </a:bodyPr>
+          <a:lstStyle/>
+          <a:p>
+            <a:r>
+              <a:rPr lang="pl-PL" dirty="0"/>
+              <a:t>generuje</a:t>
+            </a:r>
+          </a:p>
+        </p:txBody>
+      </p:sp>
+      <p:sp>
+        <p:nvSpPr>
+          <p:cNvPr id="20" name="Strzałka: w prawo 19">
+            <a:extLst>
+              <a:ext uri="{FF2B5EF4-FFF2-40B4-BE49-F238E27FC236}">
+                <a16:creationId xmlns:a16="http://schemas.microsoft.com/office/drawing/2014/main" id="{3F8B85F8-F2C5-470A-8B8B-AEE52E052CCC}"/>
+              </a:ext>
+            </a:extLst>
+          </p:cNvPr>
+          <p:cNvSpPr/>
+          <p:nvPr/>
+        </p:nvSpPr>
+        <p:spPr>
+          <a:xfrm rot="2573836">
+            <a:off x="7871517" y="4506980"/>
+            <a:ext cx="1158240" cy="324075"/>
+          </a:xfrm>
+          <a:prstGeom prst="rightArrow">
+            <a:avLst/>
+          </a:prstGeom>
+        </p:spPr>
+        <p:style>
+          <a:lnRef idx="2">
+            <a:schemeClr val="accent1">
+              <a:shade val="50000"/>
+            </a:schemeClr>
+          </a:lnRef>
+          <a:fillRef idx="1">
+            <a:schemeClr val="accent1"/>
+          </a:fillRef>
+          <a:effectRef idx="0">
+            <a:schemeClr val="accent1"/>
+          </a:effectRef>
+          <a:fontRef idx="minor">
+            <a:schemeClr val="lt1"/>
+          </a:fontRef>
+        </p:style>
+        <p:txBody>
+          <a:bodyPr rtlCol="0" anchor="ctr"/>
+          <a:lstStyle/>
+          <a:p>
+            <a:pPr algn="ctr"/>
+            <a:endParaRPr lang="pl-PL"/>
+          </a:p>
+        </p:txBody>
+      </p:sp>
+      <p:sp>
+        <p:nvSpPr>
+          <p:cNvPr id="21" name="pole tekstowe 20">
+            <a:extLst>
+              <a:ext uri="{FF2B5EF4-FFF2-40B4-BE49-F238E27FC236}">
+                <a16:creationId xmlns:a16="http://schemas.microsoft.com/office/drawing/2014/main" id="{5D14E219-10B8-4F97-8728-E121B3373D70}"/>
+              </a:ext>
+            </a:extLst>
+          </p:cNvPr>
+          <p:cNvSpPr txBox="1"/>
+          <p:nvPr/>
+        </p:nvSpPr>
+        <p:spPr>
+          <a:xfrm>
+            <a:off x="8431185" y="4220434"/>
+            <a:ext cx="1388522" cy="369332"/>
+          </a:xfrm>
+          <a:prstGeom prst="rect">
+            <a:avLst/>
+          </a:prstGeom>
+          <a:noFill/>
+        </p:spPr>
+        <p:txBody>
+          <a:bodyPr wrap="none" rtlCol="0">
+            <a:spAutoFit/>
+          </a:bodyPr>
+          <a:lstStyle/>
+          <a:p>
+            <a:r>
+              <a:rPr lang="pl-PL" dirty="0"/>
+              <a:t>aktualizuje</a:t>
+            </a:r>
+          </a:p>
+        </p:txBody>
+      </p:sp>
+      <p:sp>
+        <p:nvSpPr>
+          <p:cNvPr id="22" name="Strzałka: w prawo 21">
+            <a:extLst>
+              <a:ext uri="{FF2B5EF4-FFF2-40B4-BE49-F238E27FC236}">
+                <a16:creationId xmlns:a16="http://schemas.microsoft.com/office/drawing/2014/main" id="{851C729A-CA0A-4A4E-8078-307DEBAFA466}"/>
+              </a:ext>
+            </a:extLst>
+          </p:cNvPr>
+          <p:cNvSpPr/>
+          <p:nvPr/>
+        </p:nvSpPr>
+        <p:spPr>
+          <a:xfrm>
+            <a:off x="6405155" y="5525931"/>
+            <a:ext cx="1158240" cy="324075"/>
+          </a:xfrm>
+          <a:prstGeom prst="rightArrow">
+            <a:avLst/>
+          </a:prstGeom>
+        </p:spPr>
+        <p:style>
+          <a:lnRef idx="2">
+            <a:schemeClr val="accent1">
+              <a:shade val="50000"/>
+            </a:schemeClr>
+          </a:lnRef>
+          <a:fillRef idx="1">
+            <a:schemeClr val="accent1"/>
+          </a:fillRef>
+          <a:effectRef idx="0">
+            <a:schemeClr val="accent1"/>
+          </a:effectRef>
+          <a:fontRef idx="minor">
+            <a:schemeClr val="lt1"/>
+          </a:fontRef>
+        </p:style>
+        <p:txBody>
+          <a:bodyPr rtlCol="0" anchor="ctr"/>
+          <a:lstStyle/>
+          <a:p>
+            <a:pPr algn="ctr"/>
+            <a:endParaRPr lang="pl-PL"/>
+          </a:p>
+        </p:txBody>
+      </p:sp>
+      <p:sp>
+        <p:nvSpPr>
+          <p:cNvPr id="23" name="pole tekstowe 22">
+            <a:extLst>
+              <a:ext uri="{FF2B5EF4-FFF2-40B4-BE49-F238E27FC236}">
+                <a16:creationId xmlns:a16="http://schemas.microsoft.com/office/drawing/2014/main" id="{2C837667-31BB-4660-9E3E-15FEF5E90769}"/>
+              </a:ext>
+            </a:extLst>
+          </p:cNvPr>
+          <p:cNvSpPr txBox="1"/>
+          <p:nvPr/>
+        </p:nvSpPr>
+        <p:spPr>
+          <a:xfrm>
+            <a:off x="6290014" y="5188450"/>
+            <a:ext cx="1388522" cy="369332"/>
+          </a:xfrm>
+          <a:prstGeom prst="rect">
+            <a:avLst/>
+          </a:prstGeom>
+          <a:noFill/>
+        </p:spPr>
+        <p:txBody>
+          <a:bodyPr wrap="none" rtlCol="0">
+            <a:spAutoFit/>
+          </a:bodyPr>
+          <a:lstStyle/>
+          <a:p>
+            <a:r>
+              <a:rPr lang="pl-PL" dirty="0"/>
+              <a:t>aktualizuje</a:t>
+            </a:r>
+          </a:p>
+        </p:txBody>
+      </p:sp>
     </p:spTree>
     <p:extLst>
       <p:ext uri="{BB962C8B-B14F-4D97-AF65-F5344CB8AC3E}">
-        <p14:creationId xmlns:p14="http://schemas.microsoft.com/office/powerpoint/2010/main" val="3228916118"/>
+        <p14:creationId xmlns:p14="http://schemas.microsoft.com/office/powerpoint/2010/main" val="1277708116"/>
       </p:ext>
     </p:extLst>
   </p:cSld>

</xml_diff>

<commit_message>
poprawienie mojej częsci prezentacji
</commit_message>
<xml_diff>
--- a/Dokumentacja/Prezentacja.pptx
+++ b/Dokumentacja/Prezentacja.pptx
@@ -8,19 +8,17 @@
     <p:sldId id="256" r:id="rId2"/>
     <p:sldId id="268" r:id="rId3"/>
     <p:sldId id="269" r:id="rId4"/>
-    <p:sldId id="257" r:id="rId5"/>
-    <p:sldId id="258" r:id="rId6"/>
-    <p:sldId id="271" r:id="rId7"/>
-    <p:sldId id="270" r:id="rId8"/>
-    <p:sldId id="260" r:id="rId9"/>
-    <p:sldId id="261" r:id="rId10"/>
-    <p:sldId id="262" r:id="rId11"/>
-    <p:sldId id="263" r:id="rId12"/>
-    <p:sldId id="259" r:id="rId13"/>
-    <p:sldId id="267" r:id="rId14"/>
-    <p:sldId id="266" r:id="rId15"/>
-    <p:sldId id="265" r:id="rId16"/>
-    <p:sldId id="264" r:id="rId17"/>
+    <p:sldId id="258" r:id="rId5"/>
+    <p:sldId id="271" r:id="rId6"/>
+    <p:sldId id="270" r:id="rId7"/>
+    <p:sldId id="261" r:id="rId8"/>
+    <p:sldId id="262" r:id="rId9"/>
+    <p:sldId id="263" r:id="rId10"/>
+    <p:sldId id="259" r:id="rId11"/>
+    <p:sldId id="267" r:id="rId12"/>
+    <p:sldId id="266" r:id="rId13"/>
+    <p:sldId id="265" r:id="rId14"/>
+    <p:sldId id="264" r:id="rId15"/>
   </p:sldIdLst>
   <p:sldSz cx="12192000" cy="6858000"/>
   <p:notesSz cx="6858000" cy="9144000"/>
@@ -135,11 +133,9 @@
         </p14:section>
         <p14:section name="Mateusz" id="{98B21B8B-2B80-48DF-8111-74E14636A865}">
           <p14:sldIdLst>
-            <p14:sldId id="257"/>
             <p14:sldId id="258"/>
             <p14:sldId id="271"/>
             <p14:sldId id="270"/>
-            <p14:sldId id="260"/>
             <p14:sldId id="261"/>
             <p14:sldId id="262"/>
             <p14:sldId id="263"/>
@@ -3613,7 +3609,7 @@
           <p:cNvPr id="2" name="Tytuł 1">
             <a:extLst>
               <a:ext uri="{FF2B5EF4-FFF2-40B4-BE49-F238E27FC236}">
-                <a16:creationId xmlns:a16="http://schemas.microsoft.com/office/drawing/2014/main" id="{9360C57A-54BB-463B-B11D-EDA92B04C4E1}"/>
+                <a16:creationId xmlns:a16="http://schemas.microsoft.com/office/drawing/2014/main" id="{CE80579C-84DE-48BB-A341-1DEB50393F10}"/>
               </a:ext>
             </a:extLst>
           </p:cNvPr>
@@ -3630,465 +3626,66 @@
           <a:lstStyle/>
           <a:p>
             <a:r>
-              <a:rPr lang="pl-PL" dirty="0" err="1"/>
-              <a:t>Stripe</a:t>
-            </a:r>
-            <a:r>
               <a:rPr lang="pl-PL" dirty="0"/>
-              <a:t> – płatności online</a:t>
-            </a:r>
-          </a:p>
-        </p:txBody>
-      </p:sp>
-      <p:sp>
-        <p:nvSpPr>
-          <p:cNvPr id="4" name="Prostokąt: zaokrąglone rogi 3">
+              <a:t>Interfejs użytkownika</a:t>
+            </a:r>
+          </a:p>
+        </p:txBody>
+      </p:sp>
+      <p:sp>
+        <p:nvSpPr>
+          <p:cNvPr id="3" name="Symbol zastępczy zawartości 2">
             <a:extLst>
               <a:ext uri="{FF2B5EF4-FFF2-40B4-BE49-F238E27FC236}">
-                <a16:creationId xmlns:a16="http://schemas.microsoft.com/office/drawing/2014/main" id="{2856FFAD-AF17-4BC7-8AFD-5E17A224F5EB}"/>
+                <a16:creationId xmlns:a16="http://schemas.microsoft.com/office/drawing/2014/main" id="{9EB40BD8-B84F-4FCC-BC21-BC1F26B66D11}"/>
               </a:ext>
             </a:extLst>
           </p:cNvPr>
-          <p:cNvSpPr/>
-          <p:nvPr/>
-        </p:nvSpPr>
-        <p:spPr>
-          <a:xfrm>
-            <a:off x="1681766" y="2895533"/>
-            <a:ext cx="1776549" cy="862149"/>
-          </a:xfrm>
-          <a:prstGeom prst="roundRect">
-            <a:avLst/>
-          </a:prstGeom>
-        </p:spPr>
-        <p:style>
-          <a:lnRef idx="2">
-            <a:schemeClr val="accent1">
-              <a:shade val="50000"/>
-            </a:schemeClr>
-          </a:lnRef>
-          <a:fillRef idx="1">
-            <a:schemeClr val="accent1"/>
-          </a:fillRef>
-          <a:effectRef idx="0">
-            <a:schemeClr val="accent1"/>
-          </a:effectRef>
-          <a:fontRef idx="minor">
-            <a:schemeClr val="lt1"/>
-          </a:fontRef>
-        </p:style>
-        <p:txBody>
-          <a:bodyPr rtlCol="0" anchor="ctr"/>
-          <a:lstStyle/>
-          <a:p>
-            <a:pPr algn="ctr"/>
-            <a:r>
-              <a:rPr lang="pl-PL" dirty="0"/>
-              <a:t>Aplikacja </a:t>
-            </a:r>
-            <a:r>
-              <a:rPr lang="pl-PL" dirty="0" err="1"/>
-              <a:t>ASP.Net</a:t>
-            </a:r>
-            <a:r>
-              <a:rPr lang="pl-PL" dirty="0"/>
-              <a:t> </a:t>
-            </a:r>
-            <a:r>
-              <a:rPr lang="pl-PL" dirty="0" err="1"/>
-              <a:t>Core</a:t>
+          <p:cNvSpPr>
+            <a:spLocks noGrp="1"/>
+          </p:cNvSpPr>
+          <p:nvPr>
+            <p:ph idx="1"/>
+          </p:nvPr>
+        </p:nvSpPr>
+        <p:spPr/>
+        <p:txBody>
+          <a:bodyPr vert="horz" lIns="91440" tIns="45720" rIns="91440" bIns="45720" rtlCol="0" anchor="t">
+            <a:normAutofit/>
+          </a:bodyPr>
+          <a:lstStyle/>
+          <a:p>
+            <a:r>
+              <a:rPr lang="pl-PL"/>
+              <a:t>Razor Pages </a:t>
             </a:r>
             <a:endParaRPr lang="pl-PL" dirty="0"/>
           </a:p>
-        </p:txBody>
-      </p:sp>
-      <p:sp>
-        <p:nvSpPr>
-          <p:cNvPr id="5" name="Prostokąt: zaokrąglone rogi 4">
-            <a:extLst>
-              <a:ext uri="{FF2B5EF4-FFF2-40B4-BE49-F238E27FC236}">
-                <a16:creationId xmlns:a16="http://schemas.microsoft.com/office/drawing/2014/main" id="{A5BB7905-DE24-434F-8803-BF58C4B9F39D}"/>
-              </a:ext>
-            </a:extLst>
-          </p:cNvPr>
-          <p:cNvSpPr/>
-          <p:nvPr/>
-        </p:nvSpPr>
-        <p:spPr>
-          <a:xfrm>
-            <a:off x="1681766" y="4717885"/>
-            <a:ext cx="1776549" cy="862149"/>
-          </a:xfrm>
-          <a:prstGeom prst="roundRect">
-            <a:avLst/>
-          </a:prstGeom>
-        </p:spPr>
-        <p:style>
-          <a:lnRef idx="2">
-            <a:schemeClr val="accent1">
-              <a:shade val="50000"/>
-            </a:schemeClr>
-          </a:lnRef>
-          <a:fillRef idx="1">
-            <a:schemeClr val="accent1"/>
-          </a:fillRef>
-          <a:effectRef idx="0">
-            <a:schemeClr val="accent1"/>
-          </a:effectRef>
-          <a:fontRef idx="minor">
-            <a:schemeClr val="lt1"/>
-          </a:fontRef>
-        </p:style>
-        <p:txBody>
-          <a:bodyPr rtlCol="0" anchor="ctr"/>
-          <a:lstStyle/>
-          <a:p>
-            <a:pPr algn="ctr"/>
-            <a:r>
-              <a:rPr lang="pl-PL" dirty="0"/>
-              <a:t>Klucz </a:t>
-            </a:r>
-            <a:r>
-              <a:rPr lang="pl-PL" dirty="0" err="1"/>
-              <a:t>Auth</a:t>
-            </a:r>
-            <a:r>
-              <a:rPr lang="pl-PL" dirty="0"/>
-              <a:t> i Model</a:t>
-            </a:r>
-          </a:p>
-        </p:txBody>
-      </p:sp>
-      <p:sp>
-        <p:nvSpPr>
-          <p:cNvPr id="6" name="Prostokąt: zaokrąglone rogi 5">
-            <a:extLst>
-              <a:ext uri="{FF2B5EF4-FFF2-40B4-BE49-F238E27FC236}">
-                <a16:creationId xmlns:a16="http://schemas.microsoft.com/office/drawing/2014/main" id="{E682170E-E940-42D9-9AAD-A6D27E69C478}"/>
-              </a:ext>
-            </a:extLst>
-          </p:cNvPr>
-          <p:cNvSpPr/>
-          <p:nvPr/>
-        </p:nvSpPr>
-        <p:spPr>
-          <a:xfrm>
-            <a:off x="4921353" y="4717885"/>
-            <a:ext cx="1776549" cy="862149"/>
-          </a:xfrm>
-          <a:prstGeom prst="roundRect">
-            <a:avLst/>
-          </a:prstGeom>
-        </p:spPr>
-        <p:style>
-          <a:lnRef idx="2">
-            <a:schemeClr val="accent1">
-              <a:shade val="50000"/>
-            </a:schemeClr>
-          </a:lnRef>
-          <a:fillRef idx="1">
-            <a:schemeClr val="accent1"/>
-          </a:fillRef>
-          <a:effectRef idx="0">
-            <a:schemeClr val="accent1"/>
-          </a:effectRef>
-          <a:fontRef idx="minor">
-            <a:schemeClr val="lt1"/>
-          </a:fontRef>
-        </p:style>
-        <p:txBody>
-          <a:bodyPr rtlCol="0" anchor="ctr"/>
-          <a:lstStyle/>
-          <a:p>
-            <a:pPr algn="ctr"/>
-            <a:r>
-              <a:rPr lang="pl-PL" dirty="0" err="1"/>
-              <a:t>Stripe</a:t>
-            </a:r>
-            <a:r>
-              <a:rPr lang="pl-PL" dirty="0"/>
-              <a:t> API</a:t>
-            </a:r>
-          </a:p>
-        </p:txBody>
-      </p:sp>
-      <p:sp>
-        <p:nvSpPr>
-          <p:cNvPr id="9" name="Strzałka: w prawo 8">
-            <a:extLst>
-              <a:ext uri="{FF2B5EF4-FFF2-40B4-BE49-F238E27FC236}">
-                <a16:creationId xmlns:a16="http://schemas.microsoft.com/office/drawing/2014/main" id="{15F3DC0D-0D2F-44FF-B991-ACD528E3CD99}"/>
-              </a:ext>
-            </a:extLst>
-          </p:cNvPr>
-          <p:cNvSpPr/>
-          <p:nvPr/>
-        </p:nvSpPr>
-        <p:spPr>
-          <a:xfrm rot="5400000">
-            <a:off x="2229353" y="4097508"/>
-            <a:ext cx="681372" cy="324075"/>
-          </a:xfrm>
-          <a:prstGeom prst="rightArrow">
-            <a:avLst/>
-          </a:prstGeom>
-        </p:spPr>
-        <p:style>
-          <a:lnRef idx="2">
-            <a:schemeClr val="accent1">
-              <a:shade val="50000"/>
-            </a:schemeClr>
-          </a:lnRef>
-          <a:fillRef idx="1">
-            <a:schemeClr val="accent1"/>
-          </a:fillRef>
-          <a:effectRef idx="0">
-            <a:schemeClr val="accent1"/>
-          </a:effectRef>
-          <a:fontRef idx="minor">
-            <a:schemeClr val="lt1"/>
-          </a:fontRef>
-        </p:style>
-        <p:txBody>
-          <a:bodyPr rtlCol="0" anchor="ctr"/>
-          <a:lstStyle/>
-          <a:p>
-            <a:pPr algn="ctr"/>
-            <a:endParaRPr lang="pl-PL"/>
-          </a:p>
-        </p:txBody>
-      </p:sp>
-      <p:sp>
-        <p:nvSpPr>
-          <p:cNvPr id="10" name="pole tekstowe 9">
-            <a:extLst>
-              <a:ext uri="{FF2B5EF4-FFF2-40B4-BE49-F238E27FC236}">
-                <a16:creationId xmlns:a16="http://schemas.microsoft.com/office/drawing/2014/main" id="{FB75A087-849C-44DF-AB45-3EA4C535434A}"/>
-              </a:ext>
-            </a:extLst>
-          </p:cNvPr>
-          <p:cNvSpPr txBox="1"/>
-          <p:nvPr/>
-        </p:nvSpPr>
-        <p:spPr>
-          <a:xfrm>
-            <a:off x="2661480" y="3965645"/>
-            <a:ext cx="1098378" cy="369332"/>
-          </a:xfrm>
-          <a:prstGeom prst="rect">
-            <a:avLst/>
-          </a:prstGeom>
-          <a:noFill/>
-        </p:spPr>
-        <p:txBody>
-          <a:bodyPr wrap="none" rtlCol="0">
-            <a:spAutoFit/>
-          </a:bodyPr>
-          <a:lstStyle/>
-          <a:p>
-            <a:r>
-              <a:rPr lang="pl-PL" dirty="0"/>
-              <a:t>korzysta</a:t>
-            </a:r>
-          </a:p>
-        </p:txBody>
-      </p:sp>
-      <p:sp>
-        <p:nvSpPr>
-          <p:cNvPr id="11" name="Strzałka: w prawo 10">
-            <a:extLst>
-              <a:ext uri="{FF2B5EF4-FFF2-40B4-BE49-F238E27FC236}">
-                <a16:creationId xmlns:a16="http://schemas.microsoft.com/office/drawing/2014/main" id="{964D6393-C5B8-4D19-864B-4732FFBA0BFD}"/>
-              </a:ext>
-            </a:extLst>
-          </p:cNvPr>
-          <p:cNvSpPr/>
-          <p:nvPr/>
-        </p:nvSpPr>
-        <p:spPr>
-          <a:xfrm>
-            <a:off x="3610714" y="4717885"/>
-            <a:ext cx="1158240" cy="324075"/>
-          </a:xfrm>
-          <a:prstGeom prst="rightArrow">
-            <a:avLst/>
-          </a:prstGeom>
-        </p:spPr>
-        <p:style>
-          <a:lnRef idx="2">
-            <a:schemeClr val="accent1">
-              <a:shade val="50000"/>
-            </a:schemeClr>
-          </a:lnRef>
-          <a:fillRef idx="1">
-            <a:schemeClr val="accent1"/>
-          </a:fillRef>
-          <a:effectRef idx="0">
-            <a:schemeClr val="accent1"/>
-          </a:effectRef>
-          <a:fontRef idx="minor">
-            <a:schemeClr val="lt1"/>
-          </a:fontRef>
-        </p:style>
-        <p:txBody>
-          <a:bodyPr rtlCol="0" anchor="ctr"/>
-          <a:lstStyle/>
-          <a:p>
-            <a:pPr algn="ctr"/>
-            <a:endParaRPr lang="pl-PL"/>
-          </a:p>
-        </p:txBody>
-      </p:sp>
-      <p:sp>
-        <p:nvSpPr>
-          <p:cNvPr id="12" name="pole tekstowe 11">
-            <a:extLst>
-              <a:ext uri="{FF2B5EF4-FFF2-40B4-BE49-F238E27FC236}">
-                <a16:creationId xmlns:a16="http://schemas.microsoft.com/office/drawing/2014/main" id="{0950CA78-9CC2-46BC-8DA9-2B4844928BF0}"/>
-              </a:ext>
-            </a:extLst>
-          </p:cNvPr>
-          <p:cNvSpPr txBox="1"/>
-          <p:nvPr/>
-        </p:nvSpPr>
-        <p:spPr>
-          <a:xfrm>
-            <a:off x="3539888" y="4415565"/>
-            <a:ext cx="1180131" cy="369332"/>
-          </a:xfrm>
-          <a:prstGeom prst="rect">
-            <a:avLst/>
-          </a:prstGeom>
-          <a:noFill/>
-        </p:spPr>
-        <p:txBody>
-          <a:bodyPr wrap="none" rtlCol="0">
-            <a:spAutoFit/>
-          </a:bodyPr>
-          <a:lstStyle/>
-          <a:p>
-            <a:r>
-              <a:rPr lang="pl-PL" dirty="0"/>
-              <a:t>wywołuje</a:t>
-            </a:r>
-          </a:p>
-        </p:txBody>
-      </p:sp>
-      <p:sp>
-        <p:nvSpPr>
-          <p:cNvPr id="20" name="Strzałka: w prawo 19">
-            <a:extLst>
-              <a:ext uri="{FF2B5EF4-FFF2-40B4-BE49-F238E27FC236}">
-                <a16:creationId xmlns:a16="http://schemas.microsoft.com/office/drawing/2014/main" id="{780722DB-6D36-45B5-8871-0186277B07ED}"/>
-              </a:ext>
-            </a:extLst>
-          </p:cNvPr>
-          <p:cNvSpPr/>
-          <p:nvPr/>
-        </p:nvSpPr>
-        <p:spPr>
-          <a:xfrm rot="10800000">
-            <a:off x="3550834" y="5255959"/>
-            <a:ext cx="1158240" cy="324075"/>
-          </a:xfrm>
-          <a:prstGeom prst="rightArrow">
-            <a:avLst/>
-          </a:prstGeom>
-        </p:spPr>
-        <p:style>
-          <a:lnRef idx="2">
-            <a:schemeClr val="accent1">
-              <a:shade val="50000"/>
-            </a:schemeClr>
-          </a:lnRef>
-          <a:fillRef idx="1">
-            <a:schemeClr val="accent1"/>
-          </a:fillRef>
-          <a:effectRef idx="0">
-            <a:schemeClr val="accent1"/>
-          </a:effectRef>
-          <a:fontRef idx="minor">
-            <a:schemeClr val="lt1"/>
-          </a:fontRef>
-        </p:style>
-        <p:txBody>
-          <a:bodyPr rtlCol="0" anchor="ctr"/>
-          <a:lstStyle/>
-          <a:p>
-            <a:pPr algn="ctr"/>
-            <a:endParaRPr lang="pl-PL"/>
-          </a:p>
-        </p:txBody>
-      </p:sp>
-      <p:sp>
-        <p:nvSpPr>
-          <p:cNvPr id="21" name="pole tekstowe 20">
-            <a:extLst>
-              <a:ext uri="{FF2B5EF4-FFF2-40B4-BE49-F238E27FC236}">
-                <a16:creationId xmlns:a16="http://schemas.microsoft.com/office/drawing/2014/main" id="{0DF1D55B-58DA-4327-9695-B098EBE39EB3}"/>
-              </a:ext>
-            </a:extLst>
-          </p:cNvPr>
-          <p:cNvSpPr txBox="1"/>
-          <p:nvPr/>
-        </p:nvSpPr>
-        <p:spPr>
-          <a:xfrm>
-            <a:off x="3539888" y="5513022"/>
-            <a:ext cx="1322798" cy="369332"/>
-          </a:xfrm>
-          <a:prstGeom prst="rect">
-            <a:avLst/>
-          </a:prstGeom>
-          <a:noFill/>
-        </p:spPr>
-        <p:txBody>
-          <a:bodyPr wrap="none" rtlCol="0">
-            <a:spAutoFit/>
-          </a:bodyPr>
-          <a:lstStyle/>
-          <a:p>
-            <a:r>
-              <a:rPr lang="pl-PL" dirty="0"/>
-              <a:t>odpowiada</a:t>
-            </a:r>
-          </a:p>
-        </p:txBody>
-      </p:sp>
-      <p:pic>
-        <p:nvPicPr>
-          <p:cNvPr id="23" name="Obraz 22">
-            <a:extLst>
-              <a:ext uri="{FF2B5EF4-FFF2-40B4-BE49-F238E27FC236}">
-                <a16:creationId xmlns:a16="http://schemas.microsoft.com/office/drawing/2014/main" id="{9FD9DAB2-CCE2-4BA1-8330-4F93B049D562}"/>
-              </a:ext>
-            </a:extLst>
-          </p:cNvPr>
-          <p:cNvPicPr>
-            <a:picLocks noChangeAspect="1"/>
-          </p:cNvPicPr>
-          <p:nvPr/>
-        </p:nvPicPr>
-        <p:blipFill>
-          <a:blip r:embed="rId2"/>
-          <a:stretch>
-            <a:fillRect/>
-          </a:stretch>
-        </p:blipFill>
-        <p:spPr>
-          <a:xfrm>
-            <a:off x="7544968" y="1729217"/>
-            <a:ext cx="2723245" cy="4472856"/>
-          </a:xfrm>
-          <a:prstGeom prst="rect">
-            <a:avLst/>
-          </a:prstGeom>
-        </p:spPr>
-      </p:pic>
+          <a:p>
+            <a:r>
+              <a:rPr lang="pl-PL"/>
+              <a:t>Bootstrap</a:t>
+            </a:r>
+            <a:endParaRPr lang="pl-PL" dirty="0"/>
+          </a:p>
+          <a:p>
+            <a:pPr marL="0" indent="0">
+              <a:buNone/>
+            </a:pPr>
+            <a:endParaRPr lang="pl-PL" dirty="0"/>
+          </a:p>
+          <a:p>
+            <a:endParaRPr lang="pl-PL" dirty="0"/>
+          </a:p>
+          <a:p>
+            <a:endParaRPr lang="pl-PL" dirty="0"/>
+          </a:p>
+        </p:txBody>
+      </p:sp>
     </p:spTree>
     <p:extLst>
       <p:ext uri="{BB962C8B-B14F-4D97-AF65-F5344CB8AC3E}">
-        <p14:creationId xmlns:p14="http://schemas.microsoft.com/office/powerpoint/2010/main" val="3228916118"/>
+        <p14:creationId xmlns:p14="http://schemas.microsoft.com/office/powerpoint/2010/main" val="2830796625"/>
       </p:ext>
     </p:extLst>
   </p:cSld>
@@ -4120,7 +3717,7 @@
           <p:cNvPr id="2" name="Tytuł 1">
             <a:extLst>
               <a:ext uri="{FF2B5EF4-FFF2-40B4-BE49-F238E27FC236}">
-                <a16:creationId xmlns:a16="http://schemas.microsoft.com/office/drawing/2014/main" id="{2F655891-0751-43CE-968B-868010D3CF8F}"/>
+                <a16:creationId xmlns:a16="http://schemas.microsoft.com/office/drawing/2014/main" id="{CE80579C-84DE-48BB-A341-1DEB50393F10}"/>
               </a:ext>
             </a:extLst>
           </p:cNvPr>
@@ -4137,12 +3734,8 @@
           <a:lstStyle/>
           <a:p>
             <a:r>
-              <a:rPr lang="pl-PL" dirty="0" err="1"/>
-              <a:t>Sendgrid</a:t>
-            </a:r>
-            <a:r>
               <a:rPr lang="pl-PL" dirty="0"/>
-              <a:t> – e-mail API</a:t>
+              <a:t>Interfejs użytkownika</a:t>
             </a:r>
           </a:p>
         </p:txBody>
@@ -4152,7 +3745,7 @@
           <p:cNvPr id="3" name="Symbol zastępczy zawartości 2">
             <a:extLst>
               <a:ext uri="{FF2B5EF4-FFF2-40B4-BE49-F238E27FC236}">
-                <a16:creationId xmlns:a16="http://schemas.microsoft.com/office/drawing/2014/main" id="{9DAF8F79-0520-4A2A-87B3-55CC710E6332}"/>
+                <a16:creationId xmlns:a16="http://schemas.microsoft.com/office/drawing/2014/main" id="{9EB40BD8-B84F-4FCC-BC21-BC1F26B66D11}"/>
               </a:ext>
             </a:extLst>
           </p:cNvPr>
@@ -4165,435 +3758,40 @@
         </p:nvSpPr>
         <p:spPr/>
         <p:txBody>
-          <a:bodyPr/>
-          <a:lstStyle/>
-          <a:p>
+          <a:bodyPr vert="horz" lIns="91440" tIns="45720" rIns="91440" bIns="45720" rtlCol="0" anchor="t">
+            <a:normAutofit/>
+          </a:bodyPr>
+          <a:lstStyle/>
+          <a:p>
+            <a:r>
+              <a:rPr lang="pl-PL"/>
+              <a:t>Struktura Areas oraz Shared</a:t>
+            </a:r>
             <a:endParaRPr lang="pl-PL" dirty="0"/>
           </a:p>
-        </p:txBody>
-      </p:sp>
-      <p:sp>
-        <p:nvSpPr>
-          <p:cNvPr id="18" name="Prostokąt: zaokrąglone rogi 17">
+          <a:p>
+            <a:endParaRPr lang="pl-PL" dirty="0"/>
+          </a:p>
+          <a:p>
+            <a:pPr marL="0" indent="0">
+              <a:buNone/>
+            </a:pPr>
+            <a:endParaRPr lang="pl-PL" dirty="0"/>
+          </a:p>
+          <a:p>
+            <a:endParaRPr lang="pl-PL" dirty="0"/>
+          </a:p>
+          <a:p>
+            <a:endParaRPr lang="pl-PL" dirty="0"/>
+          </a:p>
+        </p:txBody>
+      </p:sp>
+      <p:pic>
+        <p:nvPicPr>
+          <p:cNvPr id="4" name="Obraz 4">
             <a:extLst>
               <a:ext uri="{FF2B5EF4-FFF2-40B4-BE49-F238E27FC236}">
-                <a16:creationId xmlns:a16="http://schemas.microsoft.com/office/drawing/2014/main" id="{EA86AB15-EF01-471B-A4CE-445339B1B72A}"/>
-              </a:ext>
-            </a:extLst>
-          </p:cNvPr>
-          <p:cNvSpPr/>
-          <p:nvPr/>
-        </p:nvSpPr>
-        <p:spPr>
-          <a:xfrm>
-            <a:off x="1159252" y="2965201"/>
-            <a:ext cx="1776549" cy="862149"/>
-          </a:xfrm>
-          <a:prstGeom prst="roundRect">
-            <a:avLst/>
-          </a:prstGeom>
-        </p:spPr>
-        <p:style>
-          <a:lnRef idx="2">
-            <a:schemeClr val="accent1">
-              <a:shade val="50000"/>
-            </a:schemeClr>
-          </a:lnRef>
-          <a:fillRef idx="1">
-            <a:schemeClr val="accent1"/>
-          </a:fillRef>
-          <a:effectRef idx="0">
-            <a:schemeClr val="accent1"/>
-          </a:effectRef>
-          <a:fontRef idx="minor">
-            <a:schemeClr val="lt1"/>
-          </a:fontRef>
-        </p:style>
-        <p:txBody>
-          <a:bodyPr rtlCol="0" anchor="ctr"/>
-          <a:lstStyle/>
-          <a:p>
-            <a:pPr algn="ctr"/>
-            <a:r>
-              <a:rPr lang="pl-PL" dirty="0"/>
-              <a:t>Aplikacja </a:t>
-            </a:r>
-            <a:r>
-              <a:rPr lang="pl-PL" dirty="0" err="1"/>
-              <a:t>ASP.Net</a:t>
-            </a:r>
-            <a:r>
-              <a:rPr lang="pl-PL" dirty="0"/>
-              <a:t> </a:t>
-            </a:r>
-            <a:r>
-              <a:rPr lang="pl-PL" dirty="0" err="1"/>
-              <a:t>Core</a:t>
-            </a:r>
-            <a:endParaRPr lang="pl-PL" dirty="0"/>
-          </a:p>
-        </p:txBody>
-      </p:sp>
-      <p:sp>
-        <p:nvSpPr>
-          <p:cNvPr id="19" name="Prostokąt: zaokrąglone rogi 18">
-            <a:extLst>
-              <a:ext uri="{FF2B5EF4-FFF2-40B4-BE49-F238E27FC236}">
-                <a16:creationId xmlns:a16="http://schemas.microsoft.com/office/drawing/2014/main" id="{2246912C-58E9-4B5F-B2A1-6CC9918CA29A}"/>
-              </a:ext>
-            </a:extLst>
-          </p:cNvPr>
-          <p:cNvSpPr/>
-          <p:nvPr/>
-        </p:nvSpPr>
-        <p:spPr>
-          <a:xfrm>
-            <a:off x="992778" y="4737397"/>
-            <a:ext cx="2117195" cy="862149"/>
-          </a:xfrm>
-          <a:prstGeom prst="roundRect">
-            <a:avLst/>
-          </a:prstGeom>
-        </p:spPr>
-        <p:style>
-          <a:lnRef idx="2">
-            <a:schemeClr val="accent1">
-              <a:shade val="50000"/>
-            </a:schemeClr>
-          </a:lnRef>
-          <a:fillRef idx="1">
-            <a:schemeClr val="accent1"/>
-          </a:fillRef>
-          <a:effectRef idx="0">
-            <a:schemeClr val="accent1"/>
-          </a:effectRef>
-          <a:fontRef idx="minor">
-            <a:schemeClr val="lt1"/>
-          </a:fontRef>
-        </p:style>
-        <p:txBody>
-          <a:bodyPr rtlCol="0" anchor="ctr"/>
-          <a:lstStyle/>
-          <a:p>
-            <a:pPr algn="ctr"/>
-            <a:r>
-              <a:rPr lang="pl-PL" dirty="0" err="1"/>
-              <a:t>EmailOptions</a:t>
-            </a:r>
-            <a:r>
-              <a:rPr lang="pl-PL" dirty="0"/>
-              <a:t> i </a:t>
-            </a:r>
-            <a:r>
-              <a:rPr lang="pl-PL" dirty="0" err="1"/>
-              <a:t>SendGridClient</a:t>
-            </a:r>
-            <a:endParaRPr lang="pl-PL" dirty="0"/>
-          </a:p>
-        </p:txBody>
-      </p:sp>
-      <p:sp>
-        <p:nvSpPr>
-          <p:cNvPr id="20" name="Prostokąt: zaokrąglone rogi 19">
-            <a:extLst>
-              <a:ext uri="{FF2B5EF4-FFF2-40B4-BE49-F238E27FC236}">
-                <a16:creationId xmlns:a16="http://schemas.microsoft.com/office/drawing/2014/main" id="{BBDCCE45-A743-4D23-B85E-E79E9AEC9BA3}"/>
-              </a:ext>
-            </a:extLst>
-          </p:cNvPr>
-          <p:cNvSpPr/>
-          <p:nvPr/>
-        </p:nvSpPr>
-        <p:spPr>
-          <a:xfrm>
-            <a:off x="4573011" y="4737397"/>
-            <a:ext cx="1776549" cy="862149"/>
-          </a:xfrm>
-          <a:prstGeom prst="roundRect">
-            <a:avLst/>
-          </a:prstGeom>
-        </p:spPr>
-        <p:style>
-          <a:lnRef idx="2">
-            <a:schemeClr val="accent1">
-              <a:shade val="50000"/>
-            </a:schemeClr>
-          </a:lnRef>
-          <a:fillRef idx="1">
-            <a:schemeClr val="accent1"/>
-          </a:fillRef>
-          <a:effectRef idx="0">
-            <a:schemeClr val="accent1"/>
-          </a:effectRef>
-          <a:fontRef idx="minor">
-            <a:schemeClr val="lt1"/>
-          </a:fontRef>
-        </p:style>
-        <p:txBody>
-          <a:bodyPr rtlCol="0" anchor="ctr"/>
-          <a:lstStyle/>
-          <a:p>
-            <a:pPr algn="ctr"/>
-            <a:r>
-              <a:rPr lang="pl-PL" dirty="0" err="1"/>
-              <a:t>Sendgrid</a:t>
-            </a:r>
-            <a:r>
-              <a:rPr lang="pl-PL" dirty="0"/>
-              <a:t> API</a:t>
-            </a:r>
-          </a:p>
-        </p:txBody>
-      </p:sp>
-      <p:sp>
-        <p:nvSpPr>
-          <p:cNvPr id="21" name="Strzałka: w prawo 20">
-            <a:extLst>
-              <a:ext uri="{FF2B5EF4-FFF2-40B4-BE49-F238E27FC236}">
-                <a16:creationId xmlns:a16="http://schemas.microsoft.com/office/drawing/2014/main" id="{2FD987A4-2A1C-4D8F-81B4-5461D7BB13D6}"/>
-              </a:ext>
-            </a:extLst>
-          </p:cNvPr>
-          <p:cNvSpPr/>
-          <p:nvPr/>
-        </p:nvSpPr>
-        <p:spPr>
-          <a:xfrm rot="5400000">
-            <a:off x="1706839" y="4167176"/>
-            <a:ext cx="681372" cy="324075"/>
-          </a:xfrm>
-          <a:prstGeom prst="rightArrow">
-            <a:avLst/>
-          </a:prstGeom>
-        </p:spPr>
-        <p:style>
-          <a:lnRef idx="2">
-            <a:schemeClr val="accent1">
-              <a:shade val="50000"/>
-            </a:schemeClr>
-          </a:lnRef>
-          <a:fillRef idx="1">
-            <a:schemeClr val="accent1"/>
-          </a:fillRef>
-          <a:effectRef idx="0">
-            <a:schemeClr val="accent1"/>
-          </a:effectRef>
-          <a:fontRef idx="minor">
-            <a:schemeClr val="lt1"/>
-          </a:fontRef>
-        </p:style>
-        <p:txBody>
-          <a:bodyPr rtlCol="0" anchor="ctr"/>
-          <a:lstStyle/>
-          <a:p>
-            <a:pPr algn="ctr"/>
-            <a:endParaRPr lang="pl-PL"/>
-          </a:p>
-        </p:txBody>
-      </p:sp>
-      <p:sp>
-        <p:nvSpPr>
-          <p:cNvPr id="22" name="pole tekstowe 21">
-            <a:extLst>
-              <a:ext uri="{FF2B5EF4-FFF2-40B4-BE49-F238E27FC236}">
-                <a16:creationId xmlns:a16="http://schemas.microsoft.com/office/drawing/2014/main" id="{D8313037-F6A8-4AA0-9C67-F14B8C019E94}"/>
-              </a:ext>
-            </a:extLst>
-          </p:cNvPr>
-          <p:cNvSpPr txBox="1"/>
-          <p:nvPr/>
-        </p:nvSpPr>
-        <p:spPr>
-          <a:xfrm>
-            <a:off x="2138966" y="4035313"/>
-            <a:ext cx="1098378" cy="369332"/>
-          </a:xfrm>
-          <a:prstGeom prst="rect">
-            <a:avLst/>
-          </a:prstGeom>
-          <a:noFill/>
-        </p:spPr>
-        <p:txBody>
-          <a:bodyPr wrap="none" rtlCol="0">
-            <a:spAutoFit/>
-          </a:bodyPr>
-          <a:lstStyle/>
-          <a:p>
-            <a:r>
-              <a:rPr lang="pl-PL" dirty="0"/>
-              <a:t>korzysta</a:t>
-            </a:r>
-          </a:p>
-        </p:txBody>
-      </p:sp>
-      <p:sp>
-        <p:nvSpPr>
-          <p:cNvPr id="23" name="Strzałka: w prawo 22">
-            <a:extLst>
-              <a:ext uri="{FF2B5EF4-FFF2-40B4-BE49-F238E27FC236}">
-                <a16:creationId xmlns:a16="http://schemas.microsoft.com/office/drawing/2014/main" id="{35893DB5-D33E-411D-8DEC-3300C1D3939B}"/>
-              </a:ext>
-            </a:extLst>
-          </p:cNvPr>
-          <p:cNvSpPr/>
-          <p:nvPr/>
-        </p:nvSpPr>
-        <p:spPr>
-          <a:xfrm>
-            <a:off x="3262372" y="4737397"/>
-            <a:ext cx="1158240" cy="324075"/>
-          </a:xfrm>
-          <a:prstGeom prst="rightArrow">
-            <a:avLst/>
-          </a:prstGeom>
-        </p:spPr>
-        <p:style>
-          <a:lnRef idx="2">
-            <a:schemeClr val="accent1">
-              <a:shade val="50000"/>
-            </a:schemeClr>
-          </a:lnRef>
-          <a:fillRef idx="1">
-            <a:schemeClr val="accent1"/>
-          </a:fillRef>
-          <a:effectRef idx="0">
-            <a:schemeClr val="accent1"/>
-          </a:effectRef>
-          <a:fontRef idx="minor">
-            <a:schemeClr val="lt1"/>
-          </a:fontRef>
-        </p:style>
-        <p:txBody>
-          <a:bodyPr rtlCol="0" anchor="ctr"/>
-          <a:lstStyle/>
-          <a:p>
-            <a:pPr algn="ctr"/>
-            <a:endParaRPr lang="pl-PL"/>
-          </a:p>
-        </p:txBody>
-      </p:sp>
-      <p:sp>
-        <p:nvSpPr>
-          <p:cNvPr id="24" name="pole tekstowe 23">
-            <a:extLst>
-              <a:ext uri="{FF2B5EF4-FFF2-40B4-BE49-F238E27FC236}">
-                <a16:creationId xmlns:a16="http://schemas.microsoft.com/office/drawing/2014/main" id="{339606C3-A802-4E75-8122-C981DB4F320A}"/>
-              </a:ext>
-            </a:extLst>
-          </p:cNvPr>
-          <p:cNvSpPr txBox="1"/>
-          <p:nvPr/>
-        </p:nvSpPr>
-        <p:spPr>
-          <a:xfrm>
-            <a:off x="3191546" y="4435077"/>
-            <a:ext cx="1180131" cy="369332"/>
-          </a:xfrm>
-          <a:prstGeom prst="rect">
-            <a:avLst/>
-          </a:prstGeom>
-          <a:noFill/>
-        </p:spPr>
-        <p:txBody>
-          <a:bodyPr wrap="none" rtlCol="0">
-            <a:spAutoFit/>
-          </a:bodyPr>
-          <a:lstStyle/>
-          <a:p>
-            <a:r>
-              <a:rPr lang="pl-PL" dirty="0"/>
-              <a:t>wywołuje</a:t>
-            </a:r>
-          </a:p>
-        </p:txBody>
-      </p:sp>
-      <p:sp>
-        <p:nvSpPr>
-          <p:cNvPr id="25" name="Strzałka: w prawo 24">
-            <a:extLst>
-              <a:ext uri="{FF2B5EF4-FFF2-40B4-BE49-F238E27FC236}">
-                <a16:creationId xmlns:a16="http://schemas.microsoft.com/office/drawing/2014/main" id="{69227147-1B23-4C79-AB39-AADABF45E6BF}"/>
-              </a:ext>
-            </a:extLst>
-          </p:cNvPr>
-          <p:cNvSpPr/>
-          <p:nvPr/>
-        </p:nvSpPr>
-        <p:spPr>
-          <a:xfrm rot="10800000">
-            <a:off x="3202492" y="5275471"/>
-            <a:ext cx="1158240" cy="324075"/>
-          </a:xfrm>
-          <a:prstGeom prst="rightArrow">
-            <a:avLst/>
-          </a:prstGeom>
-        </p:spPr>
-        <p:style>
-          <a:lnRef idx="2">
-            <a:schemeClr val="accent1">
-              <a:shade val="50000"/>
-            </a:schemeClr>
-          </a:lnRef>
-          <a:fillRef idx="1">
-            <a:schemeClr val="accent1"/>
-          </a:fillRef>
-          <a:effectRef idx="0">
-            <a:schemeClr val="accent1"/>
-          </a:effectRef>
-          <a:fontRef idx="minor">
-            <a:schemeClr val="lt1"/>
-          </a:fontRef>
-        </p:style>
-        <p:txBody>
-          <a:bodyPr rtlCol="0" anchor="ctr"/>
-          <a:lstStyle/>
-          <a:p>
-            <a:pPr algn="ctr"/>
-            <a:endParaRPr lang="pl-PL"/>
-          </a:p>
-        </p:txBody>
-      </p:sp>
-      <p:sp>
-        <p:nvSpPr>
-          <p:cNvPr id="26" name="pole tekstowe 25">
-            <a:extLst>
-              <a:ext uri="{FF2B5EF4-FFF2-40B4-BE49-F238E27FC236}">
-                <a16:creationId xmlns:a16="http://schemas.microsoft.com/office/drawing/2014/main" id="{AC9D4ED4-CC2D-41A0-AE13-D31D53B6C26E}"/>
-              </a:ext>
-            </a:extLst>
-          </p:cNvPr>
-          <p:cNvSpPr txBox="1"/>
-          <p:nvPr/>
-        </p:nvSpPr>
-        <p:spPr>
-          <a:xfrm>
-            <a:off x="3191546" y="5532534"/>
-            <a:ext cx="1322798" cy="369332"/>
-          </a:xfrm>
-          <a:prstGeom prst="rect">
-            <a:avLst/>
-          </a:prstGeom>
-          <a:noFill/>
-        </p:spPr>
-        <p:txBody>
-          <a:bodyPr wrap="none" rtlCol="0">
-            <a:spAutoFit/>
-          </a:bodyPr>
-          <a:lstStyle/>
-          <a:p>
-            <a:r>
-              <a:rPr lang="pl-PL" dirty="0"/>
-              <a:t>odpowiada</a:t>
-            </a:r>
-          </a:p>
-        </p:txBody>
-      </p:sp>
-      <p:pic>
-        <p:nvPicPr>
-          <p:cNvPr id="27" name="Obraz 26">
-            <a:extLst>
-              <a:ext uri="{FF2B5EF4-FFF2-40B4-BE49-F238E27FC236}">
-                <a16:creationId xmlns:a16="http://schemas.microsoft.com/office/drawing/2014/main" id="{374D52F0-9196-44C9-B821-78242C54DC2A}"/>
+                <a16:creationId xmlns:a16="http://schemas.microsoft.com/office/drawing/2014/main" id="{4782A249-DCEB-406B-8B94-60F25E6C25D7}"/>
               </a:ext>
             </a:extLst>
           </p:cNvPr>
@@ -4610,8 +3808,38 @@
         </p:blipFill>
         <p:spPr>
           <a:xfrm>
-            <a:off x="6246270" y="2069138"/>
-            <a:ext cx="3929805" cy="2335507"/>
+            <a:off x="1390716" y="2394857"/>
+            <a:ext cx="3575826" cy="3635829"/>
+          </a:xfrm>
+          <a:prstGeom prst="rect">
+            <a:avLst/>
+          </a:prstGeom>
+        </p:spPr>
+      </p:pic>
+      <p:pic>
+        <p:nvPicPr>
+          <p:cNvPr id="5" name="Obraz 5" descr="Obraz zawierający stół&#10;&#10;Opis wygenerowany automatycznie">
+            <a:extLst>
+              <a:ext uri="{FF2B5EF4-FFF2-40B4-BE49-F238E27FC236}">
+                <a16:creationId xmlns:a16="http://schemas.microsoft.com/office/drawing/2014/main" id="{4FE5F266-E2C3-4CA1-8EEB-250776E6772F}"/>
+              </a:ext>
+            </a:extLst>
+          </p:cNvPr>
+          <p:cNvPicPr>
+            <a:picLocks noChangeAspect="1"/>
+          </p:cNvPicPr>
+          <p:nvPr/>
+        </p:nvPicPr>
+        <p:blipFill>
+          <a:blip r:embed="rId3"/>
+          <a:stretch>
+            <a:fillRect/>
+          </a:stretch>
+        </p:blipFill>
+        <p:spPr>
+          <a:xfrm>
+            <a:off x="6528707" y="2287360"/>
+            <a:ext cx="3565071" cy="3676650"/>
           </a:xfrm>
           <a:prstGeom prst="rect">
             <a:avLst/>
@@ -4621,7 +3849,7 @@
     </p:spTree>
     <p:extLst>
       <p:ext uri="{BB962C8B-B14F-4D97-AF65-F5344CB8AC3E}">
-        <p14:creationId xmlns:p14="http://schemas.microsoft.com/office/powerpoint/2010/main" val="1061040325"/>
+        <p14:creationId xmlns:p14="http://schemas.microsoft.com/office/powerpoint/2010/main" val="419028080"/>
       </p:ext>
     </p:extLst>
   </p:cSld>
@@ -4701,35 +3929,48 @@
           <a:p>
             <a:r>
               <a:rPr lang="pl-PL"/>
-              <a:t>Razor Pages </a:t>
-            </a:r>
+              <a:t>Partial views - przykład TableButtonPartial </a:t>
+            </a:r>
+          </a:p>
+          <a:p>
             <a:endParaRPr lang="pl-PL" dirty="0"/>
           </a:p>
-          <a:p>
-            <a:r>
-              <a:rPr lang="pl-PL"/>
-              <a:t>Bootstrap</a:t>
-            </a:r>
-            <a:endParaRPr lang="pl-PL" dirty="0"/>
-          </a:p>
-          <a:p>
-            <a:pPr marL="0" indent="0">
-              <a:buNone/>
-            </a:pPr>
-            <a:endParaRPr lang="pl-PL" dirty="0"/>
-          </a:p>
-          <a:p>
-            <a:endParaRPr lang="pl-PL" dirty="0"/>
-          </a:p>
-          <a:p>
-            <a:endParaRPr lang="pl-PL" dirty="0"/>
-          </a:p>
-        </p:txBody>
-      </p:sp>
+        </p:txBody>
+      </p:sp>
+      <p:pic>
+        <p:nvPicPr>
+          <p:cNvPr id="5" name="Obraz 5" descr="Obraz zawierający tekst&#10;&#10;Opis wygenerowany automatycznie">
+            <a:extLst>
+              <a:ext uri="{FF2B5EF4-FFF2-40B4-BE49-F238E27FC236}">
+                <a16:creationId xmlns:a16="http://schemas.microsoft.com/office/drawing/2014/main" id="{566C36B5-CDA8-4FB3-ACD9-E73BA69B628E}"/>
+              </a:ext>
+            </a:extLst>
+          </p:cNvPr>
+          <p:cNvPicPr>
+            <a:picLocks noChangeAspect="1"/>
+          </p:cNvPicPr>
+          <p:nvPr/>
+        </p:nvPicPr>
+        <p:blipFill>
+          <a:blip r:embed="rId2"/>
+          <a:stretch>
+            <a:fillRect/>
+          </a:stretch>
+        </p:blipFill>
+        <p:spPr>
+          <a:xfrm>
+            <a:off x="1382486" y="2342698"/>
+            <a:ext cx="4659085" cy="1867806"/>
+          </a:xfrm>
+          <a:prstGeom prst="rect">
+            <a:avLst/>
+          </a:prstGeom>
+        </p:spPr>
+      </p:pic>
     </p:spTree>
     <p:extLst>
       <p:ext uri="{BB962C8B-B14F-4D97-AF65-F5344CB8AC3E}">
-        <p14:creationId xmlns:p14="http://schemas.microsoft.com/office/powerpoint/2010/main" val="2830796625"/>
+        <p14:creationId xmlns:p14="http://schemas.microsoft.com/office/powerpoint/2010/main" val="2630863259"/>
       </p:ext>
     </p:extLst>
   </p:cSld>
@@ -4761,291 +4002,6 @@
           <p:cNvPr id="2" name="Tytuł 1">
             <a:extLst>
               <a:ext uri="{FF2B5EF4-FFF2-40B4-BE49-F238E27FC236}">
-                <a16:creationId xmlns:a16="http://schemas.microsoft.com/office/drawing/2014/main" id="{CE80579C-84DE-48BB-A341-1DEB50393F10}"/>
-              </a:ext>
-            </a:extLst>
-          </p:cNvPr>
-          <p:cNvSpPr>
-            <a:spLocks noGrp="1"/>
-          </p:cNvSpPr>
-          <p:nvPr>
-            <p:ph type="title"/>
-          </p:nvPr>
-        </p:nvSpPr>
-        <p:spPr/>
-        <p:txBody>
-          <a:bodyPr/>
-          <a:lstStyle/>
-          <a:p>
-            <a:r>
-              <a:rPr lang="pl-PL" dirty="0"/>
-              <a:t>Interfejs użytkownika</a:t>
-            </a:r>
-          </a:p>
-        </p:txBody>
-      </p:sp>
-      <p:sp>
-        <p:nvSpPr>
-          <p:cNvPr id="3" name="Symbol zastępczy zawartości 2">
-            <a:extLst>
-              <a:ext uri="{FF2B5EF4-FFF2-40B4-BE49-F238E27FC236}">
-                <a16:creationId xmlns:a16="http://schemas.microsoft.com/office/drawing/2014/main" id="{9EB40BD8-B84F-4FCC-BC21-BC1F26B66D11}"/>
-              </a:ext>
-            </a:extLst>
-          </p:cNvPr>
-          <p:cNvSpPr>
-            <a:spLocks noGrp="1"/>
-          </p:cNvSpPr>
-          <p:nvPr>
-            <p:ph idx="1"/>
-          </p:nvPr>
-        </p:nvSpPr>
-        <p:spPr/>
-        <p:txBody>
-          <a:bodyPr vert="horz" lIns="91440" tIns="45720" rIns="91440" bIns="45720" rtlCol="0" anchor="t">
-            <a:normAutofit/>
-          </a:bodyPr>
-          <a:lstStyle/>
-          <a:p>
-            <a:r>
-              <a:rPr lang="pl-PL"/>
-              <a:t>Struktura Areas oraz Shared</a:t>
-            </a:r>
-            <a:endParaRPr lang="pl-PL" dirty="0"/>
-          </a:p>
-          <a:p>
-            <a:endParaRPr lang="pl-PL" dirty="0"/>
-          </a:p>
-          <a:p>
-            <a:pPr marL="0" indent="0">
-              <a:buNone/>
-            </a:pPr>
-            <a:endParaRPr lang="pl-PL" dirty="0"/>
-          </a:p>
-          <a:p>
-            <a:endParaRPr lang="pl-PL" dirty="0"/>
-          </a:p>
-          <a:p>
-            <a:endParaRPr lang="pl-PL" dirty="0"/>
-          </a:p>
-        </p:txBody>
-      </p:sp>
-      <p:pic>
-        <p:nvPicPr>
-          <p:cNvPr id="4" name="Obraz 4">
-            <a:extLst>
-              <a:ext uri="{FF2B5EF4-FFF2-40B4-BE49-F238E27FC236}">
-                <a16:creationId xmlns:a16="http://schemas.microsoft.com/office/drawing/2014/main" id="{4782A249-DCEB-406B-8B94-60F25E6C25D7}"/>
-              </a:ext>
-            </a:extLst>
-          </p:cNvPr>
-          <p:cNvPicPr>
-            <a:picLocks noChangeAspect="1"/>
-          </p:cNvPicPr>
-          <p:nvPr/>
-        </p:nvPicPr>
-        <p:blipFill>
-          <a:blip r:embed="rId2"/>
-          <a:stretch>
-            <a:fillRect/>
-          </a:stretch>
-        </p:blipFill>
-        <p:spPr>
-          <a:xfrm>
-            <a:off x="1390716" y="2394857"/>
-            <a:ext cx="3575826" cy="3635829"/>
-          </a:xfrm>
-          <a:prstGeom prst="rect">
-            <a:avLst/>
-          </a:prstGeom>
-        </p:spPr>
-      </p:pic>
-      <p:pic>
-        <p:nvPicPr>
-          <p:cNvPr id="5" name="Obraz 5" descr="Obraz zawierający stół&#10;&#10;Opis wygenerowany automatycznie">
-            <a:extLst>
-              <a:ext uri="{FF2B5EF4-FFF2-40B4-BE49-F238E27FC236}">
-                <a16:creationId xmlns:a16="http://schemas.microsoft.com/office/drawing/2014/main" id="{4FE5F266-E2C3-4CA1-8EEB-250776E6772F}"/>
-              </a:ext>
-            </a:extLst>
-          </p:cNvPr>
-          <p:cNvPicPr>
-            <a:picLocks noChangeAspect="1"/>
-          </p:cNvPicPr>
-          <p:nvPr/>
-        </p:nvPicPr>
-        <p:blipFill>
-          <a:blip r:embed="rId3"/>
-          <a:stretch>
-            <a:fillRect/>
-          </a:stretch>
-        </p:blipFill>
-        <p:spPr>
-          <a:xfrm>
-            <a:off x="6528707" y="2287360"/>
-            <a:ext cx="3565071" cy="3676650"/>
-          </a:xfrm>
-          <a:prstGeom prst="rect">
-            <a:avLst/>
-          </a:prstGeom>
-        </p:spPr>
-      </p:pic>
-    </p:spTree>
-    <p:extLst>
-      <p:ext uri="{BB962C8B-B14F-4D97-AF65-F5344CB8AC3E}">
-        <p14:creationId xmlns:p14="http://schemas.microsoft.com/office/powerpoint/2010/main" val="419028080"/>
-      </p:ext>
-    </p:extLst>
-  </p:cSld>
-  <p:clrMapOvr>
-    <a:masterClrMapping/>
-  </p:clrMapOvr>
-</p:sld>
-</file>
-
-<file path=ppt/slides/slide14.xml><?xml version="1.0" encoding="utf-8"?>
-<p:sld xmlns:a="http://schemas.openxmlformats.org/drawingml/2006/main" xmlns:r="http://schemas.openxmlformats.org/officeDocument/2006/relationships" xmlns:p="http://schemas.openxmlformats.org/presentationml/2006/main">
-  <p:cSld>
-    <p:spTree>
-      <p:nvGrpSpPr>
-        <p:cNvPr id="1" name=""/>
-        <p:cNvGrpSpPr/>
-        <p:nvPr/>
-      </p:nvGrpSpPr>
-      <p:grpSpPr>
-        <a:xfrm>
-          <a:off x="0" y="0"/>
-          <a:ext cx="0" cy="0"/>
-          <a:chOff x="0" y="0"/>
-          <a:chExt cx="0" cy="0"/>
-        </a:xfrm>
-      </p:grpSpPr>
-      <p:sp>
-        <p:nvSpPr>
-          <p:cNvPr id="2" name="Tytuł 1">
-            <a:extLst>
-              <a:ext uri="{FF2B5EF4-FFF2-40B4-BE49-F238E27FC236}">
-                <a16:creationId xmlns:a16="http://schemas.microsoft.com/office/drawing/2014/main" id="{CE80579C-84DE-48BB-A341-1DEB50393F10}"/>
-              </a:ext>
-            </a:extLst>
-          </p:cNvPr>
-          <p:cNvSpPr>
-            <a:spLocks noGrp="1"/>
-          </p:cNvSpPr>
-          <p:nvPr>
-            <p:ph type="title"/>
-          </p:nvPr>
-        </p:nvSpPr>
-        <p:spPr/>
-        <p:txBody>
-          <a:bodyPr/>
-          <a:lstStyle/>
-          <a:p>
-            <a:r>
-              <a:rPr lang="pl-PL" dirty="0"/>
-              <a:t>Interfejs użytkownika</a:t>
-            </a:r>
-          </a:p>
-        </p:txBody>
-      </p:sp>
-      <p:sp>
-        <p:nvSpPr>
-          <p:cNvPr id="3" name="Symbol zastępczy zawartości 2">
-            <a:extLst>
-              <a:ext uri="{FF2B5EF4-FFF2-40B4-BE49-F238E27FC236}">
-                <a16:creationId xmlns:a16="http://schemas.microsoft.com/office/drawing/2014/main" id="{9EB40BD8-B84F-4FCC-BC21-BC1F26B66D11}"/>
-              </a:ext>
-            </a:extLst>
-          </p:cNvPr>
-          <p:cNvSpPr>
-            <a:spLocks noGrp="1"/>
-          </p:cNvSpPr>
-          <p:nvPr>
-            <p:ph idx="1"/>
-          </p:nvPr>
-        </p:nvSpPr>
-        <p:spPr/>
-        <p:txBody>
-          <a:bodyPr vert="horz" lIns="91440" tIns="45720" rIns="91440" bIns="45720" rtlCol="0" anchor="t">
-            <a:normAutofit/>
-          </a:bodyPr>
-          <a:lstStyle/>
-          <a:p>
-            <a:r>
-              <a:rPr lang="pl-PL"/>
-              <a:t>Partial views - przykład TableButtonPartial </a:t>
-            </a:r>
-          </a:p>
-          <a:p>
-            <a:endParaRPr lang="pl-PL" dirty="0"/>
-          </a:p>
-        </p:txBody>
-      </p:sp>
-      <p:pic>
-        <p:nvPicPr>
-          <p:cNvPr id="5" name="Obraz 5" descr="Obraz zawierający tekst&#10;&#10;Opis wygenerowany automatycznie">
-            <a:extLst>
-              <a:ext uri="{FF2B5EF4-FFF2-40B4-BE49-F238E27FC236}">
-                <a16:creationId xmlns:a16="http://schemas.microsoft.com/office/drawing/2014/main" id="{566C36B5-CDA8-4FB3-ACD9-E73BA69B628E}"/>
-              </a:ext>
-            </a:extLst>
-          </p:cNvPr>
-          <p:cNvPicPr>
-            <a:picLocks noChangeAspect="1"/>
-          </p:cNvPicPr>
-          <p:nvPr/>
-        </p:nvPicPr>
-        <p:blipFill>
-          <a:blip r:embed="rId2"/>
-          <a:stretch>
-            <a:fillRect/>
-          </a:stretch>
-        </p:blipFill>
-        <p:spPr>
-          <a:xfrm>
-            <a:off x="1382486" y="2342698"/>
-            <a:ext cx="4659085" cy="1867806"/>
-          </a:xfrm>
-          <a:prstGeom prst="rect">
-            <a:avLst/>
-          </a:prstGeom>
-        </p:spPr>
-      </p:pic>
-    </p:spTree>
-    <p:extLst>
-      <p:ext uri="{BB962C8B-B14F-4D97-AF65-F5344CB8AC3E}">
-        <p14:creationId xmlns:p14="http://schemas.microsoft.com/office/powerpoint/2010/main" val="2630863259"/>
-      </p:ext>
-    </p:extLst>
-  </p:cSld>
-  <p:clrMapOvr>
-    <a:masterClrMapping/>
-  </p:clrMapOvr>
-</p:sld>
-</file>
-
-<file path=ppt/slides/slide15.xml><?xml version="1.0" encoding="utf-8"?>
-<p:sld xmlns:a="http://schemas.openxmlformats.org/drawingml/2006/main" xmlns:r="http://schemas.openxmlformats.org/officeDocument/2006/relationships" xmlns:p="http://schemas.openxmlformats.org/presentationml/2006/main">
-  <p:cSld>
-    <p:spTree>
-      <p:nvGrpSpPr>
-        <p:cNvPr id="1" name=""/>
-        <p:cNvGrpSpPr/>
-        <p:nvPr/>
-      </p:nvGrpSpPr>
-      <p:grpSpPr>
-        <a:xfrm>
-          <a:off x="0" y="0"/>
-          <a:ext cx="0" cy="0"/>
-          <a:chOff x="0" y="0"/>
-          <a:chExt cx="0" cy="0"/>
-        </a:xfrm>
-      </p:grpSpPr>
-      <p:sp>
-        <p:nvSpPr>
-          <p:cNvPr id="2" name="Tytuł 1">
-            <a:extLst>
-              <a:ext uri="{FF2B5EF4-FFF2-40B4-BE49-F238E27FC236}">
                 <a16:creationId xmlns:a16="http://schemas.microsoft.com/office/drawing/2014/main" id="{2854C2B8-898B-451F-850B-1B4366F27292}"/>
               </a:ext>
             </a:extLst>
@@ -5165,7 +4121,7 @@
 </p:sld>
 </file>
 
-<file path=ppt/slides/slide16.xml><?xml version="1.0" encoding="utf-8"?>
+<file path=ppt/slides/slide14.xml><?xml version="1.0" encoding="utf-8"?>
 <p:sld xmlns:a="http://schemas.openxmlformats.org/drawingml/2006/main" xmlns:r="http://schemas.openxmlformats.org/officeDocument/2006/relationships" xmlns:p="http://schemas.openxmlformats.org/presentationml/2006/main">
   <p:cSld>
     <p:spTree>
@@ -5528,7 +4484,7 @@
           <p:cNvPr id="2" name="Tytuł 1">
             <a:extLst>
               <a:ext uri="{FF2B5EF4-FFF2-40B4-BE49-F238E27FC236}">
-                <a16:creationId xmlns:a16="http://schemas.microsoft.com/office/drawing/2014/main" id="{842CC3E0-D777-485F-8973-6962CFAF4899}"/>
+                <a16:creationId xmlns:a16="http://schemas.microsoft.com/office/drawing/2014/main" id="{F995F813-BE46-4B51-964A-C892A479182A}"/>
               </a:ext>
             </a:extLst>
           </p:cNvPr>
@@ -5539,59 +4495,71 @@
             <p:ph type="title"/>
           </p:nvPr>
         </p:nvSpPr>
-        <p:spPr>
-          <a:xfrm>
-            <a:off x="782901" y="-287383"/>
-            <a:ext cx="9692640" cy="1325562"/>
-          </a:xfrm>
-        </p:spPr>
+        <p:spPr/>
         <p:txBody>
           <a:bodyPr/>
           <a:lstStyle/>
           <a:p>
             <a:r>
               <a:rPr lang="pl-PL" dirty="0"/>
-              <a:t>Implementacja</a:t>
+              <a:t>Wzorzec MVC</a:t>
             </a:r>
           </a:p>
         </p:txBody>
       </p:sp>
       <p:pic>
         <p:nvPicPr>
-          <p:cNvPr id="7" name="Symbol zastępczy zawartości 3">
+          <p:cNvPr id="1028" name="Picture 4" descr="ASP: Aplikacje wielowarstwowe i wzorzec MVC">
             <a:extLst>
               <a:ext uri="{FF2B5EF4-FFF2-40B4-BE49-F238E27FC236}">
-                <a16:creationId xmlns:a16="http://schemas.microsoft.com/office/drawing/2014/main" id="{BED85369-52AF-4FA4-99B3-210BAC5F0477}"/>
+                <a16:creationId xmlns:a16="http://schemas.microsoft.com/office/drawing/2014/main" id="{9FD22477-4C9B-4FB9-AD84-0F7EEA0D53CF}"/>
               </a:ext>
             </a:extLst>
           </p:cNvPr>
           <p:cNvPicPr>
-            <a:picLocks noGrp="1"/>
+            <a:picLocks noGrp="1" noChangeAspect="1" noChangeArrowheads="1"/>
           </p:cNvPicPr>
           <p:nvPr>
             <p:ph idx="1"/>
           </p:nvPr>
         </p:nvPicPr>
         <p:blipFill>
-          <a:blip r:embed="rId2"/>
+          <a:blip r:embed="rId2">
+            <a:extLst>
+              <a:ext uri="{28A0092B-C50C-407E-A947-70E740481C1C}">
+                <a14:useLocalDpi xmlns:a14="http://schemas.microsoft.com/office/drawing/2010/main" val="0"/>
+              </a:ext>
+            </a:extLst>
+          </a:blip>
+          <a:srcRect/>
           <a:stretch>
             <a:fillRect/>
           </a:stretch>
         </p:blipFill>
-        <p:spPr>
+        <p:spPr bwMode="auto">
           <a:xfrm>
-            <a:off x="-179397" y="1203642"/>
-            <a:ext cx="11474413" cy="5715318"/>
+            <a:off x="3340100" y="2561431"/>
+            <a:ext cx="4438650" cy="2886075"/>
           </a:xfrm>
           <a:prstGeom prst="rect">
             <a:avLst/>
           </a:prstGeom>
+          <a:noFill/>
+          <a:extLst>
+            <a:ext uri="{909E8E84-426E-40DD-AFC4-6F175D3DCCD1}">
+              <a14:hiddenFill xmlns:a14="http://schemas.microsoft.com/office/drawing/2010/main">
+                <a:solidFill>
+                  <a:srgbClr val="FFFFFF"/>
+                </a:solidFill>
+              </a14:hiddenFill>
+            </a:ext>
+          </a:extLst>
         </p:spPr>
       </p:pic>
     </p:spTree>
     <p:extLst>
       <p:ext uri="{BB962C8B-B14F-4D97-AF65-F5344CB8AC3E}">
-        <p14:creationId xmlns:p14="http://schemas.microsoft.com/office/powerpoint/2010/main" val="1091382430"/>
+        <p14:creationId xmlns:p14="http://schemas.microsoft.com/office/powerpoint/2010/main" val="1496689100"/>
       </p:ext>
     </p:extLst>
   </p:cSld>
@@ -5623,7 +4591,7 @@
           <p:cNvPr id="2" name="Tytuł 1">
             <a:extLst>
               <a:ext uri="{FF2B5EF4-FFF2-40B4-BE49-F238E27FC236}">
-                <a16:creationId xmlns:a16="http://schemas.microsoft.com/office/drawing/2014/main" id="{F995F813-BE46-4B51-964A-C892A479182A}"/>
+                <a16:creationId xmlns:a16="http://schemas.microsoft.com/office/drawing/2014/main" id="{78CC289D-72CD-4F32-9E73-F0AFEE3DD1C2}"/>
               </a:ext>
             </a:extLst>
           </p:cNvPr>
@@ -5636,22 +4604,40 @@
         </p:nvSpPr>
         <p:spPr/>
         <p:txBody>
-          <a:bodyPr/>
+          <a:bodyPr>
+            <a:normAutofit/>
+          </a:bodyPr>
           <a:lstStyle/>
           <a:p>
             <a:r>
               <a:rPr lang="pl-PL" dirty="0"/>
-              <a:t>Wzorzec MVC</a:t>
+              <a:t>Wstrzykiwanie zależności (</a:t>
+            </a:r>
+            <a:r>
+              <a:rPr lang="pl-PL" dirty="0" err="1"/>
+              <a:t>Dependency</a:t>
+            </a:r>
+            <a:r>
+              <a:rPr lang="pl-PL" dirty="0"/>
+              <a:t> </a:t>
+            </a:r>
+            <a:r>
+              <a:rPr lang="pl-PL" dirty="0" err="1"/>
+              <a:t>injection</a:t>
+            </a:r>
+            <a:r>
+              <a:rPr lang="pl-PL" dirty="0"/>
+              <a:t>)</a:t>
             </a:r>
           </a:p>
         </p:txBody>
       </p:sp>
       <p:pic>
         <p:nvPicPr>
-          <p:cNvPr id="1028" name="Picture 4" descr="ASP: Aplikacje wielowarstwowe i wzorzec MVC">
+          <p:cNvPr id="1026" name="Picture 2" descr="Dependency Injection">
             <a:extLst>
               <a:ext uri="{FF2B5EF4-FFF2-40B4-BE49-F238E27FC236}">
-                <a16:creationId xmlns:a16="http://schemas.microsoft.com/office/drawing/2014/main" id="{9FD22477-4C9B-4FB9-AD84-0F7EEA0D53CF}"/>
+                <a16:creationId xmlns:a16="http://schemas.microsoft.com/office/drawing/2014/main" id="{4338835A-B58D-42FE-AFBF-66E6D6BDD9C3}"/>
               </a:ext>
             </a:extLst>
           </p:cNvPr>
@@ -5677,8 +4663,8 @@
         </p:blipFill>
         <p:spPr bwMode="auto">
           <a:xfrm>
-            <a:off x="3340100" y="2561431"/>
-            <a:ext cx="4438650" cy="2886075"/>
+            <a:off x="3802063" y="3061494"/>
+            <a:ext cx="3514725" cy="1885950"/>
           </a:xfrm>
           <a:prstGeom prst="rect">
             <a:avLst/>
@@ -5698,7 +4684,7 @@
     </p:spTree>
     <p:extLst>
       <p:ext uri="{BB962C8B-B14F-4D97-AF65-F5344CB8AC3E}">
-        <p14:creationId xmlns:p14="http://schemas.microsoft.com/office/powerpoint/2010/main" val="1496689100"/>
+        <p14:creationId xmlns:p14="http://schemas.microsoft.com/office/powerpoint/2010/main" val="1504997750"/>
       </p:ext>
     </p:extLst>
   </p:cSld>
@@ -5730,7 +4716,7 @@
           <p:cNvPr id="2" name="Tytuł 1">
             <a:extLst>
               <a:ext uri="{FF2B5EF4-FFF2-40B4-BE49-F238E27FC236}">
-                <a16:creationId xmlns:a16="http://schemas.microsoft.com/office/drawing/2014/main" id="{78CC289D-72CD-4F32-9E73-F0AFEE3DD1C2}"/>
+                <a16:creationId xmlns:a16="http://schemas.microsoft.com/office/drawing/2014/main" id="{B12FB97F-7AA6-44D8-AA4B-4728336C750B}"/>
               </a:ext>
             </a:extLst>
           </p:cNvPr>
@@ -5743,40 +4729,22 @@
         </p:nvSpPr>
         <p:spPr/>
         <p:txBody>
-          <a:bodyPr>
-            <a:normAutofit/>
-          </a:bodyPr>
+          <a:bodyPr/>
           <a:lstStyle/>
           <a:p>
             <a:r>
               <a:rPr lang="pl-PL" dirty="0"/>
-              <a:t>Wstrzykiwanie zależności (</a:t>
-            </a:r>
-            <a:r>
-              <a:rPr lang="pl-PL" dirty="0" err="1"/>
-              <a:t>Dependency</a:t>
-            </a:r>
-            <a:r>
-              <a:rPr lang="pl-PL" dirty="0"/>
-              <a:t> </a:t>
-            </a:r>
-            <a:r>
-              <a:rPr lang="pl-PL" dirty="0" err="1"/>
-              <a:t>injection</a:t>
-            </a:r>
-            <a:r>
-              <a:rPr lang="pl-PL" dirty="0"/>
-              <a:t>)</a:t>
+              <a:t>ASP.NET IDENTITY</a:t>
             </a:r>
           </a:p>
         </p:txBody>
       </p:sp>
       <p:pic>
         <p:nvPicPr>
-          <p:cNvPr id="1026" name="Picture 2" descr="Dependency Injection">
+          <p:cNvPr id="2050" name="Picture 2" descr="Niestandardowi dostawcy magazynu dla programu ASP.NET Core Identity |  Microsoft Docs">
             <a:extLst>
               <a:ext uri="{FF2B5EF4-FFF2-40B4-BE49-F238E27FC236}">
-                <a16:creationId xmlns:a16="http://schemas.microsoft.com/office/drawing/2014/main" id="{4338835A-B58D-42FE-AFBF-66E6D6BDD9C3}"/>
+                <a16:creationId xmlns:a16="http://schemas.microsoft.com/office/drawing/2014/main" id="{90798F18-0FA2-40E5-A890-AC02EC0E7001}"/>
               </a:ext>
             </a:extLst>
           </p:cNvPr>
@@ -5802,8 +4770,8 @@
         </p:blipFill>
         <p:spPr bwMode="auto">
           <a:xfrm>
-            <a:off x="3802063" y="3061494"/>
-            <a:ext cx="3514725" cy="1885950"/>
+            <a:off x="2662475" y="1828800"/>
+            <a:ext cx="5793901" cy="4351338"/>
           </a:xfrm>
           <a:prstGeom prst="rect">
             <a:avLst/>
@@ -5823,7 +4791,7 @@
     </p:spTree>
     <p:extLst>
       <p:ext uri="{BB962C8B-B14F-4D97-AF65-F5344CB8AC3E}">
-        <p14:creationId xmlns:p14="http://schemas.microsoft.com/office/powerpoint/2010/main" val="1504997750"/>
+        <p14:creationId xmlns:p14="http://schemas.microsoft.com/office/powerpoint/2010/main" val="4179623338"/>
       </p:ext>
     </p:extLst>
   </p:cSld>
@@ -5855,7 +4823,7 @@
           <p:cNvPr id="2" name="Tytuł 1">
             <a:extLst>
               <a:ext uri="{FF2B5EF4-FFF2-40B4-BE49-F238E27FC236}">
-                <a16:creationId xmlns:a16="http://schemas.microsoft.com/office/drawing/2014/main" id="{B12FB97F-7AA6-44D8-AA4B-4728336C750B}"/>
+                <a16:creationId xmlns:a16="http://schemas.microsoft.com/office/drawing/2014/main" id="{7D521247-F99E-4288-BA43-27EA423979D9}"/>
               </a:ext>
             </a:extLst>
           </p:cNvPr>
@@ -5872,65 +4840,693 @@
           <a:lstStyle/>
           <a:p>
             <a:r>
+              <a:rPr lang="pl-PL" dirty="0" err="1"/>
+              <a:t>Entity</a:t>
+            </a:r>
+            <a:r>
               <a:rPr lang="pl-PL" dirty="0"/>
-              <a:t>ASP.NET IDENTITY</a:t>
-            </a:r>
-          </a:p>
-        </p:txBody>
-      </p:sp>
-      <p:pic>
-        <p:nvPicPr>
-          <p:cNvPr id="2050" name="Picture 2" descr="Niestandardowi dostawcy magazynu dla programu ASP.NET Core Identity |  Microsoft Docs">
+              <a:t> Framework </a:t>
+            </a:r>
+            <a:r>
+              <a:rPr lang="pl-PL" dirty="0" err="1"/>
+              <a:t>Core</a:t>
+            </a:r>
+            <a:endParaRPr lang="pl-PL" dirty="0"/>
+          </a:p>
+        </p:txBody>
+      </p:sp>
+      <p:sp>
+        <p:nvSpPr>
+          <p:cNvPr id="4" name="Prostokąt: zaokrąglone rogi 3">
             <a:extLst>
               <a:ext uri="{FF2B5EF4-FFF2-40B4-BE49-F238E27FC236}">
-                <a16:creationId xmlns:a16="http://schemas.microsoft.com/office/drawing/2014/main" id="{90798F18-0FA2-40E5-A890-AC02EC0E7001}"/>
+                <a16:creationId xmlns:a16="http://schemas.microsoft.com/office/drawing/2014/main" id="{196FE014-16BF-40B2-B0F7-5B74DAEFB519}"/>
               </a:ext>
             </a:extLst>
           </p:cNvPr>
-          <p:cNvPicPr>
-            <a:picLocks noGrp="1" noChangeAspect="1" noChangeArrowheads="1"/>
-          </p:cNvPicPr>
-          <p:nvPr>
-            <p:ph idx="1"/>
-          </p:nvPr>
-        </p:nvPicPr>
-        <p:blipFill>
-          <a:blip r:embed="rId2">
+          <p:cNvSpPr/>
+          <p:nvPr/>
+        </p:nvSpPr>
+        <p:spPr>
+          <a:xfrm>
+            <a:off x="779418" y="2566851"/>
+            <a:ext cx="1776549" cy="862149"/>
+          </a:xfrm>
+          <a:prstGeom prst="roundRect">
+            <a:avLst/>
+          </a:prstGeom>
+        </p:spPr>
+        <p:style>
+          <a:lnRef idx="2">
+            <a:schemeClr val="accent1">
+              <a:shade val="50000"/>
+            </a:schemeClr>
+          </a:lnRef>
+          <a:fillRef idx="1">
+            <a:schemeClr val="accent1"/>
+          </a:fillRef>
+          <a:effectRef idx="0">
+            <a:schemeClr val="accent1"/>
+          </a:effectRef>
+          <a:fontRef idx="minor">
+            <a:schemeClr val="lt1"/>
+          </a:fontRef>
+        </p:style>
+        <p:txBody>
+          <a:bodyPr rtlCol="0" anchor="ctr"/>
+          <a:lstStyle/>
+          <a:p>
+            <a:pPr algn="ctr"/>
+            <a:r>
+              <a:rPr lang="pl-PL" dirty="0"/>
+              <a:t>Aplikacja </a:t>
+            </a:r>
+            <a:r>
+              <a:rPr lang="pl-PL" dirty="0" err="1"/>
+              <a:t>ASP.Net</a:t>
+            </a:r>
+            <a:r>
+              <a:rPr lang="pl-PL" dirty="0"/>
+              <a:t> </a:t>
+            </a:r>
+            <a:r>
+              <a:rPr lang="pl-PL" dirty="0" err="1"/>
+              <a:t>Core</a:t>
+            </a:r>
+            <a:endParaRPr lang="pl-PL" dirty="0"/>
+          </a:p>
+        </p:txBody>
+      </p:sp>
+      <p:sp>
+        <p:nvSpPr>
+          <p:cNvPr id="5" name="Prostokąt: zaokrąglone rogi 4">
             <a:extLst>
-              <a:ext uri="{28A0092B-C50C-407E-A947-70E740481C1C}">
-                <a14:useLocalDpi xmlns:a14="http://schemas.microsoft.com/office/drawing/2010/main" val="0"/>
+              <a:ext uri="{FF2B5EF4-FFF2-40B4-BE49-F238E27FC236}">
+                <a16:creationId xmlns:a16="http://schemas.microsoft.com/office/drawing/2014/main" id="{4FD5509A-8ADD-452C-AF54-410055B42998}"/>
               </a:ext>
             </a:extLst>
-          </a:blip>
-          <a:srcRect/>
-          <a:stretch>
-            <a:fillRect/>
-          </a:stretch>
-        </p:blipFill>
-        <p:spPr bwMode="auto">
+          </p:cNvPr>
+          <p:cNvSpPr/>
+          <p:nvPr/>
+        </p:nvSpPr>
+        <p:spPr>
           <a:xfrm>
-            <a:off x="2662475" y="1828800"/>
-            <a:ext cx="5793901" cy="4351338"/>
+            <a:off x="4019005" y="2566849"/>
+            <a:ext cx="1776549" cy="862149"/>
+          </a:xfrm>
+          <a:prstGeom prst="roundRect">
+            <a:avLst/>
+          </a:prstGeom>
+        </p:spPr>
+        <p:style>
+          <a:lnRef idx="2">
+            <a:schemeClr val="accent1">
+              <a:shade val="50000"/>
+            </a:schemeClr>
+          </a:lnRef>
+          <a:fillRef idx="1">
+            <a:schemeClr val="accent1"/>
+          </a:fillRef>
+          <a:effectRef idx="0">
+            <a:schemeClr val="accent1"/>
+          </a:effectRef>
+          <a:fontRef idx="minor">
+            <a:schemeClr val="lt1"/>
+          </a:fontRef>
+        </p:style>
+        <p:txBody>
+          <a:bodyPr rtlCol="0" anchor="ctr"/>
+          <a:lstStyle/>
+          <a:p>
+            <a:pPr algn="ctr"/>
+            <a:r>
+              <a:rPr lang="pl-PL" dirty="0"/>
+              <a:t>Model i </a:t>
+            </a:r>
+            <a:r>
+              <a:rPr lang="pl-PL" dirty="0" err="1"/>
+              <a:t>DbContext</a:t>
+            </a:r>
+            <a:endParaRPr lang="pl-PL" dirty="0"/>
+          </a:p>
+        </p:txBody>
+      </p:sp>
+      <p:sp>
+        <p:nvSpPr>
+          <p:cNvPr id="6" name="Prostokąt: zaokrąglone rogi 5">
+            <a:extLst>
+              <a:ext uri="{FF2B5EF4-FFF2-40B4-BE49-F238E27FC236}">
+                <a16:creationId xmlns:a16="http://schemas.microsoft.com/office/drawing/2014/main" id="{061925D0-E45C-4BBA-A1F0-F8DCFD55675D}"/>
+              </a:ext>
+            </a:extLst>
+          </p:cNvPr>
+          <p:cNvSpPr/>
+          <p:nvPr/>
+        </p:nvSpPr>
+        <p:spPr>
+          <a:xfrm>
+            <a:off x="6100356" y="3901440"/>
+            <a:ext cx="1776549" cy="862149"/>
+          </a:xfrm>
+          <a:prstGeom prst="roundRect">
+            <a:avLst/>
+          </a:prstGeom>
+        </p:spPr>
+        <p:style>
+          <a:lnRef idx="2">
+            <a:schemeClr val="accent1">
+              <a:shade val="50000"/>
+            </a:schemeClr>
+          </a:lnRef>
+          <a:fillRef idx="1">
+            <a:schemeClr val="accent1"/>
+          </a:fillRef>
+          <a:effectRef idx="0">
+            <a:schemeClr val="accent1"/>
+          </a:effectRef>
+          <a:fontRef idx="minor">
+            <a:schemeClr val="lt1"/>
+          </a:fontRef>
+        </p:style>
+        <p:txBody>
+          <a:bodyPr rtlCol="0" anchor="ctr"/>
+          <a:lstStyle/>
+          <a:p>
+            <a:pPr algn="ctr"/>
+            <a:r>
+              <a:rPr lang="pl-PL" dirty="0"/>
+              <a:t>Migracje</a:t>
+            </a:r>
+          </a:p>
+        </p:txBody>
+      </p:sp>
+      <p:sp>
+        <p:nvSpPr>
+          <p:cNvPr id="7" name="Prostokąt: zaokrąglone rogi 6">
+            <a:extLst>
+              <a:ext uri="{FF2B5EF4-FFF2-40B4-BE49-F238E27FC236}">
+                <a16:creationId xmlns:a16="http://schemas.microsoft.com/office/drawing/2014/main" id="{9FDDE0A7-A396-47E6-8EF6-1FECAD1A60D5}"/>
+              </a:ext>
+            </a:extLst>
+          </p:cNvPr>
+          <p:cNvSpPr/>
+          <p:nvPr/>
+        </p:nvSpPr>
+        <p:spPr>
+          <a:xfrm>
+            <a:off x="4341222" y="5188450"/>
+            <a:ext cx="1776549" cy="862149"/>
+          </a:xfrm>
+          <a:prstGeom prst="roundRect">
+            <a:avLst/>
+          </a:prstGeom>
+        </p:spPr>
+        <p:style>
+          <a:lnRef idx="2">
+            <a:schemeClr val="accent1">
+              <a:shade val="50000"/>
+            </a:schemeClr>
+          </a:lnRef>
+          <a:fillRef idx="1">
+            <a:schemeClr val="accent1"/>
+          </a:fillRef>
+          <a:effectRef idx="0">
+            <a:schemeClr val="accent1"/>
+          </a:effectRef>
+          <a:fontRef idx="minor">
+            <a:schemeClr val="lt1"/>
+          </a:fontRef>
+        </p:style>
+        <p:txBody>
+          <a:bodyPr rtlCol="0" anchor="ctr"/>
+          <a:lstStyle/>
+          <a:p>
+            <a:pPr algn="ctr"/>
+            <a:r>
+              <a:rPr lang="pl-PL" dirty="0"/>
+              <a:t>Skrypt SQL</a:t>
+            </a:r>
+          </a:p>
+        </p:txBody>
+      </p:sp>
+      <p:sp>
+        <p:nvSpPr>
+          <p:cNvPr id="8" name="Prostokąt: zaokrąglone rogi 7">
+            <a:extLst>
+              <a:ext uri="{FF2B5EF4-FFF2-40B4-BE49-F238E27FC236}">
+                <a16:creationId xmlns:a16="http://schemas.microsoft.com/office/drawing/2014/main" id="{25FB8CDF-6F5A-44E7-A119-8FB7C6C00624}"/>
+              </a:ext>
+            </a:extLst>
+          </p:cNvPr>
+          <p:cNvSpPr/>
+          <p:nvPr/>
+        </p:nvSpPr>
+        <p:spPr>
+          <a:xfrm>
+            <a:off x="7876905" y="5188450"/>
+            <a:ext cx="1776549" cy="862149"/>
+          </a:xfrm>
+          <a:prstGeom prst="roundRect">
+            <a:avLst/>
+          </a:prstGeom>
+        </p:spPr>
+        <p:style>
+          <a:lnRef idx="2">
+            <a:schemeClr val="accent1">
+              <a:shade val="50000"/>
+            </a:schemeClr>
+          </a:lnRef>
+          <a:fillRef idx="1">
+            <a:schemeClr val="accent1"/>
+          </a:fillRef>
+          <a:effectRef idx="0">
+            <a:schemeClr val="accent1"/>
+          </a:effectRef>
+          <a:fontRef idx="minor">
+            <a:schemeClr val="lt1"/>
+          </a:fontRef>
+        </p:style>
+        <p:txBody>
+          <a:bodyPr rtlCol="0" anchor="ctr"/>
+          <a:lstStyle/>
+          <a:p>
+            <a:pPr algn="ctr"/>
+            <a:r>
+              <a:rPr lang="pl-PL" dirty="0"/>
+              <a:t>Baza danych</a:t>
+            </a:r>
+          </a:p>
+        </p:txBody>
+      </p:sp>
+      <p:sp>
+        <p:nvSpPr>
+          <p:cNvPr id="14" name="Strzałka: w prawo 13">
+            <a:extLst>
+              <a:ext uri="{FF2B5EF4-FFF2-40B4-BE49-F238E27FC236}">
+                <a16:creationId xmlns:a16="http://schemas.microsoft.com/office/drawing/2014/main" id="{BCD1F377-1D7B-4E8B-9ADA-69655A861E54}"/>
+              </a:ext>
+            </a:extLst>
+          </p:cNvPr>
+          <p:cNvSpPr/>
+          <p:nvPr/>
+        </p:nvSpPr>
+        <p:spPr>
+          <a:xfrm>
+            <a:off x="2708366" y="2835887"/>
+            <a:ext cx="1158240" cy="324075"/>
+          </a:xfrm>
+          <a:prstGeom prst="rightArrow">
+            <a:avLst/>
+          </a:prstGeom>
+        </p:spPr>
+        <p:style>
+          <a:lnRef idx="2">
+            <a:schemeClr val="accent1">
+              <a:shade val="50000"/>
+            </a:schemeClr>
+          </a:lnRef>
+          <a:fillRef idx="1">
+            <a:schemeClr val="accent1"/>
+          </a:fillRef>
+          <a:effectRef idx="0">
+            <a:schemeClr val="accent1"/>
+          </a:effectRef>
+          <a:fontRef idx="minor">
+            <a:schemeClr val="lt1"/>
+          </a:fontRef>
+        </p:style>
+        <p:txBody>
+          <a:bodyPr rtlCol="0" anchor="ctr"/>
+          <a:lstStyle/>
+          <a:p>
+            <a:pPr algn="ctr"/>
+            <a:endParaRPr lang="pl-PL"/>
+          </a:p>
+        </p:txBody>
+      </p:sp>
+      <p:sp>
+        <p:nvSpPr>
+          <p:cNvPr id="15" name="pole tekstowe 14">
+            <a:extLst>
+              <a:ext uri="{FF2B5EF4-FFF2-40B4-BE49-F238E27FC236}">
+                <a16:creationId xmlns:a16="http://schemas.microsoft.com/office/drawing/2014/main" id="{D6DE99AB-5AA9-4592-A22E-A12F892B1B2A}"/>
+              </a:ext>
+            </a:extLst>
+          </p:cNvPr>
+          <p:cNvSpPr txBox="1"/>
+          <p:nvPr/>
+        </p:nvSpPr>
+        <p:spPr>
+          <a:xfrm>
+            <a:off x="2708366" y="2466555"/>
+            <a:ext cx="1098378" cy="369332"/>
           </a:xfrm>
           <a:prstGeom prst="rect">
             <a:avLst/>
           </a:prstGeom>
           <a:noFill/>
-          <a:extLst>
-            <a:ext uri="{909E8E84-426E-40DD-AFC4-6F175D3DCCD1}">
-              <a14:hiddenFill xmlns:a14="http://schemas.microsoft.com/office/drawing/2010/main">
-                <a:solidFill>
-                  <a:srgbClr val="FFFFFF"/>
-                </a:solidFill>
-              </a14:hiddenFill>
-            </a:ext>
-          </a:extLst>
-        </p:spPr>
-      </p:pic>
+        </p:spPr>
+        <p:txBody>
+          <a:bodyPr wrap="none" rtlCol="0">
+            <a:spAutoFit/>
+          </a:bodyPr>
+          <a:lstStyle/>
+          <a:p>
+            <a:r>
+              <a:rPr lang="pl-PL" dirty="0"/>
+              <a:t>korzysta</a:t>
+            </a:r>
+          </a:p>
+        </p:txBody>
+      </p:sp>
+      <p:sp>
+        <p:nvSpPr>
+          <p:cNvPr id="16" name="Strzałka: w prawo 15">
+            <a:extLst>
+              <a:ext uri="{FF2B5EF4-FFF2-40B4-BE49-F238E27FC236}">
+                <a16:creationId xmlns:a16="http://schemas.microsoft.com/office/drawing/2014/main" id="{E6839D4B-FFA6-46CD-BBBE-F4DBA8DBE385}"/>
+              </a:ext>
+            </a:extLst>
+          </p:cNvPr>
+          <p:cNvSpPr/>
+          <p:nvPr/>
+        </p:nvSpPr>
+        <p:spPr>
+          <a:xfrm rot="2573836">
+            <a:off x="5750981" y="3226499"/>
+            <a:ext cx="1158240" cy="324075"/>
+          </a:xfrm>
+          <a:prstGeom prst="rightArrow">
+            <a:avLst/>
+          </a:prstGeom>
+        </p:spPr>
+        <p:style>
+          <a:lnRef idx="2">
+            <a:schemeClr val="accent1">
+              <a:shade val="50000"/>
+            </a:schemeClr>
+          </a:lnRef>
+          <a:fillRef idx="1">
+            <a:schemeClr val="accent1"/>
+          </a:fillRef>
+          <a:effectRef idx="0">
+            <a:schemeClr val="accent1"/>
+          </a:effectRef>
+          <a:fontRef idx="minor">
+            <a:schemeClr val="lt1"/>
+          </a:fontRef>
+        </p:style>
+        <p:txBody>
+          <a:bodyPr rtlCol="0" anchor="ctr"/>
+          <a:lstStyle/>
+          <a:p>
+            <a:pPr algn="ctr"/>
+            <a:endParaRPr lang="pl-PL"/>
+          </a:p>
+        </p:txBody>
+      </p:sp>
+      <p:sp>
+        <p:nvSpPr>
+          <p:cNvPr id="17" name="pole tekstowe 16">
+            <a:extLst>
+              <a:ext uri="{FF2B5EF4-FFF2-40B4-BE49-F238E27FC236}">
+                <a16:creationId xmlns:a16="http://schemas.microsoft.com/office/drawing/2014/main" id="{C07615AC-DD3B-4B8A-AAEA-9D022C63BEF7}"/>
+              </a:ext>
+            </a:extLst>
+          </p:cNvPr>
+          <p:cNvSpPr txBox="1"/>
+          <p:nvPr/>
+        </p:nvSpPr>
+        <p:spPr>
+          <a:xfrm>
+            <a:off x="6310649" y="2939953"/>
+            <a:ext cx="1107996" cy="369332"/>
+          </a:xfrm>
+          <a:prstGeom prst="rect">
+            <a:avLst/>
+          </a:prstGeom>
+          <a:noFill/>
+        </p:spPr>
+        <p:txBody>
+          <a:bodyPr wrap="none" rtlCol="0">
+            <a:spAutoFit/>
+          </a:bodyPr>
+          <a:lstStyle/>
+          <a:p>
+            <a:r>
+              <a:rPr lang="pl-PL" dirty="0"/>
+              <a:t>generuje</a:t>
+            </a:r>
+          </a:p>
+        </p:txBody>
+      </p:sp>
+      <p:sp>
+        <p:nvSpPr>
+          <p:cNvPr id="18" name="Strzałka: w prawo 17">
+            <a:extLst>
+              <a:ext uri="{FF2B5EF4-FFF2-40B4-BE49-F238E27FC236}">
+                <a16:creationId xmlns:a16="http://schemas.microsoft.com/office/drawing/2014/main" id="{80F10ADF-FDE6-4DF7-94C5-7F3FA399ED01}"/>
+              </a:ext>
+            </a:extLst>
+          </p:cNvPr>
+          <p:cNvSpPr/>
+          <p:nvPr/>
+        </p:nvSpPr>
+        <p:spPr>
+          <a:xfrm rot="7973592">
+            <a:off x="4999644" y="4491847"/>
+            <a:ext cx="1158240" cy="324075"/>
+          </a:xfrm>
+          <a:prstGeom prst="rightArrow">
+            <a:avLst/>
+          </a:prstGeom>
+        </p:spPr>
+        <p:style>
+          <a:lnRef idx="2">
+            <a:schemeClr val="accent1">
+              <a:shade val="50000"/>
+            </a:schemeClr>
+          </a:lnRef>
+          <a:fillRef idx="1">
+            <a:schemeClr val="accent1"/>
+          </a:fillRef>
+          <a:effectRef idx="0">
+            <a:schemeClr val="accent1"/>
+          </a:effectRef>
+          <a:fontRef idx="minor">
+            <a:schemeClr val="lt1"/>
+          </a:fontRef>
+        </p:style>
+        <p:txBody>
+          <a:bodyPr rtlCol="0" anchor="ctr"/>
+          <a:lstStyle/>
+          <a:p>
+            <a:pPr algn="ctr"/>
+            <a:endParaRPr lang="pl-PL"/>
+          </a:p>
+        </p:txBody>
+      </p:sp>
+      <p:sp>
+        <p:nvSpPr>
+          <p:cNvPr id="19" name="pole tekstowe 18">
+            <a:extLst>
+              <a:ext uri="{FF2B5EF4-FFF2-40B4-BE49-F238E27FC236}">
+                <a16:creationId xmlns:a16="http://schemas.microsoft.com/office/drawing/2014/main" id="{3390D1A1-B34A-4443-A97B-C88D00349D84}"/>
+              </a:ext>
+            </a:extLst>
+          </p:cNvPr>
+          <p:cNvSpPr txBox="1"/>
+          <p:nvPr/>
+        </p:nvSpPr>
+        <p:spPr>
+          <a:xfrm>
+            <a:off x="4470768" y="4304525"/>
+            <a:ext cx="1107996" cy="369332"/>
+          </a:xfrm>
+          <a:prstGeom prst="rect">
+            <a:avLst/>
+          </a:prstGeom>
+          <a:noFill/>
+        </p:spPr>
+        <p:txBody>
+          <a:bodyPr wrap="none" rtlCol="0">
+            <a:spAutoFit/>
+          </a:bodyPr>
+          <a:lstStyle/>
+          <a:p>
+            <a:r>
+              <a:rPr lang="pl-PL" dirty="0"/>
+              <a:t>generuje</a:t>
+            </a:r>
+          </a:p>
+        </p:txBody>
+      </p:sp>
+      <p:sp>
+        <p:nvSpPr>
+          <p:cNvPr id="20" name="Strzałka: w prawo 19">
+            <a:extLst>
+              <a:ext uri="{FF2B5EF4-FFF2-40B4-BE49-F238E27FC236}">
+                <a16:creationId xmlns:a16="http://schemas.microsoft.com/office/drawing/2014/main" id="{3F8B85F8-F2C5-470A-8B8B-AEE52E052CCC}"/>
+              </a:ext>
+            </a:extLst>
+          </p:cNvPr>
+          <p:cNvSpPr/>
+          <p:nvPr/>
+        </p:nvSpPr>
+        <p:spPr>
+          <a:xfrm rot="2573836">
+            <a:off x="7871517" y="4506980"/>
+            <a:ext cx="1158240" cy="324075"/>
+          </a:xfrm>
+          <a:prstGeom prst="rightArrow">
+            <a:avLst/>
+          </a:prstGeom>
+        </p:spPr>
+        <p:style>
+          <a:lnRef idx="2">
+            <a:schemeClr val="accent1">
+              <a:shade val="50000"/>
+            </a:schemeClr>
+          </a:lnRef>
+          <a:fillRef idx="1">
+            <a:schemeClr val="accent1"/>
+          </a:fillRef>
+          <a:effectRef idx="0">
+            <a:schemeClr val="accent1"/>
+          </a:effectRef>
+          <a:fontRef idx="minor">
+            <a:schemeClr val="lt1"/>
+          </a:fontRef>
+        </p:style>
+        <p:txBody>
+          <a:bodyPr rtlCol="0" anchor="ctr"/>
+          <a:lstStyle/>
+          <a:p>
+            <a:pPr algn="ctr"/>
+            <a:endParaRPr lang="pl-PL"/>
+          </a:p>
+        </p:txBody>
+      </p:sp>
+      <p:sp>
+        <p:nvSpPr>
+          <p:cNvPr id="21" name="pole tekstowe 20">
+            <a:extLst>
+              <a:ext uri="{FF2B5EF4-FFF2-40B4-BE49-F238E27FC236}">
+                <a16:creationId xmlns:a16="http://schemas.microsoft.com/office/drawing/2014/main" id="{5D14E219-10B8-4F97-8728-E121B3373D70}"/>
+              </a:ext>
+            </a:extLst>
+          </p:cNvPr>
+          <p:cNvSpPr txBox="1"/>
+          <p:nvPr/>
+        </p:nvSpPr>
+        <p:spPr>
+          <a:xfrm>
+            <a:off x="8431185" y="4220434"/>
+            <a:ext cx="1388522" cy="369332"/>
+          </a:xfrm>
+          <a:prstGeom prst="rect">
+            <a:avLst/>
+          </a:prstGeom>
+          <a:noFill/>
+        </p:spPr>
+        <p:txBody>
+          <a:bodyPr wrap="none" rtlCol="0">
+            <a:spAutoFit/>
+          </a:bodyPr>
+          <a:lstStyle/>
+          <a:p>
+            <a:r>
+              <a:rPr lang="pl-PL" dirty="0"/>
+              <a:t>aktualizuje</a:t>
+            </a:r>
+          </a:p>
+        </p:txBody>
+      </p:sp>
+      <p:sp>
+        <p:nvSpPr>
+          <p:cNvPr id="22" name="Strzałka: w prawo 21">
+            <a:extLst>
+              <a:ext uri="{FF2B5EF4-FFF2-40B4-BE49-F238E27FC236}">
+                <a16:creationId xmlns:a16="http://schemas.microsoft.com/office/drawing/2014/main" id="{851C729A-CA0A-4A4E-8078-307DEBAFA466}"/>
+              </a:ext>
+            </a:extLst>
+          </p:cNvPr>
+          <p:cNvSpPr/>
+          <p:nvPr/>
+        </p:nvSpPr>
+        <p:spPr>
+          <a:xfrm>
+            <a:off x="6405155" y="5525931"/>
+            <a:ext cx="1158240" cy="324075"/>
+          </a:xfrm>
+          <a:prstGeom prst="rightArrow">
+            <a:avLst/>
+          </a:prstGeom>
+        </p:spPr>
+        <p:style>
+          <a:lnRef idx="2">
+            <a:schemeClr val="accent1">
+              <a:shade val="50000"/>
+            </a:schemeClr>
+          </a:lnRef>
+          <a:fillRef idx="1">
+            <a:schemeClr val="accent1"/>
+          </a:fillRef>
+          <a:effectRef idx="0">
+            <a:schemeClr val="accent1"/>
+          </a:effectRef>
+          <a:fontRef idx="minor">
+            <a:schemeClr val="lt1"/>
+          </a:fontRef>
+        </p:style>
+        <p:txBody>
+          <a:bodyPr rtlCol="0" anchor="ctr"/>
+          <a:lstStyle/>
+          <a:p>
+            <a:pPr algn="ctr"/>
+            <a:endParaRPr lang="pl-PL"/>
+          </a:p>
+        </p:txBody>
+      </p:sp>
+      <p:sp>
+        <p:nvSpPr>
+          <p:cNvPr id="23" name="pole tekstowe 22">
+            <a:extLst>
+              <a:ext uri="{FF2B5EF4-FFF2-40B4-BE49-F238E27FC236}">
+                <a16:creationId xmlns:a16="http://schemas.microsoft.com/office/drawing/2014/main" id="{2C837667-31BB-4660-9E3E-15FEF5E90769}"/>
+              </a:ext>
+            </a:extLst>
+          </p:cNvPr>
+          <p:cNvSpPr txBox="1"/>
+          <p:nvPr/>
+        </p:nvSpPr>
+        <p:spPr>
+          <a:xfrm>
+            <a:off x="6290014" y="5188450"/>
+            <a:ext cx="1388522" cy="369332"/>
+          </a:xfrm>
+          <a:prstGeom prst="rect">
+            <a:avLst/>
+          </a:prstGeom>
+          <a:noFill/>
+        </p:spPr>
+        <p:txBody>
+          <a:bodyPr wrap="none" rtlCol="0">
+            <a:spAutoFit/>
+          </a:bodyPr>
+          <a:lstStyle/>
+          <a:p>
+            <a:r>
+              <a:rPr lang="pl-PL" dirty="0"/>
+              <a:t>aktualizuje</a:t>
+            </a:r>
+          </a:p>
+        </p:txBody>
+      </p:sp>
     </p:spTree>
     <p:extLst>
       <p:ext uri="{BB962C8B-B14F-4D97-AF65-F5344CB8AC3E}">
-        <p14:creationId xmlns:p14="http://schemas.microsoft.com/office/powerpoint/2010/main" val="4179623338"/>
+        <p14:creationId xmlns:p14="http://schemas.microsoft.com/office/powerpoint/2010/main" val="1277708116"/>
       </p:ext>
     </p:extLst>
   </p:cSld>
@@ -5962,7 +5558,7 @@
           <p:cNvPr id="2" name="Tytuł 1">
             <a:extLst>
               <a:ext uri="{FF2B5EF4-FFF2-40B4-BE49-F238E27FC236}">
-                <a16:creationId xmlns:a16="http://schemas.microsoft.com/office/drawing/2014/main" id="{5F7473A0-EB20-47EB-9FAC-C1E2BCC98ADC}"/>
+                <a16:creationId xmlns:a16="http://schemas.microsoft.com/office/drawing/2014/main" id="{9360C57A-54BB-463B-B11D-EDA92B04C4E1}"/>
               </a:ext>
             </a:extLst>
           </p:cNvPr>
@@ -5980,74 +5576,464 @@
           <a:p>
             <a:r>
               <a:rPr lang="pl-PL" dirty="0" err="1"/>
-              <a:t>Frameworki</a:t>
-            </a:r>
-            <a:endParaRPr lang="pl-PL" dirty="0"/>
-          </a:p>
-        </p:txBody>
-      </p:sp>
-      <p:sp>
-        <p:nvSpPr>
-          <p:cNvPr id="6" name="Symbol zastępczy zawartości 5">
+              <a:t>Stripe</a:t>
+            </a:r>
+            <a:r>
+              <a:rPr lang="pl-PL" dirty="0"/>
+              <a:t> – płatności online</a:t>
+            </a:r>
+          </a:p>
+        </p:txBody>
+      </p:sp>
+      <p:sp>
+        <p:nvSpPr>
+          <p:cNvPr id="4" name="Prostokąt: zaokrąglone rogi 3">
             <a:extLst>
               <a:ext uri="{FF2B5EF4-FFF2-40B4-BE49-F238E27FC236}">
-                <a16:creationId xmlns:a16="http://schemas.microsoft.com/office/drawing/2014/main" id="{8053B8E4-466B-4655-8A3A-1341EA980997}"/>
+                <a16:creationId xmlns:a16="http://schemas.microsoft.com/office/drawing/2014/main" id="{2856FFAD-AF17-4BC7-8AFD-5E17A224F5EB}"/>
               </a:ext>
             </a:extLst>
           </p:cNvPr>
-          <p:cNvSpPr>
-            <a:spLocks noGrp="1"/>
-          </p:cNvSpPr>
-          <p:nvPr>
-            <p:ph idx="1"/>
-          </p:nvPr>
+          <p:cNvSpPr/>
+          <p:nvPr/>
         </p:nvSpPr>
         <p:spPr>
           <a:xfrm>
-            <a:off x="1261872" y="1828801"/>
-            <a:ext cx="8595360" cy="1402080"/>
-          </a:xfrm>
-        </p:spPr>
-        <p:txBody>
-          <a:bodyPr vert="horz" lIns="91440" tIns="45720" rIns="91440" bIns="45720" rtlCol="0" anchor="t">
-            <a:normAutofit/>
-          </a:bodyPr>
-          <a:lstStyle/>
-          <a:p>
+            <a:off x="1681766" y="2895533"/>
+            <a:ext cx="1776549" cy="862149"/>
+          </a:xfrm>
+          <a:prstGeom prst="roundRect">
+            <a:avLst/>
+          </a:prstGeom>
+        </p:spPr>
+        <p:style>
+          <a:lnRef idx="2">
+            <a:schemeClr val="accent1">
+              <a:shade val="50000"/>
+            </a:schemeClr>
+          </a:lnRef>
+          <a:fillRef idx="1">
+            <a:schemeClr val="accent1"/>
+          </a:fillRef>
+          <a:effectRef idx="0">
+            <a:schemeClr val="accent1"/>
+          </a:effectRef>
+          <a:fontRef idx="minor">
+            <a:schemeClr val="lt1"/>
+          </a:fontRef>
+        </p:style>
+        <p:txBody>
+          <a:bodyPr rtlCol="0" anchor="ctr"/>
+          <a:lstStyle/>
+          <a:p>
+            <a:pPr algn="ctr"/>
+            <a:r>
+              <a:rPr lang="pl-PL" dirty="0"/>
+              <a:t>Aplikacja </a:t>
+            </a:r>
             <a:r>
               <a:rPr lang="pl-PL" dirty="0" err="1"/>
-              <a:t>Entity</a:t>
+              <a:t>ASP.Net</a:t>
             </a:r>
             <a:r>
               <a:rPr lang="pl-PL" dirty="0"/>
-              <a:t> Framework </a:t>
-            </a:r>
-            <a:r>
-              <a:rPr lang="pl-PL"/>
+              <a:t> </a:t>
+            </a:r>
+            <a:r>
+              <a:rPr lang="pl-PL" dirty="0" err="1"/>
               <a:t>Core</a:t>
             </a:r>
             <a:endParaRPr lang="pl-PL" dirty="0"/>
           </a:p>
-          <a:p>
+        </p:txBody>
+      </p:sp>
+      <p:sp>
+        <p:nvSpPr>
+          <p:cNvPr id="5" name="Prostokąt: zaokrąglone rogi 4">
+            <a:extLst>
+              <a:ext uri="{FF2B5EF4-FFF2-40B4-BE49-F238E27FC236}">
+                <a16:creationId xmlns:a16="http://schemas.microsoft.com/office/drawing/2014/main" id="{A5BB7905-DE24-434F-8803-BF58C4B9F39D}"/>
+              </a:ext>
+            </a:extLst>
+          </p:cNvPr>
+          <p:cNvSpPr/>
+          <p:nvPr/>
+        </p:nvSpPr>
+        <p:spPr>
+          <a:xfrm>
+            <a:off x="1681766" y="4717885"/>
+            <a:ext cx="1776549" cy="862149"/>
+          </a:xfrm>
+          <a:prstGeom prst="roundRect">
+            <a:avLst/>
+          </a:prstGeom>
+        </p:spPr>
+        <p:style>
+          <a:lnRef idx="2">
+            <a:schemeClr val="accent1">
+              <a:shade val="50000"/>
+            </a:schemeClr>
+          </a:lnRef>
+          <a:fillRef idx="1">
+            <a:schemeClr val="accent1"/>
+          </a:fillRef>
+          <a:effectRef idx="0">
+            <a:schemeClr val="accent1"/>
+          </a:effectRef>
+          <a:fontRef idx="minor">
+            <a:schemeClr val="lt1"/>
+          </a:fontRef>
+        </p:style>
+        <p:txBody>
+          <a:bodyPr rtlCol="0" anchor="ctr"/>
+          <a:lstStyle/>
+          <a:p>
+            <a:pPr algn="ctr"/>
+            <a:r>
+              <a:rPr lang="pl-PL" dirty="0"/>
+              <a:t>Klucz </a:t>
+            </a:r>
+            <a:r>
+              <a:rPr lang="pl-PL" dirty="0" err="1"/>
+              <a:t>Auth</a:t>
+            </a:r>
+            <a:r>
+              <a:rPr lang="pl-PL" dirty="0"/>
+              <a:t> i Model</a:t>
+            </a:r>
+          </a:p>
+        </p:txBody>
+      </p:sp>
+      <p:sp>
+        <p:nvSpPr>
+          <p:cNvPr id="6" name="Prostokąt: zaokrąglone rogi 5">
+            <a:extLst>
+              <a:ext uri="{FF2B5EF4-FFF2-40B4-BE49-F238E27FC236}">
+                <a16:creationId xmlns:a16="http://schemas.microsoft.com/office/drawing/2014/main" id="{E682170E-E940-42D9-9AAD-A6D27E69C478}"/>
+              </a:ext>
+            </a:extLst>
+          </p:cNvPr>
+          <p:cNvSpPr/>
+          <p:nvPr/>
+        </p:nvSpPr>
+        <p:spPr>
+          <a:xfrm>
+            <a:off x="4921353" y="4717885"/>
+            <a:ext cx="1776549" cy="862149"/>
+          </a:xfrm>
+          <a:prstGeom prst="roundRect">
+            <a:avLst/>
+          </a:prstGeom>
+        </p:spPr>
+        <p:style>
+          <a:lnRef idx="2">
+            <a:schemeClr val="accent1">
+              <a:shade val="50000"/>
+            </a:schemeClr>
+          </a:lnRef>
+          <a:fillRef idx="1">
+            <a:schemeClr val="accent1"/>
+          </a:fillRef>
+          <a:effectRef idx="0">
+            <a:schemeClr val="accent1"/>
+          </a:effectRef>
+          <a:fontRef idx="minor">
+            <a:schemeClr val="lt1"/>
+          </a:fontRef>
+        </p:style>
+        <p:txBody>
+          <a:bodyPr rtlCol="0" anchor="ctr"/>
+          <a:lstStyle/>
+          <a:p>
+            <a:pPr algn="ctr"/>
             <a:r>
               <a:rPr lang="pl-PL" dirty="0" err="1"/>
               <a:t>Stripe</a:t>
             </a:r>
-            <a:endParaRPr lang="pl-PL" dirty="0"/>
-          </a:p>
-          <a:p>
-            <a:r>
-              <a:rPr lang="pl-PL" dirty="0" err="1"/>
-              <a:t>Sendgrid</a:t>
-            </a:r>
-            <a:endParaRPr lang="pl-PL" dirty="0"/>
-          </a:p>
-        </p:txBody>
-      </p:sp>
+            <a:r>
+              <a:rPr lang="pl-PL" dirty="0"/>
+              <a:t> API</a:t>
+            </a:r>
+          </a:p>
+        </p:txBody>
+      </p:sp>
+      <p:sp>
+        <p:nvSpPr>
+          <p:cNvPr id="9" name="Strzałka: w prawo 8">
+            <a:extLst>
+              <a:ext uri="{FF2B5EF4-FFF2-40B4-BE49-F238E27FC236}">
+                <a16:creationId xmlns:a16="http://schemas.microsoft.com/office/drawing/2014/main" id="{15F3DC0D-0D2F-44FF-B991-ACD528E3CD99}"/>
+              </a:ext>
+            </a:extLst>
+          </p:cNvPr>
+          <p:cNvSpPr/>
+          <p:nvPr/>
+        </p:nvSpPr>
+        <p:spPr>
+          <a:xfrm rot="5400000">
+            <a:off x="2229353" y="4097508"/>
+            <a:ext cx="681372" cy="324075"/>
+          </a:xfrm>
+          <a:prstGeom prst="rightArrow">
+            <a:avLst/>
+          </a:prstGeom>
+        </p:spPr>
+        <p:style>
+          <a:lnRef idx="2">
+            <a:schemeClr val="accent1">
+              <a:shade val="50000"/>
+            </a:schemeClr>
+          </a:lnRef>
+          <a:fillRef idx="1">
+            <a:schemeClr val="accent1"/>
+          </a:fillRef>
+          <a:effectRef idx="0">
+            <a:schemeClr val="accent1"/>
+          </a:effectRef>
+          <a:fontRef idx="minor">
+            <a:schemeClr val="lt1"/>
+          </a:fontRef>
+        </p:style>
+        <p:txBody>
+          <a:bodyPr rtlCol="0" anchor="ctr"/>
+          <a:lstStyle/>
+          <a:p>
+            <a:pPr algn="ctr"/>
+            <a:endParaRPr lang="pl-PL"/>
+          </a:p>
+        </p:txBody>
+      </p:sp>
+      <p:sp>
+        <p:nvSpPr>
+          <p:cNvPr id="10" name="pole tekstowe 9">
+            <a:extLst>
+              <a:ext uri="{FF2B5EF4-FFF2-40B4-BE49-F238E27FC236}">
+                <a16:creationId xmlns:a16="http://schemas.microsoft.com/office/drawing/2014/main" id="{FB75A087-849C-44DF-AB45-3EA4C535434A}"/>
+              </a:ext>
+            </a:extLst>
+          </p:cNvPr>
+          <p:cNvSpPr txBox="1"/>
+          <p:nvPr/>
+        </p:nvSpPr>
+        <p:spPr>
+          <a:xfrm>
+            <a:off x="2661480" y="3965645"/>
+            <a:ext cx="1098378" cy="369332"/>
+          </a:xfrm>
+          <a:prstGeom prst="rect">
+            <a:avLst/>
+          </a:prstGeom>
+          <a:noFill/>
+        </p:spPr>
+        <p:txBody>
+          <a:bodyPr wrap="none" rtlCol="0">
+            <a:spAutoFit/>
+          </a:bodyPr>
+          <a:lstStyle/>
+          <a:p>
+            <a:r>
+              <a:rPr lang="pl-PL" dirty="0"/>
+              <a:t>korzysta</a:t>
+            </a:r>
+          </a:p>
+        </p:txBody>
+      </p:sp>
+      <p:sp>
+        <p:nvSpPr>
+          <p:cNvPr id="11" name="Strzałka: w prawo 10">
+            <a:extLst>
+              <a:ext uri="{FF2B5EF4-FFF2-40B4-BE49-F238E27FC236}">
+                <a16:creationId xmlns:a16="http://schemas.microsoft.com/office/drawing/2014/main" id="{964D6393-C5B8-4D19-864B-4732FFBA0BFD}"/>
+              </a:ext>
+            </a:extLst>
+          </p:cNvPr>
+          <p:cNvSpPr/>
+          <p:nvPr/>
+        </p:nvSpPr>
+        <p:spPr>
+          <a:xfrm>
+            <a:off x="3610714" y="4717885"/>
+            <a:ext cx="1158240" cy="324075"/>
+          </a:xfrm>
+          <a:prstGeom prst="rightArrow">
+            <a:avLst/>
+          </a:prstGeom>
+        </p:spPr>
+        <p:style>
+          <a:lnRef idx="2">
+            <a:schemeClr val="accent1">
+              <a:shade val="50000"/>
+            </a:schemeClr>
+          </a:lnRef>
+          <a:fillRef idx="1">
+            <a:schemeClr val="accent1"/>
+          </a:fillRef>
+          <a:effectRef idx="0">
+            <a:schemeClr val="accent1"/>
+          </a:effectRef>
+          <a:fontRef idx="minor">
+            <a:schemeClr val="lt1"/>
+          </a:fontRef>
+        </p:style>
+        <p:txBody>
+          <a:bodyPr rtlCol="0" anchor="ctr"/>
+          <a:lstStyle/>
+          <a:p>
+            <a:pPr algn="ctr"/>
+            <a:endParaRPr lang="pl-PL"/>
+          </a:p>
+        </p:txBody>
+      </p:sp>
+      <p:sp>
+        <p:nvSpPr>
+          <p:cNvPr id="12" name="pole tekstowe 11">
+            <a:extLst>
+              <a:ext uri="{FF2B5EF4-FFF2-40B4-BE49-F238E27FC236}">
+                <a16:creationId xmlns:a16="http://schemas.microsoft.com/office/drawing/2014/main" id="{0950CA78-9CC2-46BC-8DA9-2B4844928BF0}"/>
+              </a:ext>
+            </a:extLst>
+          </p:cNvPr>
+          <p:cNvSpPr txBox="1"/>
+          <p:nvPr/>
+        </p:nvSpPr>
+        <p:spPr>
+          <a:xfrm>
+            <a:off x="3539888" y="4415565"/>
+            <a:ext cx="1180131" cy="369332"/>
+          </a:xfrm>
+          <a:prstGeom prst="rect">
+            <a:avLst/>
+          </a:prstGeom>
+          <a:noFill/>
+        </p:spPr>
+        <p:txBody>
+          <a:bodyPr wrap="none" rtlCol="0">
+            <a:spAutoFit/>
+          </a:bodyPr>
+          <a:lstStyle/>
+          <a:p>
+            <a:r>
+              <a:rPr lang="pl-PL" dirty="0"/>
+              <a:t>wywołuje</a:t>
+            </a:r>
+          </a:p>
+        </p:txBody>
+      </p:sp>
+      <p:sp>
+        <p:nvSpPr>
+          <p:cNvPr id="20" name="Strzałka: w prawo 19">
+            <a:extLst>
+              <a:ext uri="{FF2B5EF4-FFF2-40B4-BE49-F238E27FC236}">
+                <a16:creationId xmlns:a16="http://schemas.microsoft.com/office/drawing/2014/main" id="{780722DB-6D36-45B5-8871-0186277B07ED}"/>
+              </a:ext>
+            </a:extLst>
+          </p:cNvPr>
+          <p:cNvSpPr/>
+          <p:nvPr/>
+        </p:nvSpPr>
+        <p:spPr>
+          <a:xfrm rot="10800000">
+            <a:off x="3550834" y="5255959"/>
+            <a:ext cx="1158240" cy="324075"/>
+          </a:xfrm>
+          <a:prstGeom prst="rightArrow">
+            <a:avLst/>
+          </a:prstGeom>
+        </p:spPr>
+        <p:style>
+          <a:lnRef idx="2">
+            <a:schemeClr val="accent1">
+              <a:shade val="50000"/>
+            </a:schemeClr>
+          </a:lnRef>
+          <a:fillRef idx="1">
+            <a:schemeClr val="accent1"/>
+          </a:fillRef>
+          <a:effectRef idx="0">
+            <a:schemeClr val="accent1"/>
+          </a:effectRef>
+          <a:fontRef idx="minor">
+            <a:schemeClr val="lt1"/>
+          </a:fontRef>
+        </p:style>
+        <p:txBody>
+          <a:bodyPr rtlCol="0" anchor="ctr"/>
+          <a:lstStyle/>
+          <a:p>
+            <a:pPr algn="ctr"/>
+            <a:endParaRPr lang="pl-PL"/>
+          </a:p>
+        </p:txBody>
+      </p:sp>
+      <p:sp>
+        <p:nvSpPr>
+          <p:cNvPr id="21" name="pole tekstowe 20">
+            <a:extLst>
+              <a:ext uri="{FF2B5EF4-FFF2-40B4-BE49-F238E27FC236}">
+                <a16:creationId xmlns:a16="http://schemas.microsoft.com/office/drawing/2014/main" id="{0DF1D55B-58DA-4327-9695-B098EBE39EB3}"/>
+              </a:ext>
+            </a:extLst>
+          </p:cNvPr>
+          <p:cNvSpPr txBox="1"/>
+          <p:nvPr/>
+        </p:nvSpPr>
+        <p:spPr>
+          <a:xfrm>
+            <a:off x="3539888" y="5513022"/>
+            <a:ext cx="1322798" cy="369332"/>
+          </a:xfrm>
+          <a:prstGeom prst="rect">
+            <a:avLst/>
+          </a:prstGeom>
+          <a:noFill/>
+        </p:spPr>
+        <p:txBody>
+          <a:bodyPr wrap="none" rtlCol="0">
+            <a:spAutoFit/>
+          </a:bodyPr>
+          <a:lstStyle/>
+          <a:p>
+            <a:r>
+              <a:rPr lang="pl-PL" dirty="0"/>
+              <a:t>odpowiada</a:t>
+            </a:r>
+          </a:p>
+        </p:txBody>
+      </p:sp>
+      <p:pic>
+        <p:nvPicPr>
+          <p:cNvPr id="23" name="Obraz 22">
+            <a:extLst>
+              <a:ext uri="{FF2B5EF4-FFF2-40B4-BE49-F238E27FC236}">
+                <a16:creationId xmlns:a16="http://schemas.microsoft.com/office/drawing/2014/main" id="{9FD9DAB2-CCE2-4BA1-8330-4F93B049D562}"/>
+              </a:ext>
+            </a:extLst>
+          </p:cNvPr>
+          <p:cNvPicPr>
+            <a:picLocks noChangeAspect="1"/>
+          </p:cNvPicPr>
+          <p:nvPr/>
+        </p:nvPicPr>
+        <p:blipFill>
+          <a:blip r:embed="rId2"/>
+          <a:stretch>
+            <a:fillRect/>
+          </a:stretch>
+        </p:blipFill>
+        <p:spPr>
+          <a:xfrm>
+            <a:off x="7544968" y="1729217"/>
+            <a:ext cx="2723245" cy="4472856"/>
+          </a:xfrm>
+          <a:prstGeom prst="rect">
+            <a:avLst/>
+          </a:prstGeom>
+        </p:spPr>
+      </p:pic>
     </p:spTree>
     <p:extLst>
       <p:ext uri="{BB962C8B-B14F-4D97-AF65-F5344CB8AC3E}">
-        <p14:creationId xmlns:p14="http://schemas.microsoft.com/office/powerpoint/2010/main" val="1257251168"/>
+        <p14:creationId xmlns:p14="http://schemas.microsoft.com/office/powerpoint/2010/main" val="3228916118"/>
       </p:ext>
     </p:extLst>
   </p:cSld>
@@ -6079,7 +6065,7 @@
           <p:cNvPr id="2" name="Tytuł 1">
             <a:extLst>
               <a:ext uri="{FF2B5EF4-FFF2-40B4-BE49-F238E27FC236}">
-                <a16:creationId xmlns:a16="http://schemas.microsoft.com/office/drawing/2014/main" id="{7D521247-F99E-4288-BA43-27EA423979D9}"/>
+                <a16:creationId xmlns:a16="http://schemas.microsoft.com/office/drawing/2014/main" id="{2F655891-0751-43CE-968B-868010D3CF8F}"/>
               </a:ext>
             </a:extLst>
           </p:cNvPr>
@@ -6097,26 +6083,46 @@
           <a:p>
             <a:r>
               <a:rPr lang="pl-PL" dirty="0" err="1"/>
-              <a:t>Entity</a:t>
+              <a:t>Sendgrid</a:t>
             </a:r>
             <a:r>
               <a:rPr lang="pl-PL" dirty="0"/>
-              <a:t> Framework </a:t>
-            </a:r>
-            <a:r>
-              <a:rPr lang="pl-PL" dirty="0" err="1"/>
-              <a:t>Core</a:t>
-            </a:r>
-            <a:endParaRPr lang="pl-PL" dirty="0"/>
-          </a:p>
-        </p:txBody>
-      </p:sp>
-      <p:sp>
-        <p:nvSpPr>
-          <p:cNvPr id="4" name="Prostokąt: zaokrąglone rogi 3">
+              <a:t> – e-mail API</a:t>
+            </a:r>
+          </a:p>
+        </p:txBody>
+      </p:sp>
+      <p:sp>
+        <p:nvSpPr>
+          <p:cNvPr id="3" name="Symbol zastępczy zawartości 2">
             <a:extLst>
               <a:ext uri="{FF2B5EF4-FFF2-40B4-BE49-F238E27FC236}">
-                <a16:creationId xmlns:a16="http://schemas.microsoft.com/office/drawing/2014/main" id="{196FE014-16BF-40B2-B0F7-5B74DAEFB519}"/>
+                <a16:creationId xmlns:a16="http://schemas.microsoft.com/office/drawing/2014/main" id="{9DAF8F79-0520-4A2A-87B3-55CC710E6332}"/>
+              </a:ext>
+            </a:extLst>
+          </p:cNvPr>
+          <p:cNvSpPr>
+            <a:spLocks noGrp="1"/>
+          </p:cNvSpPr>
+          <p:nvPr>
+            <p:ph idx="1"/>
+          </p:nvPr>
+        </p:nvSpPr>
+        <p:spPr/>
+        <p:txBody>
+          <a:bodyPr/>
+          <a:lstStyle/>
+          <a:p>
+            <a:endParaRPr lang="pl-PL" dirty="0"/>
+          </a:p>
+        </p:txBody>
+      </p:sp>
+      <p:sp>
+        <p:nvSpPr>
+          <p:cNvPr id="18" name="Prostokąt: zaokrąglone rogi 17">
+            <a:extLst>
+              <a:ext uri="{FF2B5EF4-FFF2-40B4-BE49-F238E27FC236}">
+                <a16:creationId xmlns:a16="http://schemas.microsoft.com/office/drawing/2014/main" id="{EA86AB15-EF01-471B-A4CE-445339B1B72A}"/>
               </a:ext>
             </a:extLst>
           </p:cNvPr>
@@ -6125,7 +6131,7 @@
         </p:nvSpPr>
         <p:spPr>
           <a:xfrm>
-            <a:off x="779418" y="2566851"/>
+            <a:off x="1159252" y="2965201"/>
             <a:ext cx="1776549" cy="862149"/>
           </a:xfrm>
           <a:prstGeom prst="roundRect">
@@ -6175,10 +6181,10 @@
       </p:sp>
       <p:sp>
         <p:nvSpPr>
-          <p:cNvPr id="5" name="Prostokąt: zaokrąglone rogi 4">
+          <p:cNvPr id="19" name="Prostokąt: zaokrąglone rogi 18">
             <a:extLst>
               <a:ext uri="{FF2B5EF4-FFF2-40B4-BE49-F238E27FC236}">
-                <a16:creationId xmlns:a16="http://schemas.microsoft.com/office/drawing/2014/main" id="{4FD5509A-8ADD-452C-AF54-410055B42998}"/>
+                <a16:creationId xmlns:a16="http://schemas.microsoft.com/office/drawing/2014/main" id="{2246912C-58E9-4B5F-B2A1-6CC9918CA29A}"/>
               </a:ext>
             </a:extLst>
           </p:cNvPr>
@@ -6187,8 +6193,8 @@
         </p:nvSpPr>
         <p:spPr>
           <a:xfrm>
-            <a:off x="4019005" y="2566849"/>
-            <a:ext cx="1776549" cy="862149"/>
+            <a:off x="992778" y="4737397"/>
+            <a:ext cx="2117195" cy="862149"/>
           </a:xfrm>
           <a:prstGeom prst="roundRect">
             <a:avLst/>
@@ -6216,12 +6222,16 @@
           <a:p>
             <a:pPr algn="ctr"/>
             <a:r>
+              <a:rPr lang="pl-PL" dirty="0" err="1"/>
+              <a:t>EmailOptions</a:t>
+            </a:r>
+            <a:r>
               <a:rPr lang="pl-PL" dirty="0"/>
-              <a:t>Model i </a:t>
+              <a:t> i </a:t>
             </a:r>
             <a:r>
               <a:rPr lang="pl-PL" dirty="0" err="1"/>
-              <a:t>DbContext</a:t>
+              <a:t>SendGridClient</a:t>
             </a:r>
             <a:endParaRPr lang="pl-PL" dirty="0"/>
           </a:p>
@@ -6229,10 +6239,10 @@
       </p:sp>
       <p:sp>
         <p:nvSpPr>
-          <p:cNvPr id="6" name="Prostokąt: zaokrąglone rogi 5">
+          <p:cNvPr id="20" name="Prostokąt: zaokrąglone rogi 19">
             <a:extLst>
               <a:ext uri="{FF2B5EF4-FFF2-40B4-BE49-F238E27FC236}">
-                <a16:creationId xmlns:a16="http://schemas.microsoft.com/office/drawing/2014/main" id="{061925D0-E45C-4BBA-A1F0-F8DCFD55675D}"/>
+                <a16:creationId xmlns:a16="http://schemas.microsoft.com/office/drawing/2014/main" id="{BBDCCE45-A743-4D23-B85E-E79E9AEC9BA3}"/>
               </a:ext>
             </a:extLst>
           </p:cNvPr>
@@ -6241,7 +6251,7 @@
         </p:nvSpPr>
         <p:spPr>
           <a:xfrm>
-            <a:off x="6100356" y="3901440"/>
+            <a:off x="4573011" y="4737397"/>
             <a:ext cx="1776549" cy="862149"/>
           </a:xfrm>
           <a:prstGeom prst="roundRect">
@@ -6270,18 +6280,22 @@
           <a:p>
             <a:pPr algn="ctr"/>
             <a:r>
+              <a:rPr lang="pl-PL" dirty="0" err="1"/>
+              <a:t>Sendgrid</a:t>
+            </a:r>
+            <a:r>
               <a:rPr lang="pl-PL" dirty="0"/>
-              <a:t>Migracje</a:t>
-            </a:r>
-          </a:p>
-        </p:txBody>
-      </p:sp>
-      <p:sp>
-        <p:nvSpPr>
-          <p:cNvPr id="7" name="Prostokąt: zaokrąglone rogi 6">
+              <a:t> API</a:t>
+            </a:r>
+          </a:p>
+        </p:txBody>
+      </p:sp>
+      <p:sp>
+        <p:nvSpPr>
+          <p:cNvPr id="21" name="Strzałka: w prawo 20">
             <a:extLst>
               <a:ext uri="{FF2B5EF4-FFF2-40B4-BE49-F238E27FC236}">
-                <a16:creationId xmlns:a16="http://schemas.microsoft.com/office/drawing/2014/main" id="{9FDDE0A7-A396-47E6-8EF6-1FECAD1A60D5}"/>
+                <a16:creationId xmlns:a16="http://schemas.microsoft.com/office/drawing/2014/main" id="{2FD987A4-2A1C-4D8F-81B4-5461D7BB13D6}"/>
               </a:ext>
             </a:extLst>
           </p:cNvPr>
@@ -6289,11 +6303,11 @@
           <p:nvPr/>
         </p:nvSpPr>
         <p:spPr>
-          <a:xfrm>
-            <a:off x="4341222" y="5188450"/>
-            <a:ext cx="1776549" cy="862149"/>
-          </a:xfrm>
-          <a:prstGeom prst="roundRect">
+          <a:xfrm rot="5400000">
+            <a:off x="1706839" y="4167176"/>
+            <a:ext cx="681372" cy="324075"/>
+          </a:xfrm>
+          <a:prstGeom prst="rightArrow">
             <a:avLst/>
           </a:prstGeom>
         </p:spPr>
@@ -6318,19 +6332,51 @@
           <a:lstStyle/>
           <a:p>
             <a:pPr algn="ctr"/>
-            <a:r>
-              <a:rPr lang="pl-PL" dirty="0"/>
-              <a:t>Skrypt SQL</a:t>
-            </a:r>
-          </a:p>
-        </p:txBody>
-      </p:sp>
-      <p:sp>
-        <p:nvSpPr>
-          <p:cNvPr id="8" name="Prostokąt: zaokrąglone rogi 7">
+            <a:endParaRPr lang="pl-PL"/>
+          </a:p>
+        </p:txBody>
+      </p:sp>
+      <p:sp>
+        <p:nvSpPr>
+          <p:cNvPr id="22" name="pole tekstowe 21">
             <a:extLst>
               <a:ext uri="{FF2B5EF4-FFF2-40B4-BE49-F238E27FC236}">
-                <a16:creationId xmlns:a16="http://schemas.microsoft.com/office/drawing/2014/main" id="{25FB8CDF-6F5A-44E7-A119-8FB7C6C00624}"/>
+                <a16:creationId xmlns:a16="http://schemas.microsoft.com/office/drawing/2014/main" id="{D8313037-F6A8-4AA0-9C67-F14B8C019E94}"/>
+              </a:ext>
+            </a:extLst>
+          </p:cNvPr>
+          <p:cNvSpPr txBox="1"/>
+          <p:nvPr/>
+        </p:nvSpPr>
+        <p:spPr>
+          <a:xfrm>
+            <a:off x="2138966" y="4035313"/>
+            <a:ext cx="1098378" cy="369332"/>
+          </a:xfrm>
+          <a:prstGeom prst="rect">
+            <a:avLst/>
+          </a:prstGeom>
+          <a:noFill/>
+        </p:spPr>
+        <p:txBody>
+          <a:bodyPr wrap="none" rtlCol="0">
+            <a:spAutoFit/>
+          </a:bodyPr>
+          <a:lstStyle/>
+          <a:p>
+            <a:r>
+              <a:rPr lang="pl-PL" dirty="0"/>
+              <a:t>korzysta</a:t>
+            </a:r>
+          </a:p>
+        </p:txBody>
+      </p:sp>
+      <p:sp>
+        <p:nvSpPr>
+          <p:cNvPr id="23" name="Strzałka: w prawo 22">
+            <a:extLst>
+              <a:ext uri="{FF2B5EF4-FFF2-40B4-BE49-F238E27FC236}">
+                <a16:creationId xmlns:a16="http://schemas.microsoft.com/office/drawing/2014/main" id="{35893DB5-D33E-411D-8DEC-3300C1D3939B}"/>
               </a:ext>
             </a:extLst>
           </p:cNvPr>
@@ -6339,10 +6385,10 @@
         </p:nvSpPr>
         <p:spPr>
           <a:xfrm>
-            <a:off x="7876905" y="5188450"/>
-            <a:ext cx="1776549" cy="862149"/>
-          </a:xfrm>
-          <a:prstGeom prst="roundRect">
+            <a:off x="3262372" y="4737397"/>
+            <a:ext cx="1158240" cy="324075"/>
+          </a:xfrm>
+          <a:prstGeom prst="rightArrow">
             <a:avLst/>
           </a:prstGeom>
         </p:spPr>
@@ -6367,19 +6413,51 @@
           <a:lstStyle/>
           <a:p>
             <a:pPr algn="ctr"/>
-            <a:r>
-              <a:rPr lang="pl-PL" dirty="0"/>
-              <a:t>Baza danych</a:t>
-            </a:r>
-          </a:p>
-        </p:txBody>
-      </p:sp>
-      <p:sp>
-        <p:nvSpPr>
-          <p:cNvPr id="14" name="Strzałka: w prawo 13">
+            <a:endParaRPr lang="pl-PL"/>
+          </a:p>
+        </p:txBody>
+      </p:sp>
+      <p:sp>
+        <p:nvSpPr>
+          <p:cNvPr id="24" name="pole tekstowe 23">
             <a:extLst>
               <a:ext uri="{FF2B5EF4-FFF2-40B4-BE49-F238E27FC236}">
-                <a16:creationId xmlns:a16="http://schemas.microsoft.com/office/drawing/2014/main" id="{BCD1F377-1D7B-4E8B-9ADA-69655A861E54}"/>
+                <a16:creationId xmlns:a16="http://schemas.microsoft.com/office/drawing/2014/main" id="{339606C3-A802-4E75-8122-C981DB4F320A}"/>
+              </a:ext>
+            </a:extLst>
+          </p:cNvPr>
+          <p:cNvSpPr txBox="1"/>
+          <p:nvPr/>
+        </p:nvSpPr>
+        <p:spPr>
+          <a:xfrm>
+            <a:off x="3191546" y="4435077"/>
+            <a:ext cx="1180131" cy="369332"/>
+          </a:xfrm>
+          <a:prstGeom prst="rect">
+            <a:avLst/>
+          </a:prstGeom>
+          <a:noFill/>
+        </p:spPr>
+        <p:txBody>
+          <a:bodyPr wrap="none" rtlCol="0">
+            <a:spAutoFit/>
+          </a:bodyPr>
+          <a:lstStyle/>
+          <a:p>
+            <a:r>
+              <a:rPr lang="pl-PL" dirty="0"/>
+              <a:t>wywołuje</a:t>
+            </a:r>
+          </a:p>
+        </p:txBody>
+      </p:sp>
+      <p:sp>
+        <p:nvSpPr>
+          <p:cNvPr id="25" name="Strzałka: w prawo 24">
+            <a:extLst>
+              <a:ext uri="{FF2B5EF4-FFF2-40B4-BE49-F238E27FC236}">
+                <a16:creationId xmlns:a16="http://schemas.microsoft.com/office/drawing/2014/main" id="{69227147-1B23-4C79-AB39-AADABF45E6BF}"/>
               </a:ext>
             </a:extLst>
           </p:cNvPr>
@@ -6387,8 +6465,8 @@
           <p:nvPr/>
         </p:nvSpPr>
         <p:spPr>
-          <a:xfrm>
-            <a:off x="2708366" y="2835887"/>
+          <a:xfrm rot="10800000">
+            <a:off x="3202492" y="5275471"/>
             <a:ext cx="1158240" cy="324075"/>
           </a:xfrm>
           <a:prstGeom prst="rightArrow">
@@ -6422,10 +6500,10 @@
       </p:sp>
       <p:sp>
         <p:nvSpPr>
-          <p:cNvPr id="15" name="pole tekstowe 14">
+          <p:cNvPr id="26" name="pole tekstowe 25">
             <a:extLst>
               <a:ext uri="{FF2B5EF4-FFF2-40B4-BE49-F238E27FC236}">
-                <a16:creationId xmlns:a16="http://schemas.microsoft.com/office/drawing/2014/main" id="{D6DE99AB-5AA9-4592-A22E-A12F892B1B2A}"/>
+                <a16:creationId xmlns:a16="http://schemas.microsoft.com/office/drawing/2014/main" id="{AC9D4ED4-CC2D-41A0-AE13-D31D53B6C26E}"/>
               </a:ext>
             </a:extLst>
           </p:cNvPr>
@@ -6434,8 +6512,8 @@
         </p:nvSpPr>
         <p:spPr>
           <a:xfrm>
-            <a:off x="2708366" y="2466555"/>
-            <a:ext cx="1098378" cy="369332"/>
+            <a:off x="3191546" y="5532534"/>
+            <a:ext cx="1322798" cy="369332"/>
           </a:xfrm>
           <a:prstGeom prst="rect">
             <a:avLst/>
@@ -6450,339 +6528,45 @@
           <a:p>
             <a:r>
               <a:rPr lang="pl-PL" dirty="0"/>
-              <a:t>korzysta</a:t>
-            </a:r>
-          </a:p>
-        </p:txBody>
-      </p:sp>
-      <p:sp>
-        <p:nvSpPr>
-          <p:cNvPr id="16" name="Strzałka: w prawo 15">
+              <a:t>odpowiada</a:t>
+            </a:r>
+          </a:p>
+        </p:txBody>
+      </p:sp>
+      <p:pic>
+        <p:nvPicPr>
+          <p:cNvPr id="27" name="Obraz 26">
             <a:extLst>
               <a:ext uri="{FF2B5EF4-FFF2-40B4-BE49-F238E27FC236}">
-                <a16:creationId xmlns:a16="http://schemas.microsoft.com/office/drawing/2014/main" id="{E6839D4B-FFA6-46CD-BBBE-F4DBA8DBE385}"/>
+                <a16:creationId xmlns:a16="http://schemas.microsoft.com/office/drawing/2014/main" id="{374D52F0-9196-44C9-B821-78242C54DC2A}"/>
               </a:ext>
             </a:extLst>
           </p:cNvPr>
-          <p:cNvSpPr/>
+          <p:cNvPicPr>
+            <a:picLocks noChangeAspect="1"/>
+          </p:cNvPicPr>
           <p:nvPr/>
-        </p:nvSpPr>
-        <p:spPr>
-          <a:xfrm rot="2573836">
-            <a:off x="5750981" y="3226499"/>
-            <a:ext cx="1158240" cy="324075"/>
-          </a:xfrm>
-          <a:prstGeom prst="rightArrow">
-            <a:avLst/>
-          </a:prstGeom>
-        </p:spPr>
-        <p:style>
-          <a:lnRef idx="2">
-            <a:schemeClr val="accent1">
-              <a:shade val="50000"/>
-            </a:schemeClr>
-          </a:lnRef>
-          <a:fillRef idx="1">
-            <a:schemeClr val="accent1"/>
-          </a:fillRef>
-          <a:effectRef idx="0">
-            <a:schemeClr val="accent1"/>
-          </a:effectRef>
-          <a:fontRef idx="minor">
-            <a:schemeClr val="lt1"/>
-          </a:fontRef>
-        </p:style>
-        <p:txBody>
-          <a:bodyPr rtlCol="0" anchor="ctr"/>
-          <a:lstStyle/>
-          <a:p>
-            <a:pPr algn="ctr"/>
-            <a:endParaRPr lang="pl-PL"/>
-          </a:p>
-        </p:txBody>
-      </p:sp>
-      <p:sp>
-        <p:nvSpPr>
-          <p:cNvPr id="17" name="pole tekstowe 16">
-            <a:extLst>
-              <a:ext uri="{FF2B5EF4-FFF2-40B4-BE49-F238E27FC236}">
-                <a16:creationId xmlns:a16="http://schemas.microsoft.com/office/drawing/2014/main" id="{C07615AC-DD3B-4B8A-AAEA-9D022C63BEF7}"/>
-              </a:ext>
-            </a:extLst>
-          </p:cNvPr>
-          <p:cNvSpPr txBox="1"/>
-          <p:nvPr/>
-        </p:nvSpPr>
+        </p:nvPicPr>
+        <p:blipFill>
+          <a:blip r:embed="rId2"/>
+          <a:stretch>
+            <a:fillRect/>
+          </a:stretch>
+        </p:blipFill>
         <p:spPr>
           <a:xfrm>
-            <a:off x="6310649" y="2939953"/>
-            <a:ext cx="1107996" cy="369332"/>
+            <a:off x="6246270" y="2069138"/>
+            <a:ext cx="3929805" cy="2335507"/>
           </a:xfrm>
           <a:prstGeom prst="rect">
             <a:avLst/>
           </a:prstGeom>
-          <a:noFill/>
-        </p:spPr>
-        <p:txBody>
-          <a:bodyPr wrap="none" rtlCol="0">
-            <a:spAutoFit/>
-          </a:bodyPr>
-          <a:lstStyle/>
-          <a:p>
-            <a:r>
-              <a:rPr lang="pl-PL" dirty="0"/>
-              <a:t>generuje</a:t>
-            </a:r>
-          </a:p>
-        </p:txBody>
-      </p:sp>
-      <p:sp>
-        <p:nvSpPr>
-          <p:cNvPr id="18" name="Strzałka: w prawo 17">
-            <a:extLst>
-              <a:ext uri="{FF2B5EF4-FFF2-40B4-BE49-F238E27FC236}">
-                <a16:creationId xmlns:a16="http://schemas.microsoft.com/office/drawing/2014/main" id="{80F10ADF-FDE6-4DF7-94C5-7F3FA399ED01}"/>
-              </a:ext>
-            </a:extLst>
-          </p:cNvPr>
-          <p:cNvSpPr/>
-          <p:nvPr/>
-        </p:nvSpPr>
-        <p:spPr>
-          <a:xfrm rot="7973592">
-            <a:off x="4999644" y="4491847"/>
-            <a:ext cx="1158240" cy="324075"/>
-          </a:xfrm>
-          <a:prstGeom prst="rightArrow">
-            <a:avLst/>
-          </a:prstGeom>
-        </p:spPr>
-        <p:style>
-          <a:lnRef idx="2">
-            <a:schemeClr val="accent1">
-              <a:shade val="50000"/>
-            </a:schemeClr>
-          </a:lnRef>
-          <a:fillRef idx="1">
-            <a:schemeClr val="accent1"/>
-          </a:fillRef>
-          <a:effectRef idx="0">
-            <a:schemeClr val="accent1"/>
-          </a:effectRef>
-          <a:fontRef idx="minor">
-            <a:schemeClr val="lt1"/>
-          </a:fontRef>
-        </p:style>
-        <p:txBody>
-          <a:bodyPr rtlCol="0" anchor="ctr"/>
-          <a:lstStyle/>
-          <a:p>
-            <a:pPr algn="ctr"/>
-            <a:endParaRPr lang="pl-PL"/>
-          </a:p>
-        </p:txBody>
-      </p:sp>
-      <p:sp>
-        <p:nvSpPr>
-          <p:cNvPr id="19" name="pole tekstowe 18">
-            <a:extLst>
-              <a:ext uri="{FF2B5EF4-FFF2-40B4-BE49-F238E27FC236}">
-                <a16:creationId xmlns:a16="http://schemas.microsoft.com/office/drawing/2014/main" id="{3390D1A1-B34A-4443-A97B-C88D00349D84}"/>
-              </a:ext>
-            </a:extLst>
-          </p:cNvPr>
-          <p:cNvSpPr txBox="1"/>
-          <p:nvPr/>
-        </p:nvSpPr>
-        <p:spPr>
-          <a:xfrm>
-            <a:off x="4470768" y="4304525"/>
-            <a:ext cx="1107996" cy="369332"/>
-          </a:xfrm>
-          <a:prstGeom prst="rect">
-            <a:avLst/>
-          </a:prstGeom>
-          <a:noFill/>
-        </p:spPr>
-        <p:txBody>
-          <a:bodyPr wrap="none" rtlCol="0">
-            <a:spAutoFit/>
-          </a:bodyPr>
-          <a:lstStyle/>
-          <a:p>
-            <a:r>
-              <a:rPr lang="pl-PL" dirty="0"/>
-              <a:t>generuje</a:t>
-            </a:r>
-          </a:p>
-        </p:txBody>
-      </p:sp>
-      <p:sp>
-        <p:nvSpPr>
-          <p:cNvPr id="20" name="Strzałka: w prawo 19">
-            <a:extLst>
-              <a:ext uri="{FF2B5EF4-FFF2-40B4-BE49-F238E27FC236}">
-                <a16:creationId xmlns:a16="http://schemas.microsoft.com/office/drawing/2014/main" id="{3F8B85F8-F2C5-470A-8B8B-AEE52E052CCC}"/>
-              </a:ext>
-            </a:extLst>
-          </p:cNvPr>
-          <p:cNvSpPr/>
-          <p:nvPr/>
-        </p:nvSpPr>
-        <p:spPr>
-          <a:xfrm rot="2573836">
-            <a:off x="7871517" y="4506980"/>
-            <a:ext cx="1158240" cy="324075"/>
-          </a:xfrm>
-          <a:prstGeom prst="rightArrow">
-            <a:avLst/>
-          </a:prstGeom>
-        </p:spPr>
-        <p:style>
-          <a:lnRef idx="2">
-            <a:schemeClr val="accent1">
-              <a:shade val="50000"/>
-            </a:schemeClr>
-          </a:lnRef>
-          <a:fillRef idx="1">
-            <a:schemeClr val="accent1"/>
-          </a:fillRef>
-          <a:effectRef idx="0">
-            <a:schemeClr val="accent1"/>
-          </a:effectRef>
-          <a:fontRef idx="minor">
-            <a:schemeClr val="lt1"/>
-          </a:fontRef>
-        </p:style>
-        <p:txBody>
-          <a:bodyPr rtlCol="0" anchor="ctr"/>
-          <a:lstStyle/>
-          <a:p>
-            <a:pPr algn="ctr"/>
-            <a:endParaRPr lang="pl-PL"/>
-          </a:p>
-        </p:txBody>
-      </p:sp>
-      <p:sp>
-        <p:nvSpPr>
-          <p:cNvPr id="21" name="pole tekstowe 20">
-            <a:extLst>
-              <a:ext uri="{FF2B5EF4-FFF2-40B4-BE49-F238E27FC236}">
-                <a16:creationId xmlns:a16="http://schemas.microsoft.com/office/drawing/2014/main" id="{5D14E219-10B8-4F97-8728-E121B3373D70}"/>
-              </a:ext>
-            </a:extLst>
-          </p:cNvPr>
-          <p:cNvSpPr txBox="1"/>
-          <p:nvPr/>
-        </p:nvSpPr>
-        <p:spPr>
-          <a:xfrm>
-            <a:off x="8431185" y="4220434"/>
-            <a:ext cx="1388522" cy="369332"/>
-          </a:xfrm>
-          <a:prstGeom prst="rect">
-            <a:avLst/>
-          </a:prstGeom>
-          <a:noFill/>
-        </p:spPr>
-        <p:txBody>
-          <a:bodyPr wrap="none" rtlCol="0">
-            <a:spAutoFit/>
-          </a:bodyPr>
-          <a:lstStyle/>
-          <a:p>
-            <a:r>
-              <a:rPr lang="pl-PL" dirty="0"/>
-              <a:t>aktualizuje</a:t>
-            </a:r>
-          </a:p>
-        </p:txBody>
-      </p:sp>
-      <p:sp>
-        <p:nvSpPr>
-          <p:cNvPr id="22" name="Strzałka: w prawo 21">
-            <a:extLst>
-              <a:ext uri="{FF2B5EF4-FFF2-40B4-BE49-F238E27FC236}">
-                <a16:creationId xmlns:a16="http://schemas.microsoft.com/office/drawing/2014/main" id="{851C729A-CA0A-4A4E-8078-307DEBAFA466}"/>
-              </a:ext>
-            </a:extLst>
-          </p:cNvPr>
-          <p:cNvSpPr/>
-          <p:nvPr/>
-        </p:nvSpPr>
-        <p:spPr>
-          <a:xfrm>
-            <a:off x="6405155" y="5525931"/>
-            <a:ext cx="1158240" cy="324075"/>
-          </a:xfrm>
-          <a:prstGeom prst="rightArrow">
-            <a:avLst/>
-          </a:prstGeom>
-        </p:spPr>
-        <p:style>
-          <a:lnRef idx="2">
-            <a:schemeClr val="accent1">
-              <a:shade val="50000"/>
-            </a:schemeClr>
-          </a:lnRef>
-          <a:fillRef idx="1">
-            <a:schemeClr val="accent1"/>
-          </a:fillRef>
-          <a:effectRef idx="0">
-            <a:schemeClr val="accent1"/>
-          </a:effectRef>
-          <a:fontRef idx="minor">
-            <a:schemeClr val="lt1"/>
-          </a:fontRef>
-        </p:style>
-        <p:txBody>
-          <a:bodyPr rtlCol="0" anchor="ctr"/>
-          <a:lstStyle/>
-          <a:p>
-            <a:pPr algn="ctr"/>
-            <a:endParaRPr lang="pl-PL"/>
-          </a:p>
-        </p:txBody>
-      </p:sp>
-      <p:sp>
-        <p:nvSpPr>
-          <p:cNvPr id="23" name="pole tekstowe 22">
-            <a:extLst>
-              <a:ext uri="{FF2B5EF4-FFF2-40B4-BE49-F238E27FC236}">
-                <a16:creationId xmlns:a16="http://schemas.microsoft.com/office/drawing/2014/main" id="{2C837667-31BB-4660-9E3E-15FEF5E90769}"/>
-              </a:ext>
-            </a:extLst>
-          </p:cNvPr>
-          <p:cNvSpPr txBox="1"/>
-          <p:nvPr/>
-        </p:nvSpPr>
-        <p:spPr>
-          <a:xfrm>
-            <a:off x="6290014" y="5188450"/>
-            <a:ext cx="1388522" cy="369332"/>
-          </a:xfrm>
-          <a:prstGeom prst="rect">
-            <a:avLst/>
-          </a:prstGeom>
-          <a:noFill/>
-        </p:spPr>
-        <p:txBody>
-          <a:bodyPr wrap="none" rtlCol="0">
-            <a:spAutoFit/>
-          </a:bodyPr>
-          <a:lstStyle/>
-          <a:p>
-            <a:r>
-              <a:rPr lang="pl-PL" dirty="0"/>
-              <a:t>aktualizuje</a:t>
-            </a:r>
-          </a:p>
-        </p:txBody>
-      </p:sp>
+        </p:spPr>
+      </p:pic>
     </p:spTree>
     <p:extLst>
       <p:ext uri="{BB962C8B-B14F-4D97-AF65-F5344CB8AC3E}">
-        <p14:creationId xmlns:p14="http://schemas.microsoft.com/office/powerpoint/2010/main" val="1277708116"/>
+        <p14:creationId xmlns:p14="http://schemas.microsoft.com/office/powerpoint/2010/main" val="1061040325"/>
       </p:ext>
     </p:extLst>
   </p:cSld>

</xml_diff>